<commit_message>
Added Modules and Components
</commit_message>
<xml_diff>
--- a/Angular Presentation.pptx
+++ b/Angular Presentation.pptx
@@ -19,6 +19,8 @@
     <p:sldId id="290" r:id="rId13"/>
     <p:sldId id="291" r:id="rId14"/>
     <p:sldId id="260" r:id="rId15"/>
+    <p:sldId id="292" r:id="rId16"/>
+    <p:sldId id="293" r:id="rId17"/>
   </p:sldIdLst>
   <p:sldSz cx="12192000" cy="6858000"/>
   <p:notesSz cx="6858000" cy="9144000"/>
@@ -14172,6 +14174,24 @@
               <a:rPr lang="en-IN" sz="2000" dirty="0" smtClean="0"/>
               <a:t>Modules</a:t>
             </a:r>
+          </a:p>
+          <a:p>
+            <a:pPr marL="342900" indent="-342900">
+              <a:buAutoNum type="arabicPeriod"/>
+            </a:pPr>
+            <a:r>
+              <a:rPr lang="en-IN" dirty="0" smtClean="0"/>
+              <a:t>Components</a:t>
+            </a:r>
+          </a:p>
+          <a:p>
+            <a:pPr marL="342900" indent="-342900">
+              <a:buAutoNum type="arabicPeriod"/>
+            </a:pPr>
+            <a:r>
+              <a:rPr lang="en-IN" sz="2000" smtClean="0"/>
+              <a:t>Services</a:t>
+            </a:r>
             <a:endParaRPr lang="en-IN" sz="2000" dirty="0"/>
           </a:p>
         </p:txBody>
@@ -14180,6 +14200,1048 @@
     <p:extLst>
       <p:ext uri="{BB962C8B-B14F-4D97-AF65-F5344CB8AC3E}">
         <p14:creationId xmlns:p14="http://schemas.microsoft.com/office/powerpoint/2010/main" val="360348243"/>
+      </p:ext>
+    </p:extLst>
+  </p:cSld>
+  <p:clrMapOvr>
+    <a:masterClrMapping/>
+  </p:clrMapOvr>
+  <p:timing>
+    <p:tnLst>
+      <p:par>
+        <p:cTn id="1" dur="indefinite" restart="never" nodeType="tmRoot"/>
+      </p:par>
+    </p:tnLst>
+  </p:timing>
+</p:sld>
+</file>
+
+<file path=ppt/slides/slide15.xml><?xml version="1.0" encoding="utf-8"?>
+<p:sld xmlns:a="http://schemas.openxmlformats.org/drawingml/2006/main" xmlns:r="http://schemas.openxmlformats.org/officeDocument/2006/relationships" xmlns:p="http://schemas.openxmlformats.org/presentationml/2006/main">
+  <p:cSld>
+    <p:spTree>
+      <p:nvGrpSpPr>
+        <p:cNvPr id="1" name=""/>
+        <p:cNvGrpSpPr/>
+        <p:nvPr/>
+      </p:nvGrpSpPr>
+      <p:grpSpPr>
+        <a:xfrm>
+          <a:off x="0" y="0"/>
+          <a:ext cx="0" cy="0"/>
+          <a:chOff x="0" y="0"/>
+          <a:chExt cx="0" cy="0"/>
+        </a:xfrm>
+      </p:grpSpPr>
+      <p:sp>
+        <p:nvSpPr>
+          <p:cNvPr id="4" name="Rectangle 3"/>
+          <p:cNvSpPr/>
+          <p:nvPr/>
+        </p:nvSpPr>
+        <p:spPr>
+          <a:xfrm>
+            <a:off x="7920319" y="2514600"/>
+            <a:ext cx="4020669" cy="3697941"/>
+          </a:xfrm>
+          <a:prstGeom prst="rect">
+            <a:avLst/>
+          </a:prstGeom>
+        </p:spPr>
+        <p:style>
+          <a:lnRef idx="2">
+            <a:schemeClr val="accent1">
+              <a:shade val="50000"/>
+            </a:schemeClr>
+          </a:lnRef>
+          <a:fillRef idx="1">
+            <a:schemeClr val="accent1"/>
+          </a:fillRef>
+          <a:effectRef idx="0">
+            <a:schemeClr val="accent1"/>
+          </a:effectRef>
+          <a:fontRef idx="minor">
+            <a:schemeClr val="lt1"/>
+          </a:fontRef>
+        </p:style>
+        <p:txBody>
+          <a:bodyPr rtlCol="0" anchor="ctr"/>
+          <a:lstStyle/>
+          <a:p>
+            <a:pPr algn="ctr"/>
+            <a:endParaRPr lang="en-IN"/>
+          </a:p>
+        </p:txBody>
+      </p:sp>
+      <p:sp>
+        <p:nvSpPr>
+          <p:cNvPr id="10" name="Rectangle 9"/>
+          <p:cNvSpPr/>
+          <p:nvPr/>
+        </p:nvSpPr>
+        <p:spPr>
+          <a:xfrm>
+            <a:off x="8122023" y="3475853"/>
+            <a:ext cx="3617259" cy="2427406"/>
+          </a:xfrm>
+          <a:prstGeom prst="rect">
+            <a:avLst/>
+          </a:prstGeom>
+          <a:solidFill>
+            <a:schemeClr val="accent4">
+              <a:lumMod val="20000"/>
+              <a:lumOff val="80000"/>
+            </a:schemeClr>
+          </a:solidFill>
+        </p:spPr>
+        <p:style>
+          <a:lnRef idx="2">
+            <a:schemeClr val="accent1">
+              <a:shade val="50000"/>
+            </a:schemeClr>
+          </a:lnRef>
+          <a:fillRef idx="1">
+            <a:schemeClr val="accent1"/>
+          </a:fillRef>
+          <a:effectRef idx="0">
+            <a:schemeClr val="accent1"/>
+          </a:effectRef>
+          <a:fontRef idx="minor">
+            <a:schemeClr val="lt1"/>
+          </a:fontRef>
+        </p:style>
+        <p:txBody>
+          <a:bodyPr rtlCol="0" anchor="ctr"/>
+          <a:lstStyle/>
+          <a:p>
+            <a:pPr algn="ctr"/>
+            <a:endParaRPr lang="en-IN"/>
+          </a:p>
+        </p:txBody>
+      </p:sp>
+      <p:sp>
+        <p:nvSpPr>
+          <p:cNvPr id="2" name="Title 1"/>
+          <p:cNvSpPr>
+            <a:spLocks noGrp="1"/>
+          </p:cNvSpPr>
+          <p:nvPr>
+            <p:ph type="title"/>
+          </p:nvPr>
+        </p:nvSpPr>
+        <p:spPr>
+          <a:xfrm>
+            <a:off x="1154954" y="973668"/>
+            <a:ext cx="9239622" cy="706964"/>
+          </a:xfrm>
+        </p:spPr>
+        <p:txBody>
+          <a:bodyPr/>
+          <a:lstStyle/>
+          <a:p>
+            <a:r>
+              <a:rPr lang="en-IN" b="1" dirty="0" smtClean="0"/>
+              <a:t>2.1 Modules</a:t>
+            </a:r>
+            <a:endParaRPr lang="en-IN" b="1" dirty="0"/>
+          </a:p>
+        </p:txBody>
+      </p:sp>
+      <p:sp>
+        <p:nvSpPr>
+          <p:cNvPr id="3" name="Content Placeholder 2"/>
+          <p:cNvSpPr>
+            <a:spLocks noGrp="1"/>
+          </p:cNvSpPr>
+          <p:nvPr>
+            <p:ph sz="half" idx="2"/>
+          </p:nvPr>
+        </p:nvSpPr>
+        <p:spPr>
+          <a:xfrm>
+            <a:off x="860612" y="2366682"/>
+            <a:ext cx="7059707" cy="4047565"/>
+          </a:xfrm>
+        </p:spPr>
+        <p:txBody>
+          <a:bodyPr>
+            <a:normAutofit/>
+          </a:bodyPr>
+          <a:lstStyle/>
+          <a:p>
+            <a:r>
+              <a:rPr lang="en-IN" dirty="0" smtClean="0"/>
+              <a:t>Modules are the first building block of Angular. Angular apps are modular in nature. Angular </a:t>
+            </a:r>
+            <a:r>
+              <a:rPr lang="en-IN" dirty="0"/>
+              <a:t>is a collection of individual </a:t>
+            </a:r>
+            <a:r>
+              <a:rPr lang="en-IN" dirty="0" smtClean="0"/>
+              <a:t>modules.</a:t>
+            </a:r>
+          </a:p>
+          <a:p>
+            <a:r>
+              <a:rPr lang="en-IN" dirty="0" smtClean="0"/>
+              <a:t>Every modules represent a feature area in your application</a:t>
+            </a:r>
+          </a:p>
+          <a:p>
+            <a:r>
+              <a:rPr lang="en-IN" dirty="0" smtClean="0"/>
+              <a:t>User Modules : Contain all user related stuffs and Admin Modules: Contain all admin related stuffs</a:t>
+            </a:r>
+          </a:p>
+          <a:p>
+            <a:r>
+              <a:rPr lang="en-IN" dirty="0" smtClean="0"/>
+              <a:t>These modules can be imported or exported</a:t>
+            </a:r>
+          </a:p>
+          <a:p>
+            <a:r>
+              <a:rPr lang="en-IN" dirty="0" smtClean="0"/>
+              <a:t>Angular application should have minimum module which is called root module and here by convention we call it as </a:t>
+            </a:r>
+            <a:r>
+              <a:rPr lang="en-IN" b="1" dirty="0" smtClean="0"/>
+              <a:t>APP Module</a:t>
+            </a:r>
+          </a:p>
+          <a:p>
+            <a:r>
+              <a:rPr lang="en-IN" dirty="0" smtClean="0"/>
+              <a:t>Each module is made up of Components &amp; Services</a:t>
+            </a:r>
+            <a:endParaRPr lang="en-IN" dirty="0"/>
+          </a:p>
+        </p:txBody>
+      </p:sp>
+      <p:sp>
+        <p:nvSpPr>
+          <p:cNvPr id="5" name="TextBox 4"/>
+          <p:cNvSpPr txBox="1"/>
+          <p:nvPr/>
+        </p:nvSpPr>
+        <p:spPr>
+          <a:xfrm>
+            <a:off x="8700247" y="2743200"/>
+            <a:ext cx="2124635" cy="369332"/>
+          </a:xfrm>
+          <a:prstGeom prst="rect">
+            <a:avLst/>
+          </a:prstGeom>
+          <a:solidFill>
+            <a:schemeClr val="bg1"/>
+          </a:solidFill>
+        </p:spPr>
+        <p:txBody>
+          <a:bodyPr wrap="square" rtlCol="0">
+            <a:spAutoFit/>
+          </a:bodyPr>
+          <a:lstStyle/>
+          <a:p>
+            <a:pPr algn="ctr"/>
+            <a:r>
+              <a:rPr lang="en-IN" b="1" dirty="0" smtClean="0">
+                <a:solidFill>
+                  <a:schemeClr val="accent6">
+                    <a:lumMod val="75000"/>
+                  </a:schemeClr>
+                </a:solidFill>
+              </a:rPr>
+              <a:t>Angular App</a:t>
+            </a:r>
+            <a:endParaRPr lang="en-IN" b="1" dirty="0">
+              <a:solidFill>
+                <a:schemeClr val="accent6">
+                  <a:lumMod val="75000"/>
+                </a:schemeClr>
+              </a:solidFill>
+            </a:endParaRPr>
+          </a:p>
+        </p:txBody>
+      </p:sp>
+      <p:sp>
+        <p:nvSpPr>
+          <p:cNvPr id="6" name="Rectangle 5"/>
+          <p:cNvSpPr/>
+          <p:nvPr/>
+        </p:nvSpPr>
+        <p:spPr>
+          <a:xfrm>
+            <a:off x="8276664" y="4296122"/>
+            <a:ext cx="1398494" cy="1035424"/>
+          </a:xfrm>
+          <a:prstGeom prst="rect">
+            <a:avLst/>
+          </a:prstGeom>
+          <a:solidFill>
+            <a:schemeClr val="accent3">
+              <a:lumMod val="50000"/>
+            </a:schemeClr>
+          </a:solidFill>
+          <a:ln>
+            <a:noFill/>
+          </a:ln>
+        </p:spPr>
+        <p:style>
+          <a:lnRef idx="2">
+            <a:schemeClr val="accent1">
+              <a:shade val="50000"/>
+            </a:schemeClr>
+          </a:lnRef>
+          <a:fillRef idx="1">
+            <a:schemeClr val="accent1"/>
+          </a:fillRef>
+          <a:effectRef idx="0">
+            <a:schemeClr val="accent1"/>
+          </a:effectRef>
+          <a:fontRef idx="minor">
+            <a:schemeClr val="lt1"/>
+          </a:fontRef>
+        </p:style>
+        <p:txBody>
+          <a:bodyPr rtlCol="0" anchor="ctr"/>
+          <a:lstStyle/>
+          <a:p>
+            <a:pPr algn="ctr"/>
+            <a:r>
+              <a:rPr lang="en-IN" dirty="0" smtClean="0"/>
+              <a:t>Module 1 (User Module)</a:t>
+            </a:r>
+            <a:endParaRPr lang="en-IN" dirty="0"/>
+          </a:p>
+        </p:txBody>
+      </p:sp>
+      <p:sp>
+        <p:nvSpPr>
+          <p:cNvPr id="8" name="Rectangle 7"/>
+          <p:cNvSpPr/>
+          <p:nvPr/>
+        </p:nvSpPr>
+        <p:spPr>
+          <a:xfrm>
+            <a:off x="10071846" y="4255781"/>
+            <a:ext cx="1398494" cy="1035424"/>
+          </a:xfrm>
+          <a:prstGeom prst="rect">
+            <a:avLst/>
+          </a:prstGeom>
+          <a:solidFill>
+            <a:srgbClr val="00B050"/>
+          </a:solidFill>
+          <a:ln>
+            <a:noFill/>
+          </a:ln>
+        </p:spPr>
+        <p:style>
+          <a:lnRef idx="2">
+            <a:schemeClr val="accent1">
+              <a:shade val="50000"/>
+            </a:schemeClr>
+          </a:lnRef>
+          <a:fillRef idx="1">
+            <a:schemeClr val="accent1"/>
+          </a:fillRef>
+          <a:effectRef idx="0">
+            <a:schemeClr val="accent1"/>
+          </a:effectRef>
+          <a:fontRef idx="minor">
+            <a:schemeClr val="lt1"/>
+          </a:fontRef>
+        </p:style>
+        <p:txBody>
+          <a:bodyPr rtlCol="0" anchor="ctr"/>
+          <a:lstStyle/>
+          <a:p>
+            <a:pPr algn="ctr"/>
+            <a:r>
+              <a:rPr lang="en-IN" dirty="0" smtClean="0"/>
+              <a:t>Module 2 (Admin Module)</a:t>
+            </a:r>
+            <a:endParaRPr lang="en-IN" dirty="0"/>
+          </a:p>
+        </p:txBody>
+      </p:sp>
+      <p:sp>
+        <p:nvSpPr>
+          <p:cNvPr id="11" name="TextBox 10"/>
+          <p:cNvSpPr txBox="1"/>
+          <p:nvPr/>
+        </p:nvSpPr>
+        <p:spPr>
+          <a:xfrm>
+            <a:off x="9066678" y="3667934"/>
+            <a:ext cx="1593477" cy="369332"/>
+          </a:xfrm>
+          <a:prstGeom prst="rect">
+            <a:avLst/>
+          </a:prstGeom>
+          <a:noFill/>
+        </p:spPr>
+        <p:txBody>
+          <a:bodyPr wrap="square" rtlCol="0">
+            <a:spAutoFit/>
+          </a:bodyPr>
+          <a:lstStyle/>
+          <a:p>
+            <a:r>
+              <a:rPr lang="en-IN" b="1" dirty="0" smtClean="0">
+                <a:solidFill>
+                  <a:schemeClr val="accent5">
+                    <a:lumMod val="75000"/>
+                  </a:schemeClr>
+                </a:solidFill>
+              </a:rPr>
+              <a:t>App Module</a:t>
+            </a:r>
+            <a:endParaRPr lang="en-IN" b="1" dirty="0">
+              <a:solidFill>
+                <a:schemeClr val="accent5">
+                  <a:lumMod val="75000"/>
+                </a:schemeClr>
+              </a:solidFill>
+            </a:endParaRPr>
+          </a:p>
+        </p:txBody>
+      </p:sp>
+      <p:cxnSp>
+        <p:nvCxnSpPr>
+          <p:cNvPr id="13" name="Straight Arrow Connector 12"/>
+          <p:cNvCxnSpPr/>
+          <p:nvPr/>
+        </p:nvCxnSpPr>
+        <p:spPr>
+          <a:xfrm flipV="1">
+            <a:off x="9637263" y="4773493"/>
+            <a:ext cx="452309" cy="2794"/>
+          </a:xfrm>
+          <a:prstGeom prst="straightConnector1">
+            <a:avLst/>
+          </a:prstGeom>
+          <a:ln>
+            <a:headEnd type="triangle"/>
+            <a:tailEnd type="triangle"/>
+          </a:ln>
+        </p:spPr>
+        <p:style>
+          <a:lnRef idx="1">
+            <a:schemeClr val="accent1"/>
+          </a:lnRef>
+          <a:fillRef idx="0">
+            <a:schemeClr val="accent1"/>
+          </a:fillRef>
+          <a:effectRef idx="0">
+            <a:schemeClr val="accent1"/>
+          </a:effectRef>
+          <a:fontRef idx="minor">
+            <a:schemeClr val="tx1"/>
+          </a:fontRef>
+        </p:style>
+      </p:cxnSp>
+      <p:sp>
+        <p:nvSpPr>
+          <p:cNvPr id="15" name="TextBox 14"/>
+          <p:cNvSpPr txBox="1"/>
+          <p:nvPr/>
+        </p:nvSpPr>
+        <p:spPr>
+          <a:xfrm>
+            <a:off x="9063318" y="5424509"/>
+            <a:ext cx="1761564" cy="369332"/>
+          </a:xfrm>
+          <a:prstGeom prst="rect">
+            <a:avLst/>
+          </a:prstGeom>
+          <a:noFill/>
+        </p:spPr>
+        <p:txBody>
+          <a:bodyPr wrap="square" rtlCol="0">
+            <a:spAutoFit/>
+          </a:bodyPr>
+          <a:lstStyle/>
+          <a:p>
+            <a:r>
+              <a:rPr lang="en-IN" b="1" dirty="0" smtClean="0"/>
+              <a:t>Import/export</a:t>
+            </a:r>
+            <a:endParaRPr lang="en-IN" b="1" dirty="0"/>
+          </a:p>
+        </p:txBody>
+      </p:sp>
+    </p:spTree>
+    <p:extLst>
+      <p:ext uri="{BB962C8B-B14F-4D97-AF65-F5344CB8AC3E}">
+        <p14:creationId xmlns:p14="http://schemas.microsoft.com/office/powerpoint/2010/main" val="2360984490"/>
+      </p:ext>
+    </p:extLst>
+  </p:cSld>
+  <p:clrMapOvr>
+    <a:masterClrMapping/>
+  </p:clrMapOvr>
+  <p:timing>
+    <p:tnLst>
+      <p:par>
+        <p:cTn id="1" dur="indefinite" restart="never" nodeType="tmRoot"/>
+      </p:par>
+    </p:tnLst>
+  </p:timing>
+</p:sld>
+</file>
+
+<file path=ppt/slides/slide16.xml><?xml version="1.0" encoding="utf-8"?>
+<p:sld xmlns:a="http://schemas.openxmlformats.org/drawingml/2006/main" xmlns:r="http://schemas.openxmlformats.org/officeDocument/2006/relationships" xmlns:p="http://schemas.openxmlformats.org/presentationml/2006/main">
+  <p:cSld>
+    <p:spTree>
+      <p:nvGrpSpPr>
+        <p:cNvPr id="1" name=""/>
+        <p:cNvGrpSpPr/>
+        <p:nvPr/>
+      </p:nvGrpSpPr>
+      <p:grpSpPr>
+        <a:xfrm>
+          <a:off x="0" y="0"/>
+          <a:ext cx="0" cy="0"/>
+          <a:chOff x="0" y="0"/>
+          <a:chExt cx="0" cy="0"/>
+        </a:xfrm>
+      </p:grpSpPr>
+      <p:sp>
+        <p:nvSpPr>
+          <p:cNvPr id="4" name="Rectangle 3"/>
+          <p:cNvSpPr/>
+          <p:nvPr/>
+        </p:nvSpPr>
+        <p:spPr>
+          <a:xfrm>
+            <a:off x="7920319" y="2514600"/>
+            <a:ext cx="4020669" cy="3697941"/>
+          </a:xfrm>
+          <a:prstGeom prst="rect">
+            <a:avLst/>
+          </a:prstGeom>
+        </p:spPr>
+        <p:style>
+          <a:lnRef idx="2">
+            <a:schemeClr val="accent1">
+              <a:shade val="50000"/>
+            </a:schemeClr>
+          </a:lnRef>
+          <a:fillRef idx="1">
+            <a:schemeClr val="accent1"/>
+          </a:fillRef>
+          <a:effectRef idx="0">
+            <a:schemeClr val="accent1"/>
+          </a:effectRef>
+          <a:fontRef idx="minor">
+            <a:schemeClr val="lt1"/>
+          </a:fontRef>
+        </p:style>
+        <p:txBody>
+          <a:bodyPr rtlCol="0" anchor="ctr"/>
+          <a:lstStyle/>
+          <a:p>
+            <a:pPr algn="ctr"/>
+            <a:endParaRPr lang="en-IN"/>
+          </a:p>
+        </p:txBody>
+      </p:sp>
+      <p:sp>
+        <p:nvSpPr>
+          <p:cNvPr id="10" name="Rectangle 9"/>
+          <p:cNvSpPr/>
+          <p:nvPr/>
+        </p:nvSpPr>
+        <p:spPr>
+          <a:xfrm>
+            <a:off x="8135470" y="3559790"/>
+            <a:ext cx="3617259" cy="2427406"/>
+          </a:xfrm>
+          <a:prstGeom prst="rect">
+            <a:avLst/>
+          </a:prstGeom>
+          <a:solidFill>
+            <a:schemeClr val="accent4">
+              <a:lumMod val="20000"/>
+              <a:lumOff val="80000"/>
+            </a:schemeClr>
+          </a:solidFill>
+        </p:spPr>
+        <p:style>
+          <a:lnRef idx="2">
+            <a:schemeClr val="accent1">
+              <a:shade val="50000"/>
+            </a:schemeClr>
+          </a:lnRef>
+          <a:fillRef idx="1">
+            <a:schemeClr val="accent1"/>
+          </a:fillRef>
+          <a:effectRef idx="0">
+            <a:schemeClr val="accent1"/>
+          </a:effectRef>
+          <a:fontRef idx="minor">
+            <a:schemeClr val="lt1"/>
+          </a:fontRef>
+        </p:style>
+        <p:txBody>
+          <a:bodyPr rtlCol="0" anchor="ctr"/>
+          <a:lstStyle/>
+          <a:p>
+            <a:pPr algn="ctr"/>
+            <a:endParaRPr lang="en-IN"/>
+          </a:p>
+        </p:txBody>
+      </p:sp>
+      <p:sp>
+        <p:nvSpPr>
+          <p:cNvPr id="2" name="Title 1"/>
+          <p:cNvSpPr>
+            <a:spLocks noGrp="1"/>
+          </p:cNvSpPr>
+          <p:nvPr>
+            <p:ph type="title"/>
+          </p:nvPr>
+        </p:nvSpPr>
+        <p:spPr>
+          <a:xfrm>
+            <a:off x="1154954" y="973668"/>
+            <a:ext cx="9239622" cy="706964"/>
+          </a:xfrm>
+        </p:spPr>
+        <p:txBody>
+          <a:bodyPr/>
+          <a:lstStyle/>
+          <a:p>
+            <a:r>
+              <a:rPr lang="en-IN" b="1" dirty="0" smtClean="0"/>
+              <a:t>2.2 Components</a:t>
+            </a:r>
+            <a:endParaRPr lang="en-IN" b="1" dirty="0"/>
+          </a:p>
+        </p:txBody>
+      </p:sp>
+      <p:sp>
+        <p:nvSpPr>
+          <p:cNvPr id="3" name="Content Placeholder 2"/>
+          <p:cNvSpPr>
+            <a:spLocks noGrp="1"/>
+          </p:cNvSpPr>
+          <p:nvPr>
+            <p:ph sz="half" idx="2"/>
+          </p:nvPr>
+        </p:nvSpPr>
+        <p:spPr>
+          <a:xfrm>
+            <a:off x="860612" y="2366682"/>
+            <a:ext cx="7059707" cy="4276165"/>
+          </a:xfrm>
+        </p:spPr>
+        <p:txBody>
+          <a:bodyPr>
+            <a:normAutofit fontScale="85000" lnSpcReduction="20000"/>
+          </a:bodyPr>
+          <a:lstStyle/>
+          <a:p>
+            <a:pPr>
+              <a:lnSpc>
+                <a:spcPct val="120000"/>
+              </a:lnSpc>
+            </a:pPr>
+            <a:r>
+              <a:rPr lang="en-IN" dirty="0" smtClean="0"/>
+              <a:t>Components controls a portion of the view in the browser</a:t>
+            </a:r>
+          </a:p>
+          <a:p>
+            <a:pPr>
+              <a:lnSpc>
+                <a:spcPct val="120000"/>
+              </a:lnSpc>
+            </a:pPr>
+            <a:r>
+              <a:rPr lang="en-IN" dirty="0" smtClean="0"/>
+              <a:t>For </a:t>
+            </a:r>
+            <a:r>
+              <a:rPr lang="en-IN" dirty="0" err="1" smtClean="0"/>
+              <a:t>Eg</a:t>
+            </a:r>
+            <a:r>
+              <a:rPr lang="en-IN" dirty="0" smtClean="0"/>
+              <a:t>: We can have components</a:t>
+            </a:r>
+          </a:p>
+          <a:p>
+            <a:pPr lvl="1">
+              <a:lnSpc>
+                <a:spcPct val="120000"/>
+              </a:lnSpc>
+            </a:pPr>
+            <a:r>
+              <a:rPr lang="en-IN" dirty="0" smtClean="0"/>
+              <a:t>1. Navigation Component</a:t>
+            </a:r>
+          </a:p>
+          <a:p>
+            <a:pPr lvl="1">
+              <a:lnSpc>
+                <a:spcPct val="120000"/>
+              </a:lnSpc>
+            </a:pPr>
+            <a:r>
+              <a:rPr lang="en-IN" dirty="0" smtClean="0"/>
+              <a:t>2. Side Bar Component</a:t>
+            </a:r>
+          </a:p>
+          <a:p>
+            <a:pPr lvl="1">
+              <a:lnSpc>
+                <a:spcPct val="120000"/>
+              </a:lnSpc>
+            </a:pPr>
+            <a:r>
+              <a:rPr lang="en-IN" dirty="0" smtClean="0"/>
+              <a:t>3. Main Content Component</a:t>
+            </a:r>
+          </a:p>
+          <a:p>
+            <a:pPr>
+              <a:lnSpc>
+                <a:spcPct val="120000"/>
+              </a:lnSpc>
+            </a:pPr>
+            <a:r>
+              <a:rPr lang="en-IN" dirty="0" smtClean="0"/>
+              <a:t>An Angular app should have at least one component that is root component of the application which is conventionally called as</a:t>
+            </a:r>
+            <a:r>
+              <a:rPr lang="en-IN" b="1" dirty="0" smtClean="0"/>
+              <a:t> </a:t>
+            </a:r>
+            <a:r>
+              <a:rPr lang="en-IN" b="1" dirty="0" err="1" smtClean="0"/>
+              <a:t>AppComponent</a:t>
+            </a:r>
+            <a:endParaRPr lang="en-IN" b="1" dirty="0" smtClean="0"/>
+          </a:p>
+          <a:p>
+            <a:pPr>
+              <a:lnSpc>
+                <a:spcPct val="120000"/>
+              </a:lnSpc>
+            </a:pPr>
+            <a:r>
+              <a:rPr lang="en-IN" dirty="0" smtClean="0"/>
+              <a:t>All the component will be nested in root component</a:t>
+            </a:r>
+          </a:p>
+          <a:p>
+            <a:pPr>
+              <a:lnSpc>
+                <a:spcPct val="120000"/>
+              </a:lnSpc>
+            </a:pPr>
+            <a:r>
+              <a:rPr lang="en-IN" dirty="0" smtClean="0"/>
+              <a:t>Every Component have</a:t>
+            </a:r>
+          </a:p>
+          <a:p>
+            <a:pPr lvl="1">
+              <a:lnSpc>
+                <a:spcPct val="120000"/>
+              </a:lnSpc>
+            </a:pPr>
+            <a:r>
+              <a:rPr lang="en-IN" dirty="0" smtClean="0"/>
+              <a:t>HTML template to display in browser</a:t>
+            </a:r>
+          </a:p>
+          <a:p>
+            <a:pPr lvl="1">
+              <a:lnSpc>
+                <a:spcPct val="120000"/>
+              </a:lnSpc>
+            </a:pPr>
+            <a:r>
+              <a:rPr lang="en-IN" dirty="0" smtClean="0"/>
+              <a:t>Class to control the component</a:t>
+            </a:r>
+          </a:p>
+          <a:p>
+            <a:pPr lvl="1">
+              <a:lnSpc>
+                <a:spcPct val="120000"/>
+              </a:lnSpc>
+            </a:pPr>
+            <a:r>
+              <a:rPr lang="en-IN" dirty="0" smtClean="0"/>
+              <a:t>Styles to styling the HTML</a:t>
+            </a:r>
+            <a:endParaRPr lang="en-IN" dirty="0"/>
+          </a:p>
+        </p:txBody>
+      </p:sp>
+      <p:sp>
+        <p:nvSpPr>
+          <p:cNvPr id="5" name="TextBox 4"/>
+          <p:cNvSpPr txBox="1"/>
+          <p:nvPr/>
+        </p:nvSpPr>
+        <p:spPr>
+          <a:xfrm>
+            <a:off x="8700247" y="2743200"/>
+            <a:ext cx="2124635" cy="369332"/>
+          </a:xfrm>
+          <a:prstGeom prst="rect">
+            <a:avLst/>
+          </a:prstGeom>
+          <a:solidFill>
+            <a:schemeClr val="bg1"/>
+          </a:solidFill>
+        </p:spPr>
+        <p:txBody>
+          <a:bodyPr wrap="square" rtlCol="0">
+            <a:spAutoFit/>
+          </a:bodyPr>
+          <a:lstStyle/>
+          <a:p>
+            <a:pPr algn="ctr"/>
+            <a:r>
+              <a:rPr lang="en-IN" b="1" dirty="0" smtClean="0">
+                <a:solidFill>
+                  <a:schemeClr val="accent6">
+                    <a:lumMod val="75000"/>
+                  </a:schemeClr>
+                </a:solidFill>
+              </a:rPr>
+              <a:t>Angular App</a:t>
+            </a:r>
+            <a:endParaRPr lang="en-IN" b="1" dirty="0">
+              <a:solidFill>
+                <a:schemeClr val="accent6">
+                  <a:lumMod val="75000"/>
+                </a:schemeClr>
+              </a:solidFill>
+            </a:endParaRPr>
+          </a:p>
+        </p:txBody>
+      </p:sp>
+      <p:sp>
+        <p:nvSpPr>
+          <p:cNvPr id="6" name="Rectangle 5"/>
+          <p:cNvSpPr/>
+          <p:nvPr/>
+        </p:nvSpPr>
+        <p:spPr>
+          <a:xfrm>
+            <a:off x="8276664" y="4296122"/>
+            <a:ext cx="1398494" cy="1035424"/>
+          </a:xfrm>
+          <a:prstGeom prst="rect">
+            <a:avLst/>
+          </a:prstGeom>
+          <a:solidFill>
+            <a:schemeClr val="accent3">
+              <a:lumMod val="50000"/>
+            </a:schemeClr>
+          </a:solidFill>
+          <a:ln>
+            <a:noFill/>
+          </a:ln>
+        </p:spPr>
+        <p:style>
+          <a:lnRef idx="2">
+            <a:schemeClr val="accent1">
+              <a:shade val="50000"/>
+            </a:schemeClr>
+          </a:lnRef>
+          <a:fillRef idx="1">
+            <a:schemeClr val="accent1"/>
+          </a:fillRef>
+          <a:effectRef idx="0">
+            <a:schemeClr val="accent1"/>
+          </a:effectRef>
+          <a:fontRef idx="minor">
+            <a:schemeClr val="lt1"/>
+          </a:fontRef>
+        </p:style>
+        <p:txBody>
+          <a:bodyPr rtlCol="0" anchor="ctr"/>
+          <a:lstStyle/>
+          <a:p>
+            <a:pPr algn="ctr"/>
+            <a:r>
+              <a:rPr lang="en-IN" sz="1600" dirty="0" smtClean="0"/>
+              <a:t>Navigation Component</a:t>
+            </a:r>
+            <a:endParaRPr lang="en-IN" sz="1600" dirty="0"/>
+          </a:p>
+        </p:txBody>
+      </p:sp>
+      <p:sp>
+        <p:nvSpPr>
+          <p:cNvPr id="8" name="Rectangle 7"/>
+          <p:cNvSpPr/>
+          <p:nvPr/>
+        </p:nvSpPr>
+        <p:spPr>
+          <a:xfrm>
+            <a:off x="10125634" y="4255781"/>
+            <a:ext cx="1398494" cy="1035424"/>
+          </a:xfrm>
+          <a:prstGeom prst="rect">
+            <a:avLst/>
+          </a:prstGeom>
+          <a:solidFill>
+            <a:srgbClr val="00B050"/>
+          </a:solidFill>
+          <a:ln>
+            <a:noFill/>
+          </a:ln>
+        </p:spPr>
+        <p:style>
+          <a:lnRef idx="2">
+            <a:schemeClr val="accent1">
+              <a:shade val="50000"/>
+            </a:schemeClr>
+          </a:lnRef>
+          <a:fillRef idx="1">
+            <a:schemeClr val="accent1"/>
+          </a:fillRef>
+          <a:effectRef idx="0">
+            <a:schemeClr val="accent1"/>
+          </a:effectRef>
+          <a:fontRef idx="minor">
+            <a:schemeClr val="lt1"/>
+          </a:fontRef>
+        </p:style>
+        <p:txBody>
+          <a:bodyPr rtlCol="0" anchor="ctr"/>
+          <a:lstStyle/>
+          <a:p>
+            <a:pPr algn="ctr"/>
+            <a:r>
+              <a:rPr lang="en-IN" sz="1600" dirty="0" smtClean="0"/>
+              <a:t>Side Bar Component</a:t>
+            </a:r>
+            <a:endParaRPr lang="en-IN" sz="1600" dirty="0"/>
+          </a:p>
+        </p:txBody>
+      </p:sp>
+      <p:sp>
+        <p:nvSpPr>
+          <p:cNvPr id="11" name="TextBox 10"/>
+          <p:cNvSpPr txBox="1"/>
+          <p:nvPr/>
+        </p:nvSpPr>
+        <p:spPr>
+          <a:xfrm>
+            <a:off x="9066677" y="3667934"/>
+            <a:ext cx="2201957" cy="369332"/>
+          </a:xfrm>
+          <a:prstGeom prst="rect">
+            <a:avLst/>
+          </a:prstGeom>
+          <a:noFill/>
+        </p:spPr>
+        <p:txBody>
+          <a:bodyPr wrap="square" rtlCol="0">
+            <a:spAutoFit/>
+          </a:bodyPr>
+          <a:lstStyle/>
+          <a:p>
+            <a:r>
+              <a:rPr lang="en-IN" b="1" dirty="0" err="1" smtClean="0">
+                <a:solidFill>
+                  <a:schemeClr val="accent5">
+                    <a:lumMod val="75000"/>
+                  </a:schemeClr>
+                </a:solidFill>
+              </a:rPr>
+              <a:t>AppComponent</a:t>
+            </a:r>
+            <a:endParaRPr lang="en-IN" b="1" dirty="0">
+              <a:solidFill>
+                <a:schemeClr val="accent5">
+                  <a:lumMod val="75000"/>
+                </a:schemeClr>
+              </a:solidFill>
+            </a:endParaRPr>
+          </a:p>
+        </p:txBody>
+      </p:sp>
+      <p:cxnSp>
+        <p:nvCxnSpPr>
+          <p:cNvPr id="13" name="Straight Arrow Connector 12"/>
+          <p:cNvCxnSpPr/>
+          <p:nvPr/>
+        </p:nvCxnSpPr>
+        <p:spPr>
+          <a:xfrm flipV="1">
+            <a:off x="9637263" y="4773493"/>
+            <a:ext cx="452309" cy="2794"/>
+          </a:xfrm>
+          <a:prstGeom prst="straightConnector1">
+            <a:avLst/>
+          </a:prstGeom>
+          <a:ln>
+            <a:headEnd type="triangle"/>
+            <a:tailEnd type="triangle"/>
+          </a:ln>
+        </p:spPr>
+        <p:style>
+          <a:lnRef idx="1">
+            <a:schemeClr val="accent1"/>
+          </a:lnRef>
+          <a:fillRef idx="0">
+            <a:schemeClr val="accent1"/>
+          </a:fillRef>
+          <a:effectRef idx="0">
+            <a:schemeClr val="accent1"/>
+          </a:effectRef>
+          <a:fontRef idx="minor">
+            <a:schemeClr val="tx1"/>
+          </a:fontRef>
+        </p:style>
+      </p:cxnSp>
+      <p:sp>
+        <p:nvSpPr>
+          <p:cNvPr id="15" name="TextBox 14"/>
+          <p:cNvSpPr txBox="1"/>
+          <p:nvPr/>
+        </p:nvSpPr>
+        <p:spPr>
+          <a:xfrm>
+            <a:off x="8357348" y="5474705"/>
+            <a:ext cx="3146610" cy="369332"/>
+          </a:xfrm>
+          <a:prstGeom prst="rect">
+            <a:avLst/>
+          </a:prstGeom>
+          <a:noFill/>
+        </p:spPr>
+        <p:txBody>
+          <a:bodyPr wrap="square" rtlCol="0">
+            <a:spAutoFit/>
+          </a:bodyPr>
+          <a:lstStyle/>
+          <a:p>
+            <a:r>
+              <a:rPr lang="en-IN" b="1" dirty="0" smtClean="0"/>
+              <a:t>Contains HTML/CSS/Class</a:t>
+            </a:r>
+            <a:endParaRPr lang="en-IN" b="1" dirty="0"/>
+          </a:p>
+        </p:txBody>
+      </p:sp>
+    </p:spTree>
+    <p:extLst>
+      <p:ext uri="{BB962C8B-B14F-4D97-AF65-F5344CB8AC3E}">
+        <p14:creationId xmlns:p14="http://schemas.microsoft.com/office/powerpoint/2010/main" val="3585441740"/>
       </p:ext>
     </p:extLst>
   </p:cSld>

</xml_diff>

<commit_message>
Added Interpolatation and property binding
</commit_message>
<xml_diff>
--- a/Angular Presentation.pptx
+++ b/Angular Presentation.pptx
@@ -38,6 +38,19 @@
     <p:sldId id="308" r:id="rId32"/>
     <p:sldId id="309" r:id="rId33"/>
     <p:sldId id="310" r:id="rId34"/>
+    <p:sldId id="311" r:id="rId35"/>
+    <p:sldId id="312" r:id="rId36"/>
+    <p:sldId id="313" r:id="rId37"/>
+    <p:sldId id="314" r:id="rId38"/>
+    <p:sldId id="315" r:id="rId39"/>
+    <p:sldId id="316" r:id="rId40"/>
+    <p:sldId id="318" r:id="rId41"/>
+    <p:sldId id="319" r:id="rId42"/>
+    <p:sldId id="320" r:id="rId43"/>
+    <p:sldId id="321" r:id="rId44"/>
+    <p:sldId id="323" r:id="rId45"/>
+    <p:sldId id="324" r:id="rId46"/>
+    <p:sldId id="325" r:id="rId47"/>
   </p:sldIdLst>
   <p:sldSz cx="12192000" cy="6858000"/>
   <p:notesSz cx="6858000" cy="9144000"/>
@@ -21566,12 +21579,12 @@
         </p:nvSpPr>
         <p:spPr>
           <a:xfrm>
-            <a:off x="1024467" y="1613647"/>
-            <a:ext cx="10144654" cy="3034553"/>
-          </a:xfrm>
-        </p:spPr>
-        <p:txBody>
-          <a:bodyPr>
+            <a:off x="1025999" y="1888418"/>
+            <a:ext cx="10363660" cy="2038123"/>
+          </a:xfrm>
+        </p:spPr>
+        <p:txBody>
+          <a:bodyPr numCol="2">
             <a:noAutofit/>
           </a:bodyPr>
           <a:lstStyle/>
@@ -21581,7 +21594,7 @@
               <a:buAutoNum type="arabicPeriod"/>
             </a:pPr>
             <a:r>
-              <a:rPr lang="en-IN" sz="2000" dirty="0" smtClean="0"/>
+              <a:rPr lang="en-IN" sz="2400" dirty="0" smtClean="0"/>
               <a:t>Component Architecture</a:t>
             </a:r>
           </a:p>
@@ -21590,7 +21603,7 @@
               <a:buAutoNum type="arabicPeriod"/>
             </a:pPr>
             <a:r>
-              <a:rPr lang="en-IN" dirty="0" smtClean="0"/>
+              <a:rPr lang="en-IN" sz="2400" dirty="0" smtClean="0"/>
               <a:t>Create Component</a:t>
             </a:r>
           </a:p>
@@ -21599,7 +21612,7 @@
               <a:buAutoNum type="arabicPeriod"/>
             </a:pPr>
             <a:r>
-              <a:rPr lang="en-US" dirty="0" smtClean="0"/>
+              <a:rPr lang="en-US" sz="2400" dirty="0" smtClean="0"/>
               <a:t>Import Component in Module </a:t>
             </a:r>
           </a:p>
@@ -21608,7 +21621,7 @@
               <a:buAutoNum type="arabicPeriod"/>
             </a:pPr>
             <a:r>
-              <a:rPr lang="en-US" dirty="0" smtClean="0"/>
+              <a:rPr lang="en-US" sz="2400" dirty="0" smtClean="0"/>
               <a:t>Use New Component</a:t>
             </a:r>
           </a:p>
@@ -21617,14 +21630,28 @@
               <a:buAutoNum type="arabicPeriod"/>
             </a:pPr>
             <a:r>
-              <a:rPr lang="en-US" dirty="0" err="1"/>
-              <a:t>app.component.spec.ts</a:t>
-            </a:r>
-            <a:r>
-              <a:rPr lang="en-US" dirty="0"/>
-              <a:t> </a:t>
-            </a:r>
-            <a:endParaRPr lang="en-IN" sz="2000" dirty="0"/>
+              <a:rPr lang="en-US" sz="2400" dirty="0" smtClean="0"/>
+              <a:t>New Component Usage output</a:t>
+            </a:r>
+          </a:p>
+          <a:p>
+            <a:pPr marL="342900" indent="-342900">
+              <a:buAutoNum type="arabicPeriod"/>
+            </a:pPr>
+            <a:r>
+              <a:rPr lang="en-US" sz="2400" dirty="0" smtClean="0"/>
+              <a:t>Inline Template</a:t>
+            </a:r>
+          </a:p>
+          <a:p>
+            <a:pPr marL="342900" indent="-342900">
+              <a:buAutoNum type="arabicPeriod"/>
+            </a:pPr>
+            <a:r>
+              <a:rPr lang="en-US" sz="2400" dirty="0" smtClean="0"/>
+              <a:t>Inline style</a:t>
+            </a:r>
+            <a:endParaRPr lang="en-IN" sz="2400" dirty="0"/>
           </a:p>
         </p:txBody>
       </p:sp>
@@ -22803,11 +22830,11 @@
           <a:p>
             <a:r>
               <a:rPr lang="en-IN" b="1" dirty="0" smtClean="0"/>
-              <a:t>6.3 </a:t>
+              <a:t>6.4 </a:t>
             </a:r>
             <a:r>
               <a:rPr lang="en-US" b="1" dirty="0" smtClean="0"/>
-              <a:t>Use New Component</a:t>
+              <a:t>New Component Usage Output</a:t>
             </a:r>
             <a:endParaRPr lang="en-IN" b="1" dirty="0"/>
           </a:p>
@@ -22825,8 +22852,8 @@
         </p:nvSpPr>
         <p:spPr>
           <a:xfrm>
-            <a:off x="1154954" y="2581835"/>
-            <a:ext cx="10530540" cy="3697941"/>
+            <a:off x="1154954" y="2581836"/>
+            <a:ext cx="10530540" cy="685800"/>
           </a:xfrm>
         </p:spPr>
         <p:txBody>
@@ -22841,15 +22868,35 @@
                   <a:schemeClr val="tx1"/>
                 </a:solidFill>
               </a:rPr>
-              <a:t>The component can be used by accessing the selector tag in </a:t>
-            </a:r>
-            <a:r>
-              <a:rPr lang="en-IN" smtClean="0">
+              <a:t>In terminal run </a:t>
+            </a:r>
+            <a:r>
+              <a:rPr lang="en-IN" b="1" dirty="0" smtClean="0">
+                <a:solidFill>
+                  <a:schemeClr val="accent6">
+                    <a:lumMod val="75000"/>
+                  </a:schemeClr>
+                </a:solidFill>
+              </a:rPr>
+              <a:t>ng serve </a:t>
+            </a:r>
+            <a:r>
+              <a:rPr lang="en-IN" dirty="0" smtClean="0">
                 <a:solidFill>
                   <a:schemeClr val="tx1"/>
                 </a:solidFill>
               </a:rPr>
-              <a:t>@Component</a:t>
+              <a:t>and in browser type </a:t>
+            </a:r>
+            <a:r>
+              <a:rPr lang="en-IN" b="1" dirty="0" smtClean="0">
+                <a:solidFill>
+                  <a:schemeClr val="accent6">
+                    <a:lumMod val="75000"/>
+                  </a:schemeClr>
+                </a:solidFill>
+              </a:rPr>
+              <a:t>http://localhost:4200</a:t>
             </a:r>
             <a:endParaRPr lang="en-US" b="1" dirty="0" smtClean="0">
               <a:solidFill>
@@ -22870,10 +22917,1597 @@
           </a:p>
         </p:txBody>
       </p:sp>
+      <p:pic>
+        <p:nvPicPr>
+          <p:cNvPr id="7" name="Picture 6"/>
+          <p:cNvPicPr>
+            <a:picLocks noChangeAspect="1"/>
+          </p:cNvPicPr>
+          <p:nvPr/>
+        </p:nvPicPr>
+        <p:blipFill>
+          <a:blip r:embed="rId2"/>
+          <a:stretch>
+            <a:fillRect/>
+          </a:stretch>
+        </p:blipFill>
+        <p:spPr>
+          <a:xfrm>
+            <a:off x="1691808" y="3183002"/>
+            <a:ext cx="3590925" cy="1971675"/>
+          </a:xfrm>
+          <a:prstGeom prst="rect">
+            <a:avLst/>
+          </a:prstGeom>
+          <a:ln>
+            <a:solidFill>
+              <a:schemeClr val="bg1">
+                <a:lumMod val="85000"/>
+              </a:schemeClr>
+            </a:solidFill>
+          </a:ln>
+        </p:spPr>
+      </p:pic>
+      <p:sp>
+        <p:nvSpPr>
+          <p:cNvPr id="15" name="Rectangle 14"/>
+          <p:cNvSpPr/>
+          <p:nvPr/>
+        </p:nvSpPr>
+        <p:spPr>
+          <a:xfrm>
+            <a:off x="3029467" y="3183002"/>
+            <a:ext cx="1273592" cy="367022"/>
+          </a:xfrm>
+          <a:prstGeom prst="rect">
+            <a:avLst/>
+          </a:prstGeom>
+          <a:noFill/>
+          <a:ln w="28575">
+            <a:solidFill>
+              <a:schemeClr val="accent6">
+                <a:lumMod val="75000"/>
+              </a:schemeClr>
+            </a:solidFill>
+          </a:ln>
+        </p:spPr>
+        <p:style>
+          <a:lnRef idx="2">
+            <a:schemeClr val="accent1">
+              <a:shade val="50000"/>
+            </a:schemeClr>
+          </a:lnRef>
+          <a:fillRef idx="1">
+            <a:schemeClr val="accent1"/>
+          </a:fillRef>
+          <a:effectRef idx="0">
+            <a:schemeClr val="accent1"/>
+          </a:effectRef>
+          <a:fontRef idx="minor">
+            <a:schemeClr val="lt1"/>
+          </a:fontRef>
+        </p:style>
+        <p:txBody>
+          <a:bodyPr rtlCol="0" anchor="ctr"/>
+          <a:lstStyle/>
+          <a:p>
+            <a:pPr algn="ctr"/>
+            <a:endParaRPr lang="en-IN"/>
+          </a:p>
+        </p:txBody>
+      </p:sp>
+      <p:sp>
+        <p:nvSpPr>
+          <p:cNvPr id="16" name="Rectangle 15"/>
+          <p:cNvSpPr/>
+          <p:nvPr/>
+        </p:nvSpPr>
+        <p:spPr>
+          <a:xfrm>
+            <a:off x="1718702" y="4652681"/>
+            <a:ext cx="1011051" cy="327213"/>
+          </a:xfrm>
+          <a:prstGeom prst="rect">
+            <a:avLst/>
+          </a:prstGeom>
+          <a:noFill/>
+          <a:ln w="28575">
+            <a:solidFill>
+              <a:schemeClr val="accent6">
+                <a:lumMod val="75000"/>
+              </a:schemeClr>
+            </a:solidFill>
+          </a:ln>
+        </p:spPr>
+        <p:style>
+          <a:lnRef idx="2">
+            <a:schemeClr val="accent1">
+              <a:shade val="50000"/>
+            </a:schemeClr>
+          </a:lnRef>
+          <a:fillRef idx="1">
+            <a:schemeClr val="accent1"/>
+          </a:fillRef>
+          <a:effectRef idx="0">
+            <a:schemeClr val="accent1"/>
+          </a:effectRef>
+          <a:fontRef idx="minor">
+            <a:schemeClr val="lt1"/>
+          </a:fontRef>
+        </p:style>
+        <p:txBody>
+          <a:bodyPr rtlCol="0" anchor="ctr"/>
+          <a:lstStyle/>
+          <a:p>
+            <a:pPr algn="ctr"/>
+            <a:endParaRPr lang="en-IN"/>
+          </a:p>
+        </p:txBody>
+      </p:sp>
     </p:spTree>
     <p:extLst>
       <p:ext uri="{BB962C8B-B14F-4D97-AF65-F5344CB8AC3E}">
         <p14:creationId xmlns:p14="http://schemas.microsoft.com/office/powerpoint/2010/main" val="4089223506"/>
+      </p:ext>
+    </p:extLst>
+  </p:cSld>
+  <p:clrMapOvr>
+    <a:masterClrMapping/>
+  </p:clrMapOvr>
+  <p:timing>
+    <p:tnLst>
+      <p:par>
+        <p:cTn id="1" dur="indefinite" restart="never" nodeType="tmRoot"/>
+      </p:par>
+    </p:tnLst>
+  </p:timing>
+</p:sld>
+</file>
+
+<file path=ppt/slides/slide34.xml><?xml version="1.0" encoding="utf-8"?>
+<p:sld xmlns:a="http://schemas.openxmlformats.org/drawingml/2006/main" xmlns:r="http://schemas.openxmlformats.org/officeDocument/2006/relationships" xmlns:p="http://schemas.openxmlformats.org/presentationml/2006/main">
+  <p:cSld>
+    <p:spTree>
+      <p:nvGrpSpPr>
+        <p:cNvPr id="1" name=""/>
+        <p:cNvGrpSpPr/>
+        <p:nvPr/>
+      </p:nvGrpSpPr>
+      <p:grpSpPr>
+        <a:xfrm>
+          <a:off x="0" y="0"/>
+          <a:ext cx="0" cy="0"/>
+          <a:chOff x="0" y="0"/>
+          <a:chExt cx="0" cy="0"/>
+        </a:xfrm>
+      </p:grpSpPr>
+      <p:pic>
+        <p:nvPicPr>
+          <p:cNvPr id="10" name="Picture 9"/>
+          <p:cNvPicPr>
+            <a:picLocks noChangeAspect="1"/>
+          </p:cNvPicPr>
+          <p:nvPr/>
+        </p:nvPicPr>
+        <p:blipFill>
+          <a:blip r:embed="rId2"/>
+          <a:stretch>
+            <a:fillRect/>
+          </a:stretch>
+        </p:blipFill>
+        <p:spPr>
+          <a:xfrm>
+            <a:off x="7344016" y="3931120"/>
+            <a:ext cx="3752850" cy="2114550"/>
+          </a:xfrm>
+          <a:prstGeom prst="rect">
+            <a:avLst/>
+          </a:prstGeom>
+          <a:ln>
+            <a:solidFill>
+              <a:schemeClr val="bg1">
+                <a:lumMod val="65000"/>
+              </a:schemeClr>
+            </a:solidFill>
+          </a:ln>
+        </p:spPr>
+      </p:pic>
+      <p:pic>
+        <p:nvPicPr>
+          <p:cNvPr id="6" name="Picture 5"/>
+          <p:cNvPicPr>
+            <a:picLocks noChangeAspect="1"/>
+          </p:cNvPicPr>
+          <p:nvPr/>
+        </p:nvPicPr>
+        <p:blipFill>
+          <a:blip r:embed="rId3"/>
+          <a:stretch>
+            <a:fillRect/>
+          </a:stretch>
+        </p:blipFill>
+        <p:spPr>
+          <a:xfrm>
+            <a:off x="1280104" y="3777386"/>
+            <a:ext cx="4273532" cy="2524939"/>
+          </a:xfrm>
+          <a:prstGeom prst="rect">
+            <a:avLst/>
+          </a:prstGeom>
+        </p:spPr>
+      </p:pic>
+      <p:sp>
+        <p:nvSpPr>
+          <p:cNvPr id="2" name="Title 1"/>
+          <p:cNvSpPr>
+            <a:spLocks noGrp="1"/>
+          </p:cNvSpPr>
+          <p:nvPr>
+            <p:ph type="title"/>
+          </p:nvPr>
+        </p:nvSpPr>
+        <p:spPr/>
+        <p:txBody>
+          <a:bodyPr/>
+          <a:lstStyle/>
+          <a:p>
+            <a:r>
+              <a:rPr lang="en-IN" b="1" dirty="0" smtClean="0"/>
+              <a:t>6.5 </a:t>
+            </a:r>
+            <a:r>
+              <a:rPr lang="en-US" b="1" dirty="0" smtClean="0"/>
+              <a:t>Inline Template</a:t>
+            </a:r>
+            <a:endParaRPr lang="en-IN" b="1" dirty="0"/>
+          </a:p>
+        </p:txBody>
+      </p:sp>
+      <p:sp>
+        <p:nvSpPr>
+          <p:cNvPr id="3" name="Content Placeholder 2"/>
+          <p:cNvSpPr>
+            <a:spLocks noGrp="1"/>
+          </p:cNvSpPr>
+          <p:nvPr>
+            <p:ph sz="half" idx="2"/>
+          </p:nvPr>
+        </p:nvSpPr>
+        <p:spPr>
+          <a:xfrm>
+            <a:off x="1154954" y="2581836"/>
+            <a:ext cx="10530540" cy="1663512"/>
+          </a:xfrm>
+        </p:spPr>
+        <p:txBody>
+          <a:bodyPr>
+            <a:normAutofit/>
+          </a:bodyPr>
+          <a:lstStyle/>
+          <a:p>
+            <a:r>
+              <a:rPr lang="en-IN" dirty="0" smtClean="0">
+                <a:solidFill>
+                  <a:schemeClr val="tx1"/>
+                </a:solidFill>
+              </a:rPr>
+              <a:t>We  can specify html element in component itself without referring to another resource</a:t>
+            </a:r>
+          </a:p>
+          <a:p>
+            <a:r>
+              <a:rPr lang="en-IN" dirty="0" smtClean="0">
+                <a:solidFill>
+                  <a:schemeClr val="tx1"/>
+                </a:solidFill>
+              </a:rPr>
+              <a:t>Change </a:t>
+            </a:r>
+            <a:r>
+              <a:rPr lang="en-IN" dirty="0" err="1" smtClean="0">
+                <a:solidFill>
+                  <a:schemeClr val="tx1"/>
+                </a:solidFill>
+              </a:rPr>
+              <a:t>TemplateUrl</a:t>
+            </a:r>
+            <a:r>
+              <a:rPr lang="en-IN" dirty="0" smtClean="0">
+                <a:solidFill>
+                  <a:schemeClr val="tx1"/>
+                </a:solidFill>
+              </a:rPr>
+              <a:t> to template </a:t>
+            </a:r>
+          </a:p>
+          <a:p>
+            <a:r>
+              <a:rPr lang="en-IN" dirty="0" smtClean="0">
+                <a:solidFill>
+                  <a:schemeClr val="tx1"/>
+                </a:solidFill>
+              </a:rPr>
+              <a:t>Change Resource name to desired html content inside colon</a:t>
+            </a:r>
+            <a:endParaRPr lang="en-US" dirty="0" smtClean="0">
+              <a:solidFill>
+                <a:schemeClr val="accent6">
+                  <a:lumMod val="75000"/>
+                </a:schemeClr>
+              </a:solidFill>
+            </a:endParaRPr>
+          </a:p>
+          <a:p>
+            <a:endParaRPr lang="en-IN" b="1" dirty="0">
+              <a:solidFill>
+                <a:schemeClr val="accent6">
+                  <a:lumMod val="75000"/>
+                </a:schemeClr>
+              </a:solidFill>
+            </a:endParaRPr>
+          </a:p>
+        </p:txBody>
+      </p:sp>
+      <p:sp>
+        <p:nvSpPr>
+          <p:cNvPr id="8" name="Rectangle 7"/>
+          <p:cNvSpPr/>
+          <p:nvPr/>
+        </p:nvSpPr>
+        <p:spPr>
+          <a:xfrm>
+            <a:off x="1847627" y="4923811"/>
+            <a:ext cx="1352773" cy="898765"/>
+          </a:xfrm>
+          <a:prstGeom prst="rect">
+            <a:avLst/>
+          </a:prstGeom>
+          <a:noFill/>
+          <a:ln w="28575">
+            <a:solidFill>
+              <a:srgbClr val="FFFF00"/>
+            </a:solidFill>
+          </a:ln>
+        </p:spPr>
+        <p:style>
+          <a:lnRef idx="2">
+            <a:schemeClr val="accent1">
+              <a:shade val="50000"/>
+            </a:schemeClr>
+          </a:lnRef>
+          <a:fillRef idx="1">
+            <a:schemeClr val="accent1"/>
+          </a:fillRef>
+          <a:effectRef idx="0">
+            <a:schemeClr val="accent1"/>
+          </a:effectRef>
+          <a:fontRef idx="minor">
+            <a:schemeClr val="lt1"/>
+          </a:fontRef>
+        </p:style>
+        <p:txBody>
+          <a:bodyPr rtlCol="0" anchor="ctr"/>
+          <a:lstStyle/>
+          <a:p>
+            <a:pPr algn="ctr"/>
+            <a:endParaRPr lang="en-IN">
+              <a:solidFill>
+                <a:srgbClr val="FFFF00"/>
+              </a:solidFill>
+            </a:endParaRPr>
+          </a:p>
+        </p:txBody>
+      </p:sp>
+      <p:sp>
+        <p:nvSpPr>
+          <p:cNvPr id="9" name="Rectangle 8"/>
+          <p:cNvSpPr/>
+          <p:nvPr/>
+        </p:nvSpPr>
+        <p:spPr>
+          <a:xfrm>
+            <a:off x="1300189" y="3833279"/>
+            <a:ext cx="1087754" cy="195683"/>
+          </a:xfrm>
+          <a:prstGeom prst="rect">
+            <a:avLst/>
+          </a:prstGeom>
+          <a:noFill/>
+          <a:ln w="28575">
+            <a:solidFill>
+              <a:srgbClr val="FFFF00"/>
+            </a:solidFill>
+          </a:ln>
+        </p:spPr>
+        <p:style>
+          <a:lnRef idx="2">
+            <a:schemeClr val="accent1">
+              <a:shade val="50000"/>
+            </a:schemeClr>
+          </a:lnRef>
+          <a:fillRef idx="1">
+            <a:schemeClr val="accent1"/>
+          </a:fillRef>
+          <a:effectRef idx="0">
+            <a:schemeClr val="accent1"/>
+          </a:effectRef>
+          <a:fontRef idx="minor">
+            <a:schemeClr val="lt1"/>
+          </a:fontRef>
+        </p:style>
+        <p:txBody>
+          <a:bodyPr rtlCol="0" anchor="ctr"/>
+          <a:lstStyle/>
+          <a:p>
+            <a:pPr algn="ctr"/>
+            <a:endParaRPr lang="en-IN">
+              <a:solidFill>
+                <a:srgbClr val="FFFF00"/>
+              </a:solidFill>
+            </a:endParaRPr>
+          </a:p>
+        </p:txBody>
+      </p:sp>
+      <p:sp>
+        <p:nvSpPr>
+          <p:cNvPr id="11" name="Rectangle 10"/>
+          <p:cNvSpPr/>
+          <p:nvPr/>
+        </p:nvSpPr>
+        <p:spPr>
+          <a:xfrm>
+            <a:off x="8936828" y="3971462"/>
+            <a:ext cx="1157811" cy="250681"/>
+          </a:xfrm>
+          <a:prstGeom prst="rect">
+            <a:avLst/>
+          </a:prstGeom>
+          <a:noFill/>
+          <a:ln w="28575">
+            <a:solidFill>
+              <a:schemeClr val="accent6">
+                <a:lumMod val="75000"/>
+              </a:schemeClr>
+            </a:solidFill>
+          </a:ln>
+        </p:spPr>
+        <p:style>
+          <a:lnRef idx="2">
+            <a:schemeClr val="accent1">
+              <a:shade val="50000"/>
+            </a:schemeClr>
+          </a:lnRef>
+          <a:fillRef idx="1">
+            <a:schemeClr val="accent1"/>
+          </a:fillRef>
+          <a:effectRef idx="0">
+            <a:schemeClr val="accent1"/>
+          </a:effectRef>
+          <a:fontRef idx="minor">
+            <a:schemeClr val="lt1"/>
+          </a:fontRef>
+        </p:style>
+        <p:txBody>
+          <a:bodyPr rtlCol="0" anchor="ctr"/>
+          <a:lstStyle/>
+          <a:p>
+            <a:pPr algn="ctr"/>
+            <a:endParaRPr lang="en-IN"/>
+          </a:p>
+        </p:txBody>
+      </p:sp>
+      <p:sp>
+        <p:nvSpPr>
+          <p:cNvPr id="12" name="Rectangle 11"/>
+          <p:cNvSpPr/>
+          <p:nvPr/>
+        </p:nvSpPr>
+        <p:spPr>
+          <a:xfrm>
+            <a:off x="7397804" y="5434736"/>
+            <a:ext cx="1052555" cy="250681"/>
+          </a:xfrm>
+          <a:prstGeom prst="rect">
+            <a:avLst/>
+          </a:prstGeom>
+          <a:noFill/>
+          <a:ln w="28575">
+            <a:solidFill>
+              <a:schemeClr val="accent6">
+                <a:lumMod val="75000"/>
+              </a:schemeClr>
+            </a:solidFill>
+          </a:ln>
+        </p:spPr>
+        <p:style>
+          <a:lnRef idx="2">
+            <a:schemeClr val="accent1">
+              <a:shade val="50000"/>
+            </a:schemeClr>
+          </a:lnRef>
+          <a:fillRef idx="1">
+            <a:schemeClr val="accent1"/>
+          </a:fillRef>
+          <a:effectRef idx="0">
+            <a:schemeClr val="accent1"/>
+          </a:effectRef>
+          <a:fontRef idx="minor">
+            <a:schemeClr val="lt1"/>
+          </a:fontRef>
+        </p:style>
+        <p:txBody>
+          <a:bodyPr rtlCol="0" anchor="ctr"/>
+          <a:lstStyle/>
+          <a:p>
+            <a:pPr algn="ctr"/>
+            <a:endParaRPr lang="en-IN"/>
+          </a:p>
+        </p:txBody>
+      </p:sp>
+    </p:spTree>
+    <p:extLst>
+      <p:ext uri="{BB962C8B-B14F-4D97-AF65-F5344CB8AC3E}">
+        <p14:creationId xmlns:p14="http://schemas.microsoft.com/office/powerpoint/2010/main" val="597081996"/>
+      </p:ext>
+    </p:extLst>
+  </p:cSld>
+  <p:clrMapOvr>
+    <a:masterClrMapping/>
+  </p:clrMapOvr>
+  <p:timing>
+    <p:tnLst>
+      <p:par>
+        <p:cTn id="1" dur="indefinite" restart="never" nodeType="tmRoot"/>
+      </p:par>
+    </p:tnLst>
+  </p:timing>
+</p:sld>
+</file>
+
+<file path=ppt/slides/slide35.xml><?xml version="1.0" encoding="utf-8"?>
+<p:sld xmlns:a="http://schemas.openxmlformats.org/drawingml/2006/main" xmlns:r="http://schemas.openxmlformats.org/officeDocument/2006/relationships" xmlns:p="http://schemas.openxmlformats.org/presentationml/2006/main">
+  <p:cSld>
+    <p:spTree>
+      <p:nvGrpSpPr>
+        <p:cNvPr id="1" name=""/>
+        <p:cNvGrpSpPr/>
+        <p:nvPr/>
+      </p:nvGrpSpPr>
+      <p:grpSpPr>
+        <a:xfrm>
+          <a:off x="0" y="0"/>
+          <a:ext cx="0" cy="0"/>
+          <a:chOff x="0" y="0"/>
+          <a:chExt cx="0" cy="0"/>
+        </a:xfrm>
+      </p:grpSpPr>
+      <p:sp>
+        <p:nvSpPr>
+          <p:cNvPr id="2" name="Title 1"/>
+          <p:cNvSpPr>
+            <a:spLocks noGrp="1"/>
+          </p:cNvSpPr>
+          <p:nvPr>
+            <p:ph type="title"/>
+          </p:nvPr>
+        </p:nvSpPr>
+        <p:spPr/>
+        <p:txBody>
+          <a:bodyPr/>
+          <a:lstStyle/>
+          <a:p>
+            <a:r>
+              <a:rPr lang="en-IN" b="1" dirty="0" smtClean="0"/>
+              <a:t>6.6 </a:t>
+            </a:r>
+            <a:r>
+              <a:rPr lang="en-US" b="1" dirty="0" smtClean="0"/>
+              <a:t>Inline Style</a:t>
+            </a:r>
+            <a:endParaRPr lang="en-IN" b="1" dirty="0"/>
+          </a:p>
+        </p:txBody>
+      </p:sp>
+      <p:sp>
+        <p:nvSpPr>
+          <p:cNvPr id="3" name="Content Placeholder 2"/>
+          <p:cNvSpPr>
+            <a:spLocks noGrp="1"/>
+          </p:cNvSpPr>
+          <p:nvPr>
+            <p:ph sz="half" idx="2"/>
+          </p:nvPr>
+        </p:nvSpPr>
+        <p:spPr>
+          <a:xfrm>
+            <a:off x="1154954" y="2581836"/>
+            <a:ext cx="10530540" cy="1663512"/>
+          </a:xfrm>
+        </p:spPr>
+        <p:txBody>
+          <a:bodyPr>
+            <a:normAutofit/>
+          </a:bodyPr>
+          <a:lstStyle/>
+          <a:p>
+            <a:r>
+              <a:rPr lang="en-IN" dirty="0" smtClean="0">
+                <a:solidFill>
+                  <a:schemeClr val="tx1"/>
+                </a:solidFill>
+              </a:rPr>
+              <a:t>We  can specify style element in component itself without referring to another resource</a:t>
+            </a:r>
+          </a:p>
+          <a:p>
+            <a:r>
+              <a:rPr lang="en-IN" dirty="0" smtClean="0">
+                <a:solidFill>
+                  <a:schemeClr val="tx1"/>
+                </a:solidFill>
+              </a:rPr>
+              <a:t>Change </a:t>
+            </a:r>
+            <a:r>
+              <a:rPr lang="en-IN" dirty="0" err="1" smtClean="0">
+                <a:solidFill>
+                  <a:schemeClr val="tx1"/>
+                </a:solidFill>
+              </a:rPr>
+              <a:t>StyleUrl</a:t>
+            </a:r>
+            <a:r>
+              <a:rPr lang="en-IN" dirty="0" smtClean="0">
+                <a:solidFill>
+                  <a:schemeClr val="tx1"/>
+                </a:solidFill>
+              </a:rPr>
+              <a:t> to Styles</a:t>
+            </a:r>
+          </a:p>
+          <a:p>
+            <a:r>
+              <a:rPr lang="en-IN" dirty="0" smtClean="0">
+                <a:solidFill>
+                  <a:schemeClr val="tx1"/>
+                </a:solidFill>
+              </a:rPr>
+              <a:t>Change Resource name to desired </a:t>
+            </a:r>
+            <a:r>
+              <a:rPr lang="en-IN" dirty="0" err="1" smtClean="0">
+                <a:solidFill>
+                  <a:schemeClr val="tx1"/>
+                </a:solidFill>
+              </a:rPr>
+              <a:t>css</a:t>
+            </a:r>
+            <a:r>
+              <a:rPr lang="en-IN" dirty="0" smtClean="0">
+                <a:solidFill>
+                  <a:schemeClr val="tx1"/>
+                </a:solidFill>
+              </a:rPr>
+              <a:t> content inside tilt colon</a:t>
+            </a:r>
+            <a:endParaRPr lang="en-US" dirty="0" smtClean="0">
+              <a:solidFill>
+                <a:schemeClr val="accent6">
+                  <a:lumMod val="75000"/>
+                </a:schemeClr>
+              </a:solidFill>
+            </a:endParaRPr>
+          </a:p>
+          <a:p>
+            <a:endParaRPr lang="en-IN" b="1" dirty="0">
+              <a:solidFill>
+                <a:schemeClr val="accent6">
+                  <a:lumMod val="75000"/>
+                </a:schemeClr>
+              </a:solidFill>
+            </a:endParaRPr>
+          </a:p>
+        </p:txBody>
+      </p:sp>
+      <p:pic>
+        <p:nvPicPr>
+          <p:cNvPr id="4" name="Picture 3"/>
+          <p:cNvPicPr>
+            <a:picLocks noChangeAspect="1"/>
+          </p:cNvPicPr>
+          <p:nvPr/>
+        </p:nvPicPr>
+        <p:blipFill>
+          <a:blip r:embed="rId2"/>
+          <a:stretch>
+            <a:fillRect/>
+          </a:stretch>
+        </p:blipFill>
+        <p:spPr>
+          <a:xfrm>
+            <a:off x="1326777" y="3883118"/>
+            <a:ext cx="5638800" cy="2238375"/>
+          </a:xfrm>
+          <a:prstGeom prst="rect">
+            <a:avLst/>
+          </a:prstGeom>
+        </p:spPr>
+      </p:pic>
+      <p:sp>
+        <p:nvSpPr>
+          <p:cNvPr id="8" name="Rectangle 7"/>
+          <p:cNvSpPr/>
+          <p:nvPr/>
+        </p:nvSpPr>
+        <p:spPr>
+          <a:xfrm>
+            <a:off x="2232212" y="5112211"/>
+            <a:ext cx="3706009" cy="226271"/>
+          </a:xfrm>
+          <a:prstGeom prst="rect">
+            <a:avLst/>
+          </a:prstGeom>
+          <a:noFill/>
+          <a:ln w="28575">
+            <a:solidFill>
+              <a:srgbClr val="FFFF00"/>
+            </a:solidFill>
+          </a:ln>
+        </p:spPr>
+        <p:style>
+          <a:lnRef idx="2">
+            <a:schemeClr val="accent1">
+              <a:shade val="50000"/>
+            </a:schemeClr>
+          </a:lnRef>
+          <a:fillRef idx="1">
+            <a:schemeClr val="accent1"/>
+          </a:fillRef>
+          <a:effectRef idx="0">
+            <a:schemeClr val="accent1"/>
+          </a:effectRef>
+          <a:fontRef idx="minor">
+            <a:schemeClr val="lt1"/>
+          </a:fontRef>
+        </p:style>
+        <p:txBody>
+          <a:bodyPr rtlCol="0" anchor="ctr"/>
+          <a:lstStyle/>
+          <a:p>
+            <a:pPr algn="ctr"/>
+            <a:endParaRPr lang="en-IN">
+              <a:solidFill>
+                <a:srgbClr val="FFFF00"/>
+              </a:solidFill>
+            </a:endParaRPr>
+          </a:p>
+        </p:txBody>
+      </p:sp>
+      <p:sp>
+        <p:nvSpPr>
+          <p:cNvPr id="9" name="Rectangle 8"/>
+          <p:cNvSpPr/>
+          <p:nvPr/>
+        </p:nvSpPr>
+        <p:spPr>
+          <a:xfrm>
+            <a:off x="1365692" y="3928013"/>
+            <a:ext cx="1316182" cy="195683"/>
+          </a:xfrm>
+          <a:prstGeom prst="rect">
+            <a:avLst/>
+          </a:prstGeom>
+          <a:noFill/>
+          <a:ln w="28575">
+            <a:solidFill>
+              <a:srgbClr val="FFFF00"/>
+            </a:solidFill>
+          </a:ln>
+        </p:spPr>
+        <p:style>
+          <a:lnRef idx="2">
+            <a:schemeClr val="accent1">
+              <a:shade val="50000"/>
+            </a:schemeClr>
+          </a:lnRef>
+          <a:fillRef idx="1">
+            <a:schemeClr val="accent1"/>
+          </a:fillRef>
+          <a:effectRef idx="0">
+            <a:schemeClr val="accent1"/>
+          </a:effectRef>
+          <a:fontRef idx="minor">
+            <a:schemeClr val="lt1"/>
+          </a:fontRef>
+        </p:style>
+        <p:txBody>
+          <a:bodyPr rtlCol="0" anchor="ctr"/>
+          <a:lstStyle/>
+          <a:p>
+            <a:pPr algn="ctr"/>
+            <a:endParaRPr lang="en-IN">
+              <a:solidFill>
+                <a:srgbClr val="FFFF00"/>
+              </a:solidFill>
+            </a:endParaRPr>
+          </a:p>
+        </p:txBody>
+      </p:sp>
+      <p:pic>
+        <p:nvPicPr>
+          <p:cNvPr id="5" name="Picture 4"/>
+          <p:cNvPicPr>
+            <a:picLocks noChangeAspect="1"/>
+          </p:cNvPicPr>
+          <p:nvPr/>
+        </p:nvPicPr>
+        <p:blipFill>
+          <a:blip r:embed="rId3"/>
+          <a:stretch>
+            <a:fillRect/>
+          </a:stretch>
+        </p:blipFill>
+        <p:spPr>
+          <a:xfrm>
+            <a:off x="7358623" y="3883118"/>
+            <a:ext cx="3933825" cy="2171700"/>
+          </a:xfrm>
+          <a:prstGeom prst="rect">
+            <a:avLst/>
+          </a:prstGeom>
+          <a:ln>
+            <a:solidFill>
+              <a:schemeClr val="bg1">
+                <a:lumMod val="65000"/>
+              </a:schemeClr>
+            </a:solidFill>
+          </a:ln>
+        </p:spPr>
+      </p:pic>
+      <p:sp>
+        <p:nvSpPr>
+          <p:cNvPr id="11" name="Rectangle 10"/>
+          <p:cNvSpPr/>
+          <p:nvPr/>
+        </p:nvSpPr>
+        <p:spPr>
+          <a:xfrm>
+            <a:off x="8936828" y="3971462"/>
+            <a:ext cx="1157811" cy="250681"/>
+          </a:xfrm>
+          <a:prstGeom prst="rect">
+            <a:avLst/>
+          </a:prstGeom>
+          <a:noFill/>
+          <a:ln w="28575">
+            <a:solidFill>
+              <a:schemeClr val="accent6">
+                <a:lumMod val="75000"/>
+              </a:schemeClr>
+            </a:solidFill>
+          </a:ln>
+        </p:spPr>
+        <p:style>
+          <a:lnRef idx="2">
+            <a:schemeClr val="accent1">
+              <a:shade val="50000"/>
+            </a:schemeClr>
+          </a:lnRef>
+          <a:fillRef idx="1">
+            <a:schemeClr val="accent1"/>
+          </a:fillRef>
+          <a:effectRef idx="0">
+            <a:schemeClr val="accent1"/>
+          </a:effectRef>
+          <a:fontRef idx="minor">
+            <a:schemeClr val="lt1"/>
+          </a:fontRef>
+        </p:style>
+        <p:txBody>
+          <a:bodyPr rtlCol="0" anchor="ctr"/>
+          <a:lstStyle/>
+          <a:p>
+            <a:pPr algn="ctr"/>
+            <a:endParaRPr lang="en-IN"/>
+          </a:p>
+        </p:txBody>
+      </p:sp>
+      <p:sp>
+        <p:nvSpPr>
+          <p:cNvPr id="12" name="Rectangle 11"/>
+          <p:cNvSpPr/>
+          <p:nvPr/>
+        </p:nvSpPr>
+        <p:spPr>
+          <a:xfrm>
+            <a:off x="7397804" y="5434736"/>
+            <a:ext cx="1052555" cy="250681"/>
+          </a:xfrm>
+          <a:prstGeom prst="rect">
+            <a:avLst/>
+          </a:prstGeom>
+          <a:noFill/>
+          <a:ln w="28575">
+            <a:solidFill>
+              <a:schemeClr val="accent6">
+                <a:lumMod val="75000"/>
+              </a:schemeClr>
+            </a:solidFill>
+          </a:ln>
+        </p:spPr>
+        <p:style>
+          <a:lnRef idx="2">
+            <a:schemeClr val="accent1">
+              <a:shade val="50000"/>
+            </a:schemeClr>
+          </a:lnRef>
+          <a:fillRef idx="1">
+            <a:schemeClr val="accent1"/>
+          </a:fillRef>
+          <a:effectRef idx="0">
+            <a:schemeClr val="accent1"/>
+          </a:effectRef>
+          <a:fontRef idx="minor">
+            <a:schemeClr val="lt1"/>
+          </a:fontRef>
+        </p:style>
+        <p:txBody>
+          <a:bodyPr rtlCol="0" anchor="ctr"/>
+          <a:lstStyle/>
+          <a:p>
+            <a:pPr algn="ctr"/>
+            <a:endParaRPr lang="en-IN"/>
+          </a:p>
+        </p:txBody>
+      </p:sp>
+    </p:spTree>
+    <p:extLst>
+      <p:ext uri="{BB962C8B-B14F-4D97-AF65-F5344CB8AC3E}">
+        <p14:creationId xmlns:p14="http://schemas.microsoft.com/office/powerpoint/2010/main" val="2596460554"/>
+      </p:ext>
+    </p:extLst>
+  </p:cSld>
+  <p:clrMapOvr>
+    <a:masterClrMapping/>
+  </p:clrMapOvr>
+  <p:timing>
+    <p:tnLst>
+      <p:par>
+        <p:cTn id="1" dur="indefinite" restart="never" nodeType="tmRoot"/>
+      </p:par>
+    </p:tnLst>
+  </p:timing>
+</p:sld>
+</file>
+
+<file path=ppt/slides/slide36.xml><?xml version="1.0" encoding="utf-8"?>
+<p:sld xmlns:a="http://schemas.openxmlformats.org/drawingml/2006/main" xmlns:r="http://schemas.openxmlformats.org/officeDocument/2006/relationships" xmlns:p="http://schemas.openxmlformats.org/presentationml/2006/main">
+  <p:cSld>
+    <p:spTree>
+      <p:nvGrpSpPr>
+        <p:cNvPr id="1" name=""/>
+        <p:cNvGrpSpPr/>
+        <p:nvPr/>
+      </p:nvGrpSpPr>
+      <p:grpSpPr>
+        <a:xfrm>
+          <a:off x="0" y="0"/>
+          <a:ext cx="0" cy="0"/>
+          <a:chOff x="0" y="0"/>
+          <a:chExt cx="0" cy="0"/>
+        </a:xfrm>
+      </p:grpSpPr>
+      <p:sp>
+        <p:nvSpPr>
+          <p:cNvPr id="4" name="Title 3"/>
+          <p:cNvSpPr>
+            <a:spLocks noGrp="1"/>
+          </p:cNvSpPr>
+          <p:nvPr>
+            <p:ph type="title"/>
+          </p:nvPr>
+        </p:nvSpPr>
+        <p:spPr>
+          <a:xfrm>
+            <a:off x="1024467" y="753035"/>
+            <a:ext cx="10146186" cy="705077"/>
+          </a:xfrm>
+        </p:spPr>
+        <p:txBody>
+          <a:bodyPr/>
+          <a:lstStyle/>
+          <a:p>
+            <a:r>
+              <a:rPr lang="en-IN" b="1" dirty="0" smtClean="0"/>
+              <a:t>Chapter </a:t>
+            </a:r>
+            <a:r>
+              <a:rPr lang="en-IN" b="1" dirty="0"/>
+              <a:t>7</a:t>
+            </a:r>
+            <a:r>
+              <a:rPr lang="en-IN" b="1" dirty="0" smtClean="0"/>
+              <a:t> </a:t>
+            </a:r>
+            <a:r>
+              <a:rPr lang="en-IN" b="1" dirty="0" smtClean="0"/>
+              <a:t>: </a:t>
+            </a:r>
+            <a:r>
+              <a:rPr lang="en-IN" b="1" dirty="0" smtClean="0"/>
+              <a:t>Interpolation {{}}</a:t>
+            </a:r>
+            <a:endParaRPr lang="en-IN" b="1" dirty="0"/>
+          </a:p>
+        </p:txBody>
+      </p:sp>
+      <p:sp>
+        <p:nvSpPr>
+          <p:cNvPr id="5" name="Text Placeholder 4"/>
+          <p:cNvSpPr>
+            <a:spLocks noGrp="1"/>
+          </p:cNvSpPr>
+          <p:nvPr>
+            <p:ph type="body" idx="1"/>
+          </p:nvPr>
+        </p:nvSpPr>
+        <p:spPr>
+          <a:xfrm>
+            <a:off x="1025999" y="1888418"/>
+            <a:ext cx="10363660" cy="2038123"/>
+          </a:xfrm>
+        </p:spPr>
+        <p:txBody>
+          <a:bodyPr numCol="1">
+            <a:noAutofit/>
+          </a:bodyPr>
+          <a:lstStyle/>
+          <a:p>
+            <a:pPr marL="342900" indent="-342900">
+              <a:buFont typeface="Wingdings 3" charset="2"/>
+              <a:buAutoNum type="arabicPeriod"/>
+            </a:pPr>
+            <a:r>
+              <a:rPr lang="en-IN" sz="2400" dirty="0" smtClean="0"/>
+              <a:t>Pass data from component to template</a:t>
+            </a:r>
+          </a:p>
+          <a:p>
+            <a:pPr marL="342900" indent="-342900">
+              <a:buFont typeface="Wingdings 3" charset="2"/>
+              <a:buAutoNum type="arabicPeriod"/>
+            </a:pPr>
+            <a:r>
+              <a:rPr lang="en-IN" sz="2400" dirty="0" smtClean="0"/>
+              <a:t>Other features of Interpolation</a:t>
+            </a:r>
+            <a:endParaRPr lang="en-IN" sz="2400" dirty="0"/>
+          </a:p>
+        </p:txBody>
+      </p:sp>
+    </p:spTree>
+    <p:extLst>
+      <p:ext uri="{BB962C8B-B14F-4D97-AF65-F5344CB8AC3E}">
+        <p14:creationId xmlns:p14="http://schemas.microsoft.com/office/powerpoint/2010/main" val="3049924481"/>
+      </p:ext>
+    </p:extLst>
+  </p:cSld>
+  <p:clrMapOvr>
+    <a:masterClrMapping/>
+  </p:clrMapOvr>
+  <p:timing>
+    <p:tnLst>
+      <p:par>
+        <p:cTn id="1" dur="indefinite" restart="never" nodeType="tmRoot"/>
+      </p:par>
+    </p:tnLst>
+  </p:timing>
+</p:sld>
+</file>
+
+<file path=ppt/slides/slide37.xml><?xml version="1.0" encoding="utf-8"?>
+<p:sld xmlns:a="http://schemas.openxmlformats.org/drawingml/2006/main" xmlns:r="http://schemas.openxmlformats.org/officeDocument/2006/relationships" xmlns:p="http://schemas.openxmlformats.org/presentationml/2006/main">
+  <p:cSld>
+    <p:spTree>
+      <p:nvGrpSpPr>
+        <p:cNvPr id="1" name=""/>
+        <p:cNvGrpSpPr/>
+        <p:nvPr/>
+      </p:nvGrpSpPr>
+      <p:grpSpPr>
+        <a:xfrm>
+          <a:off x="0" y="0"/>
+          <a:ext cx="0" cy="0"/>
+          <a:chOff x="0" y="0"/>
+          <a:chExt cx="0" cy="0"/>
+        </a:xfrm>
+      </p:grpSpPr>
+      <p:sp>
+        <p:nvSpPr>
+          <p:cNvPr id="2" name="Title 1"/>
+          <p:cNvSpPr>
+            <a:spLocks noGrp="1"/>
+          </p:cNvSpPr>
+          <p:nvPr>
+            <p:ph type="title"/>
+          </p:nvPr>
+        </p:nvSpPr>
+        <p:spPr>
+          <a:xfrm>
+            <a:off x="1154954" y="973668"/>
+            <a:ext cx="10137494" cy="706964"/>
+          </a:xfrm>
+        </p:spPr>
+        <p:txBody>
+          <a:bodyPr/>
+          <a:lstStyle/>
+          <a:p>
+            <a:r>
+              <a:rPr lang="en-IN" b="1" dirty="0" smtClean="0"/>
+              <a:t>7.2 Other </a:t>
+            </a:r>
+            <a:r>
+              <a:rPr lang="en-IN" b="1" dirty="0"/>
+              <a:t>features of Interpolation</a:t>
+            </a:r>
+            <a:endParaRPr lang="en-IN" b="1" dirty="0"/>
+          </a:p>
+        </p:txBody>
+      </p:sp>
+      <p:sp>
+        <p:nvSpPr>
+          <p:cNvPr id="3" name="Content Placeholder 2"/>
+          <p:cNvSpPr>
+            <a:spLocks noGrp="1"/>
+          </p:cNvSpPr>
+          <p:nvPr>
+            <p:ph sz="half" idx="2"/>
+          </p:nvPr>
+        </p:nvSpPr>
+        <p:spPr>
+          <a:xfrm>
+            <a:off x="1154954" y="2581836"/>
+            <a:ext cx="10530540" cy="1663512"/>
+          </a:xfrm>
+        </p:spPr>
+        <p:txBody>
+          <a:bodyPr>
+            <a:normAutofit/>
+          </a:bodyPr>
+          <a:lstStyle/>
+          <a:p>
+            <a:r>
+              <a:rPr lang="en-IN" dirty="0" smtClean="0">
+                <a:solidFill>
+                  <a:schemeClr val="tx1"/>
+                </a:solidFill>
+              </a:rPr>
+              <a:t>We can understand interpolation better in some other ways like performing calculation, string </a:t>
+            </a:r>
+            <a:r>
+              <a:rPr lang="en-IN" dirty="0" err="1" smtClean="0">
+                <a:solidFill>
+                  <a:schemeClr val="tx1"/>
+                </a:solidFill>
+              </a:rPr>
+              <a:t>concat</a:t>
+            </a:r>
+            <a:r>
+              <a:rPr lang="en-IN" dirty="0" smtClean="0">
+                <a:solidFill>
+                  <a:schemeClr val="tx1"/>
+                </a:solidFill>
+              </a:rPr>
+              <a:t>, find string length, use string methods</a:t>
+            </a:r>
+          </a:p>
+          <a:p>
+            <a:r>
+              <a:rPr lang="en-IN" dirty="0" smtClean="0">
+                <a:solidFill>
+                  <a:schemeClr val="tx1"/>
+                </a:solidFill>
+              </a:rPr>
+              <a:t>We also call methods from template using interpolation</a:t>
+            </a:r>
+            <a:endParaRPr lang="en-IN" b="1" dirty="0">
+              <a:solidFill>
+                <a:schemeClr val="accent6">
+                  <a:lumMod val="75000"/>
+                </a:schemeClr>
+              </a:solidFill>
+            </a:endParaRPr>
+          </a:p>
+        </p:txBody>
+      </p:sp>
+      <p:pic>
+        <p:nvPicPr>
+          <p:cNvPr id="14" name="Picture 13"/>
+          <p:cNvPicPr>
+            <a:picLocks noChangeAspect="1"/>
+          </p:cNvPicPr>
+          <p:nvPr/>
+        </p:nvPicPr>
+        <p:blipFill>
+          <a:blip r:embed="rId2"/>
+          <a:stretch>
+            <a:fillRect/>
+          </a:stretch>
+        </p:blipFill>
+        <p:spPr>
+          <a:xfrm>
+            <a:off x="1583671" y="3651771"/>
+            <a:ext cx="5546511" cy="3112099"/>
+          </a:xfrm>
+          <a:prstGeom prst="rect">
+            <a:avLst/>
+          </a:prstGeom>
+        </p:spPr>
+      </p:pic>
+      <p:pic>
+        <p:nvPicPr>
+          <p:cNvPr id="15" name="Picture 14"/>
+          <p:cNvPicPr>
+            <a:picLocks noChangeAspect="1"/>
+          </p:cNvPicPr>
+          <p:nvPr/>
+        </p:nvPicPr>
+        <p:blipFill rotWithShape="1">
+          <a:blip r:embed="rId3"/>
+          <a:srcRect r="4888"/>
+          <a:stretch/>
+        </p:blipFill>
+        <p:spPr>
+          <a:xfrm>
+            <a:off x="7345693" y="3651771"/>
+            <a:ext cx="4339801" cy="2883500"/>
+          </a:xfrm>
+          <a:prstGeom prst="rect">
+            <a:avLst/>
+          </a:prstGeom>
+          <a:ln>
+            <a:solidFill>
+              <a:schemeClr val="bg1">
+                <a:lumMod val="75000"/>
+              </a:schemeClr>
+            </a:solidFill>
+          </a:ln>
+        </p:spPr>
+      </p:pic>
+    </p:spTree>
+    <p:extLst>
+      <p:ext uri="{BB962C8B-B14F-4D97-AF65-F5344CB8AC3E}">
+        <p14:creationId xmlns:p14="http://schemas.microsoft.com/office/powerpoint/2010/main" val="2028851875"/>
+      </p:ext>
+    </p:extLst>
+  </p:cSld>
+  <p:clrMapOvr>
+    <a:masterClrMapping/>
+  </p:clrMapOvr>
+  <p:timing>
+    <p:tnLst>
+      <p:par>
+        <p:cTn id="1" dur="indefinite" restart="never" nodeType="tmRoot"/>
+      </p:par>
+    </p:tnLst>
+  </p:timing>
+</p:sld>
+</file>
+
+<file path=ppt/slides/slide38.xml><?xml version="1.0" encoding="utf-8"?>
+<p:sld xmlns:a="http://schemas.openxmlformats.org/drawingml/2006/main" xmlns:r="http://schemas.openxmlformats.org/officeDocument/2006/relationships" xmlns:p="http://schemas.openxmlformats.org/presentationml/2006/main">
+  <p:cSld>
+    <p:spTree>
+      <p:nvGrpSpPr>
+        <p:cNvPr id="1" name=""/>
+        <p:cNvGrpSpPr/>
+        <p:nvPr/>
+      </p:nvGrpSpPr>
+      <p:grpSpPr>
+        <a:xfrm>
+          <a:off x="0" y="0"/>
+          <a:ext cx="0" cy="0"/>
+          <a:chOff x="0" y="0"/>
+          <a:chExt cx="0" cy="0"/>
+        </a:xfrm>
+      </p:grpSpPr>
+      <p:sp>
+        <p:nvSpPr>
+          <p:cNvPr id="4" name="Title 3"/>
+          <p:cNvSpPr>
+            <a:spLocks noGrp="1"/>
+          </p:cNvSpPr>
+          <p:nvPr>
+            <p:ph type="title"/>
+          </p:nvPr>
+        </p:nvSpPr>
+        <p:spPr>
+          <a:xfrm>
+            <a:off x="1024467" y="753035"/>
+            <a:ext cx="10146186" cy="705077"/>
+          </a:xfrm>
+        </p:spPr>
+        <p:txBody>
+          <a:bodyPr/>
+          <a:lstStyle/>
+          <a:p>
+            <a:r>
+              <a:rPr lang="en-IN" b="1" dirty="0" smtClean="0"/>
+              <a:t>Chapter </a:t>
+            </a:r>
+            <a:r>
+              <a:rPr lang="en-IN" b="1" dirty="0" smtClean="0"/>
+              <a:t>8 </a:t>
+            </a:r>
+            <a:r>
+              <a:rPr lang="en-IN" b="1" dirty="0" smtClean="0"/>
+              <a:t>: </a:t>
+            </a:r>
+            <a:r>
+              <a:rPr lang="en-IN" b="1" dirty="0" smtClean="0"/>
+              <a:t>Property Binding []</a:t>
+            </a:r>
+            <a:endParaRPr lang="en-IN" b="1" dirty="0"/>
+          </a:p>
+        </p:txBody>
+      </p:sp>
+      <p:sp>
+        <p:nvSpPr>
+          <p:cNvPr id="5" name="Text Placeholder 4"/>
+          <p:cNvSpPr>
+            <a:spLocks noGrp="1"/>
+          </p:cNvSpPr>
+          <p:nvPr>
+            <p:ph type="body" idx="1"/>
+          </p:nvPr>
+        </p:nvSpPr>
+        <p:spPr>
+          <a:xfrm>
+            <a:off x="1025999" y="1888418"/>
+            <a:ext cx="10363660" cy="4525829"/>
+          </a:xfrm>
+        </p:spPr>
+        <p:txBody>
+          <a:bodyPr numCol="1">
+            <a:noAutofit/>
+          </a:bodyPr>
+          <a:lstStyle/>
+          <a:p>
+            <a:pPr marL="342900" indent="-342900">
+              <a:buFont typeface="Wingdings 3" charset="2"/>
+              <a:buAutoNum type="arabicPeriod"/>
+            </a:pPr>
+            <a:r>
+              <a:rPr lang="en-IN" sz="2400" dirty="0" smtClean="0"/>
+              <a:t>Attribute Vs Property</a:t>
+            </a:r>
+          </a:p>
+          <a:p>
+            <a:pPr marL="342900" indent="-342900">
+              <a:buFont typeface="Wingdings 3" charset="2"/>
+              <a:buAutoNum type="arabicPeriod"/>
+            </a:pPr>
+            <a:r>
+              <a:rPr lang="en-IN" sz="2400" dirty="0" smtClean="0"/>
+              <a:t>Understanding Attribute and property</a:t>
+            </a:r>
+          </a:p>
+          <a:p>
+            <a:pPr marL="342900" indent="-342900">
+              <a:buFont typeface="Wingdings 3" charset="2"/>
+              <a:buAutoNum type="arabicPeriod"/>
+            </a:pPr>
+            <a:r>
+              <a:rPr lang="en-IN" sz="2400" dirty="0"/>
+              <a:t>Property </a:t>
+            </a:r>
+            <a:r>
+              <a:rPr lang="en-IN" sz="2400" dirty="0" smtClean="0"/>
+              <a:t>Binding</a:t>
+            </a:r>
+          </a:p>
+          <a:p>
+            <a:pPr marL="342900" indent="-342900">
+              <a:buFont typeface="Wingdings 3" charset="2"/>
+              <a:buAutoNum type="arabicPeriod"/>
+            </a:pPr>
+            <a:r>
+              <a:rPr lang="en-IN" sz="2400" dirty="0" smtClean="0"/>
+              <a:t>Property Binding as Interpolation</a:t>
+            </a:r>
+          </a:p>
+          <a:p>
+            <a:pPr marL="342900" indent="-342900">
+              <a:buFont typeface="Wingdings 3" charset="2"/>
+              <a:buAutoNum type="arabicPeriod"/>
+            </a:pPr>
+            <a:r>
+              <a:rPr lang="en-IN" sz="2400" dirty="0" smtClean="0"/>
+              <a:t>Limitation in Interpolation</a:t>
+            </a:r>
+            <a:endParaRPr lang="en-IN" sz="2400" dirty="0"/>
+          </a:p>
+        </p:txBody>
+      </p:sp>
+    </p:spTree>
+    <p:extLst>
+      <p:ext uri="{BB962C8B-B14F-4D97-AF65-F5344CB8AC3E}">
+        <p14:creationId xmlns:p14="http://schemas.microsoft.com/office/powerpoint/2010/main" val="378295035"/>
+      </p:ext>
+    </p:extLst>
+  </p:cSld>
+  <p:clrMapOvr>
+    <a:masterClrMapping/>
+  </p:clrMapOvr>
+  <p:timing>
+    <p:tnLst>
+      <p:par>
+        <p:cTn id="1" dur="indefinite" restart="never" nodeType="tmRoot"/>
+      </p:par>
+    </p:tnLst>
+  </p:timing>
+</p:sld>
+</file>
+
+<file path=ppt/slides/slide39.xml><?xml version="1.0" encoding="utf-8"?>
+<p:sld xmlns:a="http://schemas.openxmlformats.org/drawingml/2006/main" xmlns:r="http://schemas.openxmlformats.org/officeDocument/2006/relationships" xmlns:p="http://schemas.openxmlformats.org/presentationml/2006/main">
+  <p:cSld>
+    <p:spTree>
+      <p:nvGrpSpPr>
+        <p:cNvPr id="1" name=""/>
+        <p:cNvGrpSpPr/>
+        <p:nvPr/>
+      </p:nvGrpSpPr>
+      <p:grpSpPr>
+        <a:xfrm>
+          <a:off x="0" y="0"/>
+          <a:ext cx="0" cy="0"/>
+          <a:chOff x="0" y="0"/>
+          <a:chExt cx="0" cy="0"/>
+        </a:xfrm>
+      </p:grpSpPr>
+      <p:sp>
+        <p:nvSpPr>
+          <p:cNvPr id="2" name="Title 1"/>
+          <p:cNvSpPr>
+            <a:spLocks noGrp="1"/>
+          </p:cNvSpPr>
+          <p:nvPr>
+            <p:ph type="title"/>
+          </p:nvPr>
+        </p:nvSpPr>
+        <p:spPr>
+          <a:xfrm>
+            <a:off x="1154954" y="973668"/>
+            <a:ext cx="10137494" cy="706964"/>
+          </a:xfrm>
+        </p:spPr>
+        <p:txBody>
+          <a:bodyPr/>
+          <a:lstStyle/>
+          <a:p>
+            <a:r>
+              <a:rPr lang="en-IN" b="1" dirty="0" smtClean="0"/>
+              <a:t>8.1 </a:t>
+            </a:r>
+            <a:r>
+              <a:rPr lang="en-IN" b="1" dirty="0"/>
+              <a:t>Attribute Vs </a:t>
+            </a:r>
+            <a:r>
+              <a:rPr lang="en-IN" b="1" dirty="0" smtClean="0"/>
+              <a:t>Property</a:t>
+            </a:r>
+            <a:endParaRPr lang="en-IN" b="1" dirty="0"/>
+          </a:p>
+        </p:txBody>
+      </p:sp>
+      <p:sp>
+        <p:nvSpPr>
+          <p:cNvPr id="3" name="Content Placeholder 2"/>
+          <p:cNvSpPr>
+            <a:spLocks noGrp="1"/>
+          </p:cNvSpPr>
+          <p:nvPr>
+            <p:ph sz="half" idx="2"/>
+          </p:nvPr>
+        </p:nvSpPr>
+        <p:spPr>
+          <a:xfrm>
+            <a:off x="1154954" y="2581835"/>
+            <a:ext cx="10530540" cy="3859305"/>
+          </a:xfrm>
+        </p:spPr>
+        <p:txBody>
+          <a:bodyPr>
+            <a:normAutofit/>
+          </a:bodyPr>
+          <a:lstStyle/>
+          <a:p>
+            <a:r>
+              <a:rPr lang="en-IN" dirty="0" smtClean="0">
+                <a:solidFill>
+                  <a:schemeClr val="accent6">
+                    <a:lumMod val="75000"/>
+                  </a:schemeClr>
+                </a:solidFill>
+              </a:rPr>
+              <a:t>Attributes and Properties are the same</a:t>
+            </a:r>
+          </a:p>
+          <a:p>
+            <a:r>
+              <a:rPr lang="en-IN" dirty="0" smtClean="0">
+                <a:solidFill>
+                  <a:schemeClr val="accent6">
+                    <a:lumMod val="75000"/>
+                  </a:schemeClr>
+                </a:solidFill>
+              </a:rPr>
+              <a:t>Attributes - HTML</a:t>
+            </a:r>
+          </a:p>
+          <a:p>
+            <a:r>
+              <a:rPr lang="en-IN" dirty="0" smtClean="0">
+                <a:solidFill>
+                  <a:schemeClr val="accent6">
+                    <a:lumMod val="75000"/>
+                  </a:schemeClr>
+                </a:solidFill>
+              </a:rPr>
+              <a:t>Properties  - DOM (Document Object Model)</a:t>
+            </a:r>
+          </a:p>
+          <a:p>
+            <a:r>
+              <a:rPr lang="en-IN" dirty="0" smtClean="0">
+                <a:solidFill>
+                  <a:schemeClr val="accent6">
+                    <a:lumMod val="75000"/>
+                  </a:schemeClr>
+                </a:solidFill>
+              </a:rPr>
+              <a:t>Attributes initialize DOM properties and they are done</a:t>
+            </a:r>
+          </a:p>
+          <a:p>
+            <a:r>
+              <a:rPr lang="en-IN" dirty="0" smtClean="0">
+                <a:solidFill>
+                  <a:schemeClr val="accent6">
+                    <a:lumMod val="75000"/>
+                  </a:schemeClr>
+                </a:solidFill>
+              </a:rPr>
+              <a:t>Attributes value cannot change once they are initialized</a:t>
+            </a:r>
+          </a:p>
+          <a:p>
+            <a:r>
+              <a:rPr lang="en-IN" dirty="0" smtClean="0">
+                <a:solidFill>
+                  <a:schemeClr val="accent6">
+                    <a:lumMod val="75000"/>
+                  </a:schemeClr>
+                </a:solidFill>
+              </a:rPr>
+              <a:t> Property value however can change</a:t>
+            </a:r>
+            <a:endParaRPr lang="en-IN" dirty="0">
+              <a:solidFill>
+                <a:schemeClr val="accent6">
+                  <a:lumMod val="75000"/>
+                </a:schemeClr>
+              </a:solidFill>
+            </a:endParaRPr>
+          </a:p>
+        </p:txBody>
+      </p:sp>
+    </p:spTree>
+    <p:extLst>
+      <p:ext uri="{BB962C8B-B14F-4D97-AF65-F5344CB8AC3E}">
+        <p14:creationId xmlns:p14="http://schemas.microsoft.com/office/powerpoint/2010/main" val="3702477833"/>
       </p:ext>
     </p:extLst>
   </p:cSld>
@@ -23014,6 +24648,2994 @@
     <p:extLst>
       <p:ext uri="{BB962C8B-B14F-4D97-AF65-F5344CB8AC3E}">
         <p14:creationId xmlns:p14="http://schemas.microsoft.com/office/powerpoint/2010/main" val="4260659219"/>
+      </p:ext>
+    </p:extLst>
+  </p:cSld>
+  <p:clrMapOvr>
+    <a:masterClrMapping/>
+  </p:clrMapOvr>
+  <p:timing>
+    <p:tnLst>
+      <p:par>
+        <p:cTn id="1" dur="indefinite" restart="never" nodeType="tmRoot"/>
+      </p:par>
+    </p:tnLst>
+  </p:timing>
+</p:sld>
+</file>
+
+<file path=ppt/slides/slide40.xml><?xml version="1.0" encoding="utf-8"?>
+<p:sld xmlns:a="http://schemas.openxmlformats.org/drawingml/2006/main" xmlns:r="http://schemas.openxmlformats.org/officeDocument/2006/relationships" xmlns:p="http://schemas.openxmlformats.org/presentationml/2006/main">
+  <p:cSld>
+    <p:spTree>
+      <p:nvGrpSpPr>
+        <p:cNvPr id="1" name=""/>
+        <p:cNvGrpSpPr/>
+        <p:nvPr/>
+      </p:nvGrpSpPr>
+      <p:grpSpPr>
+        <a:xfrm>
+          <a:off x="0" y="0"/>
+          <a:ext cx="0" cy="0"/>
+          <a:chOff x="0" y="0"/>
+          <a:chExt cx="0" cy="0"/>
+        </a:xfrm>
+      </p:grpSpPr>
+      <p:sp>
+        <p:nvSpPr>
+          <p:cNvPr id="2" name="Title 1"/>
+          <p:cNvSpPr>
+            <a:spLocks noGrp="1"/>
+          </p:cNvSpPr>
+          <p:nvPr>
+            <p:ph type="title"/>
+          </p:nvPr>
+        </p:nvSpPr>
+        <p:spPr>
+          <a:xfrm>
+            <a:off x="1154954" y="973668"/>
+            <a:ext cx="10137494" cy="706964"/>
+          </a:xfrm>
+        </p:spPr>
+        <p:txBody>
+          <a:bodyPr/>
+          <a:lstStyle/>
+          <a:p>
+            <a:r>
+              <a:rPr lang="en-IN" b="1" dirty="0"/>
+              <a:t>8.2 Understanding Attribute and </a:t>
+            </a:r>
+            <a:r>
+              <a:rPr lang="en-IN" b="1" dirty="0" smtClean="0"/>
+              <a:t>property(1)</a:t>
+            </a:r>
+            <a:endParaRPr lang="en-IN" b="1" dirty="0"/>
+          </a:p>
+        </p:txBody>
+      </p:sp>
+      <p:sp>
+        <p:nvSpPr>
+          <p:cNvPr id="3" name="Content Placeholder 2"/>
+          <p:cNvSpPr>
+            <a:spLocks noGrp="1"/>
+          </p:cNvSpPr>
+          <p:nvPr>
+            <p:ph sz="half" idx="2"/>
+          </p:nvPr>
+        </p:nvSpPr>
+        <p:spPr>
+          <a:xfrm>
+            <a:off x="1154954" y="2581836"/>
+            <a:ext cx="10530540" cy="660166"/>
+          </a:xfrm>
+        </p:spPr>
+        <p:txBody>
+          <a:bodyPr>
+            <a:normAutofit/>
+          </a:bodyPr>
+          <a:lstStyle/>
+          <a:p>
+            <a:r>
+              <a:rPr lang="en-IN" dirty="0" smtClean="0">
+                <a:solidFill>
+                  <a:schemeClr val="tx1"/>
+                </a:solidFill>
+              </a:rPr>
+              <a:t>To understand attribute and property lets have a textbox and initialize with a value</a:t>
+            </a:r>
+          </a:p>
+        </p:txBody>
+      </p:sp>
+      <p:pic>
+        <p:nvPicPr>
+          <p:cNvPr id="4" name="Picture 3"/>
+          <p:cNvPicPr>
+            <a:picLocks noChangeAspect="1"/>
+          </p:cNvPicPr>
+          <p:nvPr/>
+        </p:nvPicPr>
+        <p:blipFill>
+          <a:blip r:embed="rId2"/>
+          <a:stretch>
+            <a:fillRect/>
+          </a:stretch>
+        </p:blipFill>
+        <p:spPr>
+          <a:xfrm>
+            <a:off x="1154954" y="3242002"/>
+            <a:ext cx="5886450" cy="2466975"/>
+          </a:xfrm>
+          <a:prstGeom prst="rect">
+            <a:avLst/>
+          </a:prstGeom>
+        </p:spPr>
+      </p:pic>
+      <p:pic>
+        <p:nvPicPr>
+          <p:cNvPr id="5" name="Picture 4"/>
+          <p:cNvPicPr>
+            <a:picLocks noChangeAspect="1"/>
+          </p:cNvPicPr>
+          <p:nvPr/>
+        </p:nvPicPr>
+        <p:blipFill>
+          <a:blip r:embed="rId3"/>
+          <a:stretch>
+            <a:fillRect/>
+          </a:stretch>
+        </p:blipFill>
+        <p:spPr>
+          <a:xfrm>
+            <a:off x="7263933" y="3242002"/>
+            <a:ext cx="3876675" cy="2190750"/>
+          </a:xfrm>
+          <a:prstGeom prst="rect">
+            <a:avLst/>
+          </a:prstGeom>
+          <a:ln>
+            <a:solidFill>
+              <a:schemeClr val="bg1">
+                <a:lumMod val="75000"/>
+              </a:schemeClr>
+            </a:solidFill>
+          </a:ln>
+        </p:spPr>
+      </p:pic>
+      <p:sp>
+        <p:nvSpPr>
+          <p:cNvPr id="8" name="Rectangle 7"/>
+          <p:cNvSpPr/>
+          <p:nvPr/>
+        </p:nvSpPr>
+        <p:spPr>
+          <a:xfrm>
+            <a:off x="1231221" y="3343432"/>
+            <a:ext cx="1316182" cy="195683"/>
+          </a:xfrm>
+          <a:prstGeom prst="rect">
+            <a:avLst/>
+          </a:prstGeom>
+          <a:noFill/>
+          <a:ln w="28575">
+            <a:solidFill>
+              <a:srgbClr val="FFFF00"/>
+            </a:solidFill>
+          </a:ln>
+        </p:spPr>
+        <p:style>
+          <a:lnRef idx="2">
+            <a:schemeClr val="accent1">
+              <a:shade val="50000"/>
+            </a:schemeClr>
+          </a:lnRef>
+          <a:fillRef idx="1">
+            <a:schemeClr val="accent1"/>
+          </a:fillRef>
+          <a:effectRef idx="0">
+            <a:schemeClr val="accent1"/>
+          </a:effectRef>
+          <a:fontRef idx="minor">
+            <a:schemeClr val="lt1"/>
+          </a:fontRef>
+        </p:style>
+        <p:txBody>
+          <a:bodyPr rtlCol="0" anchor="ctr"/>
+          <a:lstStyle/>
+          <a:p>
+            <a:pPr algn="ctr"/>
+            <a:endParaRPr lang="en-IN">
+              <a:solidFill>
+                <a:srgbClr val="FFFF00"/>
+              </a:solidFill>
+            </a:endParaRPr>
+          </a:p>
+        </p:txBody>
+      </p:sp>
+      <p:sp>
+        <p:nvSpPr>
+          <p:cNvPr id="9" name="Rectangle 8"/>
+          <p:cNvSpPr/>
+          <p:nvPr/>
+        </p:nvSpPr>
+        <p:spPr>
+          <a:xfrm>
+            <a:off x="1997704" y="4050314"/>
+            <a:ext cx="4940978" cy="313623"/>
+          </a:xfrm>
+          <a:prstGeom prst="rect">
+            <a:avLst/>
+          </a:prstGeom>
+          <a:noFill/>
+          <a:ln w="28575">
+            <a:solidFill>
+              <a:srgbClr val="FFFF00"/>
+            </a:solidFill>
+          </a:ln>
+        </p:spPr>
+        <p:style>
+          <a:lnRef idx="2">
+            <a:schemeClr val="accent1">
+              <a:shade val="50000"/>
+            </a:schemeClr>
+          </a:lnRef>
+          <a:fillRef idx="1">
+            <a:schemeClr val="accent1"/>
+          </a:fillRef>
+          <a:effectRef idx="0">
+            <a:schemeClr val="accent1"/>
+          </a:effectRef>
+          <a:fontRef idx="minor">
+            <a:schemeClr val="lt1"/>
+          </a:fontRef>
+        </p:style>
+        <p:txBody>
+          <a:bodyPr rtlCol="0" anchor="ctr"/>
+          <a:lstStyle/>
+          <a:p>
+            <a:pPr algn="ctr"/>
+            <a:endParaRPr lang="en-IN">
+              <a:solidFill>
+                <a:srgbClr val="FFFF00"/>
+              </a:solidFill>
+            </a:endParaRPr>
+          </a:p>
+        </p:txBody>
+      </p:sp>
+      <p:sp>
+        <p:nvSpPr>
+          <p:cNvPr id="10" name="Rectangle 9"/>
+          <p:cNvSpPr/>
+          <p:nvPr/>
+        </p:nvSpPr>
+        <p:spPr>
+          <a:xfrm>
+            <a:off x="8842698" y="3315932"/>
+            <a:ext cx="1157811" cy="250681"/>
+          </a:xfrm>
+          <a:prstGeom prst="rect">
+            <a:avLst/>
+          </a:prstGeom>
+          <a:noFill/>
+          <a:ln w="28575">
+            <a:solidFill>
+              <a:schemeClr val="accent6">
+                <a:lumMod val="75000"/>
+              </a:schemeClr>
+            </a:solidFill>
+          </a:ln>
+        </p:spPr>
+        <p:style>
+          <a:lnRef idx="2">
+            <a:schemeClr val="accent1">
+              <a:shade val="50000"/>
+            </a:schemeClr>
+          </a:lnRef>
+          <a:fillRef idx="1">
+            <a:schemeClr val="accent1"/>
+          </a:fillRef>
+          <a:effectRef idx="0">
+            <a:schemeClr val="accent1"/>
+          </a:effectRef>
+          <a:fontRef idx="minor">
+            <a:schemeClr val="lt1"/>
+          </a:fontRef>
+        </p:style>
+        <p:txBody>
+          <a:bodyPr rtlCol="0" anchor="ctr"/>
+          <a:lstStyle/>
+          <a:p>
+            <a:pPr algn="ctr"/>
+            <a:endParaRPr lang="en-IN"/>
+          </a:p>
+        </p:txBody>
+      </p:sp>
+      <p:sp>
+        <p:nvSpPr>
+          <p:cNvPr id="11" name="Rectangle 10"/>
+          <p:cNvSpPr/>
+          <p:nvPr/>
+        </p:nvSpPr>
+        <p:spPr>
+          <a:xfrm>
+            <a:off x="7263933" y="4700173"/>
+            <a:ext cx="1839726" cy="443693"/>
+          </a:xfrm>
+          <a:prstGeom prst="rect">
+            <a:avLst/>
+          </a:prstGeom>
+          <a:noFill/>
+          <a:ln w="28575">
+            <a:solidFill>
+              <a:schemeClr val="accent6">
+                <a:lumMod val="75000"/>
+              </a:schemeClr>
+            </a:solidFill>
+            <a:prstDash val="lgDashDot"/>
+          </a:ln>
+        </p:spPr>
+        <p:style>
+          <a:lnRef idx="2">
+            <a:schemeClr val="accent1">
+              <a:shade val="50000"/>
+            </a:schemeClr>
+          </a:lnRef>
+          <a:fillRef idx="1">
+            <a:schemeClr val="accent1"/>
+          </a:fillRef>
+          <a:effectRef idx="0">
+            <a:schemeClr val="accent1"/>
+          </a:effectRef>
+          <a:fontRef idx="minor">
+            <a:schemeClr val="lt1"/>
+          </a:fontRef>
+        </p:style>
+        <p:txBody>
+          <a:bodyPr rtlCol="0" anchor="ctr"/>
+          <a:lstStyle/>
+          <a:p>
+            <a:pPr algn="ctr"/>
+            <a:endParaRPr lang="en-IN"/>
+          </a:p>
+        </p:txBody>
+      </p:sp>
+    </p:spTree>
+    <p:extLst>
+      <p:ext uri="{BB962C8B-B14F-4D97-AF65-F5344CB8AC3E}">
+        <p14:creationId xmlns:p14="http://schemas.microsoft.com/office/powerpoint/2010/main" val="2415731693"/>
+      </p:ext>
+    </p:extLst>
+  </p:cSld>
+  <p:clrMapOvr>
+    <a:masterClrMapping/>
+  </p:clrMapOvr>
+  <p:timing>
+    <p:tnLst>
+      <p:par>
+        <p:cTn id="1" dur="indefinite" restart="never" nodeType="tmRoot"/>
+      </p:par>
+    </p:tnLst>
+  </p:timing>
+</p:sld>
+</file>
+
+<file path=ppt/slides/slide41.xml><?xml version="1.0" encoding="utf-8"?>
+<p:sld xmlns:a="http://schemas.openxmlformats.org/drawingml/2006/main" xmlns:r="http://schemas.openxmlformats.org/officeDocument/2006/relationships" xmlns:p="http://schemas.openxmlformats.org/presentationml/2006/main">
+  <p:cSld>
+    <p:spTree>
+      <p:nvGrpSpPr>
+        <p:cNvPr id="1" name=""/>
+        <p:cNvGrpSpPr/>
+        <p:nvPr/>
+      </p:nvGrpSpPr>
+      <p:grpSpPr>
+        <a:xfrm>
+          <a:off x="0" y="0"/>
+          <a:ext cx="0" cy="0"/>
+          <a:chOff x="0" y="0"/>
+          <a:chExt cx="0" cy="0"/>
+        </a:xfrm>
+      </p:grpSpPr>
+      <p:sp>
+        <p:nvSpPr>
+          <p:cNvPr id="2" name="Title 1"/>
+          <p:cNvSpPr>
+            <a:spLocks noGrp="1"/>
+          </p:cNvSpPr>
+          <p:nvPr>
+            <p:ph type="title"/>
+          </p:nvPr>
+        </p:nvSpPr>
+        <p:spPr>
+          <a:xfrm>
+            <a:off x="1154954" y="973668"/>
+            <a:ext cx="10137494" cy="706964"/>
+          </a:xfrm>
+        </p:spPr>
+        <p:txBody>
+          <a:bodyPr/>
+          <a:lstStyle/>
+          <a:p>
+            <a:r>
+              <a:rPr lang="en-IN" b="1" dirty="0"/>
+              <a:t>8.2 Understanding Attribute and </a:t>
+            </a:r>
+            <a:r>
+              <a:rPr lang="en-IN" b="1" dirty="0" smtClean="0"/>
+              <a:t>property(2)</a:t>
+            </a:r>
+            <a:endParaRPr lang="en-IN" b="1" dirty="0"/>
+          </a:p>
+        </p:txBody>
+      </p:sp>
+      <p:sp>
+        <p:nvSpPr>
+          <p:cNvPr id="3" name="Content Placeholder 2"/>
+          <p:cNvSpPr>
+            <a:spLocks noGrp="1"/>
+          </p:cNvSpPr>
+          <p:nvPr>
+            <p:ph sz="half" idx="2"/>
+          </p:nvPr>
+        </p:nvSpPr>
+        <p:spPr>
+          <a:xfrm>
+            <a:off x="1154954" y="2581836"/>
+            <a:ext cx="10530540" cy="1015813"/>
+          </a:xfrm>
+        </p:spPr>
+        <p:txBody>
+          <a:bodyPr>
+            <a:normAutofit/>
+          </a:bodyPr>
+          <a:lstStyle/>
+          <a:p>
+            <a:r>
+              <a:rPr lang="en-IN" dirty="0" smtClean="0">
+                <a:solidFill>
+                  <a:schemeClr val="tx1"/>
+                </a:solidFill>
+              </a:rPr>
+              <a:t>Open inspect element and select textbox tag </a:t>
+            </a:r>
+          </a:p>
+          <a:p>
+            <a:r>
+              <a:rPr lang="en-IN" dirty="0" smtClean="0">
+                <a:solidFill>
+                  <a:schemeClr val="tx1"/>
+                </a:solidFill>
+              </a:rPr>
+              <a:t>And navigate to Browser Console</a:t>
+            </a:r>
+            <a:endParaRPr lang="en-IN" b="1" dirty="0">
+              <a:solidFill>
+                <a:schemeClr val="accent6">
+                  <a:lumMod val="75000"/>
+                </a:schemeClr>
+              </a:solidFill>
+            </a:endParaRPr>
+          </a:p>
+        </p:txBody>
+      </p:sp>
+      <p:pic>
+        <p:nvPicPr>
+          <p:cNvPr id="7" name="Picture 6"/>
+          <p:cNvPicPr>
+            <a:picLocks noChangeAspect="1"/>
+          </p:cNvPicPr>
+          <p:nvPr/>
+        </p:nvPicPr>
+        <p:blipFill>
+          <a:blip r:embed="rId2"/>
+          <a:stretch>
+            <a:fillRect/>
+          </a:stretch>
+        </p:blipFill>
+        <p:spPr>
+          <a:xfrm>
+            <a:off x="1656977" y="3597649"/>
+            <a:ext cx="4293813" cy="2656604"/>
+          </a:xfrm>
+          <a:prstGeom prst="rect">
+            <a:avLst/>
+          </a:prstGeom>
+          <a:ln>
+            <a:solidFill>
+              <a:schemeClr val="bg1">
+                <a:lumMod val="75000"/>
+              </a:schemeClr>
+            </a:solidFill>
+          </a:ln>
+        </p:spPr>
+      </p:pic>
+      <p:pic>
+        <p:nvPicPr>
+          <p:cNvPr id="12" name="Picture 11"/>
+          <p:cNvPicPr>
+            <a:picLocks noChangeAspect="1"/>
+          </p:cNvPicPr>
+          <p:nvPr/>
+        </p:nvPicPr>
+        <p:blipFill>
+          <a:blip r:embed="rId3"/>
+          <a:stretch>
+            <a:fillRect/>
+          </a:stretch>
+        </p:blipFill>
+        <p:spPr>
+          <a:xfrm>
+            <a:off x="6805381" y="3648093"/>
+            <a:ext cx="3266015" cy="2157692"/>
+          </a:xfrm>
+          <a:prstGeom prst="rect">
+            <a:avLst/>
+          </a:prstGeom>
+          <a:ln>
+            <a:solidFill>
+              <a:schemeClr val="bg1">
+                <a:lumMod val="75000"/>
+              </a:schemeClr>
+            </a:solidFill>
+          </a:ln>
+        </p:spPr>
+      </p:pic>
+      <p:sp>
+        <p:nvSpPr>
+          <p:cNvPr id="14" name="Rectangle 13"/>
+          <p:cNvSpPr/>
+          <p:nvPr/>
+        </p:nvSpPr>
+        <p:spPr>
+          <a:xfrm>
+            <a:off x="1947907" y="4831138"/>
+            <a:ext cx="3363681" cy="165036"/>
+          </a:xfrm>
+          <a:prstGeom prst="rect">
+            <a:avLst/>
+          </a:prstGeom>
+          <a:noFill/>
+          <a:ln w="28575">
+            <a:solidFill>
+              <a:schemeClr val="accent6">
+                <a:lumMod val="75000"/>
+              </a:schemeClr>
+            </a:solidFill>
+          </a:ln>
+        </p:spPr>
+        <p:style>
+          <a:lnRef idx="2">
+            <a:schemeClr val="accent1">
+              <a:shade val="50000"/>
+            </a:schemeClr>
+          </a:lnRef>
+          <a:fillRef idx="1">
+            <a:schemeClr val="accent1"/>
+          </a:fillRef>
+          <a:effectRef idx="0">
+            <a:schemeClr val="accent1"/>
+          </a:effectRef>
+          <a:fontRef idx="minor">
+            <a:schemeClr val="lt1"/>
+          </a:fontRef>
+        </p:style>
+        <p:txBody>
+          <a:bodyPr rtlCol="0" anchor="ctr"/>
+          <a:lstStyle/>
+          <a:p>
+            <a:pPr algn="ctr"/>
+            <a:endParaRPr lang="en-IN"/>
+          </a:p>
+        </p:txBody>
+      </p:sp>
+      <p:sp>
+        <p:nvSpPr>
+          <p:cNvPr id="15" name="Rectangle 14"/>
+          <p:cNvSpPr/>
+          <p:nvPr/>
+        </p:nvSpPr>
+        <p:spPr>
+          <a:xfrm>
+            <a:off x="2165678" y="3624262"/>
+            <a:ext cx="590969" cy="251882"/>
+          </a:xfrm>
+          <a:prstGeom prst="rect">
+            <a:avLst/>
+          </a:prstGeom>
+          <a:noFill/>
+          <a:ln w="28575">
+            <a:solidFill>
+              <a:schemeClr val="accent6">
+                <a:lumMod val="75000"/>
+              </a:schemeClr>
+            </a:solidFill>
+          </a:ln>
+        </p:spPr>
+        <p:style>
+          <a:lnRef idx="2">
+            <a:schemeClr val="accent1">
+              <a:shade val="50000"/>
+            </a:schemeClr>
+          </a:lnRef>
+          <a:fillRef idx="1">
+            <a:schemeClr val="accent1"/>
+          </a:fillRef>
+          <a:effectRef idx="0">
+            <a:schemeClr val="accent1"/>
+          </a:effectRef>
+          <a:fontRef idx="minor">
+            <a:schemeClr val="lt1"/>
+          </a:fontRef>
+        </p:style>
+        <p:txBody>
+          <a:bodyPr rtlCol="0" anchor="ctr"/>
+          <a:lstStyle/>
+          <a:p>
+            <a:pPr algn="ctr"/>
+            <a:endParaRPr lang="en-IN"/>
+          </a:p>
+        </p:txBody>
+      </p:sp>
+      <p:sp>
+        <p:nvSpPr>
+          <p:cNvPr id="17" name="Rectangle 16"/>
+          <p:cNvSpPr/>
+          <p:nvPr/>
+        </p:nvSpPr>
+        <p:spPr>
+          <a:xfrm>
+            <a:off x="8428545" y="3712484"/>
+            <a:ext cx="796137" cy="327319"/>
+          </a:xfrm>
+          <a:prstGeom prst="rect">
+            <a:avLst/>
+          </a:prstGeom>
+          <a:noFill/>
+          <a:ln w="28575">
+            <a:solidFill>
+              <a:schemeClr val="accent6">
+                <a:lumMod val="75000"/>
+              </a:schemeClr>
+            </a:solidFill>
+          </a:ln>
+        </p:spPr>
+        <p:style>
+          <a:lnRef idx="2">
+            <a:schemeClr val="accent1">
+              <a:shade val="50000"/>
+            </a:schemeClr>
+          </a:lnRef>
+          <a:fillRef idx="1">
+            <a:schemeClr val="accent1"/>
+          </a:fillRef>
+          <a:effectRef idx="0">
+            <a:schemeClr val="accent1"/>
+          </a:effectRef>
+          <a:fontRef idx="minor">
+            <a:schemeClr val="lt1"/>
+          </a:fontRef>
+        </p:style>
+        <p:txBody>
+          <a:bodyPr rtlCol="0" anchor="ctr"/>
+          <a:lstStyle/>
+          <a:p>
+            <a:pPr algn="ctr"/>
+            <a:endParaRPr lang="en-IN"/>
+          </a:p>
+        </p:txBody>
+      </p:sp>
+    </p:spTree>
+    <p:extLst>
+      <p:ext uri="{BB962C8B-B14F-4D97-AF65-F5344CB8AC3E}">
+        <p14:creationId xmlns:p14="http://schemas.microsoft.com/office/powerpoint/2010/main" val="468378889"/>
+      </p:ext>
+    </p:extLst>
+  </p:cSld>
+  <p:clrMapOvr>
+    <a:masterClrMapping/>
+  </p:clrMapOvr>
+  <p:timing>
+    <p:tnLst>
+      <p:par>
+        <p:cTn id="1" dur="indefinite" restart="never" nodeType="tmRoot"/>
+      </p:par>
+    </p:tnLst>
+  </p:timing>
+</p:sld>
+</file>
+
+<file path=ppt/slides/slide42.xml><?xml version="1.0" encoding="utf-8"?>
+<p:sld xmlns:a="http://schemas.openxmlformats.org/drawingml/2006/main" xmlns:r="http://schemas.openxmlformats.org/officeDocument/2006/relationships" xmlns:p="http://schemas.openxmlformats.org/presentationml/2006/main">
+  <p:cSld>
+    <p:spTree>
+      <p:nvGrpSpPr>
+        <p:cNvPr id="1" name=""/>
+        <p:cNvGrpSpPr/>
+        <p:nvPr/>
+      </p:nvGrpSpPr>
+      <p:grpSpPr>
+        <a:xfrm>
+          <a:off x="0" y="0"/>
+          <a:ext cx="0" cy="0"/>
+          <a:chOff x="0" y="0"/>
+          <a:chExt cx="0" cy="0"/>
+        </a:xfrm>
+      </p:grpSpPr>
+      <p:sp>
+        <p:nvSpPr>
+          <p:cNvPr id="2" name="Title 1"/>
+          <p:cNvSpPr>
+            <a:spLocks noGrp="1"/>
+          </p:cNvSpPr>
+          <p:nvPr>
+            <p:ph type="title"/>
+          </p:nvPr>
+        </p:nvSpPr>
+        <p:spPr>
+          <a:xfrm>
+            <a:off x="1154954" y="973668"/>
+            <a:ext cx="10137494" cy="706964"/>
+          </a:xfrm>
+        </p:spPr>
+        <p:txBody>
+          <a:bodyPr/>
+          <a:lstStyle/>
+          <a:p>
+            <a:r>
+              <a:rPr lang="en-IN" b="1" dirty="0"/>
+              <a:t>8.2 Understanding Attribute and </a:t>
+            </a:r>
+            <a:r>
+              <a:rPr lang="en-IN" b="1" dirty="0" smtClean="0"/>
+              <a:t>property(3)</a:t>
+            </a:r>
+            <a:endParaRPr lang="en-IN" b="1" dirty="0"/>
+          </a:p>
+        </p:txBody>
+      </p:sp>
+      <p:sp>
+        <p:nvSpPr>
+          <p:cNvPr id="3" name="Content Placeholder 2"/>
+          <p:cNvSpPr>
+            <a:spLocks noGrp="1"/>
+          </p:cNvSpPr>
+          <p:nvPr>
+            <p:ph sz="half" idx="2"/>
+          </p:nvPr>
+        </p:nvSpPr>
+        <p:spPr>
+          <a:xfrm>
+            <a:off x="1154954" y="2581836"/>
+            <a:ext cx="10530540" cy="484093"/>
+          </a:xfrm>
+        </p:spPr>
+        <p:txBody>
+          <a:bodyPr>
+            <a:normAutofit/>
+          </a:bodyPr>
+          <a:lstStyle/>
+          <a:p>
+            <a:r>
+              <a:rPr lang="en-IN" dirty="0" smtClean="0">
+                <a:solidFill>
+                  <a:schemeClr val="tx1"/>
+                </a:solidFill>
+              </a:rPr>
+              <a:t>Execute the following commands in console</a:t>
+            </a:r>
+            <a:endParaRPr lang="en-IN" dirty="0">
+              <a:solidFill>
+                <a:schemeClr val="tx1"/>
+              </a:solidFill>
+            </a:endParaRPr>
+          </a:p>
+        </p:txBody>
+      </p:sp>
+      <p:pic>
+        <p:nvPicPr>
+          <p:cNvPr id="4" name="Picture 3"/>
+          <p:cNvPicPr>
+            <a:picLocks noChangeAspect="1"/>
+          </p:cNvPicPr>
+          <p:nvPr/>
+        </p:nvPicPr>
+        <p:blipFill>
+          <a:blip r:embed="rId2"/>
+          <a:stretch>
+            <a:fillRect/>
+          </a:stretch>
+        </p:blipFill>
+        <p:spPr>
+          <a:xfrm>
+            <a:off x="1154954" y="3065929"/>
+            <a:ext cx="3333750" cy="2266950"/>
+          </a:xfrm>
+          <a:prstGeom prst="rect">
+            <a:avLst/>
+          </a:prstGeom>
+          <a:ln>
+            <a:solidFill>
+              <a:schemeClr val="bg1">
+                <a:lumMod val="75000"/>
+              </a:schemeClr>
+            </a:solidFill>
+          </a:ln>
+        </p:spPr>
+      </p:pic>
+      <p:pic>
+        <p:nvPicPr>
+          <p:cNvPr id="5" name="Picture 4"/>
+          <p:cNvPicPr>
+            <a:picLocks noChangeAspect="1"/>
+          </p:cNvPicPr>
+          <p:nvPr/>
+        </p:nvPicPr>
+        <p:blipFill>
+          <a:blip r:embed="rId3"/>
+          <a:stretch>
+            <a:fillRect/>
+          </a:stretch>
+        </p:blipFill>
+        <p:spPr>
+          <a:xfrm>
+            <a:off x="4958136" y="3065929"/>
+            <a:ext cx="2330808" cy="2266950"/>
+          </a:xfrm>
+          <a:prstGeom prst="rect">
+            <a:avLst/>
+          </a:prstGeom>
+          <a:ln>
+            <a:solidFill>
+              <a:schemeClr val="bg1">
+                <a:lumMod val="75000"/>
+              </a:schemeClr>
+            </a:solidFill>
+          </a:ln>
+        </p:spPr>
+      </p:pic>
+      <p:cxnSp>
+        <p:nvCxnSpPr>
+          <p:cNvPr id="9" name="Curved Connector 8"/>
+          <p:cNvCxnSpPr>
+            <a:endCxn id="10" idx="1"/>
+          </p:cNvCxnSpPr>
+          <p:nvPr/>
+        </p:nvCxnSpPr>
+        <p:spPr>
+          <a:xfrm flipV="1">
+            <a:off x="5286981" y="3389095"/>
+            <a:ext cx="2985143" cy="967754"/>
+          </a:xfrm>
+          <a:prstGeom prst="bentConnector3">
+            <a:avLst>
+              <a:gd name="adj1" fmla="val 449"/>
+            </a:avLst>
+          </a:prstGeom>
+          <a:ln w="28575">
+            <a:solidFill>
+              <a:schemeClr val="accent5">
+                <a:lumMod val="75000"/>
+              </a:schemeClr>
+            </a:solidFill>
+            <a:tailEnd type="triangle"/>
+          </a:ln>
+        </p:spPr>
+        <p:style>
+          <a:lnRef idx="1">
+            <a:schemeClr val="accent1"/>
+          </a:lnRef>
+          <a:fillRef idx="0">
+            <a:schemeClr val="accent1"/>
+          </a:fillRef>
+          <a:effectRef idx="0">
+            <a:schemeClr val="accent1"/>
+          </a:effectRef>
+          <a:fontRef idx="minor">
+            <a:schemeClr val="tx1"/>
+          </a:fontRef>
+        </p:style>
+      </p:cxnSp>
+      <p:sp>
+        <p:nvSpPr>
+          <p:cNvPr id="10" name="TextBox 9"/>
+          <p:cNvSpPr txBox="1"/>
+          <p:nvPr/>
+        </p:nvSpPr>
+        <p:spPr>
+          <a:xfrm>
+            <a:off x="8272124" y="3065929"/>
+            <a:ext cx="2003611" cy="646331"/>
+          </a:xfrm>
+          <a:prstGeom prst="rect">
+            <a:avLst/>
+          </a:prstGeom>
+          <a:noFill/>
+        </p:spPr>
+        <p:txBody>
+          <a:bodyPr wrap="square" rtlCol="0">
+            <a:spAutoFit/>
+          </a:bodyPr>
+          <a:lstStyle/>
+          <a:p>
+            <a:r>
+              <a:rPr lang="en-IN" dirty="0" smtClean="0">
+                <a:solidFill>
+                  <a:schemeClr val="accent5">
+                    <a:lumMod val="75000"/>
+                  </a:schemeClr>
+                </a:solidFill>
+              </a:rPr>
+              <a:t>$0 refers current element</a:t>
+            </a:r>
+            <a:endParaRPr lang="en-IN" dirty="0">
+              <a:solidFill>
+                <a:schemeClr val="accent5">
+                  <a:lumMod val="75000"/>
+                </a:schemeClr>
+              </a:solidFill>
+            </a:endParaRPr>
+          </a:p>
+        </p:txBody>
+      </p:sp>
+      <p:sp>
+        <p:nvSpPr>
+          <p:cNvPr id="30" name="TextBox 29"/>
+          <p:cNvSpPr txBox="1"/>
+          <p:nvPr/>
+        </p:nvSpPr>
+        <p:spPr>
+          <a:xfrm>
+            <a:off x="8407128" y="5816972"/>
+            <a:ext cx="2003611" cy="738664"/>
+          </a:xfrm>
+          <a:prstGeom prst="rect">
+            <a:avLst/>
+          </a:prstGeom>
+          <a:noFill/>
+        </p:spPr>
+        <p:txBody>
+          <a:bodyPr wrap="square" rtlCol="0">
+            <a:spAutoFit/>
+          </a:bodyPr>
+          <a:lstStyle/>
+          <a:p>
+            <a:r>
+              <a:rPr lang="en-IN" sz="1400" dirty="0" err="1" smtClean="0">
+                <a:solidFill>
+                  <a:srgbClr val="00B0F0"/>
+                </a:solidFill>
+              </a:rPr>
+              <a:t>getAttribute</a:t>
+            </a:r>
+            <a:r>
+              <a:rPr lang="en-IN" sz="1400" dirty="0" smtClean="0">
+                <a:solidFill>
+                  <a:srgbClr val="00B0F0"/>
+                </a:solidFill>
+              </a:rPr>
+              <a:t> means, what value assigned the attribute value </a:t>
+            </a:r>
+            <a:endParaRPr lang="en-IN" sz="1400" dirty="0">
+              <a:solidFill>
+                <a:srgbClr val="00B0F0"/>
+              </a:solidFill>
+            </a:endParaRPr>
+          </a:p>
+        </p:txBody>
+      </p:sp>
+      <p:pic>
+        <p:nvPicPr>
+          <p:cNvPr id="31" name="Picture 30"/>
+          <p:cNvPicPr>
+            <a:picLocks noChangeAspect="1"/>
+          </p:cNvPicPr>
+          <p:nvPr/>
+        </p:nvPicPr>
+        <p:blipFill>
+          <a:blip r:embed="rId4"/>
+          <a:stretch>
+            <a:fillRect/>
+          </a:stretch>
+        </p:blipFill>
+        <p:spPr>
+          <a:xfrm>
+            <a:off x="6456775" y="5321884"/>
+            <a:ext cx="5132879" cy="326368"/>
+          </a:xfrm>
+          <a:prstGeom prst="rect">
+            <a:avLst/>
+          </a:prstGeom>
+        </p:spPr>
+      </p:pic>
+      <p:sp>
+        <p:nvSpPr>
+          <p:cNvPr id="32" name="Rectangle 31"/>
+          <p:cNvSpPr/>
+          <p:nvPr/>
+        </p:nvSpPr>
+        <p:spPr>
+          <a:xfrm>
+            <a:off x="9493289" y="5351473"/>
+            <a:ext cx="1866620" cy="237533"/>
+          </a:xfrm>
+          <a:prstGeom prst="rect">
+            <a:avLst/>
+          </a:prstGeom>
+          <a:noFill/>
+          <a:ln w="28575">
+            <a:solidFill>
+              <a:srgbClr val="FFFF00"/>
+            </a:solidFill>
+          </a:ln>
+        </p:spPr>
+        <p:style>
+          <a:lnRef idx="2">
+            <a:schemeClr val="accent1">
+              <a:shade val="50000"/>
+            </a:schemeClr>
+          </a:lnRef>
+          <a:fillRef idx="1">
+            <a:schemeClr val="accent1"/>
+          </a:fillRef>
+          <a:effectRef idx="0">
+            <a:schemeClr val="accent1"/>
+          </a:effectRef>
+          <a:fontRef idx="minor">
+            <a:schemeClr val="lt1"/>
+          </a:fontRef>
+        </p:style>
+        <p:txBody>
+          <a:bodyPr rtlCol="0" anchor="ctr"/>
+          <a:lstStyle/>
+          <a:p>
+            <a:pPr algn="ctr"/>
+            <a:endParaRPr lang="en-IN">
+              <a:solidFill>
+                <a:srgbClr val="FFFF00"/>
+              </a:solidFill>
+            </a:endParaRPr>
+          </a:p>
+        </p:txBody>
+      </p:sp>
+      <p:cxnSp>
+        <p:nvCxnSpPr>
+          <p:cNvPr id="20" name="Elbow Connector 19"/>
+          <p:cNvCxnSpPr/>
+          <p:nvPr/>
+        </p:nvCxnSpPr>
+        <p:spPr>
+          <a:xfrm>
+            <a:off x="6954516" y="4356849"/>
+            <a:ext cx="2521653" cy="1500464"/>
+          </a:xfrm>
+          <a:prstGeom prst="bentConnector2">
+            <a:avLst/>
+          </a:prstGeom>
+          <a:ln w="28575">
+            <a:solidFill>
+              <a:srgbClr val="00B0F0"/>
+            </a:solidFill>
+            <a:tailEnd type="triangle"/>
+          </a:ln>
+        </p:spPr>
+        <p:style>
+          <a:lnRef idx="1">
+            <a:schemeClr val="accent1"/>
+          </a:lnRef>
+          <a:fillRef idx="0">
+            <a:schemeClr val="accent1"/>
+          </a:fillRef>
+          <a:effectRef idx="0">
+            <a:schemeClr val="accent1"/>
+          </a:effectRef>
+          <a:fontRef idx="minor">
+            <a:schemeClr val="tx1"/>
+          </a:fontRef>
+        </p:style>
+      </p:cxnSp>
+      <p:cxnSp>
+        <p:nvCxnSpPr>
+          <p:cNvPr id="34" name="Straight Arrow Connector 33"/>
+          <p:cNvCxnSpPr/>
+          <p:nvPr/>
+        </p:nvCxnSpPr>
+        <p:spPr>
+          <a:xfrm rot="10800000" flipV="1">
+            <a:off x="3751729" y="4800600"/>
+            <a:ext cx="1828800" cy="1016372"/>
+          </a:xfrm>
+          <a:prstGeom prst="bentConnector3">
+            <a:avLst>
+              <a:gd name="adj1" fmla="val -735"/>
+            </a:avLst>
+          </a:prstGeom>
+          <a:ln w="28575">
+            <a:solidFill>
+              <a:schemeClr val="accent1">
+                <a:lumMod val="60000"/>
+                <a:lumOff val="40000"/>
+              </a:schemeClr>
+            </a:solidFill>
+            <a:tailEnd type="triangle"/>
+          </a:ln>
+        </p:spPr>
+        <p:style>
+          <a:lnRef idx="1">
+            <a:schemeClr val="accent1"/>
+          </a:lnRef>
+          <a:fillRef idx="0">
+            <a:schemeClr val="accent1"/>
+          </a:fillRef>
+          <a:effectRef idx="0">
+            <a:schemeClr val="accent1"/>
+          </a:effectRef>
+          <a:fontRef idx="minor">
+            <a:schemeClr val="tx1"/>
+          </a:fontRef>
+        </p:style>
+      </p:cxnSp>
+      <p:sp>
+        <p:nvSpPr>
+          <p:cNvPr id="35" name="TextBox 34"/>
+          <p:cNvSpPr txBox="1"/>
+          <p:nvPr/>
+        </p:nvSpPr>
+        <p:spPr>
+          <a:xfrm>
+            <a:off x="1820023" y="5556794"/>
+            <a:ext cx="2003611" cy="738664"/>
+          </a:xfrm>
+          <a:prstGeom prst="rect">
+            <a:avLst/>
+          </a:prstGeom>
+          <a:noFill/>
+        </p:spPr>
+        <p:txBody>
+          <a:bodyPr wrap="square" rtlCol="0">
+            <a:spAutoFit/>
+          </a:bodyPr>
+          <a:lstStyle/>
+          <a:p>
+            <a:r>
+              <a:rPr lang="en-IN" sz="1400" dirty="0" smtClean="0">
+                <a:solidFill>
+                  <a:schemeClr val="accent1">
+                    <a:lumMod val="60000"/>
+                    <a:lumOff val="40000"/>
+                  </a:schemeClr>
+                </a:solidFill>
+              </a:rPr>
+              <a:t>What Value the current component have</a:t>
+            </a:r>
+            <a:endParaRPr lang="en-IN" sz="1400" dirty="0">
+              <a:solidFill>
+                <a:schemeClr val="accent1">
+                  <a:lumMod val="60000"/>
+                  <a:lumOff val="40000"/>
+                </a:schemeClr>
+              </a:solidFill>
+            </a:endParaRPr>
+          </a:p>
+        </p:txBody>
+      </p:sp>
+      <p:cxnSp>
+        <p:nvCxnSpPr>
+          <p:cNvPr id="36" name="Straight Arrow Connector 35"/>
+          <p:cNvCxnSpPr/>
+          <p:nvPr/>
+        </p:nvCxnSpPr>
+        <p:spPr>
+          <a:xfrm rot="10800000">
+            <a:off x="1480628" y="4944373"/>
+            <a:ext cx="3806353" cy="52874"/>
+          </a:xfrm>
+          <a:prstGeom prst="bentConnector3">
+            <a:avLst>
+              <a:gd name="adj1" fmla="val 89921"/>
+            </a:avLst>
+          </a:prstGeom>
+          <a:ln w="28575">
+            <a:solidFill>
+              <a:schemeClr val="accent1">
+                <a:lumMod val="60000"/>
+                <a:lumOff val="40000"/>
+              </a:schemeClr>
+            </a:solidFill>
+            <a:prstDash val="dash"/>
+            <a:tailEnd type="triangle"/>
+          </a:ln>
+        </p:spPr>
+        <p:style>
+          <a:lnRef idx="1">
+            <a:schemeClr val="accent1"/>
+          </a:lnRef>
+          <a:fillRef idx="0">
+            <a:schemeClr val="accent1"/>
+          </a:fillRef>
+          <a:effectRef idx="0">
+            <a:schemeClr val="accent1"/>
+          </a:effectRef>
+          <a:fontRef idx="minor">
+            <a:schemeClr val="tx1"/>
+          </a:fontRef>
+        </p:style>
+      </p:cxnSp>
+      <p:cxnSp>
+        <p:nvCxnSpPr>
+          <p:cNvPr id="46" name="Elbow Connector 45"/>
+          <p:cNvCxnSpPr/>
+          <p:nvPr/>
+        </p:nvCxnSpPr>
+        <p:spPr>
+          <a:xfrm>
+            <a:off x="5822925" y="4551388"/>
+            <a:ext cx="4708755" cy="682210"/>
+          </a:xfrm>
+          <a:prstGeom prst="bentConnector3">
+            <a:avLst>
+              <a:gd name="adj1" fmla="val 99976"/>
+            </a:avLst>
+          </a:prstGeom>
+          <a:ln w="28575">
+            <a:solidFill>
+              <a:srgbClr val="00B0F0"/>
+            </a:solidFill>
+            <a:prstDash val="dash"/>
+            <a:tailEnd type="triangle"/>
+          </a:ln>
+        </p:spPr>
+        <p:style>
+          <a:lnRef idx="1">
+            <a:schemeClr val="accent1"/>
+          </a:lnRef>
+          <a:fillRef idx="0">
+            <a:schemeClr val="accent1"/>
+          </a:fillRef>
+          <a:effectRef idx="0">
+            <a:schemeClr val="accent1"/>
+          </a:effectRef>
+          <a:fontRef idx="minor">
+            <a:schemeClr val="tx1"/>
+          </a:fontRef>
+        </p:style>
+      </p:cxnSp>
+      <p:cxnSp>
+        <p:nvCxnSpPr>
+          <p:cNvPr id="53" name="Curved Connector 8"/>
+          <p:cNvCxnSpPr/>
+          <p:nvPr/>
+        </p:nvCxnSpPr>
+        <p:spPr>
+          <a:xfrm rot="10800000" flipV="1">
+            <a:off x="1858985" y="4356847"/>
+            <a:ext cx="3427998" cy="535645"/>
+          </a:xfrm>
+          <a:prstGeom prst="bentConnector3">
+            <a:avLst>
+              <a:gd name="adj1" fmla="val 99818"/>
+            </a:avLst>
+          </a:prstGeom>
+          <a:ln w="28575">
+            <a:solidFill>
+              <a:schemeClr val="accent5">
+                <a:lumMod val="75000"/>
+              </a:schemeClr>
+            </a:solidFill>
+            <a:prstDash val="dash"/>
+            <a:tailEnd type="triangle"/>
+          </a:ln>
+        </p:spPr>
+        <p:style>
+          <a:lnRef idx="1">
+            <a:schemeClr val="accent1"/>
+          </a:lnRef>
+          <a:fillRef idx="0">
+            <a:schemeClr val="accent1"/>
+          </a:fillRef>
+          <a:effectRef idx="0">
+            <a:schemeClr val="accent1"/>
+          </a:effectRef>
+          <a:fontRef idx="minor">
+            <a:schemeClr val="tx1"/>
+          </a:fontRef>
+        </p:style>
+      </p:cxnSp>
+    </p:spTree>
+    <p:extLst>
+      <p:ext uri="{BB962C8B-B14F-4D97-AF65-F5344CB8AC3E}">
+        <p14:creationId xmlns:p14="http://schemas.microsoft.com/office/powerpoint/2010/main" val="1998673517"/>
+      </p:ext>
+    </p:extLst>
+  </p:cSld>
+  <p:clrMapOvr>
+    <a:masterClrMapping/>
+  </p:clrMapOvr>
+  <p:timing>
+    <p:tnLst>
+      <p:par>
+        <p:cTn id="1" dur="indefinite" restart="never" nodeType="tmRoot"/>
+      </p:par>
+    </p:tnLst>
+  </p:timing>
+</p:sld>
+</file>
+
+<file path=ppt/slides/slide43.xml><?xml version="1.0" encoding="utf-8"?>
+<p:sld xmlns:a="http://schemas.openxmlformats.org/drawingml/2006/main" xmlns:r="http://schemas.openxmlformats.org/officeDocument/2006/relationships" xmlns:p="http://schemas.openxmlformats.org/presentationml/2006/main">
+  <p:cSld>
+    <p:spTree>
+      <p:nvGrpSpPr>
+        <p:cNvPr id="1" name=""/>
+        <p:cNvGrpSpPr/>
+        <p:nvPr/>
+      </p:nvGrpSpPr>
+      <p:grpSpPr>
+        <a:xfrm>
+          <a:off x="0" y="0"/>
+          <a:ext cx="0" cy="0"/>
+          <a:chOff x="0" y="0"/>
+          <a:chExt cx="0" cy="0"/>
+        </a:xfrm>
+      </p:grpSpPr>
+      <p:pic>
+        <p:nvPicPr>
+          <p:cNvPr id="7" name="Picture 6"/>
+          <p:cNvPicPr>
+            <a:picLocks noChangeAspect="1"/>
+          </p:cNvPicPr>
+          <p:nvPr/>
+        </p:nvPicPr>
+        <p:blipFill>
+          <a:blip r:embed="rId2"/>
+          <a:stretch>
+            <a:fillRect/>
+          </a:stretch>
+        </p:blipFill>
+        <p:spPr>
+          <a:xfrm>
+            <a:off x="5011470" y="2990739"/>
+            <a:ext cx="2482650" cy="2360734"/>
+          </a:xfrm>
+          <a:prstGeom prst="rect">
+            <a:avLst/>
+          </a:prstGeom>
+          <a:ln>
+            <a:solidFill>
+              <a:schemeClr val="bg1">
+                <a:lumMod val="50000"/>
+              </a:schemeClr>
+            </a:solidFill>
+          </a:ln>
+        </p:spPr>
+      </p:pic>
+      <p:pic>
+        <p:nvPicPr>
+          <p:cNvPr id="6" name="Picture 5"/>
+          <p:cNvPicPr>
+            <a:picLocks noChangeAspect="1"/>
+          </p:cNvPicPr>
+          <p:nvPr/>
+        </p:nvPicPr>
+        <p:blipFill>
+          <a:blip r:embed="rId3"/>
+          <a:stretch>
+            <a:fillRect/>
+          </a:stretch>
+        </p:blipFill>
+        <p:spPr>
+          <a:xfrm>
+            <a:off x="1225737" y="3010071"/>
+            <a:ext cx="3457575" cy="2266950"/>
+          </a:xfrm>
+          <a:prstGeom prst="rect">
+            <a:avLst/>
+          </a:prstGeom>
+          <a:ln>
+            <a:solidFill>
+              <a:schemeClr val="bg1">
+                <a:lumMod val="50000"/>
+              </a:schemeClr>
+            </a:solidFill>
+          </a:ln>
+        </p:spPr>
+      </p:pic>
+      <p:sp>
+        <p:nvSpPr>
+          <p:cNvPr id="2" name="Title 1"/>
+          <p:cNvSpPr>
+            <a:spLocks noGrp="1"/>
+          </p:cNvSpPr>
+          <p:nvPr>
+            <p:ph type="title"/>
+          </p:nvPr>
+        </p:nvSpPr>
+        <p:spPr>
+          <a:xfrm>
+            <a:off x="1154954" y="973668"/>
+            <a:ext cx="10137494" cy="706964"/>
+          </a:xfrm>
+        </p:spPr>
+        <p:txBody>
+          <a:bodyPr/>
+          <a:lstStyle/>
+          <a:p>
+            <a:r>
+              <a:rPr lang="en-IN" b="1" dirty="0"/>
+              <a:t>8.2 Understanding Attribute and </a:t>
+            </a:r>
+            <a:r>
+              <a:rPr lang="en-IN" b="1" dirty="0" smtClean="0"/>
+              <a:t>property(4)</a:t>
+            </a:r>
+            <a:endParaRPr lang="en-IN" b="1" dirty="0"/>
+          </a:p>
+        </p:txBody>
+      </p:sp>
+      <p:sp>
+        <p:nvSpPr>
+          <p:cNvPr id="3" name="Content Placeholder 2"/>
+          <p:cNvSpPr>
+            <a:spLocks noGrp="1"/>
+          </p:cNvSpPr>
+          <p:nvPr>
+            <p:ph sz="half" idx="2"/>
+          </p:nvPr>
+        </p:nvSpPr>
+        <p:spPr>
+          <a:xfrm>
+            <a:off x="1154954" y="2581836"/>
+            <a:ext cx="10530540" cy="484093"/>
+          </a:xfrm>
+        </p:spPr>
+        <p:txBody>
+          <a:bodyPr>
+            <a:normAutofit/>
+          </a:bodyPr>
+          <a:lstStyle/>
+          <a:p>
+            <a:r>
+              <a:rPr lang="en-IN" dirty="0" smtClean="0">
+                <a:solidFill>
+                  <a:schemeClr val="tx1"/>
+                </a:solidFill>
+              </a:rPr>
+              <a:t>Change the value in the textbox and execute the same commands in console</a:t>
+            </a:r>
+            <a:endParaRPr lang="en-IN" dirty="0">
+              <a:solidFill>
+                <a:schemeClr val="tx1"/>
+              </a:solidFill>
+            </a:endParaRPr>
+          </a:p>
+        </p:txBody>
+      </p:sp>
+      <p:sp>
+        <p:nvSpPr>
+          <p:cNvPr id="30" name="TextBox 29"/>
+          <p:cNvSpPr txBox="1"/>
+          <p:nvPr/>
+        </p:nvSpPr>
+        <p:spPr>
+          <a:xfrm>
+            <a:off x="8407128" y="5816972"/>
+            <a:ext cx="2003611" cy="738664"/>
+          </a:xfrm>
+          <a:prstGeom prst="rect">
+            <a:avLst/>
+          </a:prstGeom>
+          <a:noFill/>
+        </p:spPr>
+        <p:txBody>
+          <a:bodyPr wrap="square" rtlCol="0">
+            <a:spAutoFit/>
+          </a:bodyPr>
+          <a:lstStyle/>
+          <a:p>
+            <a:r>
+              <a:rPr lang="en-IN" sz="1400" dirty="0" err="1" smtClean="0">
+                <a:solidFill>
+                  <a:srgbClr val="00B0F0"/>
+                </a:solidFill>
+              </a:rPr>
+              <a:t>getAttribute</a:t>
+            </a:r>
+            <a:r>
+              <a:rPr lang="en-IN" sz="1400" dirty="0" smtClean="0">
+                <a:solidFill>
+                  <a:srgbClr val="00B0F0"/>
+                </a:solidFill>
+              </a:rPr>
+              <a:t> means, what value assigned the attribute value </a:t>
+            </a:r>
+            <a:endParaRPr lang="en-IN" sz="1400" dirty="0">
+              <a:solidFill>
+                <a:srgbClr val="00B0F0"/>
+              </a:solidFill>
+            </a:endParaRPr>
+          </a:p>
+        </p:txBody>
+      </p:sp>
+      <p:pic>
+        <p:nvPicPr>
+          <p:cNvPr id="31" name="Picture 30"/>
+          <p:cNvPicPr>
+            <a:picLocks noChangeAspect="1"/>
+          </p:cNvPicPr>
+          <p:nvPr/>
+        </p:nvPicPr>
+        <p:blipFill>
+          <a:blip r:embed="rId4"/>
+          <a:stretch>
+            <a:fillRect/>
+          </a:stretch>
+        </p:blipFill>
+        <p:spPr>
+          <a:xfrm>
+            <a:off x="6456775" y="5321884"/>
+            <a:ext cx="5132879" cy="326368"/>
+          </a:xfrm>
+          <a:prstGeom prst="rect">
+            <a:avLst/>
+          </a:prstGeom>
+        </p:spPr>
+      </p:pic>
+      <p:sp>
+        <p:nvSpPr>
+          <p:cNvPr id="32" name="Rectangle 31"/>
+          <p:cNvSpPr/>
+          <p:nvPr/>
+        </p:nvSpPr>
+        <p:spPr>
+          <a:xfrm>
+            <a:off x="9493289" y="5351473"/>
+            <a:ext cx="1866620" cy="237533"/>
+          </a:xfrm>
+          <a:prstGeom prst="rect">
+            <a:avLst/>
+          </a:prstGeom>
+          <a:noFill/>
+          <a:ln w="28575">
+            <a:solidFill>
+              <a:srgbClr val="FFFF00"/>
+            </a:solidFill>
+          </a:ln>
+        </p:spPr>
+        <p:style>
+          <a:lnRef idx="2">
+            <a:schemeClr val="accent1">
+              <a:shade val="50000"/>
+            </a:schemeClr>
+          </a:lnRef>
+          <a:fillRef idx="1">
+            <a:schemeClr val="accent1"/>
+          </a:fillRef>
+          <a:effectRef idx="0">
+            <a:schemeClr val="accent1"/>
+          </a:effectRef>
+          <a:fontRef idx="minor">
+            <a:schemeClr val="lt1"/>
+          </a:fontRef>
+        </p:style>
+        <p:txBody>
+          <a:bodyPr rtlCol="0" anchor="ctr"/>
+          <a:lstStyle/>
+          <a:p>
+            <a:pPr algn="ctr"/>
+            <a:endParaRPr lang="en-IN">
+              <a:solidFill>
+                <a:srgbClr val="FFFF00"/>
+              </a:solidFill>
+            </a:endParaRPr>
+          </a:p>
+        </p:txBody>
+      </p:sp>
+      <p:cxnSp>
+        <p:nvCxnSpPr>
+          <p:cNvPr id="20" name="Elbow Connector 19"/>
+          <p:cNvCxnSpPr/>
+          <p:nvPr/>
+        </p:nvCxnSpPr>
+        <p:spPr>
+          <a:xfrm>
+            <a:off x="6954516" y="4356849"/>
+            <a:ext cx="2521653" cy="1500464"/>
+          </a:xfrm>
+          <a:prstGeom prst="bentConnector2">
+            <a:avLst/>
+          </a:prstGeom>
+          <a:ln w="28575">
+            <a:solidFill>
+              <a:srgbClr val="00B0F0"/>
+            </a:solidFill>
+            <a:tailEnd type="triangle"/>
+          </a:ln>
+        </p:spPr>
+        <p:style>
+          <a:lnRef idx="1">
+            <a:schemeClr val="accent1"/>
+          </a:lnRef>
+          <a:fillRef idx="0">
+            <a:schemeClr val="accent1"/>
+          </a:fillRef>
+          <a:effectRef idx="0">
+            <a:schemeClr val="accent1"/>
+          </a:effectRef>
+          <a:fontRef idx="minor">
+            <a:schemeClr val="tx1"/>
+          </a:fontRef>
+        </p:style>
+      </p:cxnSp>
+      <p:cxnSp>
+        <p:nvCxnSpPr>
+          <p:cNvPr id="34" name="Straight Arrow Connector 33"/>
+          <p:cNvCxnSpPr/>
+          <p:nvPr/>
+        </p:nvCxnSpPr>
+        <p:spPr>
+          <a:xfrm rot="10800000" flipV="1">
+            <a:off x="3751729" y="4800600"/>
+            <a:ext cx="1828800" cy="1016372"/>
+          </a:xfrm>
+          <a:prstGeom prst="bentConnector3">
+            <a:avLst>
+              <a:gd name="adj1" fmla="val -735"/>
+            </a:avLst>
+          </a:prstGeom>
+          <a:ln w="28575">
+            <a:solidFill>
+              <a:schemeClr val="accent1">
+                <a:lumMod val="60000"/>
+                <a:lumOff val="40000"/>
+              </a:schemeClr>
+            </a:solidFill>
+            <a:tailEnd type="triangle"/>
+          </a:ln>
+        </p:spPr>
+        <p:style>
+          <a:lnRef idx="1">
+            <a:schemeClr val="accent1"/>
+          </a:lnRef>
+          <a:fillRef idx="0">
+            <a:schemeClr val="accent1"/>
+          </a:fillRef>
+          <a:effectRef idx="0">
+            <a:schemeClr val="accent1"/>
+          </a:effectRef>
+          <a:fontRef idx="minor">
+            <a:schemeClr val="tx1"/>
+          </a:fontRef>
+        </p:style>
+      </p:cxnSp>
+      <p:sp>
+        <p:nvSpPr>
+          <p:cNvPr id="35" name="TextBox 34"/>
+          <p:cNvSpPr txBox="1"/>
+          <p:nvPr/>
+        </p:nvSpPr>
+        <p:spPr>
+          <a:xfrm>
+            <a:off x="1820023" y="5556794"/>
+            <a:ext cx="2003611" cy="738664"/>
+          </a:xfrm>
+          <a:prstGeom prst="rect">
+            <a:avLst/>
+          </a:prstGeom>
+          <a:noFill/>
+        </p:spPr>
+        <p:txBody>
+          <a:bodyPr wrap="square" rtlCol="0">
+            <a:spAutoFit/>
+          </a:bodyPr>
+          <a:lstStyle/>
+          <a:p>
+            <a:r>
+              <a:rPr lang="en-IN" sz="1400" dirty="0" smtClean="0">
+                <a:solidFill>
+                  <a:schemeClr val="accent1">
+                    <a:lumMod val="60000"/>
+                    <a:lumOff val="40000"/>
+                  </a:schemeClr>
+                </a:solidFill>
+              </a:rPr>
+              <a:t>What Value the current component have</a:t>
+            </a:r>
+            <a:endParaRPr lang="en-IN" sz="1400" dirty="0">
+              <a:solidFill>
+                <a:schemeClr val="accent1">
+                  <a:lumMod val="60000"/>
+                  <a:lumOff val="40000"/>
+                </a:schemeClr>
+              </a:solidFill>
+            </a:endParaRPr>
+          </a:p>
+        </p:txBody>
+      </p:sp>
+      <p:cxnSp>
+        <p:nvCxnSpPr>
+          <p:cNvPr id="36" name="Straight Arrow Connector 35"/>
+          <p:cNvCxnSpPr/>
+          <p:nvPr/>
+        </p:nvCxnSpPr>
+        <p:spPr>
+          <a:xfrm rot="10800000">
+            <a:off x="2875482" y="4975413"/>
+            <a:ext cx="2411500" cy="21835"/>
+          </a:xfrm>
+          <a:prstGeom prst="bentConnector3">
+            <a:avLst>
+              <a:gd name="adj1" fmla="val 50000"/>
+            </a:avLst>
+          </a:prstGeom>
+          <a:ln w="28575">
+            <a:solidFill>
+              <a:schemeClr val="accent1">
+                <a:lumMod val="60000"/>
+                <a:lumOff val="40000"/>
+              </a:schemeClr>
+            </a:solidFill>
+            <a:prstDash val="dash"/>
+            <a:tailEnd type="triangle"/>
+          </a:ln>
+        </p:spPr>
+        <p:style>
+          <a:lnRef idx="1">
+            <a:schemeClr val="accent1"/>
+          </a:lnRef>
+          <a:fillRef idx="0">
+            <a:schemeClr val="accent1"/>
+          </a:fillRef>
+          <a:effectRef idx="0">
+            <a:schemeClr val="accent1"/>
+          </a:effectRef>
+          <a:fontRef idx="minor">
+            <a:schemeClr val="tx1"/>
+          </a:fontRef>
+        </p:style>
+      </p:cxnSp>
+      <p:sp>
+        <p:nvSpPr>
+          <p:cNvPr id="21" name="Rectangle 20"/>
+          <p:cNvSpPr/>
+          <p:nvPr/>
+        </p:nvSpPr>
+        <p:spPr>
+          <a:xfrm>
+            <a:off x="5181053" y="4888489"/>
+            <a:ext cx="1316182" cy="195683"/>
+          </a:xfrm>
+          <a:prstGeom prst="rect">
+            <a:avLst/>
+          </a:prstGeom>
+          <a:noFill/>
+          <a:ln w="28575">
+            <a:solidFill>
+              <a:srgbClr val="00B050"/>
+            </a:solidFill>
+          </a:ln>
+        </p:spPr>
+        <p:style>
+          <a:lnRef idx="2">
+            <a:schemeClr val="accent1">
+              <a:shade val="50000"/>
+            </a:schemeClr>
+          </a:lnRef>
+          <a:fillRef idx="1">
+            <a:schemeClr val="accent1"/>
+          </a:fillRef>
+          <a:effectRef idx="0">
+            <a:schemeClr val="accent1"/>
+          </a:effectRef>
+          <a:fontRef idx="minor">
+            <a:schemeClr val="lt1"/>
+          </a:fontRef>
+        </p:style>
+        <p:txBody>
+          <a:bodyPr rtlCol="0" anchor="ctr"/>
+          <a:lstStyle/>
+          <a:p>
+            <a:pPr algn="ctr"/>
+            <a:endParaRPr lang="en-IN">
+              <a:solidFill>
+                <a:srgbClr val="FFFF00"/>
+              </a:solidFill>
+            </a:endParaRPr>
+          </a:p>
+        </p:txBody>
+      </p:sp>
+      <p:cxnSp>
+        <p:nvCxnSpPr>
+          <p:cNvPr id="46" name="Elbow Connector 45"/>
+          <p:cNvCxnSpPr/>
+          <p:nvPr/>
+        </p:nvCxnSpPr>
+        <p:spPr>
+          <a:xfrm>
+            <a:off x="5822925" y="4551388"/>
+            <a:ext cx="4708755" cy="682210"/>
+          </a:xfrm>
+          <a:prstGeom prst="bentConnector3">
+            <a:avLst>
+              <a:gd name="adj1" fmla="val 99976"/>
+            </a:avLst>
+          </a:prstGeom>
+          <a:ln w="28575">
+            <a:solidFill>
+              <a:srgbClr val="00B0F0"/>
+            </a:solidFill>
+            <a:prstDash val="dash"/>
+            <a:tailEnd type="triangle"/>
+          </a:ln>
+        </p:spPr>
+        <p:style>
+          <a:lnRef idx="1">
+            <a:schemeClr val="accent1"/>
+          </a:lnRef>
+          <a:fillRef idx="0">
+            <a:schemeClr val="accent1"/>
+          </a:fillRef>
+          <a:effectRef idx="0">
+            <a:schemeClr val="accent1"/>
+          </a:effectRef>
+          <a:fontRef idx="minor">
+            <a:schemeClr val="tx1"/>
+          </a:fontRef>
+        </p:style>
+      </p:cxnSp>
+    </p:spTree>
+    <p:extLst>
+      <p:ext uri="{BB962C8B-B14F-4D97-AF65-F5344CB8AC3E}">
+        <p14:creationId xmlns:p14="http://schemas.microsoft.com/office/powerpoint/2010/main" val="4059838239"/>
+      </p:ext>
+    </p:extLst>
+  </p:cSld>
+  <p:clrMapOvr>
+    <a:masterClrMapping/>
+  </p:clrMapOvr>
+  <p:timing>
+    <p:tnLst>
+      <p:par>
+        <p:cTn id="1" dur="indefinite" restart="never" nodeType="tmRoot"/>
+      </p:par>
+    </p:tnLst>
+  </p:timing>
+</p:sld>
+</file>
+
+<file path=ppt/slides/slide44.xml><?xml version="1.0" encoding="utf-8"?>
+<p:sld xmlns:a="http://schemas.openxmlformats.org/drawingml/2006/main" xmlns:r="http://schemas.openxmlformats.org/officeDocument/2006/relationships" xmlns:p="http://schemas.openxmlformats.org/presentationml/2006/main">
+  <p:cSld>
+    <p:spTree>
+      <p:nvGrpSpPr>
+        <p:cNvPr id="1" name=""/>
+        <p:cNvGrpSpPr/>
+        <p:nvPr/>
+      </p:nvGrpSpPr>
+      <p:grpSpPr>
+        <a:xfrm>
+          <a:off x="0" y="0"/>
+          <a:ext cx="0" cy="0"/>
+          <a:chOff x="0" y="0"/>
+          <a:chExt cx="0" cy="0"/>
+        </a:xfrm>
+      </p:grpSpPr>
+      <p:sp>
+        <p:nvSpPr>
+          <p:cNvPr id="2" name="Title 1"/>
+          <p:cNvSpPr>
+            <a:spLocks noGrp="1"/>
+          </p:cNvSpPr>
+          <p:nvPr>
+            <p:ph type="title"/>
+          </p:nvPr>
+        </p:nvSpPr>
+        <p:spPr>
+          <a:xfrm>
+            <a:off x="1154954" y="973668"/>
+            <a:ext cx="10137494" cy="706964"/>
+          </a:xfrm>
+        </p:spPr>
+        <p:txBody>
+          <a:bodyPr/>
+          <a:lstStyle/>
+          <a:p>
+            <a:r>
+              <a:rPr lang="en-IN" b="1" dirty="0" smtClean="0"/>
+              <a:t>8.3 Property Binding</a:t>
+            </a:r>
+            <a:endParaRPr lang="en-IN" b="1" dirty="0"/>
+          </a:p>
+        </p:txBody>
+      </p:sp>
+      <p:sp>
+        <p:nvSpPr>
+          <p:cNvPr id="3" name="Content Placeholder 2"/>
+          <p:cNvSpPr>
+            <a:spLocks noGrp="1"/>
+          </p:cNvSpPr>
+          <p:nvPr>
+            <p:ph sz="half" idx="2"/>
+          </p:nvPr>
+        </p:nvSpPr>
+        <p:spPr>
+          <a:xfrm>
+            <a:off x="1154954" y="2581836"/>
+            <a:ext cx="10530540" cy="1015813"/>
+          </a:xfrm>
+        </p:spPr>
+        <p:txBody>
+          <a:bodyPr>
+            <a:normAutofit fontScale="92500" lnSpcReduction="20000"/>
+          </a:bodyPr>
+          <a:lstStyle/>
+          <a:p>
+            <a:r>
+              <a:rPr lang="en-IN" dirty="0" smtClean="0">
+                <a:solidFill>
+                  <a:schemeClr val="tx1"/>
+                </a:solidFill>
+              </a:rPr>
+              <a:t>Create a property in component named </a:t>
+            </a:r>
+            <a:r>
+              <a:rPr lang="en-IN" dirty="0" err="1" smtClean="0">
+                <a:solidFill>
+                  <a:schemeClr val="accent6">
+                    <a:lumMod val="75000"/>
+                  </a:schemeClr>
+                </a:solidFill>
+              </a:rPr>
+              <a:t>myId</a:t>
+            </a:r>
+            <a:r>
+              <a:rPr lang="en-IN" dirty="0" smtClean="0">
+                <a:solidFill>
+                  <a:schemeClr val="accent6">
+                    <a:lumMod val="75000"/>
+                  </a:schemeClr>
+                </a:solidFill>
+              </a:rPr>
+              <a:t> </a:t>
+            </a:r>
+            <a:r>
+              <a:rPr lang="en-IN" dirty="0" smtClean="0">
+                <a:solidFill>
+                  <a:schemeClr val="tx1"/>
+                </a:solidFill>
+              </a:rPr>
+              <a:t>holds value as </a:t>
+            </a:r>
+            <a:r>
+              <a:rPr lang="en-IN" dirty="0" err="1" smtClean="0">
+                <a:solidFill>
+                  <a:schemeClr val="accent6">
+                    <a:lumMod val="75000"/>
+                  </a:schemeClr>
+                </a:solidFill>
+              </a:rPr>
+              <a:t>testId</a:t>
+            </a:r>
+            <a:endParaRPr lang="en-IN" dirty="0" smtClean="0">
+              <a:solidFill>
+                <a:schemeClr val="accent6">
+                  <a:lumMod val="75000"/>
+                </a:schemeClr>
+              </a:solidFill>
+            </a:endParaRPr>
+          </a:p>
+          <a:p>
+            <a:r>
+              <a:rPr lang="en-IN" dirty="0" smtClean="0">
+                <a:solidFill>
+                  <a:schemeClr val="tx1"/>
+                </a:solidFill>
+              </a:rPr>
+              <a:t>Bind the property </a:t>
+            </a:r>
+            <a:r>
+              <a:rPr lang="en-IN" dirty="0" err="1" smtClean="0">
+                <a:solidFill>
+                  <a:schemeClr val="tx1"/>
+                </a:solidFill>
+              </a:rPr>
+              <a:t>myId</a:t>
+            </a:r>
+            <a:r>
+              <a:rPr lang="en-IN" dirty="0" smtClean="0">
+                <a:solidFill>
+                  <a:schemeClr val="tx1"/>
+                </a:solidFill>
+              </a:rPr>
+              <a:t> to the ID attribute</a:t>
+            </a:r>
+          </a:p>
+          <a:p>
+            <a:r>
+              <a:rPr lang="en-IN" dirty="0" smtClean="0">
+                <a:solidFill>
+                  <a:schemeClr val="tx1"/>
+                </a:solidFill>
+              </a:rPr>
+              <a:t>And the ID gets the value of </a:t>
+            </a:r>
+            <a:r>
+              <a:rPr lang="en-IN" dirty="0" err="1" smtClean="0">
+                <a:solidFill>
+                  <a:schemeClr val="tx1"/>
+                </a:solidFill>
+              </a:rPr>
+              <a:t>myId</a:t>
+            </a:r>
+            <a:r>
+              <a:rPr lang="en-IN" dirty="0" smtClean="0">
+                <a:solidFill>
+                  <a:schemeClr val="tx1"/>
+                </a:solidFill>
+              </a:rPr>
+              <a:t> property as </a:t>
+            </a:r>
+            <a:r>
+              <a:rPr lang="en-IN" dirty="0" err="1" smtClean="0">
+                <a:solidFill>
+                  <a:schemeClr val="tx1"/>
+                </a:solidFill>
+              </a:rPr>
+              <a:t>testId</a:t>
+            </a:r>
+            <a:endParaRPr lang="en-IN" dirty="0" smtClean="0">
+              <a:solidFill>
+                <a:schemeClr val="tx1"/>
+              </a:solidFill>
+            </a:endParaRPr>
+          </a:p>
+          <a:p>
+            <a:endParaRPr lang="en-IN" b="1" dirty="0">
+              <a:solidFill>
+                <a:schemeClr val="accent6">
+                  <a:lumMod val="75000"/>
+                </a:schemeClr>
+              </a:solidFill>
+            </a:endParaRPr>
+          </a:p>
+        </p:txBody>
+      </p:sp>
+      <p:pic>
+        <p:nvPicPr>
+          <p:cNvPr id="4" name="Picture 3"/>
+          <p:cNvPicPr>
+            <a:picLocks noChangeAspect="1"/>
+          </p:cNvPicPr>
+          <p:nvPr/>
+        </p:nvPicPr>
+        <p:blipFill>
+          <a:blip r:embed="rId2"/>
+          <a:stretch>
+            <a:fillRect/>
+          </a:stretch>
+        </p:blipFill>
+        <p:spPr>
+          <a:xfrm>
+            <a:off x="1189738" y="3597649"/>
+            <a:ext cx="5033963" cy="3107997"/>
+          </a:xfrm>
+          <a:prstGeom prst="rect">
+            <a:avLst/>
+          </a:prstGeom>
+        </p:spPr>
+      </p:pic>
+      <p:pic>
+        <p:nvPicPr>
+          <p:cNvPr id="5" name="Picture 4"/>
+          <p:cNvPicPr>
+            <a:picLocks noChangeAspect="1"/>
+          </p:cNvPicPr>
+          <p:nvPr/>
+        </p:nvPicPr>
+        <p:blipFill>
+          <a:blip r:embed="rId3"/>
+          <a:stretch>
+            <a:fillRect/>
+          </a:stretch>
+        </p:blipFill>
+        <p:spPr>
+          <a:xfrm>
+            <a:off x="6420224" y="3710547"/>
+            <a:ext cx="2858247" cy="1945529"/>
+          </a:xfrm>
+          <a:prstGeom prst="rect">
+            <a:avLst/>
+          </a:prstGeom>
+          <a:ln>
+            <a:solidFill>
+              <a:schemeClr val="bg1">
+                <a:lumMod val="50000"/>
+              </a:schemeClr>
+            </a:solidFill>
+          </a:ln>
+        </p:spPr>
+      </p:pic>
+      <p:pic>
+        <p:nvPicPr>
+          <p:cNvPr id="6" name="Picture 5"/>
+          <p:cNvPicPr>
+            <a:picLocks noChangeAspect="1"/>
+          </p:cNvPicPr>
+          <p:nvPr/>
+        </p:nvPicPr>
+        <p:blipFill>
+          <a:blip r:embed="rId4"/>
+          <a:stretch>
+            <a:fillRect/>
+          </a:stretch>
+        </p:blipFill>
+        <p:spPr>
+          <a:xfrm>
+            <a:off x="6420224" y="5768974"/>
+            <a:ext cx="4620186" cy="935132"/>
+          </a:xfrm>
+          <a:prstGeom prst="rect">
+            <a:avLst/>
+          </a:prstGeom>
+          <a:ln>
+            <a:solidFill>
+              <a:schemeClr val="bg1">
+                <a:lumMod val="50000"/>
+              </a:schemeClr>
+            </a:solidFill>
+          </a:ln>
+        </p:spPr>
+      </p:pic>
+      <p:cxnSp>
+        <p:nvCxnSpPr>
+          <p:cNvPr id="11" name="Straight Arrow Connector 10"/>
+          <p:cNvCxnSpPr/>
+          <p:nvPr/>
+        </p:nvCxnSpPr>
+        <p:spPr>
+          <a:xfrm>
+            <a:off x="7355541" y="5379010"/>
+            <a:ext cx="0" cy="995082"/>
+          </a:xfrm>
+          <a:prstGeom prst="straightConnector1">
+            <a:avLst/>
+          </a:prstGeom>
+          <a:ln>
+            <a:tailEnd type="triangle"/>
+          </a:ln>
+        </p:spPr>
+        <p:style>
+          <a:lnRef idx="1">
+            <a:schemeClr val="accent1"/>
+          </a:lnRef>
+          <a:fillRef idx="0">
+            <a:schemeClr val="accent1"/>
+          </a:fillRef>
+          <a:effectRef idx="0">
+            <a:schemeClr val="accent1"/>
+          </a:effectRef>
+          <a:fontRef idx="minor">
+            <a:schemeClr val="tx1"/>
+          </a:fontRef>
+        </p:style>
+      </p:cxnSp>
+      <p:cxnSp>
+        <p:nvCxnSpPr>
+          <p:cNvPr id="16" name="Straight Arrow Connector 15"/>
+          <p:cNvCxnSpPr/>
+          <p:nvPr/>
+        </p:nvCxnSpPr>
+        <p:spPr>
+          <a:xfrm flipV="1">
+            <a:off x="2810435" y="5048996"/>
+            <a:ext cx="430306" cy="975286"/>
+          </a:xfrm>
+          <a:prstGeom prst="straightConnector1">
+            <a:avLst/>
+          </a:prstGeom>
+          <a:ln w="28575">
+            <a:solidFill>
+              <a:srgbClr val="FFFF00"/>
+            </a:solidFill>
+            <a:tailEnd type="triangle"/>
+          </a:ln>
+        </p:spPr>
+        <p:style>
+          <a:lnRef idx="1">
+            <a:schemeClr val="accent1"/>
+          </a:lnRef>
+          <a:fillRef idx="0">
+            <a:schemeClr val="accent1"/>
+          </a:fillRef>
+          <a:effectRef idx="0">
+            <a:schemeClr val="accent1"/>
+          </a:effectRef>
+          <a:fontRef idx="minor">
+            <a:schemeClr val="tx1"/>
+          </a:fontRef>
+        </p:style>
+      </p:cxnSp>
+      <p:cxnSp>
+        <p:nvCxnSpPr>
+          <p:cNvPr id="20" name="Straight Arrow Connector 19"/>
+          <p:cNvCxnSpPr/>
+          <p:nvPr/>
+        </p:nvCxnSpPr>
+        <p:spPr>
+          <a:xfrm>
+            <a:off x="3240741" y="5008655"/>
+            <a:ext cx="6656294" cy="1325096"/>
+          </a:xfrm>
+          <a:prstGeom prst="straightConnector1">
+            <a:avLst/>
+          </a:prstGeom>
+          <a:ln w="28575">
+            <a:solidFill>
+              <a:schemeClr val="accent5"/>
+            </a:solidFill>
+            <a:tailEnd type="triangle"/>
+          </a:ln>
+        </p:spPr>
+        <p:style>
+          <a:lnRef idx="1">
+            <a:schemeClr val="accent1"/>
+          </a:lnRef>
+          <a:fillRef idx="0">
+            <a:schemeClr val="accent1"/>
+          </a:fillRef>
+          <a:effectRef idx="0">
+            <a:schemeClr val="accent1"/>
+          </a:effectRef>
+          <a:fontRef idx="minor">
+            <a:schemeClr val="tx1"/>
+          </a:fontRef>
+        </p:style>
+      </p:cxnSp>
+    </p:spTree>
+    <p:extLst>
+      <p:ext uri="{BB962C8B-B14F-4D97-AF65-F5344CB8AC3E}">
+        <p14:creationId xmlns:p14="http://schemas.microsoft.com/office/powerpoint/2010/main" val="2487401694"/>
+      </p:ext>
+    </p:extLst>
+  </p:cSld>
+  <p:clrMapOvr>
+    <a:masterClrMapping/>
+  </p:clrMapOvr>
+  <p:timing>
+    <p:tnLst>
+      <p:par>
+        <p:cTn id="1" dur="indefinite" restart="never" nodeType="tmRoot"/>
+      </p:par>
+    </p:tnLst>
+  </p:timing>
+</p:sld>
+</file>
+
+<file path=ppt/slides/slide45.xml><?xml version="1.0" encoding="utf-8"?>
+<p:sld xmlns:a="http://schemas.openxmlformats.org/drawingml/2006/main" xmlns:r="http://schemas.openxmlformats.org/officeDocument/2006/relationships" xmlns:p="http://schemas.openxmlformats.org/presentationml/2006/main">
+  <p:cSld>
+    <p:spTree>
+      <p:nvGrpSpPr>
+        <p:cNvPr id="1" name=""/>
+        <p:cNvGrpSpPr/>
+        <p:nvPr/>
+      </p:nvGrpSpPr>
+      <p:grpSpPr>
+        <a:xfrm>
+          <a:off x="0" y="0"/>
+          <a:ext cx="0" cy="0"/>
+          <a:chOff x="0" y="0"/>
+          <a:chExt cx="0" cy="0"/>
+        </a:xfrm>
+      </p:grpSpPr>
+      <p:pic>
+        <p:nvPicPr>
+          <p:cNvPr id="7" name="Picture 6"/>
+          <p:cNvPicPr>
+            <a:picLocks noChangeAspect="1"/>
+          </p:cNvPicPr>
+          <p:nvPr/>
+        </p:nvPicPr>
+        <p:blipFill>
+          <a:blip r:embed="rId2"/>
+          <a:stretch>
+            <a:fillRect/>
+          </a:stretch>
+        </p:blipFill>
+        <p:spPr>
+          <a:xfrm>
+            <a:off x="1203325" y="3380990"/>
+            <a:ext cx="5684558" cy="3255330"/>
+          </a:xfrm>
+          <a:prstGeom prst="rect">
+            <a:avLst/>
+          </a:prstGeom>
+        </p:spPr>
+      </p:pic>
+      <p:sp>
+        <p:nvSpPr>
+          <p:cNvPr id="2" name="Title 1"/>
+          <p:cNvSpPr>
+            <a:spLocks noGrp="1"/>
+          </p:cNvSpPr>
+          <p:nvPr>
+            <p:ph type="title"/>
+          </p:nvPr>
+        </p:nvSpPr>
+        <p:spPr>
+          <a:xfrm>
+            <a:off x="1154954" y="973668"/>
+            <a:ext cx="10137494" cy="706964"/>
+          </a:xfrm>
+        </p:spPr>
+        <p:txBody>
+          <a:bodyPr/>
+          <a:lstStyle/>
+          <a:p>
+            <a:r>
+              <a:rPr lang="en-IN" b="1" dirty="0" smtClean="0"/>
+              <a:t>8.4 Property Binding [] as Interpolation{{}}</a:t>
+            </a:r>
+            <a:endParaRPr lang="en-IN" b="1" dirty="0"/>
+          </a:p>
+        </p:txBody>
+      </p:sp>
+      <p:sp>
+        <p:nvSpPr>
+          <p:cNvPr id="3" name="Content Placeholder 2"/>
+          <p:cNvSpPr>
+            <a:spLocks noGrp="1"/>
+          </p:cNvSpPr>
+          <p:nvPr>
+            <p:ph sz="half" idx="2"/>
+          </p:nvPr>
+        </p:nvSpPr>
+        <p:spPr>
+          <a:xfrm>
+            <a:off x="1154954" y="2581836"/>
+            <a:ext cx="10530540" cy="1015813"/>
+          </a:xfrm>
+        </p:spPr>
+        <p:txBody>
+          <a:bodyPr>
+            <a:normAutofit/>
+          </a:bodyPr>
+          <a:lstStyle/>
+          <a:p>
+            <a:r>
+              <a:rPr lang="en-IN" dirty="0" smtClean="0">
+                <a:solidFill>
+                  <a:schemeClr val="tx1"/>
+                </a:solidFill>
+              </a:rPr>
+              <a:t>For String values property binding [] can also be done as Interpolation{{}}</a:t>
+            </a:r>
+            <a:endParaRPr lang="en-IN" b="1" dirty="0">
+              <a:solidFill>
+                <a:schemeClr val="accent6">
+                  <a:lumMod val="75000"/>
+                </a:schemeClr>
+              </a:solidFill>
+            </a:endParaRPr>
+          </a:p>
+        </p:txBody>
+      </p:sp>
+      <p:cxnSp>
+        <p:nvCxnSpPr>
+          <p:cNvPr id="16" name="Straight Arrow Connector 15"/>
+          <p:cNvCxnSpPr/>
+          <p:nvPr/>
+        </p:nvCxnSpPr>
+        <p:spPr>
+          <a:xfrm flipV="1">
+            <a:off x="2810435" y="4774085"/>
+            <a:ext cx="430306" cy="1250197"/>
+          </a:xfrm>
+          <a:prstGeom prst="straightConnector1">
+            <a:avLst/>
+          </a:prstGeom>
+          <a:ln w="28575">
+            <a:solidFill>
+              <a:srgbClr val="FFC000"/>
+            </a:solidFill>
+            <a:tailEnd type="triangle"/>
+          </a:ln>
+        </p:spPr>
+        <p:style>
+          <a:lnRef idx="1">
+            <a:schemeClr val="accent1"/>
+          </a:lnRef>
+          <a:fillRef idx="0">
+            <a:schemeClr val="accent1"/>
+          </a:fillRef>
+          <a:effectRef idx="0">
+            <a:schemeClr val="accent1"/>
+          </a:effectRef>
+          <a:fontRef idx="minor">
+            <a:schemeClr val="tx1"/>
+          </a:fontRef>
+        </p:style>
+      </p:cxnSp>
+      <p:pic>
+        <p:nvPicPr>
+          <p:cNvPr id="8" name="Picture 7"/>
+          <p:cNvPicPr>
+            <a:picLocks noChangeAspect="1"/>
+          </p:cNvPicPr>
+          <p:nvPr/>
+        </p:nvPicPr>
+        <p:blipFill rotWithShape="1">
+          <a:blip r:embed="rId3"/>
+          <a:srcRect b="14875"/>
+          <a:stretch/>
+        </p:blipFill>
+        <p:spPr>
+          <a:xfrm>
+            <a:off x="6973141" y="3367759"/>
+            <a:ext cx="3476625" cy="2262187"/>
+          </a:xfrm>
+          <a:prstGeom prst="rect">
+            <a:avLst/>
+          </a:prstGeom>
+          <a:ln>
+            <a:solidFill>
+              <a:schemeClr val="bg1">
+                <a:lumMod val="65000"/>
+              </a:schemeClr>
+            </a:solidFill>
+          </a:ln>
+        </p:spPr>
+      </p:pic>
+      <p:pic>
+        <p:nvPicPr>
+          <p:cNvPr id="9" name="Picture 8"/>
+          <p:cNvPicPr>
+            <a:picLocks noChangeAspect="1"/>
+          </p:cNvPicPr>
+          <p:nvPr/>
+        </p:nvPicPr>
+        <p:blipFill>
+          <a:blip r:embed="rId4"/>
+          <a:stretch>
+            <a:fillRect/>
+          </a:stretch>
+        </p:blipFill>
+        <p:spPr>
+          <a:xfrm>
+            <a:off x="6973141" y="5836210"/>
+            <a:ext cx="4489917" cy="721134"/>
+          </a:xfrm>
+          <a:prstGeom prst="rect">
+            <a:avLst/>
+          </a:prstGeom>
+          <a:ln>
+            <a:solidFill>
+              <a:schemeClr val="bg1">
+                <a:lumMod val="65000"/>
+              </a:schemeClr>
+            </a:solidFill>
+          </a:ln>
+        </p:spPr>
+      </p:pic>
+      <p:cxnSp>
+        <p:nvCxnSpPr>
+          <p:cNvPr id="11" name="Straight Arrow Connector 10"/>
+          <p:cNvCxnSpPr/>
+          <p:nvPr/>
+        </p:nvCxnSpPr>
+        <p:spPr>
+          <a:xfrm>
+            <a:off x="8711453" y="5271247"/>
+            <a:ext cx="2395818" cy="753035"/>
+          </a:xfrm>
+          <a:prstGeom prst="straightConnector1">
+            <a:avLst/>
+          </a:prstGeom>
+          <a:ln w="28575">
+            <a:solidFill>
+              <a:srgbClr val="FFC000"/>
+            </a:solidFill>
+            <a:tailEnd type="triangle"/>
+          </a:ln>
+        </p:spPr>
+        <p:style>
+          <a:lnRef idx="1">
+            <a:schemeClr val="accent1"/>
+          </a:lnRef>
+          <a:fillRef idx="0">
+            <a:schemeClr val="accent1"/>
+          </a:fillRef>
+          <a:effectRef idx="0">
+            <a:schemeClr val="accent1"/>
+          </a:effectRef>
+          <a:fontRef idx="minor">
+            <a:schemeClr val="tx1"/>
+          </a:fontRef>
+        </p:style>
+      </p:cxnSp>
+      <p:cxnSp>
+        <p:nvCxnSpPr>
+          <p:cNvPr id="20" name="Straight Arrow Connector 19"/>
+          <p:cNvCxnSpPr/>
+          <p:nvPr/>
+        </p:nvCxnSpPr>
+        <p:spPr>
+          <a:xfrm>
+            <a:off x="3240741" y="4774085"/>
+            <a:ext cx="7866530" cy="1250197"/>
+          </a:xfrm>
+          <a:prstGeom prst="straightConnector1">
+            <a:avLst/>
+          </a:prstGeom>
+          <a:ln w="28575">
+            <a:solidFill>
+              <a:srgbClr val="FFC000"/>
+            </a:solidFill>
+            <a:tailEnd type="triangle"/>
+          </a:ln>
+        </p:spPr>
+        <p:style>
+          <a:lnRef idx="1">
+            <a:schemeClr val="accent1"/>
+          </a:lnRef>
+          <a:fillRef idx="0">
+            <a:schemeClr val="accent1"/>
+          </a:fillRef>
+          <a:effectRef idx="0">
+            <a:schemeClr val="accent1"/>
+          </a:effectRef>
+          <a:fontRef idx="minor">
+            <a:schemeClr val="tx1"/>
+          </a:fontRef>
+        </p:style>
+      </p:cxnSp>
+      <p:cxnSp>
+        <p:nvCxnSpPr>
+          <p:cNvPr id="19" name="Straight Arrow Connector 18"/>
+          <p:cNvCxnSpPr/>
+          <p:nvPr/>
+        </p:nvCxnSpPr>
+        <p:spPr>
+          <a:xfrm flipV="1">
+            <a:off x="2810435" y="5008655"/>
+            <a:ext cx="524436" cy="1015627"/>
+          </a:xfrm>
+          <a:prstGeom prst="straightConnector1">
+            <a:avLst/>
+          </a:prstGeom>
+          <a:ln w="28575">
+            <a:solidFill>
+              <a:schemeClr val="accent1">
+                <a:lumMod val="60000"/>
+                <a:lumOff val="40000"/>
+              </a:schemeClr>
+            </a:solidFill>
+            <a:tailEnd type="triangle"/>
+          </a:ln>
+        </p:spPr>
+        <p:style>
+          <a:lnRef idx="1">
+            <a:schemeClr val="accent1"/>
+          </a:lnRef>
+          <a:fillRef idx="0">
+            <a:schemeClr val="accent1"/>
+          </a:fillRef>
+          <a:effectRef idx="0">
+            <a:schemeClr val="accent1"/>
+          </a:effectRef>
+          <a:fontRef idx="minor">
+            <a:schemeClr val="tx1"/>
+          </a:fontRef>
+        </p:style>
+      </p:cxnSp>
+      <p:cxnSp>
+        <p:nvCxnSpPr>
+          <p:cNvPr id="22" name="Straight Arrow Connector 21"/>
+          <p:cNvCxnSpPr/>
+          <p:nvPr/>
+        </p:nvCxnSpPr>
+        <p:spPr>
+          <a:xfrm>
+            <a:off x="3325999" y="5008655"/>
+            <a:ext cx="7525777" cy="1310183"/>
+          </a:xfrm>
+          <a:prstGeom prst="straightConnector1">
+            <a:avLst/>
+          </a:prstGeom>
+          <a:ln w="28575">
+            <a:solidFill>
+              <a:schemeClr val="accent1">
+                <a:lumMod val="60000"/>
+                <a:lumOff val="40000"/>
+              </a:schemeClr>
+            </a:solidFill>
+            <a:tailEnd type="triangle"/>
+          </a:ln>
+        </p:spPr>
+        <p:style>
+          <a:lnRef idx="1">
+            <a:schemeClr val="accent1"/>
+          </a:lnRef>
+          <a:fillRef idx="0">
+            <a:schemeClr val="accent1"/>
+          </a:fillRef>
+          <a:effectRef idx="0">
+            <a:schemeClr val="accent1"/>
+          </a:effectRef>
+          <a:fontRef idx="minor">
+            <a:schemeClr val="tx1"/>
+          </a:fontRef>
+        </p:style>
+      </p:cxnSp>
+      <p:cxnSp>
+        <p:nvCxnSpPr>
+          <p:cNvPr id="25" name="Straight Arrow Connector 24"/>
+          <p:cNvCxnSpPr/>
+          <p:nvPr/>
+        </p:nvCxnSpPr>
+        <p:spPr>
+          <a:xfrm>
+            <a:off x="7403447" y="5559448"/>
+            <a:ext cx="3448329" cy="759390"/>
+          </a:xfrm>
+          <a:prstGeom prst="straightConnector1">
+            <a:avLst/>
+          </a:prstGeom>
+          <a:ln w="28575">
+            <a:solidFill>
+              <a:schemeClr val="accent1">
+                <a:lumMod val="60000"/>
+                <a:lumOff val="40000"/>
+              </a:schemeClr>
+            </a:solidFill>
+            <a:tailEnd type="triangle"/>
+          </a:ln>
+        </p:spPr>
+        <p:style>
+          <a:lnRef idx="1">
+            <a:schemeClr val="accent1"/>
+          </a:lnRef>
+          <a:fillRef idx="0">
+            <a:schemeClr val="accent1"/>
+          </a:fillRef>
+          <a:effectRef idx="0">
+            <a:schemeClr val="accent1"/>
+          </a:effectRef>
+          <a:fontRef idx="minor">
+            <a:schemeClr val="tx1"/>
+          </a:fontRef>
+        </p:style>
+      </p:cxnSp>
+    </p:spTree>
+    <p:extLst>
+      <p:ext uri="{BB962C8B-B14F-4D97-AF65-F5344CB8AC3E}">
+        <p14:creationId xmlns:p14="http://schemas.microsoft.com/office/powerpoint/2010/main" val="260046988"/>
+      </p:ext>
+    </p:extLst>
+  </p:cSld>
+  <p:clrMapOvr>
+    <a:masterClrMapping/>
+  </p:clrMapOvr>
+  <p:timing>
+    <p:tnLst>
+      <p:par>
+        <p:cTn id="1" dur="indefinite" restart="never" nodeType="tmRoot"/>
+      </p:par>
+    </p:tnLst>
+  </p:timing>
+</p:sld>
+</file>
+
+<file path=ppt/slides/slide46.xml><?xml version="1.0" encoding="utf-8"?>
+<p:sld xmlns:a="http://schemas.openxmlformats.org/drawingml/2006/main" xmlns:r="http://schemas.openxmlformats.org/officeDocument/2006/relationships" xmlns:p="http://schemas.openxmlformats.org/presentationml/2006/main">
+  <p:cSld>
+    <p:spTree>
+      <p:nvGrpSpPr>
+        <p:cNvPr id="1" name=""/>
+        <p:cNvGrpSpPr/>
+        <p:nvPr/>
+      </p:nvGrpSpPr>
+      <p:grpSpPr>
+        <a:xfrm>
+          <a:off x="0" y="0"/>
+          <a:ext cx="0" cy="0"/>
+          <a:chOff x="0" y="0"/>
+          <a:chExt cx="0" cy="0"/>
+        </a:xfrm>
+      </p:grpSpPr>
+      <p:sp>
+        <p:nvSpPr>
+          <p:cNvPr id="2" name="Title 1"/>
+          <p:cNvSpPr>
+            <a:spLocks noGrp="1"/>
+          </p:cNvSpPr>
+          <p:nvPr>
+            <p:ph type="title"/>
+          </p:nvPr>
+        </p:nvSpPr>
+        <p:spPr>
+          <a:xfrm>
+            <a:off x="1154954" y="973668"/>
+            <a:ext cx="10137494" cy="706964"/>
+          </a:xfrm>
+        </p:spPr>
+        <p:txBody>
+          <a:bodyPr/>
+          <a:lstStyle/>
+          <a:p>
+            <a:r>
+              <a:rPr lang="en-IN" b="1" dirty="0" smtClean="0"/>
+              <a:t>8.5 Limitations in Interpolation{{}}</a:t>
+            </a:r>
+            <a:endParaRPr lang="en-IN" b="1" dirty="0"/>
+          </a:p>
+        </p:txBody>
+      </p:sp>
+      <p:sp>
+        <p:nvSpPr>
+          <p:cNvPr id="3" name="Content Placeholder 2"/>
+          <p:cNvSpPr>
+            <a:spLocks noGrp="1"/>
+          </p:cNvSpPr>
+          <p:nvPr>
+            <p:ph sz="half" idx="2"/>
+          </p:nvPr>
+        </p:nvSpPr>
+        <p:spPr>
+          <a:xfrm>
+            <a:off x="1154954" y="2581836"/>
+            <a:ext cx="10530540" cy="1015813"/>
+          </a:xfrm>
+        </p:spPr>
+        <p:txBody>
+          <a:bodyPr>
+            <a:normAutofit/>
+          </a:bodyPr>
+          <a:lstStyle/>
+          <a:p>
+            <a:r>
+              <a:rPr lang="en-IN" dirty="0" smtClean="0">
+                <a:solidFill>
+                  <a:schemeClr val="tx1"/>
+                </a:solidFill>
+              </a:rPr>
+              <a:t>For Boolean values Interpolation{{}} wont work</a:t>
+            </a:r>
+            <a:endParaRPr lang="en-IN" b="1" dirty="0">
+              <a:solidFill>
+                <a:schemeClr val="accent6">
+                  <a:lumMod val="75000"/>
+                </a:schemeClr>
+              </a:solidFill>
+            </a:endParaRPr>
+          </a:p>
+        </p:txBody>
+      </p:sp>
+      <p:pic>
+        <p:nvPicPr>
+          <p:cNvPr id="4" name="Picture 3"/>
+          <p:cNvPicPr>
+            <a:picLocks noChangeAspect="1"/>
+          </p:cNvPicPr>
+          <p:nvPr/>
+        </p:nvPicPr>
+        <p:blipFill>
+          <a:blip r:embed="rId2"/>
+          <a:stretch>
+            <a:fillRect/>
+          </a:stretch>
+        </p:blipFill>
+        <p:spPr>
+          <a:xfrm>
+            <a:off x="1301844" y="3091032"/>
+            <a:ext cx="4372816" cy="3545371"/>
+          </a:xfrm>
+          <a:prstGeom prst="rect">
+            <a:avLst/>
+          </a:prstGeom>
+        </p:spPr>
+      </p:pic>
+      <p:pic>
+        <p:nvPicPr>
+          <p:cNvPr id="6" name="Picture 5"/>
+          <p:cNvPicPr>
+            <a:picLocks noChangeAspect="1"/>
+          </p:cNvPicPr>
+          <p:nvPr/>
+        </p:nvPicPr>
+        <p:blipFill>
+          <a:blip r:embed="rId3"/>
+          <a:stretch>
+            <a:fillRect/>
+          </a:stretch>
+        </p:blipFill>
+        <p:spPr>
+          <a:xfrm>
+            <a:off x="5867868" y="4498853"/>
+            <a:ext cx="4695825" cy="2105025"/>
+          </a:xfrm>
+          <a:prstGeom prst="rect">
+            <a:avLst/>
+          </a:prstGeom>
+          <a:ln>
+            <a:solidFill>
+              <a:schemeClr val="bg1">
+                <a:lumMod val="65000"/>
+              </a:schemeClr>
+            </a:solidFill>
+          </a:ln>
+        </p:spPr>
+      </p:pic>
+      <p:pic>
+        <p:nvPicPr>
+          <p:cNvPr id="10" name="Picture 9"/>
+          <p:cNvPicPr>
+            <a:picLocks noChangeAspect="1"/>
+          </p:cNvPicPr>
+          <p:nvPr/>
+        </p:nvPicPr>
+        <p:blipFill>
+          <a:blip r:embed="rId4"/>
+          <a:stretch>
+            <a:fillRect/>
+          </a:stretch>
+        </p:blipFill>
+        <p:spPr>
+          <a:xfrm>
+            <a:off x="6924490" y="2616875"/>
+            <a:ext cx="3639203" cy="1666767"/>
+          </a:xfrm>
+          <a:prstGeom prst="rect">
+            <a:avLst/>
+          </a:prstGeom>
+          <a:ln>
+            <a:solidFill>
+              <a:schemeClr val="bg1">
+                <a:lumMod val="65000"/>
+              </a:schemeClr>
+            </a:solidFill>
+          </a:ln>
+        </p:spPr>
+      </p:pic>
+      <p:cxnSp>
+        <p:nvCxnSpPr>
+          <p:cNvPr id="13" name="Straight Arrow Connector 12"/>
+          <p:cNvCxnSpPr/>
+          <p:nvPr/>
+        </p:nvCxnSpPr>
+        <p:spPr>
+          <a:xfrm flipV="1">
+            <a:off x="4666129" y="3909573"/>
+            <a:ext cx="2715933" cy="589280"/>
+          </a:xfrm>
+          <a:prstGeom prst="straightConnector1">
+            <a:avLst/>
+          </a:prstGeom>
+          <a:ln w="28575">
+            <a:tailEnd type="triangle"/>
+          </a:ln>
+        </p:spPr>
+        <p:style>
+          <a:lnRef idx="1">
+            <a:schemeClr val="accent1"/>
+          </a:lnRef>
+          <a:fillRef idx="0">
+            <a:schemeClr val="accent1"/>
+          </a:fillRef>
+          <a:effectRef idx="0">
+            <a:schemeClr val="accent1"/>
+          </a:effectRef>
+          <a:fontRef idx="minor">
+            <a:schemeClr val="tx1"/>
+          </a:fontRef>
+        </p:style>
+      </p:cxnSp>
+      <p:cxnSp>
+        <p:nvCxnSpPr>
+          <p:cNvPr id="21" name="Straight Arrow Connector 20"/>
+          <p:cNvCxnSpPr/>
+          <p:nvPr/>
+        </p:nvCxnSpPr>
+        <p:spPr>
+          <a:xfrm>
+            <a:off x="7382062" y="3909573"/>
+            <a:ext cx="833718" cy="1395870"/>
+          </a:xfrm>
+          <a:prstGeom prst="straightConnector1">
+            <a:avLst/>
+          </a:prstGeom>
+          <a:ln w="28575">
+            <a:tailEnd type="triangle"/>
+          </a:ln>
+        </p:spPr>
+        <p:style>
+          <a:lnRef idx="1">
+            <a:schemeClr val="accent1"/>
+          </a:lnRef>
+          <a:fillRef idx="0">
+            <a:schemeClr val="accent1"/>
+          </a:fillRef>
+          <a:effectRef idx="0">
+            <a:schemeClr val="accent1"/>
+          </a:effectRef>
+          <a:fontRef idx="minor">
+            <a:schemeClr val="tx1"/>
+          </a:fontRef>
+        </p:style>
+      </p:cxnSp>
+      <p:cxnSp>
+        <p:nvCxnSpPr>
+          <p:cNvPr id="18" name="Straight Arrow Connector 17"/>
+          <p:cNvCxnSpPr/>
+          <p:nvPr/>
+        </p:nvCxnSpPr>
+        <p:spPr>
+          <a:xfrm flipV="1">
+            <a:off x="3394077" y="4106845"/>
+            <a:ext cx="3854308" cy="1018109"/>
+          </a:xfrm>
+          <a:prstGeom prst="straightConnector1">
+            <a:avLst/>
+          </a:prstGeom>
+          <a:ln w="28575">
+            <a:solidFill>
+              <a:srgbClr val="0070C0"/>
+            </a:solidFill>
+            <a:tailEnd type="triangle"/>
+          </a:ln>
+        </p:spPr>
+        <p:style>
+          <a:lnRef idx="1">
+            <a:schemeClr val="accent1"/>
+          </a:lnRef>
+          <a:fillRef idx="0">
+            <a:schemeClr val="accent1"/>
+          </a:fillRef>
+          <a:effectRef idx="0">
+            <a:schemeClr val="accent1"/>
+          </a:effectRef>
+          <a:fontRef idx="minor">
+            <a:schemeClr val="tx1"/>
+          </a:fontRef>
+        </p:style>
+      </p:cxnSp>
+      <p:cxnSp>
+        <p:nvCxnSpPr>
+          <p:cNvPr id="24" name="Straight Arrow Connector 23"/>
+          <p:cNvCxnSpPr/>
+          <p:nvPr/>
+        </p:nvCxnSpPr>
+        <p:spPr>
+          <a:xfrm>
+            <a:off x="7221911" y="4131633"/>
+            <a:ext cx="650781" cy="1986642"/>
+          </a:xfrm>
+          <a:prstGeom prst="straightConnector1">
+            <a:avLst/>
+          </a:prstGeom>
+          <a:ln w="28575">
+            <a:solidFill>
+              <a:srgbClr val="0070C0"/>
+            </a:solidFill>
+            <a:tailEnd type="triangle"/>
+          </a:ln>
+        </p:spPr>
+        <p:style>
+          <a:lnRef idx="1">
+            <a:schemeClr val="accent1"/>
+          </a:lnRef>
+          <a:fillRef idx="0">
+            <a:schemeClr val="accent1"/>
+          </a:fillRef>
+          <a:effectRef idx="0">
+            <a:schemeClr val="accent1"/>
+          </a:effectRef>
+          <a:fontRef idx="minor">
+            <a:schemeClr val="tx1"/>
+          </a:fontRef>
+        </p:style>
+      </p:cxnSp>
+    </p:spTree>
+    <p:extLst>
+      <p:ext uri="{BB962C8B-B14F-4D97-AF65-F5344CB8AC3E}">
+        <p14:creationId xmlns:p14="http://schemas.microsoft.com/office/powerpoint/2010/main" val="3637948886"/>
       </p:ext>
     </p:extLst>
   </p:cSld>

</xml_diff>

<commit_message>
Updated TRW, two way binding
</commit_message>
<xml_diff>
--- a/Angular Presentation.pptx
+++ b/Angular Presentation.pptx
@@ -5,7 +5,7 @@
     <p:sldMasterId id="2147483723" r:id="rId1"/>
   </p:sldMasterIdLst>
   <p:notesMasterIdLst>
-    <p:notesMasterId r:id="rId58"/>
+    <p:notesMasterId r:id="rId60"/>
   </p:notesMasterIdLst>
   <p:sldIdLst>
     <p:sldId id="256" r:id="rId2"/>
@@ -64,6 +64,8 @@
     <p:sldId id="334" r:id="rId55"/>
     <p:sldId id="335" r:id="rId56"/>
     <p:sldId id="336" r:id="rId57"/>
+    <p:sldId id="337" r:id="rId58"/>
+    <p:sldId id="338" r:id="rId59"/>
   </p:sldIdLst>
   <p:sldSz cx="12192000" cy="6858000"/>
   <p:notesSz cx="6858000" cy="9144000"/>
@@ -31732,7 +31734,7 @@
             </a:r>
             <a:r>
               <a:rPr lang="en-IN" b="1" dirty="0" smtClean="0"/>
-              <a:t>Event Binding</a:t>
+              <a:t>Event Binding()</a:t>
             </a:r>
             <a:endParaRPr lang="en-IN" b="1" dirty="0"/>
           </a:p>
@@ -33472,31 +33474,14 @@
             <p:ph type="title"/>
           </p:nvPr>
         </p:nvSpPr>
-        <p:spPr>
-          <a:xfrm>
-            <a:off x="1024466" y="753035"/>
-            <a:ext cx="10607239" cy="705077"/>
-          </a:xfrm>
-        </p:spPr>
+        <p:spPr/>
         <p:txBody>
           <a:bodyPr/>
           <a:lstStyle/>
           <a:p>
             <a:r>
               <a:rPr lang="en-IN" b="1" dirty="0" smtClean="0"/>
-              <a:t>Chapter </a:t>
-            </a:r>
-            <a:r>
-              <a:rPr lang="en-IN" b="1" dirty="0" smtClean="0"/>
-              <a:t>11 </a:t>
-            </a:r>
-            <a:r>
-              <a:rPr lang="en-IN" b="1" dirty="0" smtClean="0"/>
-              <a:t>: </a:t>
-            </a:r>
-            <a:r>
-              <a:rPr lang="en-IN" b="1" dirty="0" smtClean="0"/>
-              <a:t>Template Reference Variable</a:t>
+              <a:t>11.1 Template Reference Variable</a:t>
             </a:r>
             <a:endParaRPr lang="en-IN" b="1" dirty="0"/>
           </a:p>
@@ -33509,13 +33494,13 @@
             <a:spLocks noGrp="1"/>
           </p:cNvSpPr>
           <p:nvPr>
-            <p:ph type="body" idx="1"/>
+            <p:ph idx="1"/>
           </p:nvPr>
         </p:nvSpPr>
         <p:spPr>
           <a:xfrm>
-            <a:off x="1025999" y="1888419"/>
-            <a:ext cx="10363660" cy="2481876"/>
+            <a:off x="1165411" y="2697630"/>
+            <a:ext cx="10478292" cy="2467267"/>
           </a:xfrm>
         </p:spPr>
         <p:txBody>
@@ -33525,27 +33510,30 @@
           <a:lstStyle/>
           <a:p>
             <a:r>
-              <a:rPr lang="en-IN" sz="2400" dirty="0" smtClean="0"/>
+              <a:rPr lang="en-IN" sz="2000" dirty="0" smtClean="0"/>
               <a:t>A way to pass a data from template component and pass that </a:t>
             </a:r>
             <a:r>
-              <a:rPr lang="en-IN" sz="2400" dirty="0" err="1" smtClean="0"/>
+              <a:rPr lang="en-IN" sz="2000" dirty="0" err="1" smtClean="0"/>
               <a:t>vaue</a:t>
             </a:r>
             <a:r>
-              <a:rPr lang="en-IN" sz="2400" dirty="0" smtClean="0"/>
+              <a:rPr lang="en-IN" sz="2000" dirty="0" smtClean="0"/>
               <a:t> to class through a event handler property.</a:t>
             </a:r>
           </a:p>
           <a:p>
             <a:r>
-              <a:rPr lang="en-IN" sz="2400" dirty="0" smtClean="0"/>
+              <a:rPr lang="en-IN" sz="2000" dirty="0" smtClean="0"/>
               <a:t>In the below example,</a:t>
             </a:r>
           </a:p>
           <a:p>
-            <a:r>
-              <a:rPr lang="en-IN" sz="2400" dirty="0" smtClean="0"/>
+            <a:pPr marL="0" indent="0">
+              <a:buNone/>
+            </a:pPr>
+            <a:r>
+              <a:rPr lang="en-IN" sz="2400" dirty="0"/>
               <a:t>	</a:t>
             </a:r>
             <a:r>
@@ -33555,13 +33543,22 @@
             <a:r>
               <a:rPr lang="en-IN" b="1" dirty="0" smtClean="0">
                 <a:solidFill>
-                  <a:srgbClr val="FFFF00"/>
+                  <a:schemeClr val="accent2">
+                    <a:lumMod val="60000"/>
+                    <a:lumOff val="40000"/>
+                  </a:schemeClr>
                 </a:solidFill>
               </a:rPr>
               <a:t>inputTxt</a:t>
             </a:r>
             <a:r>
-              <a:rPr lang="en-IN" b="1" dirty="0" smtClean="0"/>
+              <a:rPr lang="en-IN" b="1" dirty="0" smtClean="0">
+                <a:solidFill>
+                  <a:schemeClr val="accent5">
+                    <a:lumMod val="75000"/>
+                  </a:schemeClr>
+                </a:solidFill>
+              </a:rPr>
               <a:t> </a:t>
             </a:r>
             <a:r>
@@ -33571,7 +33568,10 @@
             <a:r>
               <a:rPr lang="en-IN" dirty="0" err="1" smtClean="0">
                 <a:solidFill>
-                  <a:srgbClr val="FFFF00"/>
+                  <a:schemeClr val="accent2">
+                    <a:lumMod val="60000"/>
+                    <a:lumOff val="40000"/>
+                  </a:schemeClr>
                 </a:solidFill>
               </a:rPr>
               <a:t>OnClick</a:t>
@@ -33579,7 +33579,10 @@
             <a:r>
               <a:rPr lang="en-IN" dirty="0" smtClean="0">
                 <a:solidFill>
-                  <a:srgbClr val="FFFF00"/>
+                  <a:schemeClr val="accent2">
+                    <a:lumMod val="60000"/>
+                    <a:lumOff val="40000"/>
+                  </a:schemeClr>
                 </a:solidFill>
               </a:rPr>
               <a:t> </a:t>
@@ -33589,6 +33592,52 @@
               <a:t>and passing the textbox box value as parameter</a:t>
             </a:r>
             <a:endParaRPr lang="en-IN" dirty="0"/>
+          </a:p>
+        </p:txBody>
+      </p:sp>
+      <p:sp>
+        <p:nvSpPr>
+          <p:cNvPr id="7" name="Date Placeholder 6"/>
+          <p:cNvSpPr>
+            <a:spLocks noGrp="1"/>
+          </p:cNvSpPr>
+          <p:nvPr>
+            <p:ph type="dt" sz="half" idx="10"/>
+          </p:nvPr>
+        </p:nvSpPr>
+        <p:spPr/>
+        <p:txBody>
+          <a:bodyPr/>
+          <a:lstStyle/>
+          <a:p>
+            <a:r>
+              <a:rPr lang="en-US" smtClean="0"/>
+              <a:t>5/6/2019</a:t>
+            </a:r>
+            <a:endParaRPr lang="en-US" dirty="0"/>
+          </a:p>
+        </p:txBody>
+      </p:sp>
+      <p:sp>
+        <p:nvSpPr>
+          <p:cNvPr id="8" name="Slide Number Placeholder 7"/>
+          <p:cNvSpPr>
+            <a:spLocks noGrp="1"/>
+          </p:cNvSpPr>
+          <p:nvPr>
+            <p:ph type="sldNum" sz="quarter" idx="12"/>
+          </p:nvPr>
+        </p:nvSpPr>
+        <p:spPr/>
+        <p:txBody>
+          <a:bodyPr/>
+          <a:lstStyle/>
+          <a:p>
+            <a:fld id="{6D22F896-40B5-4ADD-8801-0D06FADFA095}" type="slidenum">
+              <a:rPr lang="en-US" smtClean="0"/>
+              <a:t>55</a:t>
+            </a:fld>
+            <a:endParaRPr lang="en-US" dirty="0"/>
           </a:p>
         </p:txBody>
       </p:sp>
@@ -33600,7 +33649,7 @@
         </p:nvSpPr>
         <p:spPr>
           <a:xfrm>
-            <a:off x="1165411" y="4819000"/>
+            <a:off x="1154954" y="5493344"/>
             <a:ext cx="10224247" cy="646331"/>
           </a:xfrm>
           <a:prstGeom prst="rect">
@@ -33903,7 +33952,7 @@
         </p:nvSpPr>
         <p:spPr>
           <a:xfrm>
-            <a:off x="2067180" y="4854999"/>
+            <a:off x="2060865" y="5530062"/>
             <a:ext cx="1271358" cy="281166"/>
           </a:xfrm>
           <a:prstGeom prst="rect">
@@ -33949,7 +33998,7 @@
         </p:nvSpPr>
         <p:spPr>
           <a:xfrm>
-            <a:off x="4227676" y="5136165"/>
+            <a:off x="4227676" y="5816509"/>
             <a:ext cx="1861395" cy="281166"/>
           </a:xfrm>
           <a:prstGeom prst="rect">
@@ -33984,52 +34033,6 @@
           <a:p>
             <a:pPr algn="ctr"/>
             <a:endParaRPr lang="en-IN"/>
-          </a:p>
-        </p:txBody>
-      </p:sp>
-      <p:sp>
-        <p:nvSpPr>
-          <p:cNvPr id="7" name="Date Placeholder 6"/>
-          <p:cNvSpPr>
-            <a:spLocks noGrp="1"/>
-          </p:cNvSpPr>
-          <p:nvPr>
-            <p:ph type="dt" sz="half" idx="10"/>
-          </p:nvPr>
-        </p:nvSpPr>
-        <p:spPr/>
-        <p:txBody>
-          <a:bodyPr/>
-          <a:lstStyle/>
-          <a:p>
-            <a:r>
-              <a:rPr lang="en-US" smtClean="0"/>
-              <a:t>5/6/2019</a:t>
-            </a:r>
-            <a:endParaRPr lang="en-US" dirty="0"/>
-          </a:p>
-        </p:txBody>
-      </p:sp>
-      <p:sp>
-        <p:nvSpPr>
-          <p:cNvPr id="8" name="Slide Number Placeholder 7"/>
-          <p:cNvSpPr>
-            <a:spLocks noGrp="1"/>
-          </p:cNvSpPr>
-          <p:nvPr>
-            <p:ph type="sldNum" sz="quarter" idx="12"/>
-          </p:nvPr>
-        </p:nvSpPr>
-        <p:spPr/>
-        <p:txBody>
-          <a:bodyPr/>
-          <a:lstStyle/>
-          <a:p>
-            <a:fld id="{6D22F896-40B5-4ADD-8801-0D06FADFA095}" type="slidenum">
-              <a:rPr lang="en-US" smtClean="0"/>
-              <a:t>55</a:t>
-            </a:fld>
-            <a:endParaRPr lang="en-US" dirty="0"/>
           </a:p>
         </p:txBody>
       </p:sp>
@@ -34142,7 +34145,7 @@
           <a:p>
             <a:r>
               <a:rPr lang="en-IN" b="1" dirty="0" smtClean="0"/>
-              <a:t>11.1 </a:t>
+              <a:t>11.2 </a:t>
             </a:r>
             <a:r>
               <a:rPr lang="en-IN" b="1" dirty="0" smtClean="0"/>
@@ -34459,6 +34462,1040 @@
     <p:extLst>
       <p:ext uri="{BB962C8B-B14F-4D97-AF65-F5344CB8AC3E}">
         <p14:creationId xmlns:p14="http://schemas.microsoft.com/office/powerpoint/2010/main" val="3624252173"/>
+      </p:ext>
+    </p:extLst>
+  </p:cSld>
+  <p:clrMapOvr>
+    <a:masterClrMapping/>
+  </p:clrMapOvr>
+  <p:timing>
+    <p:tnLst>
+      <p:par>
+        <p:cTn id="1" dur="indefinite" restart="never" nodeType="tmRoot"/>
+      </p:par>
+    </p:tnLst>
+  </p:timing>
+</p:sld>
+</file>
+
+<file path=ppt/slides/slide57.xml><?xml version="1.0" encoding="utf-8"?>
+<p:sld xmlns:a="http://schemas.openxmlformats.org/drawingml/2006/main" xmlns:r="http://schemas.openxmlformats.org/officeDocument/2006/relationships" xmlns:p="http://schemas.openxmlformats.org/presentationml/2006/main">
+  <p:cSld>
+    <p:spTree>
+      <p:nvGrpSpPr>
+        <p:cNvPr id="1" name=""/>
+        <p:cNvGrpSpPr/>
+        <p:nvPr/>
+      </p:nvGrpSpPr>
+      <p:grpSpPr>
+        <a:xfrm>
+          <a:off x="0" y="0"/>
+          <a:ext cx="0" cy="0"/>
+          <a:chOff x="0" y="0"/>
+          <a:chExt cx="0" cy="0"/>
+        </a:xfrm>
+      </p:grpSpPr>
+      <p:sp>
+        <p:nvSpPr>
+          <p:cNvPr id="4" name="Title 3"/>
+          <p:cNvSpPr>
+            <a:spLocks noGrp="1"/>
+          </p:cNvSpPr>
+          <p:nvPr>
+            <p:ph type="title"/>
+          </p:nvPr>
+        </p:nvSpPr>
+        <p:spPr/>
+        <p:txBody>
+          <a:bodyPr/>
+          <a:lstStyle/>
+          <a:p>
+            <a:r>
+              <a:rPr lang="en-IN" b="1" dirty="0" smtClean="0"/>
+              <a:t>12 </a:t>
+            </a:r>
+            <a:r>
+              <a:rPr lang="en-IN" b="1" dirty="0" smtClean="0"/>
+              <a:t>: </a:t>
+            </a:r>
+            <a:r>
+              <a:rPr lang="en-IN" b="1" dirty="0" smtClean="0"/>
+              <a:t>Two Way Binding</a:t>
+            </a:r>
+            <a:endParaRPr lang="en-IN" b="1" dirty="0"/>
+          </a:p>
+        </p:txBody>
+      </p:sp>
+      <p:sp>
+        <p:nvSpPr>
+          <p:cNvPr id="8" name="Content Placeholder 7"/>
+          <p:cNvSpPr>
+            <a:spLocks noGrp="1"/>
+          </p:cNvSpPr>
+          <p:nvPr>
+            <p:ph idx="1"/>
+          </p:nvPr>
+        </p:nvSpPr>
+        <p:spPr/>
+        <p:txBody>
+          <a:bodyPr/>
+          <a:lstStyle/>
+          <a:p>
+            <a:r>
+              <a:rPr lang="en-IN" dirty="0" smtClean="0"/>
+              <a:t>While working with model and view, its essential that the data is always in sync otherwise the data might not be in consistent</a:t>
+            </a:r>
+          </a:p>
+          <a:p>
+            <a:r>
+              <a:rPr lang="en-IN" dirty="0" smtClean="0"/>
+              <a:t>We have to import </a:t>
+            </a:r>
+            <a:r>
+              <a:rPr lang="en-IN" dirty="0" err="1" smtClean="0"/>
+              <a:t>ngModel</a:t>
+            </a:r>
+            <a:r>
+              <a:rPr lang="en-IN" dirty="0" smtClean="0"/>
+              <a:t> in </a:t>
+            </a:r>
+            <a:r>
+              <a:rPr lang="en-IN" dirty="0" err="1" smtClean="0"/>
+              <a:t>appmodule.ts</a:t>
+            </a:r>
+            <a:r>
+              <a:rPr lang="en-IN" dirty="0" smtClean="0"/>
+              <a:t> from @angular/forms </a:t>
+            </a:r>
+            <a:r>
+              <a:rPr lang="en-IN" dirty="0" err="1" smtClean="0"/>
+              <a:t>pkg</a:t>
+            </a:r>
+            <a:endParaRPr lang="en-IN" dirty="0" smtClean="0"/>
+          </a:p>
+          <a:p>
+            <a:r>
+              <a:rPr lang="en-IN" dirty="0" smtClean="0"/>
+              <a:t>Angular Directive for two way binding is </a:t>
+            </a:r>
+            <a:r>
+              <a:rPr lang="en-IN" b="1" dirty="0" smtClean="0">
+                <a:solidFill>
+                  <a:srgbClr val="00B0F0"/>
+                </a:solidFill>
+              </a:rPr>
+              <a:t>[</a:t>
+            </a:r>
+            <a:r>
+              <a:rPr lang="en-IN" b="1" dirty="0" smtClean="0">
+                <a:solidFill>
+                  <a:schemeClr val="accent3">
+                    <a:lumMod val="75000"/>
+                  </a:schemeClr>
+                </a:solidFill>
+              </a:rPr>
+              <a:t>(</a:t>
+            </a:r>
+            <a:r>
+              <a:rPr lang="en-IN" b="1" dirty="0" err="1">
+                <a:solidFill>
+                  <a:schemeClr val="accent6">
+                    <a:lumMod val="75000"/>
+                  </a:schemeClr>
+                </a:solidFill>
+              </a:rPr>
+              <a:t>n</a:t>
+            </a:r>
+            <a:r>
+              <a:rPr lang="en-IN" b="1" dirty="0" err="1" smtClean="0">
+                <a:solidFill>
+                  <a:schemeClr val="accent6">
+                    <a:lumMod val="75000"/>
+                  </a:schemeClr>
+                </a:solidFill>
+              </a:rPr>
+              <a:t>gModel</a:t>
+            </a:r>
+            <a:r>
+              <a:rPr lang="en-IN" b="1" dirty="0" smtClean="0">
+                <a:solidFill>
+                  <a:schemeClr val="accent3">
+                    <a:lumMod val="75000"/>
+                  </a:schemeClr>
+                </a:solidFill>
+              </a:rPr>
+              <a:t>)</a:t>
+            </a:r>
+            <a:r>
+              <a:rPr lang="en-IN" b="1" dirty="0" smtClean="0">
+                <a:solidFill>
+                  <a:srgbClr val="00B0F0"/>
+                </a:solidFill>
+              </a:rPr>
+              <a:t>]</a:t>
+            </a:r>
+            <a:r>
+              <a:rPr lang="en-IN" b="1" dirty="0" smtClean="0">
+                <a:solidFill>
+                  <a:schemeClr val="accent6">
+                    <a:lumMod val="75000"/>
+                  </a:schemeClr>
+                </a:solidFill>
+              </a:rPr>
+              <a:t>=name</a:t>
+            </a:r>
+            <a:endParaRPr lang="en-IN" b="1" dirty="0">
+              <a:solidFill>
+                <a:srgbClr val="00B0F0"/>
+              </a:solidFill>
+            </a:endParaRPr>
+          </a:p>
+        </p:txBody>
+      </p:sp>
+      <p:sp>
+        <p:nvSpPr>
+          <p:cNvPr id="3" name="Date Placeholder 2"/>
+          <p:cNvSpPr>
+            <a:spLocks noGrp="1"/>
+          </p:cNvSpPr>
+          <p:nvPr>
+            <p:ph type="dt" sz="half" idx="10"/>
+          </p:nvPr>
+        </p:nvSpPr>
+        <p:spPr/>
+        <p:txBody>
+          <a:bodyPr/>
+          <a:lstStyle/>
+          <a:p>
+            <a:r>
+              <a:rPr lang="en-US" smtClean="0"/>
+              <a:t>5/6/2019</a:t>
+            </a:r>
+            <a:endParaRPr lang="en-US" dirty="0"/>
+          </a:p>
+        </p:txBody>
+      </p:sp>
+      <p:sp>
+        <p:nvSpPr>
+          <p:cNvPr id="6" name="Slide Number Placeholder 5"/>
+          <p:cNvSpPr>
+            <a:spLocks noGrp="1"/>
+          </p:cNvSpPr>
+          <p:nvPr>
+            <p:ph type="sldNum" sz="quarter" idx="12"/>
+          </p:nvPr>
+        </p:nvSpPr>
+        <p:spPr/>
+        <p:txBody>
+          <a:bodyPr/>
+          <a:lstStyle/>
+          <a:p>
+            <a:fld id="{6D22F896-40B5-4ADD-8801-0D06FADFA095}" type="slidenum">
+              <a:rPr lang="en-US" smtClean="0"/>
+              <a:t>57</a:t>
+            </a:fld>
+            <a:endParaRPr lang="en-US" dirty="0"/>
+          </a:p>
+        </p:txBody>
+      </p:sp>
+      <p:sp>
+        <p:nvSpPr>
+          <p:cNvPr id="9" name="Rectangle 8"/>
+          <p:cNvSpPr/>
+          <p:nvPr/>
+        </p:nvSpPr>
+        <p:spPr>
+          <a:xfrm>
+            <a:off x="2693894" y="5029198"/>
+            <a:ext cx="2052918" cy="1013012"/>
+          </a:xfrm>
+          <a:prstGeom prst="rect">
+            <a:avLst/>
+          </a:prstGeom>
+          <a:ln>
+            <a:noFill/>
+          </a:ln>
+        </p:spPr>
+        <p:style>
+          <a:lnRef idx="2">
+            <a:schemeClr val="accent1">
+              <a:shade val="50000"/>
+            </a:schemeClr>
+          </a:lnRef>
+          <a:fillRef idx="1">
+            <a:schemeClr val="accent1"/>
+          </a:fillRef>
+          <a:effectRef idx="0">
+            <a:schemeClr val="accent1"/>
+          </a:effectRef>
+          <a:fontRef idx="minor">
+            <a:schemeClr val="lt1"/>
+          </a:fontRef>
+        </p:style>
+        <p:txBody>
+          <a:bodyPr rtlCol="0" anchor="ctr"/>
+          <a:lstStyle/>
+          <a:p>
+            <a:pPr algn="ctr"/>
+            <a:endParaRPr lang="en-IN" sz="1400" b="1" dirty="0"/>
+          </a:p>
+        </p:txBody>
+      </p:sp>
+      <p:cxnSp>
+        <p:nvCxnSpPr>
+          <p:cNvPr id="11" name="Elbow Connector 10"/>
+          <p:cNvCxnSpPr>
+            <a:endCxn id="9" idx="2"/>
+          </p:cNvCxnSpPr>
+          <p:nvPr/>
+        </p:nvCxnSpPr>
+        <p:spPr>
+          <a:xfrm rot="5400000">
+            <a:off x="5286878" y="4475685"/>
+            <a:ext cx="12700" cy="3133050"/>
+          </a:xfrm>
+          <a:prstGeom prst="bentConnector3">
+            <a:avLst>
+              <a:gd name="adj1" fmla="val 1800000"/>
+            </a:avLst>
+          </a:prstGeom>
+          <a:ln w="28575">
+            <a:solidFill>
+              <a:srgbClr val="00B0F0"/>
+            </a:solidFill>
+            <a:tailEnd type="triangle"/>
+          </a:ln>
+        </p:spPr>
+        <p:style>
+          <a:lnRef idx="1">
+            <a:schemeClr val="accent1"/>
+          </a:lnRef>
+          <a:fillRef idx="0">
+            <a:schemeClr val="accent1"/>
+          </a:fillRef>
+          <a:effectRef idx="0">
+            <a:schemeClr val="accent1"/>
+          </a:effectRef>
+          <a:fontRef idx="minor">
+            <a:schemeClr val="tx1"/>
+          </a:fontRef>
+        </p:style>
+      </p:cxnSp>
+      <p:sp>
+        <p:nvSpPr>
+          <p:cNvPr id="12" name="TextBox 11"/>
+          <p:cNvSpPr txBox="1"/>
+          <p:nvPr/>
+        </p:nvSpPr>
+        <p:spPr>
+          <a:xfrm>
+            <a:off x="4715986" y="6229891"/>
+            <a:ext cx="1154483" cy="276999"/>
+          </a:xfrm>
+          <a:prstGeom prst="rect">
+            <a:avLst/>
+          </a:prstGeom>
+          <a:noFill/>
+        </p:spPr>
+        <p:txBody>
+          <a:bodyPr wrap="none" rtlCol="0">
+            <a:spAutoFit/>
+          </a:bodyPr>
+          <a:lstStyle/>
+          <a:p>
+            <a:r>
+              <a:rPr lang="en-IN" sz="1200" dirty="0" smtClean="0">
+                <a:solidFill>
+                  <a:srgbClr val="00B0F0"/>
+                </a:solidFill>
+              </a:rPr>
+              <a:t>Data Binding</a:t>
+            </a:r>
+            <a:endParaRPr lang="en-IN" sz="1200" dirty="0">
+              <a:solidFill>
+                <a:srgbClr val="00B0F0"/>
+              </a:solidFill>
+            </a:endParaRPr>
+          </a:p>
+        </p:txBody>
+      </p:sp>
+      <p:cxnSp>
+        <p:nvCxnSpPr>
+          <p:cNvPr id="13" name="Elbow Connector 12"/>
+          <p:cNvCxnSpPr>
+            <a:stCxn id="9" idx="0"/>
+          </p:cNvCxnSpPr>
+          <p:nvPr/>
+        </p:nvCxnSpPr>
+        <p:spPr>
+          <a:xfrm rot="16200000" flipH="1">
+            <a:off x="5156890" y="3592661"/>
+            <a:ext cx="259976" cy="3133050"/>
+          </a:xfrm>
+          <a:prstGeom prst="bentConnector3">
+            <a:avLst>
+              <a:gd name="adj1" fmla="val -87931"/>
+            </a:avLst>
+          </a:prstGeom>
+          <a:ln w="28575">
+            <a:solidFill>
+              <a:schemeClr val="accent2">
+                <a:lumMod val="75000"/>
+              </a:schemeClr>
+            </a:solidFill>
+            <a:tailEnd type="triangle"/>
+          </a:ln>
+        </p:spPr>
+        <p:style>
+          <a:lnRef idx="1">
+            <a:schemeClr val="accent1"/>
+          </a:lnRef>
+          <a:fillRef idx="0">
+            <a:schemeClr val="accent1"/>
+          </a:fillRef>
+          <a:effectRef idx="0">
+            <a:schemeClr val="accent1"/>
+          </a:effectRef>
+          <a:fontRef idx="minor">
+            <a:schemeClr val="tx1"/>
+          </a:fontRef>
+        </p:style>
+      </p:cxnSp>
+      <p:sp>
+        <p:nvSpPr>
+          <p:cNvPr id="14" name="TextBox 13"/>
+          <p:cNvSpPr txBox="1"/>
+          <p:nvPr/>
+        </p:nvSpPr>
+        <p:spPr>
+          <a:xfrm>
+            <a:off x="4715197" y="4550024"/>
+            <a:ext cx="1189749" cy="276999"/>
+          </a:xfrm>
+          <a:prstGeom prst="rect">
+            <a:avLst/>
+          </a:prstGeom>
+          <a:noFill/>
+        </p:spPr>
+        <p:txBody>
+          <a:bodyPr wrap="none" rtlCol="0">
+            <a:spAutoFit/>
+          </a:bodyPr>
+          <a:lstStyle/>
+          <a:p>
+            <a:r>
+              <a:rPr lang="en-IN" sz="1200" dirty="0" smtClean="0">
+                <a:solidFill>
+                  <a:schemeClr val="accent2">
+                    <a:lumMod val="75000"/>
+                  </a:schemeClr>
+                </a:solidFill>
+              </a:rPr>
+              <a:t>Event Binding</a:t>
+            </a:r>
+            <a:endParaRPr lang="en-IN" sz="1200" dirty="0">
+              <a:solidFill>
+                <a:schemeClr val="accent2">
+                  <a:lumMod val="75000"/>
+                </a:schemeClr>
+              </a:solidFill>
+            </a:endParaRPr>
+          </a:p>
+        </p:txBody>
+      </p:sp>
+      <p:sp>
+        <p:nvSpPr>
+          <p:cNvPr id="22" name="Rectangle 21"/>
+          <p:cNvSpPr/>
+          <p:nvPr/>
+        </p:nvSpPr>
+        <p:spPr>
+          <a:xfrm>
+            <a:off x="2975067" y="5166309"/>
+            <a:ext cx="1503271" cy="337083"/>
+          </a:xfrm>
+          <a:prstGeom prst="rect">
+            <a:avLst/>
+          </a:prstGeom>
+          <a:solidFill>
+            <a:schemeClr val="bg1"/>
+          </a:solidFill>
+          <a:ln>
+            <a:noFill/>
+          </a:ln>
+        </p:spPr>
+        <p:style>
+          <a:lnRef idx="2">
+            <a:schemeClr val="accent1">
+              <a:shade val="50000"/>
+            </a:schemeClr>
+          </a:lnRef>
+          <a:fillRef idx="1">
+            <a:schemeClr val="accent1"/>
+          </a:fillRef>
+          <a:effectRef idx="0">
+            <a:schemeClr val="accent1"/>
+          </a:effectRef>
+          <a:fontRef idx="minor">
+            <a:schemeClr val="lt1"/>
+          </a:fontRef>
+        </p:style>
+        <p:txBody>
+          <a:bodyPr rtlCol="0" anchor="ctr"/>
+          <a:lstStyle/>
+          <a:p>
+            <a:pPr algn="ctr"/>
+            <a:r>
+              <a:rPr lang="en-IN" b="1" dirty="0" smtClean="0">
+                <a:solidFill>
+                  <a:schemeClr val="accent6">
+                    <a:lumMod val="75000"/>
+                  </a:schemeClr>
+                </a:solidFill>
+                <a:effectLst>
+                  <a:outerShdw blurRad="38100" dist="38100" dir="2700000" algn="tl">
+                    <a:srgbClr val="000000">
+                      <a:alpha val="43137"/>
+                    </a:srgbClr>
+                  </a:outerShdw>
+                </a:effectLst>
+              </a:rPr>
+              <a:t>Username</a:t>
+            </a:r>
+            <a:endParaRPr lang="en-IN" b="1" dirty="0">
+              <a:solidFill>
+                <a:schemeClr val="accent6">
+                  <a:lumMod val="75000"/>
+                </a:schemeClr>
+              </a:solidFill>
+              <a:effectLst>
+                <a:outerShdw blurRad="38100" dist="38100" dir="2700000" algn="tl">
+                  <a:srgbClr val="000000">
+                    <a:alpha val="43137"/>
+                  </a:srgbClr>
+                </a:outerShdw>
+              </a:effectLst>
+            </a:endParaRPr>
+          </a:p>
+        </p:txBody>
+      </p:sp>
+      <p:sp>
+        <p:nvSpPr>
+          <p:cNvPr id="25" name="Rectangle 24"/>
+          <p:cNvSpPr/>
+          <p:nvPr/>
+        </p:nvSpPr>
+        <p:spPr>
+          <a:xfrm>
+            <a:off x="2968717" y="5546111"/>
+            <a:ext cx="1503271" cy="337083"/>
+          </a:xfrm>
+          <a:prstGeom prst="rect">
+            <a:avLst/>
+          </a:prstGeom>
+          <a:solidFill>
+            <a:schemeClr val="bg1"/>
+          </a:solidFill>
+          <a:ln>
+            <a:noFill/>
+          </a:ln>
+        </p:spPr>
+        <p:style>
+          <a:lnRef idx="2">
+            <a:schemeClr val="accent1">
+              <a:shade val="50000"/>
+            </a:schemeClr>
+          </a:lnRef>
+          <a:fillRef idx="1">
+            <a:schemeClr val="accent1"/>
+          </a:fillRef>
+          <a:effectRef idx="0">
+            <a:schemeClr val="accent1"/>
+          </a:effectRef>
+          <a:fontRef idx="minor">
+            <a:schemeClr val="lt1"/>
+          </a:fontRef>
+        </p:style>
+        <p:txBody>
+          <a:bodyPr rtlCol="0" anchor="ctr"/>
+          <a:lstStyle/>
+          <a:p>
+            <a:pPr algn="ctr"/>
+            <a:r>
+              <a:rPr lang="en-IN" b="1" dirty="0" smtClean="0">
+                <a:solidFill>
+                  <a:schemeClr val="accent6">
+                    <a:lumMod val="75000"/>
+                  </a:schemeClr>
+                </a:solidFill>
+                <a:effectLst>
+                  <a:outerShdw blurRad="38100" dist="38100" dir="2700000" algn="tl">
+                    <a:srgbClr val="000000">
+                      <a:alpha val="43137"/>
+                    </a:srgbClr>
+                  </a:outerShdw>
+                </a:effectLst>
+              </a:rPr>
+              <a:t>Password</a:t>
+            </a:r>
+            <a:endParaRPr lang="en-IN" b="1" dirty="0">
+              <a:solidFill>
+                <a:schemeClr val="accent6">
+                  <a:lumMod val="75000"/>
+                </a:schemeClr>
+              </a:solidFill>
+              <a:effectLst>
+                <a:outerShdw blurRad="38100" dist="38100" dir="2700000" algn="tl">
+                  <a:srgbClr val="000000">
+                    <a:alpha val="43137"/>
+                  </a:srgbClr>
+                </a:outerShdw>
+              </a:effectLst>
+            </a:endParaRPr>
+          </a:p>
+        </p:txBody>
+      </p:sp>
+      <p:sp>
+        <p:nvSpPr>
+          <p:cNvPr id="26" name="Rectangle 25"/>
+          <p:cNvSpPr/>
+          <p:nvPr/>
+        </p:nvSpPr>
+        <p:spPr>
+          <a:xfrm>
+            <a:off x="5952655" y="5035548"/>
+            <a:ext cx="2052918" cy="1013012"/>
+          </a:xfrm>
+          <a:prstGeom prst="rect">
+            <a:avLst/>
+          </a:prstGeom>
+          <a:solidFill>
+            <a:srgbClr val="00B0F0"/>
+          </a:solidFill>
+          <a:ln>
+            <a:noFill/>
+          </a:ln>
+        </p:spPr>
+        <p:style>
+          <a:lnRef idx="2">
+            <a:schemeClr val="accent1">
+              <a:shade val="50000"/>
+            </a:schemeClr>
+          </a:lnRef>
+          <a:fillRef idx="1">
+            <a:schemeClr val="accent1"/>
+          </a:fillRef>
+          <a:effectRef idx="0">
+            <a:schemeClr val="accent1"/>
+          </a:effectRef>
+          <a:fontRef idx="minor">
+            <a:schemeClr val="lt1"/>
+          </a:fontRef>
+        </p:style>
+        <p:txBody>
+          <a:bodyPr rtlCol="0" anchor="ctr"/>
+          <a:lstStyle/>
+          <a:p>
+            <a:pPr algn="ctr"/>
+            <a:r>
+              <a:rPr lang="en-IN" sz="1400" b="1" dirty="0" smtClean="0"/>
+              <a:t>Public Username</a:t>
+            </a:r>
+            <a:br>
+              <a:rPr lang="en-IN" sz="1400" b="1" dirty="0" smtClean="0"/>
+            </a:br>
+            <a:r>
+              <a:rPr lang="en-IN" sz="1400" b="1" dirty="0" smtClean="0"/>
+              <a:t>Public Password</a:t>
+            </a:r>
+            <a:endParaRPr lang="en-IN" sz="1400" b="1" dirty="0"/>
+          </a:p>
+        </p:txBody>
+      </p:sp>
+      <p:cxnSp>
+        <p:nvCxnSpPr>
+          <p:cNvPr id="28" name="Straight Connector 27"/>
+          <p:cNvCxnSpPr>
+            <a:stCxn id="9" idx="3"/>
+            <a:endCxn id="26" idx="1"/>
+          </p:cNvCxnSpPr>
+          <p:nvPr/>
+        </p:nvCxnSpPr>
+        <p:spPr>
+          <a:xfrm>
+            <a:off x="4746812" y="5535704"/>
+            <a:ext cx="1205843" cy="6350"/>
+          </a:xfrm>
+          <a:prstGeom prst="line">
+            <a:avLst/>
+          </a:prstGeom>
+        </p:spPr>
+        <p:style>
+          <a:lnRef idx="1">
+            <a:schemeClr val="accent1"/>
+          </a:lnRef>
+          <a:fillRef idx="0">
+            <a:schemeClr val="accent1"/>
+          </a:fillRef>
+          <a:effectRef idx="0">
+            <a:schemeClr val="accent1"/>
+          </a:effectRef>
+          <a:fontRef idx="minor">
+            <a:schemeClr val="tx1"/>
+          </a:fontRef>
+        </p:style>
+      </p:cxnSp>
+      <p:sp>
+        <p:nvSpPr>
+          <p:cNvPr id="29" name="TextBox 28"/>
+          <p:cNvSpPr txBox="1"/>
+          <p:nvPr/>
+        </p:nvSpPr>
+        <p:spPr>
+          <a:xfrm>
+            <a:off x="4881109" y="5320631"/>
+            <a:ext cx="857927" cy="461665"/>
+          </a:xfrm>
+          <a:prstGeom prst="rect">
+            <a:avLst/>
+          </a:prstGeom>
+          <a:noFill/>
+        </p:spPr>
+        <p:txBody>
+          <a:bodyPr wrap="none" rtlCol="0">
+            <a:spAutoFit/>
+          </a:bodyPr>
+          <a:lstStyle/>
+          <a:p>
+            <a:r>
+              <a:rPr lang="en-IN" sz="1200" dirty="0" smtClean="0">
+                <a:solidFill>
+                  <a:schemeClr val="accent6">
+                    <a:lumMod val="75000"/>
+                  </a:schemeClr>
+                </a:solidFill>
+              </a:rPr>
+              <a:t>Two Way</a:t>
+            </a:r>
+          </a:p>
+          <a:p>
+            <a:pPr algn="ctr"/>
+            <a:r>
+              <a:rPr lang="en-IN" sz="1200" dirty="0" smtClean="0">
+                <a:solidFill>
+                  <a:schemeClr val="accent6">
+                    <a:lumMod val="75000"/>
+                  </a:schemeClr>
+                </a:solidFill>
+              </a:rPr>
+              <a:t>Binding</a:t>
+            </a:r>
+            <a:endParaRPr lang="en-IN" sz="1200" dirty="0">
+              <a:solidFill>
+                <a:schemeClr val="accent6">
+                  <a:lumMod val="75000"/>
+                </a:schemeClr>
+              </a:solidFill>
+            </a:endParaRPr>
+          </a:p>
+        </p:txBody>
+      </p:sp>
+      <p:cxnSp>
+        <p:nvCxnSpPr>
+          <p:cNvPr id="31" name="Straight Arrow Connector 30"/>
+          <p:cNvCxnSpPr/>
+          <p:nvPr/>
+        </p:nvCxnSpPr>
+        <p:spPr>
+          <a:xfrm>
+            <a:off x="6162926" y="4001940"/>
+            <a:ext cx="547156" cy="766772"/>
+          </a:xfrm>
+          <a:prstGeom prst="straightConnector1">
+            <a:avLst/>
+          </a:prstGeom>
+          <a:ln w="28575">
+            <a:solidFill>
+              <a:schemeClr val="accent4">
+                <a:lumMod val="75000"/>
+              </a:schemeClr>
+            </a:solidFill>
+            <a:tailEnd type="triangle"/>
+          </a:ln>
+        </p:spPr>
+        <p:style>
+          <a:lnRef idx="1">
+            <a:schemeClr val="accent1"/>
+          </a:lnRef>
+          <a:fillRef idx="0">
+            <a:schemeClr val="accent1"/>
+          </a:fillRef>
+          <a:effectRef idx="0">
+            <a:schemeClr val="accent1"/>
+          </a:effectRef>
+          <a:fontRef idx="minor">
+            <a:schemeClr val="tx1"/>
+          </a:fontRef>
+        </p:style>
+      </p:cxnSp>
+      <p:cxnSp>
+        <p:nvCxnSpPr>
+          <p:cNvPr id="32" name="Straight Arrow Connector 31"/>
+          <p:cNvCxnSpPr/>
+          <p:nvPr/>
+        </p:nvCxnSpPr>
+        <p:spPr>
+          <a:xfrm rot="5400000">
+            <a:off x="5159766" y="4092693"/>
+            <a:ext cx="2276447" cy="2094941"/>
+          </a:xfrm>
+          <a:prstGeom prst="bentConnector3">
+            <a:avLst>
+              <a:gd name="adj1" fmla="val 41140"/>
+            </a:avLst>
+          </a:prstGeom>
+          <a:ln w="28575">
+            <a:solidFill>
+              <a:srgbClr val="00B0F0"/>
+            </a:solidFill>
+            <a:tailEnd type="triangle"/>
+          </a:ln>
+        </p:spPr>
+        <p:style>
+          <a:lnRef idx="1">
+            <a:schemeClr val="accent1"/>
+          </a:lnRef>
+          <a:fillRef idx="0">
+            <a:schemeClr val="accent1"/>
+          </a:fillRef>
+          <a:effectRef idx="0">
+            <a:schemeClr val="accent1"/>
+          </a:effectRef>
+          <a:fontRef idx="minor">
+            <a:schemeClr val="tx1"/>
+          </a:fontRef>
+        </p:style>
+      </p:cxnSp>
+    </p:spTree>
+    <p:extLst>
+      <p:ext uri="{BB962C8B-B14F-4D97-AF65-F5344CB8AC3E}">
+        <p14:creationId xmlns:p14="http://schemas.microsoft.com/office/powerpoint/2010/main" val="2973505688"/>
+      </p:ext>
+    </p:extLst>
+  </p:cSld>
+  <p:clrMapOvr>
+    <a:masterClrMapping/>
+  </p:clrMapOvr>
+  <p:timing>
+    <p:tnLst>
+      <p:par>
+        <p:cTn id="1" dur="indefinite" restart="never" nodeType="tmRoot"/>
+      </p:par>
+    </p:tnLst>
+  </p:timing>
+</p:sld>
+</file>
+
+<file path=ppt/slides/slide58.xml><?xml version="1.0" encoding="utf-8"?>
+<p:sld xmlns:a="http://schemas.openxmlformats.org/drawingml/2006/main" xmlns:r="http://schemas.openxmlformats.org/officeDocument/2006/relationships" xmlns:p="http://schemas.openxmlformats.org/presentationml/2006/main">
+  <p:cSld>
+    <p:spTree>
+      <p:nvGrpSpPr>
+        <p:cNvPr id="1" name=""/>
+        <p:cNvGrpSpPr/>
+        <p:nvPr/>
+      </p:nvGrpSpPr>
+      <p:grpSpPr>
+        <a:xfrm>
+          <a:off x="0" y="0"/>
+          <a:ext cx="0" cy="0"/>
+          <a:chOff x="0" y="0"/>
+          <a:chExt cx="0" cy="0"/>
+        </a:xfrm>
+      </p:grpSpPr>
+      <p:sp>
+        <p:nvSpPr>
+          <p:cNvPr id="4" name="Title 3"/>
+          <p:cNvSpPr>
+            <a:spLocks noGrp="1"/>
+          </p:cNvSpPr>
+          <p:nvPr>
+            <p:ph type="title"/>
+          </p:nvPr>
+        </p:nvSpPr>
+        <p:spPr/>
+        <p:txBody>
+          <a:bodyPr/>
+          <a:lstStyle/>
+          <a:p>
+            <a:r>
+              <a:rPr lang="en-IN" b="1" dirty="0" smtClean="0"/>
+              <a:t>12 </a:t>
+            </a:r>
+            <a:r>
+              <a:rPr lang="en-IN" b="1" dirty="0" smtClean="0"/>
+              <a:t>: </a:t>
+            </a:r>
+            <a:r>
+              <a:rPr lang="en-IN" b="1" dirty="0" smtClean="0"/>
+              <a:t>Two Way Binding</a:t>
+            </a:r>
+            <a:endParaRPr lang="en-IN" b="1" dirty="0"/>
+          </a:p>
+        </p:txBody>
+      </p:sp>
+      <p:sp>
+        <p:nvSpPr>
+          <p:cNvPr id="6" name="Slide Number Placeholder 5"/>
+          <p:cNvSpPr>
+            <a:spLocks noGrp="1"/>
+          </p:cNvSpPr>
+          <p:nvPr>
+            <p:ph type="sldNum" sz="quarter" idx="12"/>
+          </p:nvPr>
+        </p:nvSpPr>
+        <p:spPr/>
+        <p:txBody>
+          <a:bodyPr/>
+          <a:lstStyle/>
+          <a:p>
+            <a:fld id="{6D22F896-40B5-4ADD-8801-0D06FADFA095}" type="slidenum">
+              <a:rPr lang="en-US" smtClean="0"/>
+              <a:t>58</a:t>
+            </a:fld>
+            <a:endParaRPr lang="en-US" dirty="0"/>
+          </a:p>
+        </p:txBody>
+      </p:sp>
+      <p:pic>
+        <p:nvPicPr>
+          <p:cNvPr id="5" name="Picture 4"/>
+          <p:cNvPicPr>
+            <a:picLocks noChangeAspect="1"/>
+          </p:cNvPicPr>
+          <p:nvPr/>
+        </p:nvPicPr>
+        <p:blipFill>
+          <a:blip r:embed="rId2"/>
+          <a:stretch>
+            <a:fillRect/>
+          </a:stretch>
+        </p:blipFill>
+        <p:spPr>
+          <a:xfrm>
+            <a:off x="1154954" y="2354636"/>
+            <a:ext cx="4114800" cy="2847975"/>
+          </a:xfrm>
+          <a:prstGeom prst="rect">
+            <a:avLst/>
+          </a:prstGeom>
+        </p:spPr>
+      </p:pic>
+      <p:pic>
+        <p:nvPicPr>
+          <p:cNvPr id="10" name="Picture 9"/>
+          <p:cNvPicPr>
+            <a:picLocks noChangeAspect="1"/>
+          </p:cNvPicPr>
+          <p:nvPr/>
+        </p:nvPicPr>
+        <p:blipFill>
+          <a:blip r:embed="rId3"/>
+          <a:stretch>
+            <a:fillRect/>
+          </a:stretch>
+        </p:blipFill>
+        <p:spPr>
+          <a:xfrm>
+            <a:off x="5922029" y="2521884"/>
+            <a:ext cx="2714625" cy="1733550"/>
+          </a:xfrm>
+          <a:prstGeom prst="rect">
+            <a:avLst/>
+          </a:prstGeom>
+          <a:ln>
+            <a:solidFill>
+              <a:schemeClr val="bg1">
+                <a:lumMod val="50000"/>
+              </a:schemeClr>
+            </a:solidFill>
+          </a:ln>
+        </p:spPr>
+      </p:pic>
+      <p:pic>
+        <p:nvPicPr>
+          <p:cNvPr id="15" name="Picture 14"/>
+          <p:cNvPicPr>
+            <a:picLocks noChangeAspect="1"/>
+          </p:cNvPicPr>
+          <p:nvPr/>
+        </p:nvPicPr>
+        <p:blipFill>
+          <a:blip r:embed="rId4"/>
+          <a:stretch>
+            <a:fillRect/>
+          </a:stretch>
+        </p:blipFill>
+        <p:spPr>
+          <a:xfrm>
+            <a:off x="5785863" y="4365407"/>
+            <a:ext cx="4566677" cy="2266235"/>
+          </a:xfrm>
+          <a:prstGeom prst="rect">
+            <a:avLst/>
+          </a:prstGeom>
+        </p:spPr>
+      </p:pic>
+      <p:sp>
+        <p:nvSpPr>
+          <p:cNvPr id="21" name="Rectangle 20"/>
+          <p:cNvSpPr/>
+          <p:nvPr/>
+        </p:nvSpPr>
+        <p:spPr>
+          <a:xfrm>
+            <a:off x="5775002" y="4413956"/>
+            <a:ext cx="1050709" cy="281166"/>
+          </a:xfrm>
+          <a:prstGeom prst="rect">
+            <a:avLst/>
+          </a:prstGeom>
+          <a:noFill/>
+          <a:ln w="28575">
+            <a:solidFill>
+              <a:srgbClr val="FFFF00"/>
+            </a:solidFill>
+          </a:ln>
+        </p:spPr>
+        <p:style>
+          <a:lnRef idx="2">
+            <a:schemeClr val="accent1">
+              <a:shade val="50000"/>
+            </a:schemeClr>
+          </a:lnRef>
+          <a:fillRef idx="1">
+            <a:schemeClr val="accent1"/>
+          </a:fillRef>
+          <a:effectRef idx="0">
+            <a:schemeClr val="accent1"/>
+          </a:effectRef>
+          <a:fontRef idx="minor">
+            <a:schemeClr val="lt1"/>
+          </a:fontRef>
+        </p:style>
+        <p:txBody>
+          <a:bodyPr rtlCol="0" anchor="ctr"/>
+          <a:lstStyle/>
+          <a:p>
+            <a:pPr algn="ctr"/>
+            <a:endParaRPr lang="en-IN"/>
+          </a:p>
+        </p:txBody>
+      </p:sp>
+    </p:spTree>
+    <p:extLst>
+      <p:ext uri="{BB962C8B-B14F-4D97-AF65-F5344CB8AC3E}">
+        <p14:creationId xmlns:p14="http://schemas.microsoft.com/office/powerpoint/2010/main" val="4213160791"/>
       </p:ext>
     </p:extLst>
   </p:cSld>

</xml_diff>

<commit_message>
Updated DI Using Service
</commit_message>
<xml_diff>
--- a/Angular Presentation.pptx
+++ b/Angular Presentation.pptx
@@ -5,7 +5,7 @@
     <p:sldMasterId id="2147483723" r:id="rId1"/>
   </p:sldMasterIdLst>
   <p:notesMasterIdLst>
-    <p:notesMasterId r:id="rId84"/>
+    <p:notesMasterId r:id="rId86"/>
   </p:notesMasterIdLst>
   <p:sldIdLst>
     <p:sldId id="256" r:id="rId2"/>
@@ -90,6 +90,8 @@
     <p:sldId id="358" r:id="rId81"/>
     <p:sldId id="362" r:id="rId82"/>
     <p:sldId id="363" r:id="rId83"/>
+    <p:sldId id="364" r:id="rId84"/>
+    <p:sldId id="365" r:id="rId85"/>
   </p:sldIdLst>
   <p:sldSz cx="12192000" cy="6858000"/>
   <p:notesSz cx="6858000" cy="9144000"/>
@@ -44007,6 +44009,961 @@
   <p:clrMapOvr>
     <a:masterClrMapping/>
   </p:clrMapOvr>
+</p:sld>
+</file>
+
+<file path=ppt/slides/slide83.xml><?xml version="1.0" encoding="utf-8"?>
+<p:sld xmlns:a="http://schemas.openxmlformats.org/drawingml/2006/main" xmlns:r="http://schemas.openxmlformats.org/officeDocument/2006/relationships" xmlns:p="http://schemas.openxmlformats.org/presentationml/2006/main">
+  <p:cSld>
+    <p:spTree>
+      <p:nvGrpSpPr>
+        <p:cNvPr id="1" name=""/>
+        <p:cNvGrpSpPr/>
+        <p:nvPr/>
+      </p:nvGrpSpPr>
+      <p:grpSpPr>
+        <a:xfrm>
+          <a:off x="0" y="0"/>
+          <a:ext cx="0" cy="0"/>
+          <a:chOff x="0" y="0"/>
+          <a:chExt cx="0" cy="0"/>
+        </a:xfrm>
+      </p:grpSpPr>
+      <p:sp>
+        <p:nvSpPr>
+          <p:cNvPr id="2" name="Title 1"/>
+          <p:cNvSpPr>
+            <a:spLocks noGrp="1"/>
+          </p:cNvSpPr>
+          <p:nvPr>
+            <p:ph type="title"/>
+          </p:nvPr>
+        </p:nvSpPr>
+        <p:spPr/>
+        <p:txBody>
+          <a:bodyPr/>
+          <a:lstStyle/>
+          <a:p>
+            <a:r>
+              <a:rPr lang="en-IN" b="1" dirty="0" smtClean="0"/>
+              <a:t>18. </a:t>
+            </a:r>
+            <a:r>
+              <a:rPr lang="en-IN" b="1" dirty="0" smtClean="0"/>
+              <a:t>DI </a:t>
+            </a:r>
+            <a:r>
+              <a:rPr lang="en-IN" b="1" dirty="0" smtClean="0"/>
+              <a:t>using a service(3)</a:t>
+            </a:r>
+            <a:endParaRPr lang="en-IN" b="1" dirty="0"/>
+          </a:p>
+        </p:txBody>
+      </p:sp>
+      <p:sp>
+        <p:nvSpPr>
+          <p:cNvPr id="7" name="Text Placeholder 6"/>
+          <p:cNvSpPr>
+            <a:spLocks noGrp="1"/>
+          </p:cNvSpPr>
+          <p:nvPr>
+            <p:ph type="body" idx="1"/>
+          </p:nvPr>
+        </p:nvSpPr>
+        <p:spPr>
+          <a:xfrm>
+            <a:off x="1154952" y="2083919"/>
+            <a:ext cx="9197587" cy="576262"/>
+          </a:xfrm>
+        </p:spPr>
+        <p:txBody>
+          <a:bodyPr/>
+          <a:lstStyle/>
+          <a:p>
+            <a:r>
+              <a:rPr lang="en-IN" dirty="0" smtClean="0"/>
+              <a:t>Add logic in </a:t>
+            </a:r>
+            <a:r>
+              <a:rPr lang="en-IN" dirty="0" err="1" smtClean="0"/>
+              <a:t>EmployeeService</a:t>
+            </a:r>
+            <a:r>
+              <a:rPr lang="en-IN" dirty="0" smtClean="0"/>
+              <a:t> class</a:t>
+            </a:r>
+            <a:endParaRPr lang="en-IN" dirty="0"/>
+          </a:p>
+        </p:txBody>
+      </p:sp>
+      <p:sp>
+        <p:nvSpPr>
+          <p:cNvPr id="6" name="Content Placeholder 5"/>
+          <p:cNvSpPr>
+            <a:spLocks noGrp="1"/>
+          </p:cNvSpPr>
+          <p:nvPr>
+            <p:ph sz="half" idx="2"/>
+          </p:nvPr>
+        </p:nvSpPr>
+        <p:spPr>
+          <a:xfrm>
+            <a:off x="1154953" y="2629389"/>
+            <a:ext cx="9878917" cy="662341"/>
+          </a:xfrm>
+        </p:spPr>
+        <p:txBody>
+          <a:bodyPr>
+            <a:normAutofit/>
+          </a:bodyPr>
+          <a:lstStyle/>
+          <a:p>
+            <a:r>
+              <a:rPr lang="en-IN" dirty="0" smtClean="0"/>
+              <a:t>Create a method </a:t>
+            </a:r>
+            <a:r>
+              <a:rPr lang="en-IN" dirty="0"/>
+              <a:t>in Employee Service </a:t>
+            </a:r>
+            <a:r>
+              <a:rPr lang="en-IN" dirty="0" smtClean="0"/>
+              <a:t>class and m</a:t>
+            </a:r>
+            <a:r>
+              <a:rPr lang="en-IN" dirty="0" smtClean="0"/>
+              <a:t>ove the person object creation code </a:t>
+            </a:r>
+          </a:p>
+        </p:txBody>
+      </p:sp>
+      <p:sp>
+        <p:nvSpPr>
+          <p:cNvPr id="4" name="Date Placeholder 3"/>
+          <p:cNvSpPr>
+            <a:spLocks noGrp="1"/>
+          </p:cNvSpPr>
+          <p:nvPr>
+            <p:ph type="dt" sz="half" idx="10"/>
+          </p:nvPr>
+        </p:nvSpPr>
+        <p:spPr/>
+        <p:txBody>
+          <a:bodyPr/>
+          <a:lstStyle/>
+          <a:p>
+            <a:r>
+              <a:rPr lang="en-US" smtClean="0"/>
+              <a:t>5/6/2019</a:t>
+            </a:r>
+            <a:endParaRPr lang="en-US" dirty="0"/>
+          </a:p>
+        </p:txBody>
+      </p:sp>
+      <p:sp>
+        <p:nvSpPr>
+          <p:cNvPr id="5" name="Slide Number Placeholder 4"/>
+          <p:cNvSpPr>
+            <a:spLocks noGrp="1"/>
+          </p:cNvSpPr>
+          <p:nvPr>
+            <p:ph type="sldNum" sz="quarter" idx="12"/>
+          </p:nvPr>
+        </p:nvSpPr>
+        <p:spPr/>
+        <p:txBody>
+          <a:bodyPr/>
+          <a:lstStyle/>
+          <a:p>
+            <a:fld id="{6D22F896-40B5-4ADD-8801-0D06FADFA095}" type="slidenum">
+              <a:rPr lang="en-US" smtClean="0"/>
+              <a:t>83</a:t>
+            </a:fld>
+            <a:endParaRPr lang="en-US" dirty="0"/>
+          </a:p>
+        </p:txBody>
+      </p:sp>
+      <p:sp>
+        <p:nvSpPr>
+          <p:cNvPr id="12" name="Content Placeholder 5"/>
+          <p:cNvSpPr>
+            <a:spLocks noGrp="1"/>
+          </p:cNvSpPr>
+          <p:nvPr>
+            <p:ph sz="half" idx="2"/>
+          </p:nvPr>
+        </p:nvSpPr>
+        <p:spPr>
+          <a:xfrm>
+            <a:off x="1154953" y="4226155"/>
+            <a:ext cx="9878917" cy="1340928"/>
+          </a:xfrm>
+        </p:spPr>
+        <p:txBody>
+          <a:bodyPr>
+            <a:normAutofit/>
+          </a:bodyPr>
+          <a:lstStyle/>
+          <a:p>
+            <a:r>
+              <a:rPr lang="en-IN" dirty="0" smtClean="0"/>
+              <a:t>Inject employee service in Employee List Component Constructor</a:t>
+            </a:r>
+          </a:p>
+          <a:p>
+            <a:r>
+              <a:rPr lang="en-IN" dirty="0" smtClean="0"/>
+              <a:t>Make Employee list person object as null</a:t>
+            </a:r>
+          </a:p>
+          <a:p>
+            <a:r>
+              <a:rPr lang="en-IN" dirty="0" smtClean="0"/>
+              <a:t>Call employee service </a:t>
+            </a:r>
+            <a:r>
+              <a:rPr lang="en-IN" dirty="0" err="1" smtClean="0"/>
+              <a:t>getEmployee</a:t>
+            </a:r>
+            <a:r>
+              <a:rPr lang="en-IN" dirty="0" smtClean="0"/>
+              <a:t> method to assign value for person array</a:t>
+            </a:r>
+          </a:p>
+        </p:txBody>
+      </p:sp>
+      <p:sp>
+        <p:nvSpPr>
+          <p:cNvPr id="13" name="Text Placeholder 6"/>
+          <p:cNvSpPr>
+            <a:spLocks noGrp="1"/>
+          </p:cNvSpPr>
+          <p:nvPr>
+            <p:ph type="body" idx="1"/>
+          </p:nvPr>
+        </p:nvSpPr>
+        <p:spPr>
+          <a:xfrm>
+            <a:off x="1154951" y="3549069"/>
+            <a:ext cx="9197587" cy="576262"/>
+          </a:xfrm>
+        </p:spPr>
+        <p:txBody>
+          <a:bodyPr/>
+          <a:lstStyle/>
+          <a:p>
+            <a:r>
+              <a:rPr lang="en-IN" dirty="0" smtClean="0"/>
+              <a:t>Inject Service in Component</a:t>
+            </a:r>
+            <a:endParaRPr lang="en-IN" dirty="0"/>
+          </a:p>
+        </p:txBody>
+      </p:sp>
+    </p:spTree>
+    <p:extLst>
+      <p:ext uri="{BB962C8B-B14F-4D97-AF65-F5344CB8AC3E}">
+        <p14:creationId xmlns:p14="http://schemas.microsoft.com/office/powerpoint/2010/main" val="629766165"/>
+      </p:ext>
+    </p:extLst>
+  </p:cSld>
+  <p:clrMapOvr>
+    <a:masterClrMapping/>
+  </p:clrMapOvr>
+  <p:timing>
+    <p:tnLst>
+      <p:par>
+        <p:cTn id="1" dur="indefinite" restart="never" nodeType="tmRoot"/>
+      </p:par>
+    </p:tnLst>
+  </p:timing>
+</p:sld>
+</file>
+
+<file path=ppt/slides/slide84.xml><?xml version="1.0" encoding="utf-8"?>
+<p:sld xmlns:a="http://schemas.openxmlformats.org/drawingml/2006/main" xmlns:r="http://schemas.openxmlformats.org/officeDocument/2006/relationships" xmlns:p="http://schemas.openxmlformats.org/presentationml/2006/main">
+  <p:cSld>
+    <p:spTree>
+      <p:nvGrpSpPr>
+        <p:cNvPr id="1" name=""/>
+        <p:cNvGrpSpPr/>
+        <p:nvPr/>
+      </p:nvGrpSpPr>
+      <p:grpSpPr>
+        <a:xfrm>
+          <a:off x="0" y="0"/>
+          <a:ext cx="0" cy="0"/>
+          <a:chOff x="0" y="0"/>
+          <a:chExt cx="0" cy="0"/>
+        </a:xfrm>
+      </p:grpSpPr>
+      <p:sp>
+        <p:nvSpPr>
+          <p:cNvPr id="7" name="Date Placeholder 6"/>
+          <p:cNvSpPr>
+            <a:spLocks noGrp="1"/>
+          </p:cNvSpPr>
+          <p:nvPr>
+            <p:ph type="dt" sz="half" idx="10"/>
+          </p:nvPr>
+        </p:nvSpPr>
+        <p:spPr/>
+        <p:txBody>
+          <a:bodyPr/>
+          <a:lstStyle/>
+          <a:p>
+            <a:r>
+              <a:rPr lang="en-US" smtClean="0"/>
+              <a:t>5/6/2019</a:t>
+            </a:r>
+            <a:endParaRPr lang="en-US" dirty="0"/>
+          </a:p>
+        </p:txBody>
+      </p:sp>
+      <p:sp>
+        <p:nvSpPr>
+          <p:cNvPr id="8" name="Slide Number Placeholder 7"/>
+          <p:cNvSpPr>
+            <a:spLocks noGrp="1"/>
+          </p:cNvSpPr>
+          <p:nvPr>
+            <p:ph type="sldNum" sz="quarter" idx="12"/>
+          </p:nvPr>
+        </p:nvSpPr>
+        <p:spPr/>
+        <p:txBody>
+          <a:bodyPr/>
+          <a:lstStyle/>
+          <a:p>
+            <a:fld id="{6D22F896-40B5-4ADD-8801-0D06FADFA095}" type="slidenum">
+              <a:rPr lang="en-US" smtClean="0"/>
+              <a:t>84</a:t>
+            </a:fld>
+            <a:endParaRPr lang="en-US" dirty="0"/>
+          </a:p>
+        </p:txBody>
+      </p:sp>
+      <p:pic>
+        <p:nvPicPr>
+          <p:cNvPr id="11" name="Picture 10"/>
+          <p:cNvPicPr>
+            <a:picLocks noChangeAspect="1"/>
+          </p:cNvPicPr>
+          <p:nvPr/>
+        </p:nvPicPr>
+        <p:blipFill>
+          <a:blip r:embed="rId2"/>
+          <a:stretch>
+            <a:fillRect/>
+          </a:stretch>
+        </p:blipFill>
+        <p:spPr>
+          <a:xfrm>
+            <a:off x="0" y="-21011"/>
+            <a:ext cx="4558553" cy="3879186"/>
+          </a:xfrm>
+          <a:prstGeom prst="rect">
+            <a:avLst/>
+          </a:prstGeom>
+        </p:spPr>
+      </p:pic>
+      <p:sp>
+        <p:nvSpPr>
+          <p:cNvPr id="12" name="Rectangle 11"/>
+          <p:cNvSpPr/>
+          <p:nvPr/>
+        </p:nvSpPr>
+        <p:spPr>
+          <a:xfrm>
+            <a:off x="1" y="-21013"/>
+            <a:ext cx="1089212" cy="300299"/>
+          </a:xfrm>
+          <a:prstGeom prst="rect">
+            <a:avLst/>
+          </a:prstGeom>
+          <a:noFill/>
+          <a:ln w="28575">
+            <a:solidFill>
+              <a:srgbClr val="FFFF00"/>
+            </a:solidFill>
+          </a:ln>
+        </p:spPr>
+        <p:style>
+          <a:lnRef idx="2">
+            <a:schemeClr val="accent1">
+              <a:shade val="50000"/>
+            </a:schemeClr>
+          </a:lnRef>
+          <a:fillRef idx="1">
+            <a:schemeClr val="accent1"/>
+          </a:fillRef>
+          <a:effectRef idx="0">
+            <a:schemeClr val="accent1"/>
+          </a:effectRef>
+          <a:fontRef idx="minor">
+            <a:schemeClr val="lt1"/>
+          </a:fontRef>
+        </p:style>
+        <p:txBody>
+          <a:bodyPr rtlCol="0" anchor="ctr"/>
+          <a:lstStyle/>
+          <a:p>
+            <a:pPr algn="ctr"/>
+            <a:endParaRPr lang="en-IN"/>
+          </a:p>
+        </p:txBody>
+      </p:sp>
+      <p:pic>
+        <p:nvPicPr>
+          <p:cNvPr id="14" name="Picture 13"/>
+          <p:cNvPicPr>
+            <a:picLocks noChangeAspect="1"/>
+          </p:cNvPicPr>
+          <p:nvPr/>
+        </p:nvPicPr>
+        <p:blipFill>
+          <a:blip r:embed="rId3"/>
+          <a:stretch>
+            <a:fillRect/>
+          </a:stretch>
+        </p:blipFill>
+        <p:spPr>
+          <a:xfrm>
+            <a:off x="4666130" y="0"/>
+            <a:ext cx="4588213" cy="3879188"/>
+          </a:xfrm>
+          <a:prstGeom prst="rect">
+            <a:avLst/>
+          </a:prstGeom>
+        </p:spPr>
+      </p:pic>
+      <p:pic>
+        <p:nvPicPr>
+          <p:cNvPr id="9" name="Picture 8"/>
+          <p:cNvPicPr>
+            <a:picLocks noChangeAspect="1"/>
+          </p:cNvPicPr>
+          <p:nvPr/>
+        </p:nvPicPr>
+        <p:blipFill>
+          <a:blip r:embed="rId4"/>
+          <a:stretch>
+            <a:fillRect/>
+          </a:stretch>
+        </p:blipFill>
+        <p:spPr>
+          <a:xfrm>
+            <a:off x="0" y="3879189"/>
+            <a:ext cx="3846811" cy="2978812"/>
+          </a:xfrm>
+          <a:prstGeom prst="rect">
+            <a:avLst/>
+          </a:prstGeom>
+        </p:spPr>
+      </p:pic>
+      <p:sp>
+        <p:nvSpPr>
+          <p:cNvPr id="13" name="Rectangle 12"/>
+          <p:cNvSpPr/>
+          <p:nvPr/>
+        </p:nvSpPr>
+        <p:spPr>
+          <a:xfrm>
+            <a:off x="10787" y="3906082"/>
+            <a:ext cx="946006" cy="228134"/>
+          </a:xfrm>
+          <a:prstGeom prst="rect">
+            <a:avLst/>
+          </a:prstGeom>
+          <a:noFill/>
+          <a:ln w="28575">
+            <a:solidFill>
+              <a:srgbClr val="FFFF00"/>
+            </a:solidFill>
+          </a:ln>
+        </p:spPr>
+        <p:style>
+          <a:lnRef idx="2">
+            <a:schemeClr val="accent1">
+              <a:shade val="50000"/>
+            </a:schemeClr>
+          </a:lnRef>
+          <a:fillRef idx="1">
+            <a:schemeClr val="accent1"/>
+          </a:fillRef>
+          <a:effectRef idx="0">
+            <a:schemeClr val="accent1"/>
+          </a:effectRef>
+          <a:fontRef idx="minor">
+            <a:schemeClr val="lt1"/>
+          </a:fontRef>
+        </p:style>
+        <p:txBody>
+          <a:bodyPr rtlCol="0" anchor="ctr"/>
+          <a:lstStyle/>
+          <a:p>
+            <a:pPr algn="ctr"/>
+            <a:endParaRPr lang="en-IN"/>
+          </a:p>
+        </p:txBody>
+      </p:sp>
+      <p:sp>
+        <p:nvSpPr>
+          <p:cNvPr id="15" name="Rectangle 14"/>
+          <p:cNvSpPr/>
+          <p:nvPr/>
+        </p:nvSpPr>
+        <p:spPr>
+          <a:xfrm>
+            <a:off x="4600025" y="4306"/>
+            <a:ext cx="1316681" cy="251561"/>
+          </a:xfrm>
+          <a:prstGeom prst="rect">
+            <a:avLst/>
+          </a:prstGeom>
+          <a:noFill/>
+          <a:ln w="28575">
+            <a:solidFill>
+              <a:srgbClr val="FFFF00"/>
+            </a:solidFill>
+          </a:ln>
+        </p:spPr>
+        <p:style>
+          <a:lnRef idx="2">
+            <a:schemeClr val="accent1">
+              <a:shade val="50000"/>
+            </a:schemeClr>
+          </a:lnRef>
+          <a:fillRef idx="1">
+            <a:schemeClr val="accent1"/>
+          </a:fillRef>
+          <a:effectRef idx="0">
+            <a:schemeClr val="accent1"/>
+          </a:effectRef>
+          <a:fontRef idx="minor">
+            <a:schemeClr val="lt1"/>
+          </a:fontRef>
+        </p:style>
+        <p:txBody>
+          <a:bodyPr rtlCol="0" anchor="ctr"/>
+          <a:lstStyle/>
+          <a:p>
+            <a:pPr algn="ctr"/>
+            <a:endParaRPr lang="en-IN"/>
+          </a:p>
+        </p:txBody>
+      </p:sp>
+      <p:pic>
+        <p:nvPicPr>
+          <p:cNvPr id="16" name="Picture 15"/>
+          <p:cNvPicPr>
+            <a:picLocks noChangeAspect="1"/>
+          </p:cNvPicPr>
+          <p:nvPr/>
+        </p:nvPicPr>
+        <p:blipFill>
+          <a:blip r:embed="rId5"/>
+          <a:stretch>
+            <a:fillRect/>
+          </a:stretch>
+        </p:blipFill>
+        <p:spPr>
+          <a:xfrm>
+            <a:off x="9385751" y="2496112"/>
+            <a:ext cx="2771775" cy="4200525"/>
+          </a:xfrm>
+          <a:prstGeom prst="rect">
+            <a:avLst/>
+          </a:prstGeom>
+          <a:solidFill>
+            <a:srgbClr val="00B050"/>
+          </a:solidFill>
+          <a:ln>
+            <a:solidFill>
+              <a:schemeClr val="bg1">
+                <a:lumMod val="50000"/>
+              </a:schemeClr>
+            </a:solidFill>
+          </a:ln>
+        </p:spPr>
+      </p:pic>
+      <p:cxnSp>
+        <p:nvCxnSpPr>
+          <p:cNvPr id="19" name="Straight Arrow Connector 18"/>
+          <p:cNvCxnSpPr/>
+          <p:nvPr/>
+        </p:nvCxnSpPr>
+        <p:spPr>
+          <a:xfrm flipH="1">
+            <a:off x="1645024" y="3415553"/>
+            <a:ext cx="2039470" cy="1797424"/>
+          </a:xfrm>
+          <a:prstGeom prst="straightConnector1">
+            <a:avLst/>
+          </a:prstGeom>
+          <a:ln w="28575">
+            <a:solidFill>
+              <a:srgbClr val="FFFF00"/>
+            </a:solidFill>
+            <a:tailEnd type="triangle"/>
+          </a:ln>
+        </p:spPr>
+        <p:style>
+          <a:lnRef idx="1">
+            <a:schemeClr val="accent1"/>
+          </a:lnRef>
+          <a:fillRef idx="0">
+            <a:schemeClr val="accent1"/>
+          </a:fillRef>
+          <a:effectRef idx="0">
+            <a:schemeClr val="accent1"/>
+          </a:effectRef>
+          <a:fontRef idx="minor">
+            <a:schemeClr val="tx1"/>
+          </a:fontRef>
+        </p:style>
+      </p:cxnSp>
+      <p:cxnSp>
+        <p:nvCxnSpPr>
+          <p:cNvPr id="20" name="Straight Arrow Connector 19"/>
+          <p:cNvCxnSpPr/>
+          <p:nvPr/>
+        </p:nvCxnSpPr>
+        <p:spPr>
+          <a:xfrm flipH="1">
+            <a:off x="1645024" y="3415553"/>
+            <a:ext cx="6579088" cy="1967753"/>
+          </a:xfrm>
+          <a:prstGeom prst="straightConnector1">
+            <a:avLst/>
+          </a:prstGeom>
+          <a:ln w="28575">
+            <a:solidFill>
+              <a:srgbClr val="00B050"/>
+            </a:solidFill>
+            <a:tailEnd type="triangle"/>
+          </a:ln>
+        </p:spPr>
+        <p:style>
+          <a:lnRef idx="1">
+            <a:schemeClr val="accent1"/>
+          </a:lnRef>
+          <a:fillRef idx="0">
+            <a:schemeClr val="accent1"/>
+          </a:fillRef>
+          <a:effectRef idx="0">
+            <a:schemeClr val="accent1"/>
+          </a:effectRef>
+          <a:fontRef idx="minor">
+            <a:schemeClr val="tx1"/>
+          </a:fontRef>
+        </p:style>
+      </p:cxnSp>
+      <p:cxnSp>
+        <p:nvCxnSpPr>
+          <p:cNvPr id="23" name="Straight Arrow Connector 22"/>
+          <p:cNvCxnSpPr/>
+          <p:nvPr/>
+        </p:nvCxnSpPr>
+        <p:spPr>
+          <a:xfrm flipH="1">
+            <a:off x="1482707" y="2756647"/>
+            <a:ext cx="1" cy="658906"/>
+          </a:xfrm>
+          <a:prstGeom prst="straightConnector1">
+            <a:avLst/>
+          </a:prstGeom>
+          <a:ln w="28575">
+            <a:solidFill>
+              <a:srgbClr val="FFFF00"/>
+            </a:solidFill>
+            <a:tailEnd type="triangle"/>
+          </a:ln>
+        </p:spPr>
+        <p:style>
+          <a:lnRef idx="1">
+            <a:schemeClr val="accent1"/>
+          </a:lnRef>
+          <a:fillRef idx="0">
+            <a:schemeClr val="accent1"/>
+          </a:fillRef>
+          <a:effectRef idx="0">
+            <a:schemeClr val="accent1"/>
+          </a:effectRef>
+          <a:fontRef idx="minor">
+            <a:schemeClr val="tx1"/>
+          </a:fontRef>
+        </p:style>
+      </p:cxnSp>
+      <p:cxnSp>
+        <p:nvCxnSpPr>
+          <p:cNvPr id="27" name="Straight Arrow Connector 26"/>
+          <p:cNvCxnSpPr/>
+          <p:nvPr/>
+        </p:nvCxnSpPr>
+        <p:spPr>
+          <a:xfrm flipH="1">
+            <a:off x="6081352" y="2827272"/>
+            <a:ext cx="1" cy="544550"/>
+          </a:xfrm>
+          <a:prstGeom prst="straightConnector1">
+            <a:avLst/>
+          </a:prstGeom>
+          <a:ln w="28575">
+            <a:solidFill>
+              <a:srgbClr val="00B050"/>
+            </a:solidFill>
+            <a:tailEnd type="triangle"/>
+          </a:ln>
+        </p:spPr>
+        <p:style>
+          <a:lnRef idx="1">
+            <a:schemeClr val="accent1"/>
+          </a:lnRef>
+          <a:fillRef idx="0">
+            <a:schemeClr val="accent1"/>
+          </a:fillRef>
+          <a:effectRef idx="0">
+            <a:schemeClr val="accent1"/>
+          </a:effectRef>
+          <a:fontRef idx="minor">
+            <a:schemeClr val="tx1"/>
+          </a:fontRef>
+        </p:style>
+      </p:cxnSp>
+      <p:cxnSp>
+        <p:nvCxnSpPr>
+          <p:cNvPr id="28" name="Straight Arrow Connector 27"/>
+          <p:cNvCxnSpPr/>
+          <p:nvPr/>
+        </p:nvCxnSpPr>
+        <p:spPr>
+          <a:xfrm flipH="1">
+            <a:off x="1450867" y="1485167"/>
+            <a:ext cx="1346122" cy="1342105"/>
+          </a:xfrm>
+          <a:prstGeom prst="straightConnector1">
+            <a:avLst/>
+          </a:prstGeom>
+          <a:ln w="28575">
+            <a:solidFill>
+              <a:srgbClr val="FFFF00"/>
+            </a:solidFill>
+            <a:tailEnd type="triangle"/>
+          </a:ln>
+        </p:spPr>
+        <p:style>
+          <a:lnRef idx="1">
+            <a:schemeClr val="accent1"/>
+          </a:lnRef>
+          <a:fillRef idx="0">
+            <a:schemeClr val="accent1"/>
+          </a:fillRef>
+          <a:effectRef idx="0">
+            <a:schemeClr val="accent1"/>
+          </a:effectRef>
+          <a:fontRef idx="minor">
+            <a:schemeClr val="tx1"/>
+          </a:fontRef>
+        </p:style>
+      </p:cxnSp>
+      <p:cxnSp>
+        <p:nvCxnSpPr>
+          <p:cNvPr id="32" name="Straight Arrow Connector 31"/>
+          <p:cNvCxnSpPr/>
+          <p:nvPr/>
+        </p:nvCxnSpPr>
+        <p:spPr>
+          <a:xfrm flipH="1">
+            <a:off x="6081352" y="1485167"/>
+            <a:ext cx="1306030" cy="1271480"/>
+          </a:xfrm>
+          <a:prstGeom prst="straightConnector1">
+            <a:avLst/>
+          </a:prstGeom>
+          <a:ln w="28575">
+            <a:solidFill>
+              <a:srgbClr val="00B050"/>
+            </a:solidFill>
+            <a:tailEnd type="triangle"/>
+          </a:ln>
+        </p:spPr>
+        <p:style>
+          <a:lnRef idx="1">
+            <a:schemeClr val="accent1"/>
+          </a:lnRef>
+          <a:fillRef idx="0">
+            <a:schemeClr val="accent1"/>
+          </a:fillRef>
+          <a:effectRef idx="0">
+            <a:schemeClr val="accent1"/>
+          </a:effectRef>
+          <a:fontRef idx="minor">
+            <a:schemeClr val="tx1"/>
+          </a:fontRef>
+        </p:style>
+      </p:cxnSp>
+      <p:cxnSp>
+        <p:nvCxnSpPr>
+          <p:cNvPr id="34" name="Straight Arrow Connector 33"/>
+          <p:cNvCxnSpPr/>
+          <p:nvPr/>
+        </p:nvCxnSpPr>
+        <p:spPr>
+          <a:xfrm flipV="1">
+            <a:off x="1482707" y="2929218"/>
+            <a:ext cx="2125587" cy="2122395"/>
+          </a:xfrm>
+          <a:prstGeom prst="straightConnector1">
+            <a:avLst/>
+          </a:prstGeom>
+          <a:ln w="28575">
+            <a:solidFill>
+              <a:srgbClr val="FFFF00"/>
+            </a:solidFill>
+            <a:tailEnd type="triangle"/>
+          </a:ln>
+        </p:spPr>
+        <p:style>
+          <a:lnRef idx="1">
+            <a:schemeClr val="accent1"/>
+          </a:lnRef>
+          <a:fillRef idx="0">
+            <a:schemeClr val="accent1"/>
+          </a:fillRef>
+          <a:effectRef idx="0">
+            <a:schemeClr val="accent1"/>
+          </a:effectRef>
+          <a:fontRef idx="minor">
+            <a:schemeClr val="tx1"/>
+          </a:fontRef>
+        </p:style>
+      </p:cxnSp>
+      <p:cxnSp>
+        <p:nvCxnSpPr>
+          <p:cNvPr id="37" name="Straight Arrow Connector 36"/>
+          <p:cNvCxnSpPr/>
+          <p:nvPr/>
+        </p:nvCxnSpPr>
+        <p:spPr>
+          <a:xfrm flipV="1">
+            <a:off x="1482706" y="2962824"/>
+            <a:ext cx="6903722" cy="2109803"/>
+          </a:xfrm>
+          <a:prstGeom prst="straightConnector1">
+            <a:avLst/>
+          </a:prstGeom>
+          <a:ln w="28575">
+            <a:solidFill>
+              <a:srgbClr val="00B050"/>
+            </a:solidFill>
+            <a:tailEnd type="triangle"/>
+          </a:ln>
+        </p:spPr>
+        <p:style>
+          <a:lnRef idx="1">
+            <a:schemeClr val="accent1"/>
+          </a:lnRef>
+          <a:fillRef idx="0">
+            <a:schemeClr val="accent1"/>
+          </a:fillRef>
+          <a:effectRef idx="0">
+            <a:schemeClr val="accent1"/>
+          </a:effectRef>
+          <a:fontRef idx="minor">
+            <a:schemeClr val="tx1"/>
+          </a:fontRef>
+        </p:style>
+      </p:cxnSp>
+      <p:cxnSp>
+        <p:nvCxnSpPr>
+          <p:cNvPr id="40" name="Straight Arrow Connector 39"/>
+          <p:cNvCxnSpPr/>
+          <p:nvPr/>
+        </p:nvCxnSpPr>
+        <p:spPr>
+          <a:xfrm>
+            <a:off x="2828829" y="1485167"/>
+            <a:ext cx="6965270" cy="2253672"/>
+          </a:xfrm>
+          <a:prstGeom prst="straightConnector1">
+            <a:avLst/>
+          </a:prstGeom>
+          <a:ln w="28575">
+            <a:solidFill>
+              <a:srgbClr val="FFFF00"/>
+            </a:solidFill>
+            <a:tailEnd type="triangle"/>
+          </a:ln>
+        </p:spPr>
+        <p:style>
+          <a:lnRef idx="1">
+            <a:schemeClr val="accent1"/>
+          </a:lnRef>
+          <a:fillRef idx="0">
+            <a:schemeClr val="accent1"/>
+          </a:fillRef>
+          <a:effectRef idx="0">
+            <a:schemeClr val="accent1"/>
+          </a:effectRef>
+          <a:fontRef idx="minor">
+            <a:schemeClr val="tx1"/>
+          </a:fontRef>
+        </p:style>
+      </p:cxnSp>
+      <p:cxnSp>
+        <p:nvCxnSpPr>
+          <p:cNvPr id="43" name="Straight Arrow Connector 42"/>
+          <p:cNvCxnSpPr/>
+          <p:nvPr/>
+        </p:nvCxnSpPr>
+        <p:spPr>
+          <a:xfrm>
+            <a:off x="7387382" y="1485167"/>
+            <a:ext cx="2438557" cy="4040189"/>
+          </a:xfrm>
+          <a:prstGeom prst="straightConnector1">
+            <a:avLst/>
+          </a:prstGeom>
+          <a:ln w="28575">
+            <a:solidFill>
+              <a:srgbClr val="00B050"/>
+            </a:solidFill>
+            <a:tailEnd type="triangle"/>
+          </a:ln>
+        </p:spPr>
+        <p:style>
+          <a:lnRef idx="1">
+            <a:schemeClr val="accent1"/>
+          </a:lnRef>
+          <a:fillRef idx="0">
+            <a:schemeClr val="accent1"/>
+          </a:fillRef>
+          <a:effectRef idx="0">
+            <a:schemeClr val="accent1"/>
+          </a:effectRef>
+          <a:fontRef idx="minor">
+            <a:schemeClr val="tx1"/>
+          </a:fontRef>
+        </p:style>
+      </p:cxnSp>
+    </p:spTree>
+    <p:extLst>
+      <p:ext uri="{BB962C8B-B14F-4D97-AF65-F5344CB8AC3E}">
+        <p14:creationId xmlns:p14="http://schemas.microsoft.com/office/powerpoint/2010/main" val="4019971486"/>
+      </p:ext>
+    </p:extLst>
+  </p:cSld>
+  <p:clrMapOvr>
+    <a:masterClrMapping/>
+  </p:clrMapOvr>
+  <p:timing>
+    <p:tnLst>
+      <p:par>
+        <p:cTn id="1" dur="indefinite" restart="never" nodeType="tmRoot"/>
+      </p:par>
+    </p:tnLst>
+  </p:timing>
 </p:sld>
 </file>
 

</xml_diff>

<commit_message>
Update HTTP fetch data
</commit_message>
<xml_diff>
--- a/Angular Presentation.pptx
+++ b/Angular Presentation.pptx
@@ -5,7 +5,7 @@
     <p:sldMasterId id="2147483723" r:id="rId1"/>
   </p:sldMasterIdLst>
   <p:notesMasterIdLst>
-    <p:notesMasterId r:id="rId86"/>
+    <p:notesMasterId r:id="rId92"/>
   </p:notesMasterIdLst>
   <p:sldIdLst>
     <p:sldId id="256" r:id="rId2"/>
@@ -92,6 +92,12 @@
     <p:sldId id="363" r:id="rId83"/>
     <p:sldId id="364" r:id="rId84"/>
     <p:sldId id="365" r:id="rId85"/>
+    <p:sldId id="366" r:id="rId86"/>
+    <p:sldId id="367" r:id="rId87"/>
+    <p:sldId id="368" r:id="rId88"/>
+    <p:sldId id="369" r:id="rId89"/>
+    <p:sldId id="370" r:id="rId90"/>
+    <p:sldId id="371" r:id="rId91"/>
   </p:sldIdLst>
   <p:sldSz cx="12192000" cy="6858000"/>
   <p:notesSz cx="6858000" cy="9144000"/>
@@ -44967,6 +44973,1712 @@
 </p:sld>
 </file>
 
+<file path=ppt/slides/slide85.xml><?xml version="1.0" encoding="utf-8"?>
+<p:sld xmlns:a="http://schemas.openxmlformats.org/drawingml/2006/main" xmlns:r="http://schemas.openxmlformats.org/officeDocument/2006/relationships" xmlns:p="http://schemas.openxmlformats.org/presentationml/2006/main">
+  <p:cSld>
+    <p:spTree>
+      <p:nvGrpSpPr>
+        <p:cNvPr id="1" name=""/>
+        <p:cNvGrpSpPr/>
+        <p:nvPr/>
+      </p:nvGrpSpPr>
+      <p:grpSpPr>
+        <a:xfrm>
+          <a:off x="0" y="0"/>
+          <a:ext cx="0" cy="0"/>
+          <a:chOff x="0" y="0"/>
+          <a:chExt cx="0" cy="0"/>
+        </a:xfrm>
+      </p:grpSpPr>
+      <p:sp>
+        <p:nvSpPr>
+          <p:cNvPr id="4" name="Title 3"/>
+          <p:cNvSpPr>
+            <a:spLocks noGrp="1"/>
+          </p:cNvSpPr>
+          <p:nvPr>
+            <p:ph type="title"/>
+          </p:nvPr>
+        </p:nvSpPr>
+        <p:spPr/>
+        <p:txBody>
+          <a:bodyPr/>
+          <a:lstStyle/>
+          <a:p>
+            <a:r>
+              <a:rPr lang="en-IN" b="1" dirty="0" smtClean="0"/>
+              <a:t>19 </a:t>
+            </a:r>
+            <a:r>
+              <a:rPr lang="en-IN" b="1" dirty="0" smtClean="0"/>
+              <a:t>: </a:t>
+            </a:r>
+            <a:r>
+              <a:rPr lang="en-IN" b="1" dirty="0" smtClean="0"/>
+              <a:t>HTTP and Observables</a:t>
+            </a:r>
+            <a:endParaRPr lang="en-IN" b="1" dirty="0"/>
+          </a:p>
+        </p:txBody>
+      </p:sp>
+      <p:sp>
+        <p:nvSpPr>
+          <p:cNvPr id="2" name="Content Placeholder 1"/>
+          <p:cNvSpPr>
+            <a:spLocks noGrp="1"/>
+          </p:cNvSpPr>
+          <p:nvPr>
+            <p:ph idx="1"/>
+          </p:nvPr>
+        </p:nvSpPr>
+        <p:spPr/>
+        <p:txBody>
+          <a:bodyPr/>
+          <a:lstStyle/>
+          <a:p>
+            <a:r>
+              <a:rPr lang="en-IN" dirty="0" smtClean="0"/>
+              <a:t>So far we have hardcoded values to display. But in real time scenarios we need to get those values from some server</a:t>
+            </a:r>
+          </a:p>
+          <a:p>
+            <a:r>
+              <a:rPr lang="en-IN" dirty="0" smtClean="0"/>
+              <a:t>For that we need to use HTTP and Observables this is returned by the HTTP call. </a:t>
+            </a:r>
+          </a:p>
+          <a:p>
+            <a:r>
+              <a:rPr lang="en-IN" dirty="0" smtClean="0"/>
+              <a:t>Usually the server have a database which contains all data and send back the desired output based on our requirement.</a:t>
+            </a:r>
+          </a:p>
+          <a:p>
+            <a:r>
+              <a:rPr lang="en-IN" dirty="0" smtClean="0"/>
+              <a:t>Lets see HTTP Mechanism…</a:t>
+            </a:r>
+            <a:endParaRPr lang="en-IN" dirty="0"/>
+          </a:p>
+        </p:txBody>
+      </p:sp>
+      <p:sp>
+        <p:nvSpPr>
+          <p:cNvPr id="14" name="Date Placeholder 13"/>
+          <p:cNvSpPr>
+            <a:spLocks noGrp="1"/>
+          </p:cNvSpPr>
+          <p:nvPr>
+            <p:ph type="dt" sz="half" idx="10"/>
+          </p:nvPr>
+        </p:nvSpPr>
+        <p:spPr/>
+        <p:txBody>
+          <a:bodyPr/>
+          <a:lstStyle/>
+          <a:p>
+            <a:r>
+              <a:rPr lang="en-US" smtClean="0"/>
+              <a:t>5/6/2019</a:t>
+            </a:r>
+            <a:endParaRPr lang="en-US" dirty="0"/>
+          </a:p>
+        </p:txBody>
+      </p:sp>
+      <p:sp>
+        <p:nvSpPr>
+          <p:cNvPr id="15" name="Slide Number Placeholder 14"/>
+          <p:cNvSpPr>
+            <a:spLocks noGrp="1"/>
+          </p:cNvSpPr>
+          <p:nvPr>
+            <p:ph type="sldNum" sz="quarter" idx="12"/>
+          </p:nvPr>
+        </p:nvSpPr>
+        <p:spPr/>
+        <p:txBody>
+          <a:bodyPr/>
+          <a:lstStyle/>
+          <a:p>
+            <a:fld id="{6D22F896-40B5-4ADD-8801-0D06FADFA095}" type="slidenum">
+              <a:rPr lang="en-US" smtClean="0"/>
+              <a:t>85</a:t>
+            </a:fld>
+            <a:endParaRPr lang="en-US" dirty="0"/>
+          </a:p>
+        </p:txBody>
+      </p:sp>
+    </p:spTree>
+    <p:extLst>
+      <p:ext uri="{BB962C8B-B14F-4D97-AF65-F5344CB8AC3E}">
+        <p14:creationId xmlns:p14="http://schemas.microsoft.com/office/powerpoint/2010/main" val="38168644"/>
+      </p:ext>
+    </p:extLst>
+  </p:cSld>
+  <p:clrMapOvr>
+    <a:masterClrMapping/>
+  </p:clrMapOvr>
+  <p:timing>
+    <p:tnLst>
+      <p:par>
+        <p:cTn id="1" dur="indefinite" restart="never" nodeType="tmRoot"/>
+      </p:par>
+    </p:tnLst>
+  </p:timing>
+</p:sld>
+</file>
+
+<file path=ppt/slides/slide86.xml><?xml version="1.0" encoding="utf-8"?>
+<p:sld xmlns:a="http://schemas.openxmlformats.org/drawingml/2006/main" xmlns:r="http://schemas.openxmlformats.org/officeDocument/2006/relationships" xmlns:p="http://schemas.openxmlformats.org/presentationml/2006/main">
+  <p:cSld>
+    <p:spTree>
+      <p:nvGrpSpPr>
+        <p:cNvPr id="1" name=""/>
+        <p:cNvGrpSpPr/>
+        <p:nvPr/>
+      </p:nvGrpSpPr>
+      <p:grpSpPr>
+        <a:xfrm>
+          <a:off x="0" y="0"/>
+          <a:ext cx="0" cy="0"/>
+          <a:chOff x="0" y="0"/>
+          <a:chExt cx="0" cy="0"/>
+        </a:xfrm>
+      </p:grpSpPr>
+      <p:sp>
+        <p:nvSpPr>
+          <p:cNvPr id="4" name="Title 3"/>
+          <p:cNvSpPr>
+            <a:spLocks noGrp="1"/>
+          </p:cNvSpPr>
+          <p:nvPr>
+            <p:ph type="title"/>
+          </p:nvPr>
+        </p:nvSpPr>
+        <p:spPr/>
+        <p:txBody>
+          <a:bodyPr/>
+          <a:lstStyle/>
+          <a:p>
+            <a:r>
+              <a:rPr lang="en-IN" b="1" dirty="0" smtClean="0"/>
+              <a:t>19.1 </a:t>
+            </a:r>
+            <a:r>
+              <a:rPr lang="en-IN" b="1" dirty="0" smtClean="0"/>
+              <a:t>: </a:t>
+            </a:r>
+            <a:r>
+              <a:rPr lang="en-IN" b="1" dirty="0" smtClean="0"/>
+              <a:t>HTTP Mechanism</a:t>
+            </a:r>
+            <a:endParaRPr lang="en-IN" b="1" dirty="0"/>
+          </a:p>
+        </p:txBody>
+      </p:sp>
+      <p:sp>
+        <p:nvSpPr>
+          <p:cNvPr id="14" name="Date Placeholder 13"/>
+          <p:cNvSpPr>
+            <a:spLocks noGrp="1"/>
+          </p:cNvSpPr>
+          <p:nvPr>
+            <p:ph type="dt" sz="half" idx="10"/>
+          </p:nvPr>
+        </p:nvSpPr>
+        <p:spPr/>
+        <p:txBody>
+          <a:bodyPr/>
+          <a:lstStyle/>
+          <a:p>
+            <a:r>
+              <a:rPr lang="en-US" smtClean="0"/>
+              <a:t>5/6/2019</a:t>
+            </a:r>
+            <a:endParaRPr lang="en-US" dirty="0"/>
+          </a:p>
+        </p:txBody>
+      </p:sp>
+      <p:sp>
+        <p:nvSpPr>
+          <p:cNvPr id="15" name="Slide Number Placeholder 14"/>
+          <p:cNvSpPr>
+            <a:spLocks noGrp="1"/>
+          </p:cNvSpPr>
+          <p:nvPr>
+            <p:ph type="sldNum" sz="quarter" idx="12"/>
+          </p:nvPr>
+        </p:nvSpPr>
+        <p:spPr/>
+        <p:txBody>
+          <a:bodyPr/>
+          <a:lstStyle/>
+          <a:p>
+            <a:fld id="{6D22F896-40B5-4ADD-8801-0D06FADFA095}" type="slidenum">
+              <a:rPr lang="en-US" smtClean="0"/>
+              <a:t>86</a:t>
+            </a:fld>
+            <a:endParaRPr lang="en-US" dirty="0"/>
+          </a:p>
+        </p:txBody>
+      </p:sp>
+      <p:sp>
+        <p:nvSpPr>
+          <p:cNvPr id="5" name="Rectangle 4"/>
+          <p:cNvSpPr/>
+          <p:nvPr/>
+        </p:nvSpPr>
+        <p:spPr>
+          <a:xfrm>
+            <a:off x="1304365" y="2675965"/>
+            <a:ext cx="7503459" cy="3715873"/>
+          </a:xfrm>
+          <a:prstGeom prst="rect">
+            <a:avLst/>
+          </a:prstGeom>
+          <a:solidFill>
+            <a:schemeClr val="accent2">
+              <a:lumMod val="20000"/>
+              <a:lumOff val="80000"/>
+            </a:schemeClr>
+          </a:solidFill>
+        </p:spPr>
+        <p:style>
+          <a:lnRef idx="2">
+            <a:schemeClr val="accent1">
+              <a:shade val="50000"/>
+            </a:schemeClr>
+          </a:lnRef>
+          <a:fillRef idx="1">
+            <a:schemeClr val="accent1"/>
+          </a:fillRef>
+          <a:effectRef idx="0">
+            <a:schemeClr val="accent1"/>
+          </a:effectRef>
+          <a:fontRef idx="minor">
+            <a:schemeClr val="lt1"/>
+          </a:fontRef>
+        </p:style>
+        <p:txBody>
+          <a:bodyPr rtlCol="0" anchor="ctr"/>
+          <a:lstStyle/>
+          <a:p>
+            <a:pPr algn="ctr"/>
+            <a:r>
+              <a:rPr lang="en-IN" dirty="0" smtClean="0"/>
+              <a:t>Get</a:t>
+            </a:r>
+            <a:endParaRPr lang="en-IN" dirty="0"/>
+          </a:p>
+        </p:txBody>
+      </p:sp>
+      <p:sp>
+        <p:nvSpPr>
+          <p:cNvPr id="6" name="TextBox 5"/>
+          <p:cNvSpPr txBox="1"/>
+          <p:nvPr/>
+        </p:nvSpPr>
+        <p:spPr>
+          <a:xfrm>
+            <a:off x="4329953" y="2895349"/>
+            <a:ext cx="1089211" cy="369332"/>
+          </a:xfrm>
+          <a:prstGeom prst="rect">
+            <a:avLst/>
+          </a:prstGeom>
+          <a:solidFill>
+            <a:schemeClr val="bg1"/>
+          </a:solidFill>
+        </p:spPr>
+        <p:txBody>
+          <a:bodyPr wrap="square" rtlCol="0">
+            <a:spAutoFit/>
+          </a:bodyPr>
+          <a:lstStyle/>
+          <a:p>
+            <a:pPr algn="ctr"/>
+            <a:r>
+              <a:rPr lang="en-IN" b="1" dirty="0" smtClean="0">
+                <a:solidFill>
+                  <a:schemeClr val="accent2">
+                    <a:lumMod val="50000"/>
+                  </a:schemeClr>
+                </a:solidFill>
+              </a:rPr>
+              <a:t>Browser</a:t>
+            </a:r>
+            <a:endParaRPr lang="en-IN" b="1" dirty="0">
+              <a:solidFill>
+                <a:schemeClr val="accent2">
+                  <a:lumMod val="50000"/>
+                </a:schemeClr>
+              </a:solidFill>
+            </a:endParaRPr>
+          </a:p>
+        </p:txBody>
+      </p:sp>
+      <p:sp>
+        <p:nvSpPr>
+          <p:cNvPr id="7" name="Rectangle 6"/>
+          <p:cNvSpPr/>
+          <p:nvPr/>
+        </p:nvSpPr>
+        <p:spPr>
+          <a:xfrm>
+            <a:off x="1532963" y="3290899"/>
+            <a:ext cx="1761565" cy="854350"/>
+          </a:xfrm>
+          <a:prstGeom prst="rect">
+            <a:avLst/>
+          </a:prstGeom>
+        </p:spPr>
+        <p:style>
+          <a:lnRef idx="2">
+            <a:schemeClr val="accent1">
+              <a:shade val="50000"/>
+            </a:schemeClr>
+          </a:lnRef>
+          <a:fillRef idx="1">
+            <a:schemeClr val="accent1"/>
+          </a:fillRef>
+          <a:effectRef idx="0">
+            <a:schemeClr val="accent1"/>
+          </a:effectRef>
+          <a:fontRef idx="minor">
+            <a:schemeClr val="lt1"/>
+          </a:fontRef>
+        </p:style>
+        <p:txBody>
+          <a:bodyPr rtlCol="0" anchor="ctr"/>
+          <a:lstStyle/>
+          <a:p>
+            <a:pPr algn="ctr"/>
+            <a:r>
+              <a:rPr lang="en-IN" dirty="0" err="1" smtClean="0"/>
+              <a:t>EmpList</a:t>
+            </a:r>
+            <a:endParaRPr lang="en-IN" dirty="0"/>
+          </a:p>
+        </p:txBody>
+      </p:sp>
+      <p:sp>
+        <p:nvSpPr>
+          <p:cNvPr id="10" name="Rectangle 9"/>
+          <p:cNvSpPr/>
+          <p:nvPr/>
+        </p:nvSpPr>
+        <p:spPr>
+          <a:xfrm>
+            <a:off x="1532963" y="5320980"/>
+            <a:ext cx="1761565" cy="854350"/>
+          </a:xfrm>
+          <a:prstGeom prst="rect">
+            <a:avLst/>
+          </a:prstGeom>
+        </p:spPr>
+        <p:style>
+          <a:lnRef idx="2">
+            <a:schemeClr val="accent1">
+              <a:shade val="50000"/>
+            </a:schemeClr>
+          </a:lnRef>
+          <a:fillRef idx="1">
+            <a:schemeClr val="accent1"/>
+          </a:fillRef>
+          <a:effectRef idx="0">
+            <a:schemeClr val="accent1"/>
+          </a:effectRef>
+          <a:fontRef idx="minor">
+            <a:schemeClr val="lt1"/>
+          </a:fontRef>
+        </p:style>
+        <p:txBody>
+          <a:bodyPr rtlCol="0" anchor="ctr"/>
+          <a:lstStyle/>
+          <a:p>
+            <a:pPr algn="ctr"/>
+            <a:r>
+              <a:rPr lang="en-IN" dirty="0" err="1" smtClean="0"/>
+              <a:t>EmpDetail</a:t>
+            </a:r>
+            <a:endParaRPr lang="en-IN" dirty="0"/>
+          </a:p>
+        </p:txBody>
+      </p:sp>
+      <p:sp>
+        <p:nvSpPr>
+          <p:cNvPr id="11" name="Rectangle 10"/>
+          <p:cNvSpPr/>
+          <p:nvPr/>
+        </p:nvSpPr>
+        <p:spPr>
+          <a:xfrm>
+            <a:off x="3657599" y="4260014"/>
+            <a:ext cx="1761565" cy="854350"/>
+          </a:xfrm>
+          <a:prstGeom prst="rect">
+            <a:avLst/>
+          </a:prstGeom>
+          <a:solidFill>
+            <a:schemeClr val="accent5">
+              <a:lumMod val="75000"/>
+            </a:schemeClr>
+          </a:solidFill>
+          <a:ln>
+            <a:solidFill>
+              <a:schemeClr val="accent5">
+                <a:lumMod val="50000"/>
+              </a:schemeClr>
+            </a:solidFill>
+          </a:ln>
+        </p:spPr>
+        <p:style>
+          <a:lnRef idx="2">
+            <a:schemeClr val="accent1">
+              <a:shade val="50000"/>
+            </a:schemeClr>
+          </a:lnRef>
+          <a:fillRef idx="1">
+            <a:schemeClr val="accent1"/>
+          </a:fillRef>
+          <a:effectRef idx="0">
+            <a:schemeClr val="accent1"/>
+          </a:effectRef>
+          <a:fontRef idx="minor">
+            <a:schemeClr val="lt1"/>
+          </a:fontRef>
+        </p:style>
+        <p:txBody>
+          <a:bodyPr rtlCol="0" anchor="ctr"/>
+          <a:lstStyle/>
+          <a:p>
+            <a:pPr algn="ctr"/>
+            <a:r>
+              <a:rPr lang="en-IN" dirty="0" err="1" smtClean="0"/>
+              <a:t>EmpService</a:t>
+            </a:r>
+            <a:endParaRPr lang="en-IN" dirty="0"/>
+          </a:p>
+        </p:txBody>
+      </p:sp>
+      <p:sp>
+        <p:nvSpPr>
+          <p:cNvPr id="8" name="Rectangle 7"/>
+          <p:cNvSpPr/>
+          <p:nvPr/>
+        </p:nvSpPr>
+        <p:spPr>
+          <a:xfrm>
+            <a:off x="9345706" y="2675965"/>
+            <a:ext cx="2297997" cy="3715873"/>
+          </a:xfrm>
+          <a:prstGeom prst="rect">
+            <a:avLst/>
+          </a:prstGeom>
+          <a:solidFill>
+            <a:schemeClr val="accent5">
+              <a:lumMod val="20000"/>
+              <a:lumOff val="80000"/>
+            </a:schemeClr>
+          </a:solidFill>
+          <a:ln>
+            <a:solidFill>
+              <a:schemeClr val="accent5">
+                <a:lumMod val="50000"/>
+              </a:schemeClr>
+            </a:solidFill>
+          </a:ln>
+        </p:spPr>
+        <p:style>
+          <a:lnRef idx="2">
+            <a:schemeClr val="accent1">
+              <a:shade val="50000"/>
+            </a:schemeClr>
+          </a:lnRef>
+          <a:fillRef idx="1">
+            <a:schemeClr val="accent1"/>
+          </a:fillRef>
+          <a:effectRef idx="0">
+            <a:schemeClr val="accent1"/>
+          </a:effectRef>
+          <a:fontRef idx="minor">
+            <a:schemeClr val="lt1"/>
+          </a:fontRef>
+        </p:style>
+        <p:txBody>
+          <a:bodyPr rtlCol="0" anchor="ctr"/>
+          <a:lstStyle/>
+          <a:p>
+            <a:pPr algn="ctr"/>
+            <a:endParaRPr lang="en-IN"/>
+          </a:p>
+        </p:txBody>
+      </p:sp>
+      <p:sp>
+        <p:nvSpPr>
+          <p:cNvPr id="9" name="Can 8"/>
+          <p:cNvSpPr/>
+          <p:nvPr/>
+        </p:nvSpPr>
+        <p:spPr>
+          <a:xfrm>
+            <a:off x="9688607" y="3783781"/>
+            <a:ext cx="1553974" cy="1537199"/>
+          </a:xfrm>
+          <a:prstGeom prst="can">
+            <a:avLst/>
+          </a:prstGeom>
+        </p:spPr>
+        <p:style>
+          <a:lnRef idx="2">
+            <a:schemeClr val="accent1">
+              <a:shade val="50000"/>
+            </a:schemeClr>
+          </a:lnRef>
+          <a:fillRef idx="1">
+            <a:schemeClr val="accent1"/>
+          </a:fillRef>
+          <a:effectRef idx="0">
+            <a:schemeClr val="accent1"/>
+          </a:effectRef>
+          <a:fontRef idx="minor">
+            <a:schemeClr val="lt1"/>
+          </a:fontRef>
+        </p:style>
+        <p:txBody>
+          <a:bodyPr rtlCol="0" anchor="ctr"/>
+          <a:lstStyle/>
+          <a:p>
+            <a:pPr algn="ctr"/>
+            <a:r>
+              <a:rPr lang="en-IN" b="1" dirty="0" smtClean="0"/>
+              <a:t>DB</a:t>
+            </a:r>
+            <a:endParaRPr lang="en-IN" b="1" dirty="0"/>
+          </a:p>
+        </p:txBody>
+      </p:sp>
+      <p:cxnSp>
+        <p:nvCxnSpPr>
+          <p:cNvPr id="16" name="Straight Connector 15"/>
+          <p:cNvCxnSpPr>
+            <a:stCxn id="7" idx="2"/>
+            <a:endCxn id="10" idx="0"/>
+          </p:cNvCxnSpPr>
+          <p:nvPr/>
+        </p:nvCxnSpPr>
+        <p:spPr>
+          <a:xfrm>
+            <a:off x="2413746" y="4145249"/>
+            <a:ext cx="0" cy="1175731"/>
+          </a:xfrm>
+          <a:prstGeom prst="line">
+            <a:avLst/>
+          </a:prstGeom>
+          <a:ln w="28575"/>
+        </p:spPr>
+        <p:style>
+          <a:lnRef idx="1">
+            <a:schemeClr val="accent1"/>
+          </a:lnRef>
+          <a:fillRef idx="0">
+            <a:schemeClr val="accent1"/>
+          </a:fillRef>
+          <a:effectRef idx="0">
+            <a:schemeClr val="accent1"/>
+          </a:effectRef>
+          <a:fontRef idx="minor">
+            <a:schemeClr val="tx1"/>
+          </a:fontRef>
+        </p:style>
+      </p:cxnSp>
+      <p:cxnSp>
+        <p:nvCxnSpPr>
+          <p:cNvPr id="18" name="Straight Arrow Connector 17"/>
+          <p:cNvCxnSpPr/>
+          <p:nvPr/>
+        </p:nvCxnSpPr>
+        <p:spPr>
+          <a:xfrm>
+            <a:off x="2413745" y="4687189"/>
+            <a:ext cx="1243854" cy="0"/>
+          </a:xfrm>
+          <a:prstGeom prst="straightConnector1">
+            <a:avLst/>
+          </a:prstGeom>
+          <a:ln w="28575">
+            <a:tailEnd type="triangle"/>
+          </a:ln>
+        </p:spPr>
+        <p:style>
+          <a:lnRef idx="1">
+            <a:schemeClr val="accent1"/>
+          </a:lnRef>
+          <a:fillRef idx="0">
+            <a:schemeClr val="accent1"/>
+          </a:fillRef>
+          <a:effectRef idx="0">
+            <a:schemeClr val="accent1"/>
+          </a:effectRef>
+          <a:fontRef idx="minor">
+            <a:schemeClr val="tx1"/>
+          </a:fontRef>
+        </p:style>
+      </p:cxnSp>
+      <p:cxnSp>
+        <p:nvCxnSpPr>
+          <p:cNvPr id="19" name="Straight Arrow Connector 18"/>
+          <p:cNvCxnSpPr/>
+          <p:nvPr/>
+        </p:nvCxnSpPr>
+        <p:spPr>
+          <a:xfrm>
+            <a:off x="5426321" y="4533901"/>
+            <a:ext cx="1243855" cy="0"/>
+          </a:xfrm>
+          <a:prstGeom prst="straightConnector1">
+            <a:avLst/>
+          </a:prstGeom>
+          <a:ln w="28575">
+            <a:tailEnd type="triangle"/>
+          </a:ln>
+        </p:spPr>
+        <p:style>
+          <a:lnRef idx="1">
+            <a:schemeClr val="accent1"/>
+          </a:lnRef>
+          <a:fillRef idx="0">
+            <a:schemeClr val="accent1"/>
+          </a:fillRef>
+          <a:effectRef idx="0">
+            <a:schemeClr val="accent1"/>
+          </a:effectRef>
+          <a:fontRef idx="minor">
+            <a:schemeClr val="tx1"/>
+          </a:fontRef>
+        </p:style>
+      </p:cxnSp>
+      <p:cxnSp>
+        <p:nvCxnSpPr>
+          <p:cNvPr id="21" name="Straight Arrow Connector 20"/>
+          <p:cNvCxnSpPr/>
+          <p:nvPr/>
+        </p:nvCxnSpPr>
+        <p:spPr>
+          <a:xfrm>
+            <a:off x="8454836" y="4507007"/>
+            <a:ext cx="1243854" cy="0"/>
+          </a:xfrm>
+          <a:prstGeom prst="straightConnector1">
+            <a:avLst/>
+          </a:prstGeom>
+          <a:ln w="28575">
+            <a:tailEnd type="triangle"/>
+          </a:ln>
+        </p:spPr>
+        <p:style>
+          <a:lnRef idx="1">
+            <a:schemeClr val="accent1"/>
+          </a:lnRef>
+          <a:fillRef idx="0">
+            <a:schemeClr val="accent1"/>
+          </a:fillRef>
+          <a:effectRef idx="0">
+            <a:schemeClr val="accent1"/>
+          </a:effectRef>
+          <a:fontRef idx="minor">
+            <a:schemeClr val="tx1"/>
+          </a:fontRef>
+        </p:style>
+      </p:cxnSp>
+      <p:cxnSp>
+        <p:nvCxnSpPr>
+          <p:cNvPr id="22" name="Straight Arrow Connector 21"/>
+          <p:cNvCxnSpPr/>
+          <p:nvPr/>
+        </p:nvCxnSpPr>
+        <p:spPr>
+          <a:xfrm flipH="1">
+            <a:off x="8415732" y="4834218"/>
+            <a:ext cx="1254330" cy="0"/>
+          </a:xfrm>
+          <a:prstGeom prst="straightConnector1">
+            <a:avLst/>
+          </a:prstGeom>
+          <a:ln w="28575">
+            <a:solidFill>
+              <a:srgbClr val="00B0F0"/>
+            </a:solidFill>
+            <a:tailEnd type="triangle"/>
+          </a:ln>
+        </p:spPr>
+        <p:style>
+          <a:lnRef idx="1">
+            <a:schemeClr val="accent1"/>
+          </a:lnRef>
+          <a:fillRef idx="0">
+            <a:schemeClr val="accent1"/>
+          </a:fillRef>
+          <a:effectRef idx="0">
+            <a:schemeClr val="accent1"/>
+          </a:effectRef>
+          <a:fontRef idx="minor">
+            <a:schemeClr val="tx1"/>
+          </a:fontRef>
+        </p:style>
+      </p:cxnSp>
+      <p:sp>
+        <p:nvSpPr>
+          <p:cNvPr id="29" name="TextBox 28"/>
+          <p:cNvSpPr txBox="1"/>
+          <p:nvPr/>
+        </p:nvSpPr>
+        <p:spPr>
+          <a:xfrm>
+            <a:off x="9950098" y="2895349"/>
+            <a:ext cx="1089211" cy="369332"/>
+          </a:xfrm>
+          <a:prstGeom prst="rect">
+            <a:avLst/>
+          </a:prstGeom>
+          <a:solidFill>
+            <a:schemeClr val="bg1"/>
+          </a:solidFill>
+        </p:spPr>
+        <p:txBody>
+          <a:bodyPr wrap="square" rtlCol="0">
+            <a:spAutoFit/>
+          </a:bodyPr>
+          <a:lstStyle/>
+          <a:p>
+            <a:pPr algn="ctr"/>
+            <a:r>
+              <a:rPr lang="en-IN" b="1" dirty="0" smtClean="0">
+                <a:solidFill>
+                  <a:schemeClr val="accent2">
+                    <a:lumMod val="50000"/>
+                  </a:schemeClr>
+                </a:solidFill>
+              </a:rPr>
+              <a:t>Server</a:t>
+            </a:r>
+            <a:endParaRPr lang="en-IN" b="1" dirty="0">
+              <a:solidFill>
+                <a:schemeClr val="accent2">
+                  <a:lumMod val="50000"/>
+                </a:schemeClr>
+              </a:solidFill>
+            </a:endParaRPr>
+          </a:p>
+        </p:txBody>
+      </p:sp>
+      <p:sp>
+        <p:nvSpPr>
+          <p:cNvPr id="12" name="Rectangle 11"/>
+          <p:cNvSpPr/>
+          <p:nvPr/>
+        </p:nvSpPr>
+        <p:spPr>
+          <a:xfrm>
+            <a:off x="6663015" y="4260014"/>
+            <a:ext cx="1761565" cy="854350"/>
+          </a:xfrm>
+          <a:prstGeom prst="rect">
+            <a:avLst/>
+          </a:prstGeom>
+          <a:solidFill>
+            <a:schemeClr val="accent4">
+              <a:lumMod val="75000"/>
+            </a:schemeClr>
+          </a:solidFill>
+          <a:ln>
+            <a:solidFill>
+              <a:schemeClr val="accent4">
+                <a:lumMod val="50000"/>
+              </a:schemeClr>
+            </a:solidFill>
+          </a:ln>
+        </p:spPr>
+        <p:style>
+          <a:lnRef idx="2">
+            <a:schemeClr val="accent1">
+              <a:shade val="50000"/>
+            </a:schemeClr>
+          </a:lnRef>
+          <a:fillRef idx="1">
+            <a:schemeClr val="accent1"/>
+          </a:fillRef>
+          <a:effectRef idx="0">
+            <a:schemeClr val="accent1"/>
+          </a:effectRef>
+          <a:fontRef idx="minor">
+            <a:schemeClr val="lt1"/>
+          </a:fontRef>
+        </p:style>
+        <p:txBody>
+          <a:bodyPr rtlCol="0" anchor="ctr"/>
+          <a:lstStyle/>
+          <a:p>
+            <a:pPr algn="ctr"/>
+            <a:r>
+              <a:rPr lang="en-IN" b="1" dirty="0" smtClean="0"/>
+              <a:t>HTTP</a:t>
+            </a:r>
+            <a:endParaRPr lang="en-IN" b="1" dirty="0"/>
+          </a:p>
+        </p:txBody>
+      </p:sp>
+      <p:sp>
+        <p:nvSpPr>
+          <p:cNvPr id="30" name="TextBox 29"/>
+          <p:cNvSpPr txBox="1"/>
+          <p:nvPr/>
+        </p:nvSpPr>
+        <p:spPr>
+          <a:xfrm>
+            <a:off x="5623122" y="4222395"/>
+            <a:ext cx="505267" cy="307777"/>
+          </a:xfrm>
+          <a:prstGeom prst="rect">
+            <a:avLst/>
+          </a:prstGeom>
+          <a:noFill/>
+        </p:spPr>
+        <p:txBody>
+          <a:bodyPr wrap="none" rtlCol="0">
+            <a:spAutoFit/>
+          </a:bodyPr>
+          <a:lstStyle/>
+          <a:p>
+            <a:r>
+              <a:rPr lang="en-IN" sz="1400" b="1" dirty="0" smtClean="0"/>
+              <a:t>Get</a:t>
+            </a:r>
+            <a:endParaRPr lang="en-IN" b="1" dirty="0"/>
+          </a:p>
+        </p:txBody>
+      </p:sp>
+      <p:sp>
+        <p:nvSpPr>
+          <p:cNvPr id="31" name="TextBox 30"/>
+          <p:cNvSpPr txBox="1"/>
+          <p:nvPr/>
+        </p:nvSpPr>
+        <p:spPr>
+          <a:xfrm>
+            <a:off x="5419164" y="4861131"/>
+            <a:ext cx="1202573" cy="307777"/>
+          </a:xfrm>
+          <a:prstGeom prst="rect">
+            <a:avLst/>
+          </a:prstGeom>
+          <a:noFill/>
+        </p:spPr>
+        <p:txBody>
+          <a:bodyPr wrap="none" rtlCol="0">
+            <a:spAutoFit/>
+          </a:bodyPr>
+          <a:lstStyle/>
+          <a:p>
+            <a:r>
+              <a:rPr lang="en-IN" sz="1400" b="1" dirty="0" smtClean="0"/>
+              <a:t>Observable</a:t>
+            </a:r>
+            <a:endParaRPr lang="en-IN" b="1" dirty="0"/>
+          </a:p>
+        </p:txBody>
+      </p:sp>
+      <p:cxnSp>
+        <p:nvCxnSpPr>
+          <p:cNvPr id="25" name="Straight Arrow Connector 24"/>
+          <p:cNvCxnSpPr/>
+          <p:nvPr/>
+        </p:nvCxnSpPr>
+        <p:spPr>
+          <a:xfrm flipH="1">
+            <a:off x="5452315" y="4834218"/>
+            <a:ext cx="1173066" cy="0"/>
+          </a:xfrm>
+          <a:prstGeom prst="straightConnector1">
+            <a:avLst/>
+          </a:prstGeom>
+          <a:ln w="28575">
+            <a:solidFill>
+              <a:srgbClr val="00B0F0"/>
+            </a:solidFill>
+            <a:tailEnd type="triangle"/>
+          </a:ln>
+        </p:spPr>
+        <p:style>
+          <a:lnRef idx="1">
+            <a:schemeClr val="accent1"/>
+          </a:lnRef>
+          <a:fillRef idx="0">
+            <a:schemeClr val="accent1"/>
+          </a:fillRef>
+          <a:effectRef idx="0">
+            <a:schemeClr val="accent1"/>
+          </a:effectRef>
+          <a:fontRef idx="minor">
+            <a:schemeClr val="tx1"/>
+          </a:fontRef>
+        </p:style>
+      </p:cxnSp>
+      <p:sp>
+        <p:nvSpPr>
+          <p:cNvPr id="32" name="TextBox 31"/>
+          <p:cNvSpPr txBox="1"/>
+          <p:nvPr/>
+        </p:nvSpPr>
+        <p:spPr>
+          <a:xfrm>
+            <a:off x="8603513" y="4179797"/>
+            <a:ext cx="878767" cy="307777"/>
+          </a:xfrm>
+          <a:prstGeom prst="rect">
+            <a:avLst/>
+          </a:prstGeom>
+          <a:noFill/>
+        </p:spPr>
+        <p:txBody>
+          <a:bodyPr wrap="none" rtlCol="0">
+            <a:spAutoFit/>
+          </a:bodyPr>
+          <a:lstStyle/>
+          <a:p>
+            <a:r>
+              <a:rPr lang="en-IN" sz="1400" b="1" dirty="0" smtClean="0"/>
+              <a:t>Request</a:t>
+            </a:r>
+            <a:endParaRPr lang="en-IN" b="1" dirty="0"/>
+          </a:p>
+        </p:txBody>
+      </p:sp>
+      <p:sp>
+        <p:nvSpPr>
+          <p:cNvPr id="33" name="TextBox 32"/>
+          <p:cNvSpPr txBox="1"/>
+          <p:nvPr/>
+        </p:nvSpPr>
+        <p:spPr>
+          <a:xfrm>
+            <a:off x="8603869" y="4834218"/>
+            <a:ext cx="1018227" cy="307777"/>
+          </a:xfrm>
+          <a:prstGeom prst="rect">
+            <a:avLst/>
+          </a:prstGeom>
+          <a:noFill/>
+        </p:spPr>
+        <p:txBody>
+          <a:bodyPr wrap="none" rtlCol="0">
+            <a:spAutoFit/>
+          </a:bodyPr>
+          <a:lstStyle/>
+          <a:p>
+            <a:r>
+              <a:rPr lang="en-IN" sz="1400" b="1" dirty="0" smtClean="0"/>
+              <a:t>Response</a:t>
+            </a:r>
+            <a:endParaRPr lang="en-IN" b="1" dirty="0"/>
+          </a:p>
+        </p:txBody>
+      </p:sp>
+    </p:spTree>
+    <p:extLst>
+      <p:ext uri="{BB962C8B-B14F-4D97-AF65-F5344CB8AC3E}">
+        <p14:creationId xmlns:p14="http://schemas.microsoft.com/office/powerpoint/2010/main" val="1110134989"/>
+      </p:ext>
+    </p:extLst>
+  </p:cSld>
+  <p:clrMapOvr>
+    <a:masterClrMapping/>
+  </p:clrMapOvr>
+  <p:timing>
+    <p:tnLst>
+      <p:par>
+        <p:cTn id="1" dur="indefinite" restart="never" nodeType="tmRoot"/>
+      </p:par>
+    </p:tnLst>
+  </p:timing>
+</p:sld>
+</file>
+
+<file path=ppt/slides/slide87.xml><?xml version="1.0" encoding="utf-8"?>
+<p:sld xmlns:a="http://schemas.openxmlformats.org/drawingml/2006/main" xmlns:r="http://schemas.openxmlformats.org/officeDocument/2006/relationships" xmlns:p="http://schemas.openxmlformats.org/presentationml/2006/main">
+  <p:cSld>
+    <p:spTree>
+      <p:nvGrpSpPr>
+        <p:cNvPr id="1" name=""/>
+        <p:cNvGrpSpPr/>
+        <p:nvPr/>
+      </p:nvGrpSpPr>
+      <p:grpSpPr>
+        <a:xfrm>
+          <a:off x="0" y="0"/>
+          <a:ext cx="0" cy="0"/>
+          <a:chOff x="0" y="0"/>
+          <a:chExt cx="0" cy="0"/>
+        </a:xfrm>
+      </p:grpSpPr>
+      <p:sp>
+        <p:nvSpPr>
+          <p:cNvPr id="4" name="Title 3"/>
+          <p:cNvSpPr>
+            <a:spLocks noGrp="1"/>
+          </p:cNvSpPr>
+          <p:nvPr>
+            <p:ph type="title"/>
+          </p:nvPr>
+        </p:nvSpPr>
+        <p:spPr/>
+        <p:txBody>
+          <a:bodyPr/>
+          <a:lstStyle/>
+          <a:p>
+            <a:r>
+              <a:rPr lang="en-IN" b="1" dirty="0" smtClean="0"/>
+              <a:t>19.2 </a:t>
+            </a:r>
+            <a:r>
+              <a:rPr lang="en-IN" b="1" dirty="0" smtClean="0"/>
+              <a:t>: </a:t>
+            </a:r>
+            <a:r>
+              <a:rPr lang="en-IN" b="1" dirty="0" smtClean="0"/>
+              <a:t>Observables</a:t>
+            </a:r>
+            <a:endParaRPr lang="en-IN" b="1" dirty="0"/>
+          </a:p>
+        </p:txBody>
+      </p:sp>
+      <p:sp>
+        <p:nvSpPr>
+          <p:cNvPr id="15" name="Slide Number Placeholder 14"/>
+          <p:cNvSpPr>
+            <a:spLocks noGrp="1"/>
+          </p:cNvSpPr>
+          <p:nvPr>
+            <p:ph type="sldNum" sz="quarter" idx="12"/>
+          </p:nvPr>
+        </p:nvSpPr>
+        <p:spPr/>
+        <p:txBody>
+          <a:bodyPr/>
+          <a:lstStyle/>
+          <a:p>
+            <a:fld id="{6D22F896-40B5-4ADD-8801-0D06FADFA095}" type="slidenum">
+              <a:rPr lang="en-US" smtClean="0"/>
+              <a:t>87</a:t>
+            </a:fld>
+            <a:endParaRPr lang="en-US" dirty="0"/>
+          </a:p>
+        </p:txBody>
+      </p:sp>
+      <p:pic>
+        <p:nvPicPr>
+          <p:cNvPr id="2" name="Picture 1"/>
+          <p:cNvPicPr>
+            <a:picLocks noChangeAspect="1"/>
+          </p:cNvPicPr>
+          <p:nvPr/>
+        </p:nvPicPr>
+        <p:blipFill rotWithShape="1">
+          <a:blip r:embed="rId2"/>
+          <a:srcRect l="7279" t="26459" r="4816" b="9196"/>
+          <a:stretch/>
+        </p:blipFill>
+        <p:spPr>
+          <a:xfrm>
+            <a:off x="887506" y="2366680"/>
+            <a:ext cx="10717306" cy="4410635"/>
+          </a:xfrm>
+          <a:prstGeom prst="rect">
+            <a:avLst/>
+          </a:prstGeom>
+        </p:spPr>
+      </p:pic>
+    </p:spTree>
+    <p:extLst>
+      <p:ext uri="{BB962C8B-B14F-4D97-AF65-F5344CB8AC3E}">
+        <p14:creationId xmlns:p14="http://schemas.microsoft.com/office/powerpoint/2010/main" val="837786773"/>
+      </p:ext>
+    </p:extLst>
+  </p:cSld>
+  <p:clrMapOvr>
+    <a:masterClrMapping/>
+  </p:clrMapOvr>
+  <p:timing>
+    <p:tnLst>
+      <p:par>
+        <p:cTn id="1" dur="indefinite" restart="never" nodeType="tmRoot"/>
+      </p:par>
+    </p:tnLst>
+  </p:timing>
+</p:sld>
+</file>
+
+<file path=ppt/slides/slide88.xml><?xml version="1.0" encoding="utf-8"?>
+<p:sld xmlns:a="http://schemas.openxmlformats.org/drawingml/2006/main" xmlns:r="http://schemas.openxmlformats.org/officeDocument/2006/relationships" xmlns:p="http://schemas.openxmlformats.org/presentationml/2006/main">
+  <p:cSld>
+    <p:spTree>
+      <p:nvGrpSpPr>
+        <p:cNvPr id="1" name=""/>
+        <p:cNvGrpSpPr/>
+        <p:nvPr/>
+      </p:nvGrpSpPr>
+      <p:grpSpPr>
+        <a:xfrm>
+          <a:off x="0" y="0"/>
+          <a:ext cx="0" cy="0"/>
+          <a:chOff x="0" y="0"/>
+          <a:chExt cx="0" cy="0"/>
+        </a:xfrm>
+      </p:grpSpPr>
+      <p:sp>
+        <p:nvSpPr>
+          <p:cNvPr id="4" name="Title 3"/>
+          <p:cNvSpPr>
+            <a:spLocks noGrp="1"/>
+          </p:cNvSpPr>
+          <p:nvPr>
+            <p:ph type="title"/>
+          </p:nvPr>
+        </p:nvSpPr>
+        <p:spPr/>
+        <p:txBody>
+          <a:bodyPr/>
+          <a:lstStyle/>
+          <a:p>
+            <a:r>
+              <a:rPr lang="en-IN" b="1" dirty="0" smtClean="0"/>
+              <a:t>19.2 </a:t>
+            </a:r>
+            <a:r>
+              <a:rPr lang="en-IN" b="1" dirty="0" smtClean="0"/>
+              <a:t>: </a:t>
+            </a:r>
+            <a:r>
+              <a:rPr lang="en-IN" b="1" dirty="0" smtClean="0"/>
+              <a:t>Observables Explanation</a:t>
+            </a:r>
+            <a:endParaRPr lang="en-IN" b="1" dirty="0"/>
+          </a:p>
+        </p:txBody>
+      </p:sp>
+      <p:sp>
+        <p:nvSpPr>
+          <p:cNvPr id="3" name="Text Placeholder 2"/>
+          <p:cNvSpPr>
+            <a:spLocks noGrp="1"/>
+          </p:cNvSpPr>
+          <p:nvPr>
+            <p:ph type="body" idx="1"/>
+          </p:nvPr>
+        </p:nvSpPr>
+        <p:spPr>
+          <a:xfrm>
+            <a:off x="648312" y="2321113"/>
+            <a:ext cx="5838440" cy="576262"/>
+          </a:xfrm>
+        </p:spPr>
+        <p:txBody>
+          <a:bodyPr/>
+          <a:lstStyle/>
+          <a:p>
+            <a:r>
+              <a:rPr lang="en-IN" dirty="0" smtClean="0"/>
+              <a:t>Newspaper </a:t>
+            </a:r>
+            <a:r>
+              <a:rPr lang="en-IN" dirty="0" err="1" smtClean="0"/>
+              <a:t>Eg</a:t>
+            </a:r>
+            <a:r>
+              <a:rPr lang="en-IN" dirty="0" smtClean="0"/>
+              <a:t>:</a:t>
+            </a:r>
+            <a:endParaRPr lang="en-IN" dirty="0"/>
+          </a:p>
+        </p:txBody>
+      </p:sp>
+      <p:sp>
+        <p:nvSpPr>
+          <p:cNvPr id="5" name="Content Placeholder 4"/>
+          <p:cNvSpPr>
+            <a:spLocks noGrp="1"/>
+          </p:cNvSpPr>
+          <p:nvPr>
+            <p:ph sz="half" idx="2"/>
+          </p:nvPr>
+        </p:nvSpPr>
+        <p:spPr>
+          <a:xfrm>
+            <a:off x="543542" y="2937716"/>
+            <a:ext cx="5559133" cy="3570660"/>
+          </a:xfrm>
+        </p:spPr>
+        <p:txBody>
+          <a:bodyPr/>
+          <a:lstStyle/>
+          <a:p>
+            <a:r>
+              <a:rPr lang="en-IN" dirty="0" smtClean="0"/>
+              <a:t>There is a source for all news which is a story</a:t>
+            </a:r>
+          </a:p>
+          <a:p>
+            <a:r>
+              <a:rPr lang="en-IN" dirty="0" smtClean="0"/>
+              <a:t>Newspaper company get that source and convert that in a format for viewers to read </a:t>
+            </a:r>
+          </a:p>
+          <a:p>
+            <a:r>
+              <a:rPr lang="en-IN" dirty="0" smtClean="0"/>
+              <a:t>They wont issue newspaper to all but only to those who subscribed for that newspaper</a:t>
+            </a:r>
+          </a:p>
+          <a:p>
+            <a:r>
+              <a:rPr lang="en-IN" dirty="0" smtClean="0"/>
+              <a:t>Once they issued the paper their responsibility got over and they don’t mind how the users using their paper</a:t>
+            </a:r>
+          </a:p>
+          <a:p>
+            <a:r>
+              <a:rPr lang="en-IN" dirty="0" smtClean="0"/>
+              <a:t>Its their own wish to use the newspaper either to read and to make kite</a:t>
+            </a:r>
+            <a:endParaRPr lang="en-IN" dirty="0"/>
+          </a:p>
+        </p:txBody>
+      </p:sp>
+      <p:sp>
+        <p:nvSpPr>
+          <p:cNvPr id="6" name="Text Placeholder 5"/>
+          <p:cNvSpPr>
+            <a:spLocks noGrp="1"/>
+          </p:cNvSpPr>
+          <p:nvPr>
+            <p:ph type="body" sz="quarter" idx="3"/>
+          </p:nvPr>
+        </p:nvSpPr>
+        <p:spPr>
+          <a:xfrm>
+            <a:off x="6102675" y="2321113"/>
+            <a:ext cx="5488669" cy="576262"/>
+          </a:xfrm>
+        </p:spPr>
+        <p:txBody>
+          <a:bodyPr/>
+          <a:lstStyle/>
+          <a:p>
+            <a:r>
+              <a:rPr lang="en-IN" dirty="0" smtClean="0"/>
+              <a:t>Angular </a:t>
+            </a:r>
+            <a:r>
+              <a:rPr lang="en-IN" dirty="0" err="1" smtClean="0"/>
+              <a:t>Eg</a:t>
+            </a:r>
+            <a:r>
+              <a:rPr lang="en-IN" smtClean="0"/>
+              <a:t>:</a:t>
+            </a:r>
+            <a:endParaRPr lang="en-IN" dirty="0"/>
+          </a:p>
+        </p:txBody>
+      </p:sp>
+      <p:sp>
+        <p:nvSpPr>
+          <p:cNvPr id="7" name="Content Placeholder 6"/>
+          <p:cNvSpPr>
+            <a:spLocks noGrp="1"/>
+          </p:cNvSpPr>
+          <p:nvPr>
+            <p:ph sz="quarter" idx="4"/>
+          </p:nvPr>
+        </p:nvSpPr>
+        <p:spPr>
+          <a:xfrm>
+            <a:off x="6102675" y="2937716"/>
+            <a:ext cx="5488669" cy="3691684"/>
+          </a:xfrm>
+        </p:spPr>
+        <p:txBody>
+          <a:bodyPr>
+            <a:normAutofit/>
+          </a:bodyPr>
+          <a:lstStyle/>
+          <a:p>
+            <a:r>
+              <a:rPr lang="en-IN" dirty="0" smtClean="0"/>
+              <a:t>DB have data and that will be send to service through observables. It’s a single line </a:t>
+            </a:r>
+            <a:r>
+              <a:rPr lang="en-IN" dirty="0" err="1" smtClean="0"/>
+              <a:t>async</a:t>
+            </a:r>
+            <a:r>
+              <a:rPr lang="en-IN" dirty="0" smtClean="0"/>
+              <a:t> data</a:t>
+            </a:r>
+          </a:p>
+          <a:p>
+            <a:r>
+              <a:rPr lang="en-IN" dirty="0" smtClean="0"/>
+              <a:t>Service will format the data how the user want</a:t>
+            </a:r>
+          </a:p>
+          <a:p>
+            <a:r>
+              <a:rPr lang="en-IN" dirty="0" smtClean="0"/>
+              <a:t>Service will send the data o the component who are all subscribed to that request</a:t>
+            </a:r>
+          </a:p>
+          <a:p>
+            <a:r>
+              <a:rPr lang="en-IN" dirty="0" smtClean="0"/>
+              <a:t>Once the component got their data they can use how they want. Employee list use only name and employee detail use all data no issues in that</a:t>
+            </a:r>
+          </a:p>
+          <a:p>
+            <a:endParaRPr lang="en-IN" dirty="0"/>
+          </a:p>
+        </p:txBody>
+      </p:sp>
+      <p:sp>
+        <p:nvSpPr>
+          <p:cNvPr id="15" name="Slide Number Placeholder 14"/>
+          <p:cNvSpPr>
+            <a:spLocks noGrp="1"/>
+          </p:cNvSpPr>
+          <p:nvPr>
+            <p:ph type="sldNum" sz="quarter" idx="12"/>
+          </p:nvPr>
+        </p:nvSpPr>
+        <p:spPr/>
+        <p:txBody>
+          <a:bodyPr/>
+          <a:lstStyle/>
+          <a:p>
+            <a:fld id="{6D22F896-40B5-4ADD-8801-0D06FADFA095}" type="slidenum">
+              <a:rPr lang="en-US" smtClean="0"/>
+              <a:t>88</a:t>
+            </a:fld>
+            <a:endParaRPr lang="en-US" dirty="0"/>
+          </a:p>
+        </p:txBody>
+      </p:sp>
+    </p:spTree>
+    <p:extLst>
+      <p:ext uri="{BB962C8B-B14F-4D97-AF65-F5344CB8AC3E}">
+        <p14:creationId xmlns:p14="http://schemas.microsoft.com/office/powerpoint/2010/main" val="1718682123"/>
+      </p:ext>
+    </p:extLst>
+  </p:cSld>
+  <p:clrMapOvr>
+    <a:masterClrMapping/>
+  </p:clrMapOvr>
+  <p:timing>
+    <p:tnLst>
+      <p:par>
+        <p:cTn id="1" dur="indefinite" restart="never" nodeType="tmRoot"/>
+      </p:par>
+    </p:tnLst>
+  </p:timing>
+</p:sld>
+</file>
+
+<file path=ppt/slides/slide89.xml><?xml version="1.0" encoding="utf-8"?>
+<p:sld xmlns:a="http://schemas.openxmlformats.org/drawingml/2006/main" xmlns:r="http://schemas.openxmlformats.org/officeDocument/2006/relationships" xmlns:p="http://schemas.openxmlformats.org/presentationml/2006/main">
+  <p:cSld>
+    <p:spTree>
+      <p:nvGrpSpPr>
+        <p:cNvPr id="1" name=""/>
+        <p:cNvGrpSpPr/>
+        <p:nvPr/>
+      </p:nvGrpSpPr>
+      <p:grpSpPr>
+        <a:xfrm>
+          <a:off x="0" y="0"/>
+          <a:ext cx="0" cy="0"/>
+          <a:chOff x="0" y="0"/>
+          <a:chExt cx="0" cy="0"/>
+        </a:xfrm>
+      </p:grpSpPr>
+      <p:sp>
+        <p:nvSpPr>
+          <p:cNvPr id="4" name="Title 3"/>
+          <p:cNvSpPr>
+            <a:spLocks noGrp="1"/>
+          </p:cNvSpPr>
+          <p:nvPr>
+            <p:ph type="title"/>
+          </p:nvPr>
+        </p:nvSpPr>
+        <p:spPr/>
+        <p:txBody>
+          <a:bodyPr/>
+          <a:lstStyle/>
+          <a:p>
+            <a:r>
+              <a:rPr lang="en-IN" b="1" dirty="0" smtClean="0"/>
+              <a:t>19.3 </a:t>
+            </a:r>
+            <a:r>
+              <a:rPr lang="en-IN" b="1" dirty="0" smtClean="0"/>
+              <a:t>: </a:t>
+            </a:r>
+            <a:r>
+              <a:rPr lang="en-IN" b="1" dirty="0" smtClean="0"/>
+              <a:t>HTTP, Observables and </a:t>
+            </a:r>
+            <a:r>
+              <a:rPr lang="en-IN" b="1" dirty="0" err="1" smtClean="0"/>
+              <a:t>RxJS</a:t>
+            </a:r>
+            <a:endParaRPr lang="en-IN" b="1" dirty="0"/>
+          </a:p>
+        </p:txBody>
+      </p:sp>
+      <p:sp>
+        <p:nvSpPr>
+          <p:cNvPr id="5" name="Content Placeholder 4"/>
+          <p:cNvSpPr>
+            <a:spLocks noGrp="1"/>
+          </p:cNvSpPr>
+          <p:nvPr>
+            <p:ph idx="1"/>
+          </p:nvPr>
+        </p:nvSpPr>
+        <p:spPr>
+          <a:xfrm>
+            <a:off x="1154954" y="2603500"/>
+            <a:ext cx="8825659" cy="3582148"/>
+          </a:xfrm>
+        </p:spPr>
+        <p:txBody>
+          <a:bodyPr>
+            <a:normAutofit/>
+          </a:bodyPr>
+          <a:lstStyle/>
+          <a:p>
+            <a:r>
+              <a:rPr lang="en-IN" dirty="0" smtClean="0"/>
+              <a:t>HTTP get request from </a:t>
+            </a:r>
+            <a:r>
+              <a:rPr lang="en-IN" dirty="0" err="1" smtClean="0"/>
+              <a:t>EmpService</a:t>
+            </a:r>
+            <a:endParaRPr lang="en-IN" dirty="0" smtClean="0"/>
+          </a:p>
+          <a:p>
+            <a:r>
+              <a:rPr lang="en-IN" dirty="0" smtClean="0"/>
+              <a:t>Receive the observable and cast it to an employee array</a:t>
+            </a:r>
+          </a:p>
+          <a:p>
+            <a:r>
+              <a:rPr lang="en-IN" dirty="0" smtClean="0"/>
+              <a:t>Subscribe to the observable from </a:t>
+            </a:r>
+            <a:r>
+              <a:rPr lang="en-IN" dirty="0" err="1" smtClean="0"/>
+              <a:t>EmpList</a:t>
+            </a:r>
+            <a:r>
+              <a:rPr lang="en-IN" dirty="0" smtClean="0"/>
+              <a:t> and </a:t>
+            </a:r>
+            <a:r>
+              <a:rPr lang="en-IN" dirty="0" err="1" smtClean="0"/>
+              <a:t>EmpDetail</a:t>
+            </a:r>
+            <a:endParaRPr lang="en-IN" dirty="0" smtClean="0"/>
+          </a:p>
+          <a:p>
+            <a:r>
+              <a:rPr lang="en-IN" dirty="0" smtClean="0"/>
+              <a:t>Assign the employee array to the local variable</a:t>
+            </a:r>
+          </a:p>
+          <a:p>
+            <a:endParaRPr lang="en-IN" dirty="0"/>
+          </a:p>
+          <a:p>
+            <a:pPr marL="0" indent="0">
+              <a:buNone/>
+            </a:pPr>
+            <a:r>
+              <a:rPr lang="en-IN" dirty="0" err="1" smtClean="0"/>
+              <a:t>RxJS</a:t>
+            </a:r>
+            <a:endParaRPr lang="en-IN" dirty="0" smtClean="0"/>
+          </a:p>
+          <a:p>
+            <a:pPr>
+              <a:buFontTx/>
+              <a:buChar char="-"/>
+            </a:pPr>
+            <a:r>
+              <a:rPr lang="en-IN" dirty="0" smtClean="0"/>
+              <a:t>Reactive extension of </a:t>
+            </a:r>
+            <a:r>
+              <a:rPr lang="en-IN" dirty="0" err="1" smtClean="0"/>
+              <a:t>Javascript</a:t>
+            </a:r>
+            <a:endParaRPr lang="en-IN" dirty="0" smtClean="0"/>
+          </a:p>
+          <a:p>
+            <a:pPr>
+              <a:buFontTx/>
+              <a:buChar char="-"/>
+            </a:pPr>
+            <a:r>
+              <a:rPr lang="en-IN" dirty="0" smtClean="0"/>
+              <a:t>External library to work with Observable</a:t>
+            </a:r>
+          </a:p>
+          <a:p>
+            <a:pPr marL="0" indent="0" defTabSz="363538">
+              <a:buNone/>
+            </a:pPr>
+            <a:r>
+              <a:rPr lang="en-IN" dirty="0" smtClean="0"/>
+              <a:t>	</a:t>
+            </a:r>
+            <a:r>
+              <a:rPr lang="en-IN" b="1" dirty="0" err="1" smtClean="0">
+                <a:solidFill>
+                  <a:schemeClr val="accent1">
+                    <a:lumMod val="75000"/>
+                  </a:schemeClr>
+                </a:solidFill>
+              </a:rPr>
+              <a:t>npm</a:t>
+            </a:r>
+            <a:r>
+              <a:rPr lang="en-IN" b="1" dirty="0" smtClean="0">
+                <a:solidFill>
+                  <a:schemeClr val="accent1">
+                    <a:lumMod val="75000"/>
+                  </a:schemeClr>
+                </a:solidFill>
+              </a:rPr>
+              <a:t> </a:t>
+            </a:r>
+            <a:r>
+              <a:rPr lang="en-IN" b="1" dirty="0">
+                <a:solidFill>
+                  <a:schemeClr val="accent1">
+                    <a:lumMod val="75000"/>
+                  </a:schemeClr>
+                </a:solidFill>
+              </a:rPr>
+              <a:t>install --save </a:t>
+            </a:r>
+            <a:r>
+              <a:rPr lang="en-IN" b="1" dirty="0" err="1" smtClean="0">
+                <a:solidFill>
+                  <a:schemeClr val="accent1">
+                    <a:lumMod val="75000"/>
+                  </a:schemeClr>
+                </a:solidFill>
+              </a:rPr>
+              <a:t>rxjs-compat</a:t>
+            </a:r>
+            <a:endParaRPr lang="en-IN" b="1" dirty="0" smtClean="0">
+              <a:solidFill>
+                <a:schemeClr val="accent1">
+                  <a:lumMod val="75000"/>
+                </a:schemeClr>
+              </a:solidFill>
+            </a:endParaRPr>
+          </a:p>
+        </p:txBody>
+      </p:sp>
+      <p:sp>
+        <p:nvSpPr>
+          <p:cNvPr id="15" name="Slide Number Placeholder 14"/>
+          <p:cNvSpPr>
+            <a:spLocks noGrp="1"/>
+          </p:cNvSpPr>
+          <p:nvPr>
+            <p:ph type="sldNum" sz="quarter" idx="12"/>
+          </p:nvPr>
+        </p:nvSpPr>
+        <p:spPr/>
+        <p:txBody>
+          <a:bodyPr/>
+          <a:lstStyle/>
+          <a:p>
+            <a:fld id="{6D22F896-40B5-4ADD-8801-0D06FADFA095}" type="slidenum">
+              <a:rPr lang="en-US" smtClean="0"/>
+              <a:t>89</a:t>
+            </a:fld>
+            <a:endParaRPr lang="en-US" dirty="0"/>
+          </a:p>
+        </p:txBody>
+      </p:sp>
+      <p:sp>
+        <p:nvSpPr>
+          <p:cNvPr id="10" name="TextBox 9"/>
+          <p:cNvSpPr txBox="1"/>
+          <p:nvPr/>
+        </p:nvSpPr>
+        <p:spPr>
+          <a:xfrm>
+            <a:off x="8214619" y="6360460"/>
+            <a:ext cx="3403496" cy="369332"/>
+          </a:xfrm>
+          <a:prstGeom prst="rect">
+            <a:avLst/>
+          </a:prstGeom>
+          <a:noFill/>
+        </p:spPr>
+        <p:txBody>
+          <a:bodyPr wrap="none" rtlCol="0">
+            <a:spAutoFit/>
+          </a:bodyPr>
+          <a:lstStyle/>
+          <a:p>
+            <a:r>
+              <a:rPr lang="en-IN" dirty="0"/>
+              <a:t>See Example </a:t>
+            </a:r>
+            <a:r>
+              <a:rPr lang="en-IN" dirty="0" smtClean="0"/>
+              <a:t>in next page….</a:t>
+            </a:r>
+            <a:endParaRPr lang="en-IN" dirty="0"/>
+          </a:p>
+        </p:txBody>
+      </p:sp>
+    </p:spTree>
+    <p:extLst>
+      <p:ext uri="{BB962C8B-B14F-4D97-AF65-F5344CB8AC3E}">
+        <p14:creationId xmlns:p14="http://schemas.microsoft.com/office/powerpoint/2010/main" val="971350199"/>
+      </p:ext>
+    </p:extLst>
+  </p:cSld>
+  <p:clrMapOvr>
+    <a:masterClrMapping/>
+  </p:clrMapOvr>
+  <p:timing>
+    <p:tnLst>
+      <p:par>
+        <p:cTn id="1" dur="indefinite" restart="never" nodeType="tmRoot"/>
+      </p:par>
+    </p:tnLst>
+  </p:timing>
+</p:sld>
+</file>
+
 <file path=ppt/slides/slide9.xml><?xml version="1.0" encoding="utf-8"?>
 <p:sld xmlns:a="http://schemas.openxmlformats.org/drawingml/2006/main" xmlns:r="http://schemas.openxmlformats.org/officeDocument/2006/relationships" xmlns:p="http://schemas.openxmlformats.org/presentationml/2006/main">
   <p:cSld>
@@ -45080,6 +46792,558 @@
     <p:extLst>
       <p:ext uri="{BB962C8B-B14F-4D97-AF65-F5344CB8AC3E}">
         <p14:creationId xmlns:p14="http://schemas.microsoft.com/office/powerpoint/2010/main" val="4028900169"/>
+      </p:ext>
+    </p:extLst>
+  </p:cSld>
+  <p:clrMapOvr>
+    <a:masterClrMapping/>
+  </p:clrMapOvr>
+  <p:timing>
+    <p:tnLst>
+      <p:par>
+        <p:cTn id="1" dur="indefinite" restart="never" nodeType="tmRoot"/>
+      </p:par>
+    </p:tnLst>
+  </p:timing>
+</p:sld>
+</file>
+
+<file path=ppt/slides/slide90.xml><?xml version="1.0" encoding="utf-8"?>
+<p:sld xmlns:a="http://schemas.openxmlformats.org/drawingml/2006/main" xmlns:r="http://schemas.openxmlformats.org/officeDocument/2006/relationships" xmlns:p="http://schemas.openxmlformats.org/presentationml/2006/main">
+  <p:cSld>
+    <p:spTree>
+      <p:nvGrpSpPr>
+        <p:cNvPr id="1" name=""/>
+        <p:cNvGrpSpPr/>
+        <p:nvPr/>
+      </p:nvGrpSpPr>
+      <p:grpSpPr>
+        <a:xfrm>
+          <a:off x="0" y="0"/>
+          <a:ext cx="0" cy="0"/>
+          <a:chOff x="0" y="0"/>
+          <a:chExt cx="0" cy="0"/>
+        </a:xfrm>
+      </p:grpSpPr>
+      <p:sp>
+        <p:nvSpPr>
+          <p:cNvPr id="4" name="Date Placeholder 3"/>
+          <p:cNvSpPr>
+            <a:spLocks noGrp="1"/>
+          </p:cNvSpPr>
+          <p:nvPr>
+            <p:ph type="dt" sz="half" idx="10"/>
+          </p:nvPr>
+        </p:nvSpPr>
+        <p:spPr/>
+        <p:txBody>
+          <a:bodyPr/>
+          <a:lstStyle/>
+          <a:p>
+            <a:r>
+              <a:rPr lang="en-US" smtClean="0"/>
+              <a:t>5/6/2019</a:t>
+            </a:r>
+            <a:endParaRPr lang="en-US" dirty="0"/>
+          </a:p>
+        </p:txBody>
+      </p:sp>
+      <p:sp>
+        <p:nvSpPr>
+          <p:cNvPr id="5" name="Slide Number Placeholder 4"/>
+          <p:cNvSpPr>
+            <a:spLocks noGrp="1"/>
+          </p:cNvSpPr>
+          <p:nvPr>
+            <p:ph type="sldNum" sz="quarter" idx="12"/>
+          </p:nvPr>
+        </p:nvSpPr>
+        <p:spPr/>
+        <p:txBody>
+          <a:bodyPr/>
+          <a:lstStyle/>
+          <a:p>
+            <a:fld id="{6D22F896-40B5-4ADD-8801-0D06FADFA095}" type="slidenum">
+              <a:rPr lang="en-US" smtClean="0"/>
+              <a:t>90</a:t>
+            </a:fld>
+            <a:endParaRPr lang="en-US" dirty="0"/>
+          </a:p>
+        </p:txBody>
+      </p:sp>
+      <p:pic>
+        <p:nvPicPr>
+          <p:cNvPr id="6" name="Picture 5"/>
+          <p:cNvPicPr>
+            <a:picLocks noChangeAspect="1"/>
+          </p:cNvPicPr>
+          <p:nvPr/>
+        </p:nvPicPr>
+        <p:blipFill>
+          <a:blip r:embed="rId2"/>
+          <a:stretch>
+            <a:fillRect/>
+          </a:stretch>
+        </p:blipFill>
+        <p:spPr>
+          <a:xfrm>
+            <a:off x="0" y="1"/>
+            <a:ext cx="6817659" cy="3292714"/>
+          </a:xfrm>
+          <a:prstGeom prst="rect">
+            <a:avLst/>
+          </a:prstGeom>
+          <a:ln>
+            <a:solidFill>
+              <a:schemeClr val="bg1"/>
+            </a:solidFill>
+          </a:ln>
+        </p:spPr>
+      </p:pic>
+      <p:pic>
+        <p:nvPicPr>
+          <p:cNvPr id="7" name="Picture 6"/>
+          <p:cNvPicPr>
+            <a:picLocks noChangeAspect="1"/>
+          </p:cNvPicPr>
+          <p:nvPr/>
+        </p:nvPicPr>
+        <p:blipFill>
+          <a:blip r:embed="rId3"/>
+          <a:stretch>
+            <a:fillRect/>
+          </a:stretch>
+        </p:blipFill>
+        <p:spPr>
+          <a:xfrm>
+            <a:off x="6817660" y="1"/>
+            <a:ext cx="4545106" cy="3282982"/>
+          </a:xfrm>
+          <a:prstGeom prst="rect">
+            <a:avLst/>
+          </a:prstGeom>
+          <a:ln>
+            <a:solidFill>
+              <a:schemeClr val="bg1"/>
+            </a:solidFill>
+          </a:ln>
+        </p:spPr>
+      </p:pic>
+      <p:pic>
+        <p:nvPicPr>
+          <p:cNvPr id="8" name="Picture 7"/>
+          <p:cNvPicPr>
+            <a:picLocks noChangeAspect="1"/>
+          </p:cNvPicPr>
+          <p:nvPr/>
+        </p:nvPicPr>
+        <p:blipFill>
+          <a:blip r:embed="rId4"/>
+          <a:stretch>
+            <a:fillRect/>
+          </a:stretch>
+        </p:blipFill>
+        <p:spPr>
+          <a:xfrm>
+            <a:off x="-1" y="3292715"/>
+            <a:ext cx="4410635" cy="3609304"/>
+          </a:xfrm>
+          <a:prstGeom prst="rect">
+            <a:avLst/>
+          </a:prstGeom>
+          <a:ln>
+            <a:solidFill>
+              <a:schemeClr val="bg1"/>
+            </a:solidFill>
+          </a:ln>
+        </p:spPr>
+      </p:pic>
+      <p:pic>
+        <p:nvPicPr>
+          <p:cNvPr id="9" name="Picture 8"/>
+          <p:cNvPicPr>
+            <a:picLocks noChangeAspect="1"/>
+          </p:cNvPicPr>
+          <p:nvPr/>
+        </p:nvPicPr>
+        <p:blipFill>
+          <a:blip r:embed="rId5"/>
+          <a:stretch>
+            <a:fillRect/>
+          </a:stretch>
+        </p:blipFill>
+        <p:spPr>
+          <a:xfrm>
+            <a:off x="4410634" y="3292715"/>
+            <a:ext cx="4262719" cy="3597659"/>
+          </a:xfrm>
+          <a:prstGeom prst="rect">
+            <a:avLst/>
+          </a:prstGeom>
+          <a:ln>
+            <a:solidFill>
+              <a:schemeClr val="bg1"/>
+            </a:solidFill>
+          </a:ln>
+        </p:spPr>
+      </p:pic>
+      <p:pic>
+        <p:nvPicPr>
+          <p:cNvPr id="10" name="Picture 9"/>
+          <p:cNvPicPr>
+            <a:picLocks noChangeAspect="1"/>
+          </p:cNvPicPr>
+          <p:nvPr/>
+        </p:nvPicPr>
+        <p:blipFill>
+          <a:blip r:embed="rId6"/>
+          <a:stretch>
+            <a:fillRect/>
+          </a:stretch>
+        </p:blipFill>
+        <p:spPr>
+          <a:xfrm>
+            <a:off x="8727139" y="3323312"/>
+            <a:ext cx="2066541" cy="3373325"/>
+          </a:xfrm>
+          <a:prstGeom prst="rect">
+            <a:avLst/>
+          </a:prstGeom>
+          <a:ln>
+            <a:solidFill>
+              <a:schemeClr val="bg1">
+                <a:lumMod val="50000"/>
+              </a:schemeClr>
+            </a:solidFill>
+          </a:ln>
+        </p:spPr>
+      </p:pic>
+      <p:sp>
+        <p:nvSpPr>
+          <p:cNvPr id="11" name="Rectangle 10"/>
+          <p:cNvSpPr/>
+          <p:nvPr/>
+        </p:nvSpPr>
+        <p:spPr>
+          <a:xfrm>
+            <a:off x="2355" y="17274"/>
+            <a:ext cx="989242" cy="251561"/>
+          </a:xfrm>
+          <a:prstGeom prst="rect">
+            <a:avLst/>
+          </a:prstGeom>
+          <a:noFill/>
+          <a:ln w="28575">
+            <a:solidFill>
+              <a:srgbClr val="FFFF00"/>
+            </a:solidFill>
+          </a:ln>
+        </p:spPr>
+        <p:style>
+          <a:lnRef idx="2">
+            <a:schemeClr val="accent1">
+              <a:shade val="50000"/>
+            </a:schemeClr>
+          </a:lnRef>
+          <a:fillRef idx="1">
+            <a:schemeClr val="accent1"/>
+          </a:fillRef>
+          <a:effectRef idx="0">
+            <a:schemeClr val="accent1"/>
+          </a:effectRef>
+          <a:fontRef idx="minor">
+            <a:schemeClr val="lt1"/>
+          </a:fontRef>
+        </p:style>
+        <p:txBody>
+          <a:bodyPr rtlCol="0" anchor="ctr"/>
+          <a:lstStyle/>
+          <a:p>
+            <a:pPr algn="ctr"/>
+            <a:endParaRPr lang="en-IN"/>
+          </a:p>
+        </p:txBody>
+      </p:sp>
+      <p:sp>
+        <p:nvSpPr>
+          <p:cNvPr id="12" name="Rectangle 11"/>
+          <p:cNvSpPr/>
+          <p:nvPr/>
+        </p:nvSpPr>
+        <p:spPr>
+          <a:xfrm>
+            <a:off x="6860355" y="30615"/>
+            <a:ext cx="989242" cy="251561"/>
+          </a:xfrm>
+          <a:prstGeom prst="rect">
+            <a:avLst/>
+          </a:prstGeom>
+          <a:noFill/>
+          <a:ln w="28575">
+            <a:solidFill>
+              <a:srgbClr val="FFFF00"/>
+            </a:solidFill>
+          </a:ln>
+        </p:spPr>
+        <p:style>
+          <a:lnRef idx="2">
+            <a:schemeClr val="accent1">
+              <a:shade val="50000"/>
+            </a:schemeClr>
+          </a:lnRef>
+          <a:fillRef idx="1">
+            <a:schemeClr val="accent1"/>
+          </a:fillRef>
+          <a:effectRef idx="0">
+            <a:schemeClr val="accent1"/>
+          </a:effectRef>
+          <a:fontRef idx="minor">
+            <a:schemeClr val="lt1"/>
+          </a:fontRef>
+        </p:style>
+        <p:txBody>
+          <a:bodyPr rtlCol="0" anchor="ctr"/>
+          <a:lstStyle/>
+          <a:p>
+            <a:pPr algn="ctr"/>
+            <a:endParaRPr lang="en-IN"/>
+          </a:p>
+        </p:txBody>
+      </p:sp>
+      <p:sp>
+        <p:nvSpPr>
+          <p:cNvPr id="13" name="Rectangle 12"/>
+          <p:cNvSpPr/>
+          <p:nvPr/>
+        </p:nvSpPr>
+        <p:spPr>
+          <a:xfrm>
+            <a:off x="42696" y="3292715"/>
+            <a:ext cx="989242" cy="251561"/>
+          </a:xfrm>
+          <a:prstGeom prst="rect">
+            <a:avLst/>
+          </a:prstGeom>
+          <a:noFill/>
+          <a:ln w="28575">
+            <a:solidFill>
+              <a:srgbClr val="FFFF00"/>
+            </a:solidFill>
+          </a:ln>
+        </p:spPr>
+        <p:style>
+          <a:lnRef idx="2">
+            <a:schemeClr val="accent1">
+              <a:shade val="50000"/>
+            </a:schemeClr>
+          </a:lnRef>
+          <a:fillRef idx="1">
+            <a:schemeClr val="accent1"/>
+          </a:fillRef>
+          <a:effectRef idx="0">
+            <a:schemeClr val="accent1"/>
+          </a:effectRef>
+          <a:fontRef idx="minor">
+            <a:schemeClr val="lt1"/>
+          </a:fontRef>
+        </p:style>
+        <p:txBody>
+          <a:bodyPr rtlCol="0" anchor="ctr"/>
+          <a:lstStyle/>
+          <a:p>
+            <a:pPr algn="ctr"/>
+            <a:endParaRPr lang="en-IN"/>
+          </a:p>
+        </p:txBody>
+      </p:sp>
+      <p:sp>
+        <p:nvSpPr>
+          <p:cNvPr id="14" name="Rectangle 13"/>
+          <p:cNvSpPr/>
+          <p:nvPr/>
+        </p:nvSpPr>
+        <p:spPr>
+          <a:xfrm>
+            <a:off x="7218352" y="3321210"/>
+            <a:ext cx="1088166" cy="228692"/>
+          </a:xfrm>
+          <a:prstGeom prst="rect">
+            <a:avLst/>
+          </a:prstGeom>
+          <a:noFill/>
+          <a:ln w="28575">
+            <a:solidFill>
+              <a:srgbClr val="FFFF00"/>
+            </a:solidFill>
+          </a:ln>
+        </p:spPr>
+        <p:style>
+          <a:lnRef idx="2">
+            <a:schemeClr val="accent1">
+              <a:shade val="50000"/>
+            </a:schemeClr>
+          </a:lnRef>
+          <a:fillRef idx="1">
+            <a:schemeClr val="accent1"/>
+          </a:fillRef>
+          <a:effectRef idx="0">
+            <a:schemeClr val="accent1"/>
+          </a:effectRef>
+          <a:fontRef idx="minor">
+            <a:schemeClr val="lt1"/>
+          </a:fontRef>
+        </p:style>
+        <p:txBody>
+          <a:bodyPr rtlCol="0" anchor="ctr"/>
+          <a:lstStyle/>
+          <a:p>
+            <a:pPr algn="ctr"/>
+            <a:endParaRPr lang="en-IN"/>
+          </a:p>
+        </p:txBody>
+      </p:sp>
+      <p:sp>
+        <p:nvSpPr>
+          <p:cNvPr id="15" name="Rectangle 14"/>
+          <p:cNvSpPr/>
+          <p:nvPr/>
+        </p:nvSpPr>
+        <p:spPr>
+          <a:xfrm>
+            <a:off x="529807" y="450880"/>
+            <a:ext cx="4822122" cy="234920"/>
+          </a:xfrm>
+          <a:prstGeom prst="rect">
+            <a:avLst/>
+          </a:prstGeom>
+          <a:noFill/>
+          <a:ln w="28575">
+            <a:solidFill>
+              <a:schemeClr val="bg1"/>
+            </a:solidFill>
+          </a:ln>
+        </p:spPr>
+        <p:style>
+          <a:lnRef idx="2">
+            <a:schemeClr val="accent1">
+              <a:shade val="50000"/>
+            </a:schemeClr>
+          </a:lnRef>
+          <a:fillRef idx="1">
+            <a:schemeClr val="accent1"/>
+          </a:fillRef>
+          <a:effectRef idx="0">
+            <a:schemeClr val="accent1"/>
+          </a:effectRef>
+          <a:fontRef idx="minor">
+            <a:schemeClr val="lt1"/>
+          </a:fontRef>
+        </p:style>
+        <p:txBody>
+          <a:bodyPr rtlCol="0" anchor="ctr"/>
+          <a:lstStyle/>
+          <a:p>
+            <a:pPr algn="ctr"/>
+            <a:endParaRPr lang="en-IN"/>
+          </a:p>
+        </p:txBody>
+      </p:sp>
+      <p:sp>
+        <p:nvSpPr>
+          <p:cNvPr id="16" name="Rectangle 15"/>
+          <p:cNvSpPr/>
+          <p:nvPr/>
+        </p:nvSpPr>
+        <p:spPr>
+          <a:xfrm>
+            <a:off x="7347466" y="444651"/>
+            <a:ext cx="3843273" cy="375619"/>
+          </a:xfrm>
+          <a:prstGeom prst="rect">
+            <a:avLst/>
+          </a:prstGeom>
+          <a:noFill/>
+          <a:ln w="28575">
+            <a:solidFill>
+              <a:schemeClr val="bg1"/>
+            </a:solidFill>
+          </a:ln>
+        </p:spPr>
+        <p:style>
+          <a:lnRef idx="2">
+            <a:schemeClr val="accent1">
+              <a:shade val="50000"/>
+            </a:schemeClr>
+          </a:lnRef>
+          <a:fillRef idx="1">
+            <a:schemeClr val="accent1"/>
+          </a:fillRef>
+          <a:effectRef idx="0">
+            <a:schemeClr val="accent1"/>
+          </a:effectRef>
+          <a:fontRef idx="minor">
+            <a:schemeClr val="lt1"/>
+          </a:fontRef>
+        </p:style>
+        <p:txBody>
+          <a:bodyPr rtlCol="0" anchor="ctr"/>
+          <a:lstStyle/>
+          <a:p>
+            <a:pPr algn="ctr"/>
+            <a:endParaRPr lang="en-IN"/>
+          </a:p>
+        </p:txBody>
+      </p:sp>
+      <p:sp>
+        <p:nvSpPr>
+          <p:cNvPr id="17" name="Rectangle 16"/>
+          <p:cNvSpPr/>
+          <p:nvPr/>
+        </p:nvSpPr>
+        <p:spPr>
+          <a:xfrm>
+            <a:off x="886194" y="2039185"/>
+            <a:ext cx="1536477" cy="234920"/>
+          </a:xfrm>
+          <a:prstGeom prst="rect">
+            <a:avLst/>
+          </a:prstGeom>
+          <a:noFill/>
+          <a:ln w="28575">
+            <a:solidFill>
+              <a:schemeClr val="bg1"/>
+            </a:solidFill>
+          </a:ln>
+        </p:spPr>
+        <p:style>
+          <a:lnRef idx="2">
+            <a:schemeClr val="accent1">
+              <a:shade val="50000"/>
+            </a:schemeClr>
+          </a:lnRef>
+          <a:fillRef idx="1">
+            <a:schemeClr val="accent1"/>
+          </a:fillRef>
+          <a:effectRef idx="0">
+            <a:schemeClr val="accent1"/>
+          </a:effectRef>
+          <a:fontRef idx="minor">
+            <a:schemeClr val="lt1"/>
+          </a:fontRef>
+        </p:style>
+        <p:txBody>
+          <a:bodyPr rtlCol="0" anchor="ctr"/>
+          <a:lstStyle/>
+          <a:p>
+            <a:pPr algn="ctr"/>
+            <a:endParaRPr lang="en-IN"/>
+          </a:p>
+        </p:txBody>
+      </p:sp>
+    </p:spTree>
+    <p:extLst>
+      <p:ext uri="{BB962C8B-B14F-4D97-AF65-F5344CB8AC3E}">
+        <p14:creationId xmlns:p14="http://schemas.microsoft.com/office/powerpoint/2010/main" val="2425502039"/>
       </p:ext>
     </p:extLst>
   </p:cSld>

</xml_diff>

<commit_message>
Added Routing and Navigation
</commit_message>
<xml_diff>
--- a/Angular Presentation.pptx
+++ b/Angular Presentation.pptx
@@ -5,7 +5,7 @@
     <p:sldMasterId id="2147483723" r:id="rId1"/>
   </p:sldMasterIdLst>
   <p:notesMasterIdLst>
-    <p:notesMasterId r:id="rId97"/>
+    <p:notesMasterId r:id="rId98"/>
   </p:notesMasterIdLst>
   <p:sldIdLst>
     <p:sldId id="256" r:id="rId2"/>
@@ -101,8 +101,9 @@
     <p:sldId id="373" r:id="rId92"/>
     <p:sldId id="372" r:id="rId93"/>
     <p:sldId id="374" r:id="rId94"/>
-    <p:sldId id="375" r:id="rId95"/>
-    <p:sldId id="376" r:id="rId96"/>
+    <p:sldId id="376" r:id="rId95"/>
+    <p:sldId id="377" r:id="rId96"/>
+    <p:sldId id="378" r:id="rId97"/>
   </p:sldIdLst>
   <p:sldSz cx="12192000" cy="6858000"/>
   <p:notesSz cx="6858000" cy="9144000"/>
@@ -47753,7 +47754,7 @@
       </p:grpSpPr>
       <p:sp>
         <p:nvSpPr>
-          <p:cNvPr id="3" name="Title 2"/>
+          <p:cNvPr id="6" name="Title 5"/>
           <p:cNvSpPr>
             <a:spLocks noGrp="1"/>
           </p:cNvSpPr>
@@ -47767,8 +47768,12 @@
           <a:lstStyle/>
           <a:p>
             <a:r>
+              <a:rPr lang="en-IN" b="1" smtClean="0"/>
+              <a:t>22. </a:t>
+            </a:r>
+            <a:r>
               <a:rPr lang="en-IN" b="1" dirty="0" smtClean="0"/>
-              <a:t>22. Routing &amp; Navigation</a:t>
+              <a:t>Routing &amp; Navigation</a:t>
             </a:r>
             <a:endParaRPr lang="en-IN" b="1" dirty="0"/>
           </a:p>
@@ -47776,12 +47781,12 @@
       </p:sp>
       <p:sp>
         <p:nvSpPr>
-          <p:cNvPr id="7" name="Text Placeholder 6"/>
+          <p:cNvPr id="7" name="Content Placeholder 6"/>
           <p:cNvSpPr>
             <a:spLocks noGrp="1"/>
           </p:cNvSpPr>
           <p:nvPr>
-            <p:ph type="body" idx="1"/>
+            <p:ph idx="1"/>
           </p:nvPr>
         </p:nvSpPr>
         <p:spPr/>
@@ -47789,7 +47794,98 @@
           <a:bodyPr/>
           <a:lstStyle/>
           <a:p>
-            <a:endParaRPr lang="en-IN"/>
+            <a:r>
+              <a:rPr lang="en-IN" dirty="0" smtClean="0"/>
+              <a:t>A way to navigate between views when the user performs a operation</a:t>
+            </a:r>
+          </a:p>
+          <a:p>
+            <a:r>
+              <a:rPr lang="en-IN" dirty="0" smtClean="0"/>
+              <a:t>Generate a project with routing option</a:t>
+            </a:r>
+          </a:p>
+          <a:p>
+            <a:r>
+              <a:rPr lang="en-IN" dirty="0" smtClean="0"/>
+              <a:t>Generate Department List and Employee List Component</a:t>
+            </a:r>
+          </a:p>
+          <a:p>
+            <a:r>
+              <a:rPr lang="en-IN" dirty="0" smtClean="0"/>
+              <a:t>Configure the routes</a:t>
+            </a:r>
+          </a:p>
+          <a:p>
+            <a:r>
+              <a:rPr lang="en-IN" dirty="0" smtClean="0"/>
+              <a:t>Add Buttons and use directives to navigate</a:t>
+            </a:r>
+          </a:p>
+          <a:p>
+            <a:endParaRPr lang="en-IN" dirty="0"/>
+          </a:p>
+          <a:p>
+            <a:pPr marL="0" indent="0">
+              <a:buNone/>
+            </a:pPr>
+            <a:r>
+              <a:rPr lang="en-IN" dirty="0" smtClean="0"/>
+              <a:t>Create a component with inline template and inline style</a:t>
+            </a:r>
+          </a:p>
+          <a:p>
+            <a:pPr marL="0" indent="0">
+              <a:buNone/>
+            </a:pPr>
+            <a:r>
+              <a:rPr lang="en-IN" b="1" dirty="0">
+                <a:solidFill>
+                  <a:schemeClr val="accent1">
+                    <a:lumMod val="75000"/>
+                  </a:schemeClr>
+                </a:solidFill>
+              </a:rPr>
+              <a:t>n</a:t>
+            </a:r>
+            <a:r>
+              <a:rPr lang="en-IN" b="1" dirty="0" smtClean="0">
+                <a:solidFill>
+                  <a:schemeClr val="accent1">
+                    <a:lumMod val="75000"/>
+                  </a:schemeClr>
+                </a:solidFill>
+              </a:rPr>
+              <a:t>g g c </a:t>
+            </a:r>
+            <a:r>
+              <a:rPr lang="en-IN" b="1" dirty="0" err="1" smtClean="0">
+                <a:solidFill>
+                  <a:schemeClr val="accent1">
+                    <a:lumMod val="75000"/>
+                  </a:schemeClr>
+                </a:solidFill>
+              </a:rPr>
+              <a:t>emp</a:t>
+            </a:r>
+            <a:r>
+              <a:rPr lang="en-IN" b="1" dirty="0" smtClean="0">
+                <a:solidFill>
+                  <a:schemeClr val="accent1">
+                    <a:lumMod val="75000"/>
+                  </a:schemeClr>
+                </a:solidFill>
+              </a:rPr>
+              <a:t>-list –it -is</a:t>
+            </a:r>
+            <a:endParaRPr lang="en-IN" b="1" dirty="0">
+              <a:solidFill>
+                <a:schemeClr val="accent1">
+                  <a:lumMod val="75000"/>
+                </a:schemeClr>
+              </a:solidFill>
+            </a:endParaRPr>
           </a:p>
         </p:txBody>
       </p:sp>
@@ -47839,23 +47935,50 @@
           </a:p>
         </p:txBody>
       </p:sp>
+      <p:sp>
+        <p:nvSpPr>
+          <p:cNvPr id="8" name="TextBox 7"/>
+          <p:cNvSpPr txBox="1"/>
+          <p:nvPr/>
+        </p:nvSpPr>
+        <p:spPr>
+          <a:xfrm>
+            <a:off x="8240207" y="6019800"/>
+            <a:ext cx="3403496" cy="369332"/>
+          </a:xfrm>
+          <a:prstGeom prst="rect">
+            <a:avLst/>
+          </a:prstGeom>
+          <a:noFill/>
+        </p:spPr>
+        <p:txBody>
+          <a:bodyPr wrap="none" rtlCol="0">
+            <a:spAutoFit/>
+          </a:bodyPr>
+          <a:lstStyle/>
+          <a:p>
+            <a:r>
+              <a:rPr lang="en-IN" dirty="0"/>
+              <a:t>See Example </a:t>
+            </a:r>
+            <a:r>
+              <a:rPr lang="en-IN" dirty="0" smtClean="0"/>
+              <a:t>in next page….</a:t>
+            </a:r>
+            <a:endParaRPr lang="en-IN" dirty="0"/>
+          </a:p>
+        </p:txBody>
+      </p:sp>
     </p:spTree>
     <p:extLst>
       <p:ext uri="{BB962C8B-B14F-4D97-AF65-F5344CB8AC3E}">
-        <p14:creationId xmlns:p14="http://schemas.microsoft.com/office/powerpoint/2010/main" val="1922325626"/>
+        <p14:creationId xmlns:p14="http://schemas.microsoft.com/office/powerpoint/2010/main" val="4097238813"/>
       </p:ext>
     </p:extLst>
   </p:cSld>
   <p:clrMapOvr>
     <a:masterClrMapping/>
   </p:clrMapOvr>
-  <p:timing>
-    <p:tnLst>
-      <p:par>
-        <p:cTn id="1" dur="indefinite" restart="never" nodeType="tmRoot"/>
-      </p:par>
-    </p:tnLst>
-  </p:timing>
 </p:sld>
 </file>
 
@@ -47878,6 +48001,200 @@
       </p:grpSpPr>
       <p:sp>
         <p:nvSpPr>
+          <p:cNvPr id="4" name="Date Placeholder 3"/>
+          <p:cNvSpPr>
+            <a:spLocks noGrp="1"/>
+          </p:cNvSpPr>
+          <p:nvPr>
+            <p:ph type="dt" sz="half" idx="10"/>
+          </p:nvPr>
+        </p:nvSpPr>
+        <p:spPr/>
+        <p:txBody>
+          <a:bodyPr/>
+          <a:lstStyle/>
+          <a:p>
+            <a:r>
+              <a:rPr lang="en-US" smtClean="0"/>
+              <a:t>5/6/2019</a:t>
+            </a:r>
+            <a:endParaRPr lang="en-US" dirty="0"/>
+          </a:p>
+        </p:txBody>
+      </p:sp>
+      <p:sp>
+        <p:nvSpPr>
+          <p:cNvPr id="5" name="Slide Number Placeholder 4"/>
+          <p:cNvSpPr>
+            <a:spLocks noGrp="1"/>
+          </p:cNvSpPr>
+          <p:nvPr>
+            <p:ph type="sldNum" sz="quarter" idx="12"/>
+          </p:nvPr>
+        </p:nvSpPr>
+        <p:spPr/>
+        <p:txBody>
+          <a:bodyPr/>
+          <a:lstStyle/>
+          <a:p>
+            <a:fld id="{6D22F896-40B5-4ADD-8801-0D06FADFA095}" type="slidenum">
+              <a:rPr lang="en-US" smtClean="0"/>
+              <a:t>95</a:t>
+            </a:fld>
+            <a:endParaRPr lang="en-US" dirty="0"/>
+          </a:p>
+        </p:txBody>
+      </p:sp>
+      <p:pic>
+        <p:nvPicPr>
+          <p:cNvPr id="2" name="Picture 1"/>
+          <p:cNvPicPr>
+            <a:picLocks noChangeAspect="1"/>
+          </p:cNvPicPr>
+          <p:nvPr/>
+        </p:nvPicPr>
+        <p:blipFill>
+          <a:blip r:embed="rId2"/>
+          <a:stretch>
+            <a:fillRect/>
+          </a:stretch>
+        </p:blipFill>
+        <p:spPr>
+          <a:xfrm>
+            <a:off x="0" y="0"/>
+            <a:ext cx="6831106" cy="4518212"/>
+          </a:xfrm>
+          <a:prstGeom prst="rect">
+            <a:avLst/>
+          </a:prstGeom>
+          <a:ln>
+            <a:solidFill>
+              <a:schemeClr val="bg1"/>
+            </a:solidFill>
+          </a:ln>
+        </p:spPr>
+      </p:pic>
+      <p:pic>
+        <p:nvPicPr>
+          <p:cNvPr id="3" name="Picture 2"/>
+          <p:cNvPicPr>
+            <a:picLocks noChangeAspect="1"/>
+          </p:cNvPicPr>
+          <p:nvPr/>
+        </p:nvPicPr>
+        <p:blipFill>
+          <a:blip r:embed="rId3"/>
+          <a:stretch>
+            <a:fillRect/>
+          </a:stretch>
+        </p:blipFill>
+        <p:spPr>
+          <a:xfrm>
+            <a:off x="6802357" y="0"/>
+            <a:ext cx="5389643" cy="4510454"/>
+          </a:xfrm>
+          <a:prstGeom prst="rect">
+            <a:avLst/>
+          </a:prstGeom>
+          <a:ln>
+            <a:solidFill>
+              <a:schemeClr val="bg1"/>
+            </a:solidFill>
+          </a:ln>
+        </p:spPr>
+      </p:pic>
+      <p:pic>
+        <p:nvPicPr>
+          <p:cNvPr id="8" name="Picture 7"/>
+          <p:cNvPicPr>
+            <a:picLocks noChangeAspect="1"/>
+          </p:cNvPicPr>
+          <p:nvPr/>
+        </p:nvPicPr>
+        <p:blipFill>
+          <a:blip r:embed="rId4"/>
+          <a:stretch>
+            <a:fillRect/>
+          </a:stretch>
+        </p:blipFill>
+        <p:spPr>
+          <a:xfrm>
+            <a:off x="0" y="4510454"/>
+            <a:ext cx="8377518" cy="2347546"/>
+          </a:xfrm>
+          <a:prstGeom prst="rect">
+            <a:avLst/>
+          </a:prstGeom>
+          <a:ln>
+            <a:solidFill>
+              <a:schemeClr val="bg1"/>
+            </a:solidFill>
+          </a:ln>
+        </p:spPr>
+      </p:pic>
+      <p:pic>
+        <p:nvPicPr>
+          <p:cNvPr id="9" name="Picture 8"/>
+          <p:cNvPicPr>
+            <a:picLocks noChangeAspect="1"/>
+          </p:cNvPicPr>
+          <p:nvPr/>
+        </p:nvPicPr>
+        <p:blipFill>
+          <a:blip r:embed="rId5"/>
+          <a:stretch>
+            <a:fillRect/>
+          </a:stretch>
+        </p:blipFill>
+        <p:spPr>
+          <a:xfrm>
+            <a:off x="8588468" y="4615144"/>
+            <a:ext cx="3419475" cy="2009775"/>
+          </a:xfrm>
+          <a:prstGeom prst="rect">
+            <a:avLst/>
+          </a:prstGeom>
+          <a:ln>
+            <a:solidFill>
+              <a:schemeClr val="bg1">
+                <a:lumMod val="50000"/>
+              </a:schemeClr>
+            </a:solidFill>
+          </a:ln>
+        </p:spPr>
+      </p:pic>
+    </p:spTree>
+    <p:extLst>
+      <p:ext uri="{BB962C8B-B14F-4D97-AF65-F5344CB8AC3E}">
+        <p14:creationId xmlns:p14="http://schemas.microsoft.com/office/powerpoint/2010/main" val="2436196214"/>
+      </p:ext>
+    </p:extLst>
+  </p:cSld>
+  <p:clrMapOvr>
+    <a:masterClrMapping/>
+  </p:clrMapOvr>
+</p:sld>
+</file>
+
+<file path=ppt/slides/slide96.xml><?xml version="1.0" encoding="utf-8"?>
+<p:sld xmlns:a="http://schemas.openxmlformats.org/drawingml/2006/main" xmlns:r="http://schemas.openxmlformats.org/officeDocument/2006/relationships" xmlns:p="http://schemas.openxmlformats.org/presentationml/2006/main">
+  <p:cSld>
+    <p:spTree>
+      <p:nvGrpSpPr>
+        <p:cNvPr id="1" name=""/>
+        <p:cNvGrpSpPr/>
+        <p:nvPr/>
+      </p:nvGrpSpPr>
+      <p:grpSpPr>
+        <a:xfrm>
+          <a:off x="0" y="0"/>
+          <a:ext cx="0" cy="0"/>
+          <a:chOff x="0" y="0"/>
+          <a:chExt cx="0" cy="0"/>
+        </a:xfrm>
+      </p:grpSpPr>
+      <p:sp>
+        <p:nvSpPr>
           <p:cNvPr id="6" name="Title 5"/>
           <p:cNvSpPr>
             <a:spLocks noGrp="1"/>
@@ -47886,14 +48203,27 @@
             <p:ph type="title"/>
           </p:nvPr>
         </p:nvSpPr>
-        <p:spPr/>
+        <p:spPr>
+          <a:xfrm>
+            <a:off x="1154954" y="973668"/>
+            <a:ext cx="10140575" cy="706964"/>
+          </a:xfrm>
+        </p:spPr>
         <p:txBody>
           <a:bodyPr/>
           <a:lstStyle/>
           <a:p>
             <a:r>
               <a:rPr lang="en-IN" b="1" dirty="0" smtClean="0"/>
-              <a:t>22.1 Routing</a:t>
+              <a:t>23. </a:t>
+            </a:r>
+            <a:r>
+              <a:rPr lang="en-IN" b="1" dirty="0"/>
+              <a:t>Wildcard Route and Redirecting </a:t>
+            </a:r>
+            <a:r>
+              <a:rPr lang="en-IN" b="1" dirty="0" smtClean="0"/>
+              <a:t>Routes</a:t>
             </a:r>
             <a:endParaRPr lang="en-IN" b="1" dirty="0"/>
           </a:p>
@@ -48049,16 +48379,50 @@
           <a:p>
             <a:fld id="{6D22F896-40B5-4ADD-8801-0D06FADFA095}" type="slidenum">
               <a:rPr lang="en-US" smtClean="0"/>
-              <a:t>95</a:t>
+              <a:t>96</a:t>
             </a:fld>
             <a:endParaRPr lang="en-US" dirty="0"/>
+          </a:p>
+        </p:txBody>
+      </p:sp>
+      <p:sp>
+        <p:nvSpPr>
+          <p:cNvPr id="8" name="TextBox 7"/>
+          <p:cNvSpPr txBox="1"/>
+          <p:nvPr/>
+        </p:nvSpPr>
+        <p:spPr>
+          <a:xfrm>
+            <a:off x="8240207" y="6019800"/>
+            <a:ext cx="3403496" cy="369332"/>
+          </a:xfrm>
+          <a:prstGeom prst="rect">
+            <a:avLst/>
+          </a:prstGeom>
+          <a:noFill/>
+        </p:spPr>
+        <p:txBody>
+          <a:bodyPr wrap="none" rtlCol="0">
+            <a:spAutoFit/>
+          </a:bodyPr>
+          <a:lstStyle/>
+          <a:p>
+            <a:r>
+              <a:rPr lang="en-IN" dirty="0"/>
+              <a:t>See Example </a:t>
+            </a:r>
+            <a:r>
+              <a:rPr lang="en-IN" dirty="0" smtClean="0"/>
+              <a:t>in next page….</a:t>
+            </a:r>
+            <a:endParaRPr lang="en-IN" dirty="0"/>
           </a:p>
         </p:txBody>
       </p:sp>
     </p:spTree>
     <p:extLst>
       <p:ext uri="{BB962C8B-B14F-4D97-AF65-F5344CB8AC3E}">
-        <p14:creationId xmlns:p14="http://schemas.microsoft.com/office/powerpoint/2010/main" val="4097238813"/>
+        <p14:creationId xmlns:p14="http://schemas.microsoft.com/office/powerpoint/2010/main" val="3964286397"/>
       </p:ext>
     </p:extLst>
   </p:cSld>

</xml_diff>

<commit_message>
Added Wildcart and redirect routing
</commit_message>
<xml_diff>
--- a/Angular Presentation.pptx
+++ b/Angular Presentation.pptx
@@ -5,7 +5,7 @@
     <p:sldMasterId id="2147483723" r:id="rId1"/>
   </p:sldMasterIdLst>
   <p:notesMasterIdLst>
-    <p:notesMasterId r:id="rId98"/>
+    <p:notesMasterId r:id="rId101"/>
   </p:notesMasterIdLst>
   <p:sldIdLst>
     <p:sldId id="256" r:id="rId2"/>
@@ -104,6 +104,9 @@
     <p:sldId id="376" r:id="rId95"/>
     <p:sldId id="377" r:id="rId96"/>
     <p:sldId id="378" r:id="rId97"/>
+    <p:sldId id="379" r:id="rId98"/>
+    <p:sldId id="380" r:id="rId99"/>
+    <p:sldId id="381" r:id="rId100"/>
   </p:sldIdLst>
   <p:sldSz cx="12192000" cy="6858000"/>
   <p:notesSz cx="6858000" cy="9144000"/>
@@ -47768,12 +47771,8 @@
           <a:lstStyle/>
           <a:p>
             <a:r>
-              <a:rPr lang="en-IN" b="1" smtClean="0"/>
-              <a:t>22. </a:t>
-            </a:r>
-            <a:r>
               <a:rPr lang="en-IN" b="1" dirty="0" smtClean="0"/>
-              <a:t>Routing &amp; Navigation</a:t>
+              <a:t>22. Routing &amp; Navigation</a:t>
             </a:r>
             <a:endParaRPr lang="en-IN" b="1" dirty="0"/>
           </a:p>
@@ -48163,6 +48162,144 @@
           </a:ln>
         </p:spPr>
       </p:pic>
+      <p:sp>
+        <p:nvSpPr>
+          <p:cNvPr id="10" name="Rectangle 9"/>
+          <p:cNvSpPr/>
+          <p:nvPr/>
+        </p:nvSpPr>
+        <p:spPr>
+          <a:xfrm>
+            <a:off x="0" y="70956"/>
+            <a:ext cx="1448349" cy="224773"/>
+          </a:xfrm>
+          <a:prstGeom prst="rect">
+            <a:avLst/>
+          </a:prstGeom>
+          <a:noFill/>
+          <a:ln w="28575">
+            <a:solidFill>
+              <a:srgbClr val="FFFF00"/>
+            </a:solidFill>
+          </a:ln>
+        </p:spPr>
+        <p:style>
+          <a:lnRef idx="2">
+            <a:schemeClr val="accent1">
+              <a:shade val="50000"/>
+            </a:schemeClr>
+          </a:lnRef>
+          <a:fillRef idx="1">
+            <a:schemeClr val="accent1"/>
+          </a:fillRef>
+          <a:effectRef idx="0">
+            <a:schemeClr val="accent1"/>
+          </a:effectRef>
+          <a:fontRef idx="minor">
+            <a:schemeClr val="lt1"/>
+          </a:fontRef>
+        </p:style>
+        <p:txBody>
+          <a:bodyPr rtlCol="0" anchor="ctr"/>
+          <a:lstStyle/>
+          <a:p>
+            <a:pPr algn="ctr"/>
+            <a:endParaRPr lang="en-IN"/>
+          </a:p>
+        </p:txBody>
+      </p:sp>
+      <p:sp>
+        <p:nvSpPr>
+          <p:cNvPr id="11" name="Rectangle 10"/>
+          <p:cNvSpPr/>
+          <p:nvPr/>
+        </p:nvSpPr>
+        <p:spPr>
+          <a:xfrm>
+            <a:off x="45000" y="4581410"/>
+            <a:ext cx="1196983" cy="224773"/>
+          </a:xfrm>
+          <a:prstGeom prst="rect">
+            <a:avLst/>
+          </a:prstGeom>
+          <a:noFill/>
+          <a:ln w="28575">
+            <a:solidFill>
+              <a:srgbClr val="FFFF00"/>
+            </a:solidFill>
+          </a:ln>
+        </p:spPr>
+        <p:style>
+          <a:lnRef idx="2">
+            <a:schemeClr val="accent1">
+              <a:shade val="50000"/>
+            </a:schemeClr>
+          </a:lnRef>
+          <a:fillRef idx="1">
+            <a:schemeClr val="accent1"/>
+          </a:fillRef>
+          <a:effectRef idx="0">
+            <a:schemeClr val="accent1"/>
+          </a:effectRef>
+          <a:fontRef idx="minor">
+            <a:schemeClr val="lt1"/>
+          </a:fontRef>
+        </p:style>
+        <p:txBody>
+          <a:bodyPr rtlCol="0" anchor="ctr"/>
+          <a:lstStyle/>
+          <a:p>
+            <a:pPr algn="ctr"/>
+            <a:endParaRPr lang="en-IN"/>
+          </a:p>
+        </p:txBody>
+      </p:sp>
+      <p:sp>
+        <p:nvSpPr>
+          <p:cNvPr id="12" name="Rectangle 11"/>
+          <p:cNvSpPr/>
+          <p:nvPr/>
+        </p:nvSpPr>
+        <p:spPr>
+          <a:xfrm>
+            <a:off x="6841167" y="70955"/>
+            <a:ext cx="899311" cy="224773"/>
+          </a:xfrm>
+          <a:prstGeom prst="rect">
+            <a:avLst/>
+          </a:prstGeom>
+          <a:noFill/>
+          <a:ln w="28575">
+            <a:solidFill>
+              <a:srgbClr val="FFFF00"/>
+            </a:solidFill>
+          </a:ln>
+        </p:spPr>
+        <p:style>
+          <a:lnRef idx="2">
+            <a:schemeClr val="accent1">
+              <a:shade val="50000"/>
+            </a:schemeClr>
+          </a:lnRef>
+          <a:fillRef idx="1">
+            <a:schemeClr val="accent1"/>
+          </a:fillRef>
+          <a:effectRef idx="0">
+            <a:schemeClr val="accent1"/>
+          </a:effectRef>
+          <a:fontRef idx="minor">
+            <a:schemeClr val="lt1"/>
+          </a:fontRef>
+        </p:style>
+        <p:txBody>
+          <a:bodyPr rtlCol="0" anchor="ctr"/>
+          <a:lstStyle/>
+          <a:p>
+            <a:pPr algn="ctr"/>
+            <a:endParaRPr lang="en-IN"/>
+          </a:p>
+        </p:txBody>
+      </p:sp>
     </p:spTree>
     <p:extLst>
       <p:ext uri="{BB962C8B-B14F-4D97-AF65-F5344CB8AC3E}">
@@ -48219,11 +48356,11 @@
             </a:r>
             <a:r>
               <a:rPr lang="en-IN" b="1" dirty="0"/>
-              <a:t>Wildcard Route and Redirecting </a:t>
+              <a:t>Wildcard </a:t>
             </a:r>
             <a:r>
               <a:rPr lang="en-IN" b="1" dirty="0" smtClean="0"/>
-              <a:t>Routes</a:t>
+              <a:t>Route</a:t>
             </a:r>
             <a:endParaRPr lang="en-IN" b="1" dirty="0"/>
           </a:p>
@@ -48246,94 +48383,67 @@
           <a:p>
             <a:r>
               <a:rPr lang="en-IN" dirty="0" smtClean="0"/>
-              <a:t>A way to navigate between views when the user performs a operation</a:t>
-            </a:r>
-          </a:p>
-          <a:p>
-            <a:r>
-              <a:rPr lang="en-IN" dirty="0" smtClean="0"/>
-              <a:t>Generate a project with routing option</a:t>
-            </a:r>
-          </a:p>
-          <a:p>
-            <a:r>
-              <a:rPr lang="en-IN" dirty="0" smtClean="0"/>
-              <a:t>Generate Department List and Employee List Component</a:t>
-            </a:r>
-          </a:p>
-          <a:p>
-            <a:r>
-              <a:rPr lang="en-IN" dirty="0" smtClean="0"/>
-              <a:t>Configure the routes</a:t>
-            </a:r>
-          </a:p>
-          <a:p>
-            <a:r>
-              <a:rPr lang="en-IN" dirty="0" smtClean="0"/>
-              <a:t>Add Buttons and use directives to navigate</a:t>
-            </a:r>
-          </a:p>
-          <a:p>
-            <a:endParaRPr lang="en-IN" dirty="0"/>
-          </a:p>
-          <a:p>
-            <a:pPr marL="0" indent="0">
-              <a:buNone/>
-            </a:pPr>
-            <a:r>
-              <a:rPr lang="en-IN" dirty="0" smtClean="0"/>
-              <a:t>Create a component with inline template and inline style</a:t>
-            </a:r>
-          </a:p>
-          <a:p>
-            <a:pPr marL="0" indent="0">
-              <a:buNone/>
-            </a:pPr>
-            <a:r>
-              <a:rPr lang="en-IN" b="1" dirty="0">
+              <a:t>We have configured two routes to access two components. What if the user typed a route which is not present. </a:t>
+            </a:r>
+            <a:r>
+              <a:rPr lang="en-IN" dirty="0" smtClean="0">
                 <a:solidFill>
-                  <a:schemeClr val="accent1">
-                    <a:lumMod val="75000"/>
-                  </a:schemeClr>
+                  <a:schemeClr val="tx1"/>
                 </a:solidFill>
               </a:rPr>
-              <a:t>n</a:t>
-            </a:r>
-            <a:r>
-              <a:rPr lang="en-IN" b="1" dirty="0" smtClean="0">
+              <a:t>It will through an error. </a:t>
+            </a:r>
+          </a:p>
+          <a:p>
+            <a:r>
+              <a:rPr lang="en-IN" dirty="0" smtClean="0">
                 <a:solidFill>
-                  <a:schemeClr val="accent1">
-                    <a:lumMod val="75000"/>
-                  </a:schemeClr>
+                  <a:schemeClr val="tx1"/>
                 </a:solidFill>
               </a:rPr>
-              <a:t>g g c </a:t>
-            </a:r>
-            <a:r>
-              <a:rPr lang="en-IN" b="1" dirty="0" err="1" smtClean="0">
+              <a:t>For that we have to configure a page not found for this scenario</a:t>
+            </a:r>
+          </a:p>
+          <a:p>
+            <a:r>
+              <a:rPr lang="en-IN" dirty="0" smtClean="0">
                 <a:solidFill>
-                  <a:schemeClr val="accent1">
-                    <a:lumMod val="75000"/>
-                  </a:schemeClr>
+                  <a:schemeClr val="tx1"/>
                 </a:solidFill>
               </a:rPr>
-              <a:t>emp</a:t>
-            </a:r>
-            <a:r>
-              <a:rPr lang="en-IN" b="1" dirty="0" smtClean="0">
+              <a:t>Generate a component as page-not-found</a:t>
+            </a:r>
+          </a:p>
+          <a:p>
+            <a:r>
+              <a:rPr lang="en-IN" dirty="0" smtClean="0">
                 <a:solidFill>
-                  <a:schemeClr val="accent1">
-                    <a:lumMod val="75000"/>
-                  </a:schemeClr>
+                  <a:schemeClr val="tx1"/>
                 </a:solidFill>
               </a:rPr>
-              <a:t>-list –it -is</a:t>
-            </a:r>
-            <a:endParaRPr lang="en-IN" b="1" dirty="0">
+              <a:t>Add a new path in route array saying ** to Page not found component</a:t>
+            </a:r>
+          </a:p>
+          <a:p>
+            <a:r>
+              <a:rPr lang="en-IN" dirty="0" smtClean="0">
+                <a:solidFill>
+                  <a:schemeClr val="tx1"/>
+                </a:solidFill>
+              </a:rPr>
+              <a:t>We have to only modify the </a:t>
+            </a:r>
+            <a:r>
+              <a:rPr lang="en-IN" dirty="0" err="1" smtClean="0">
+                <a:solidFill>
+                  <a:schemeClr val="tx1"/>
+                </a:solidFill>
+              </a:rPr>
+              <a:t>app.routing.ts</a:t>
+            </a:r>
+            <a:endParaRPr lang="en-IN" dirty="0">
               <a:solidFill>
-                <a:schemeClr val="accent1">
-                  <a:lumMod val="75000"/>
-                </a:schemeClr>
+                <a:schemeClr val="tx1"/>
               </a:solidFill>
             </a:endParaRPr>
           </a:p>
@@ -48423,6 +48533,977 @@
     <p:extLst>
       <p:ext uri="{BB962C8B-B14F-4D97-AF65-F5344CB8AC3E}">
         <p14:creationId xmlns:p14="http://schemas.microsoft.com/office/powerpoint/2010/main" val="3964286397"/>
+      </p:ext>
+    </p:extLst>
+  </p:cSld>
+  <p:clrMapOvr>
+    <a:masterClrMapping/>
+  </p:clrMapOvr>
+</p:sld>
+</file>
+
+<file path=ppt/slides/slide97.xml><?xml version="1.0" encoding="utf-8"?>
+<p:sld xmlns:a="http://schemas.openxmlformats.org/drawingml/2006/main" xmlns:r="http://schemas.openxmlformats.org/officeDocument/2006/relationships" xmlns:p="http://schemas.openxmlformats.org/presentationml/2006/main">
+  <p:cSld>
+    <p:spTree>
+      <p:nvGrpSpPr>
+        <p:cNvPr id="1" name=""/>
+        <p:cNvGrpSpPr/>
+        <p:nvPr/>
+      </p:nvGrpSpPr>
+      <p:grpSpPr>
+        <a:xfrm>
+          <a:off x="0" y="0"/>
+          <a:ext cx="0" cy="0"/>
+          <a:chOff x="0" y="0"/>
+          <a:chExt cx="0" cy="0"/>
+        </a:xfrm>
+      </p:grpSpPr>
+      <p:sp>
+        <p:nvSpPr>
+          <p:cNvPr id="4" name="Date Placeholder 3"/>
+          <p:cNvSpPr>
+            <a:spLocks noGrp="1"/>
+          </p:cNvSpPr>
+          <p:nvPr>
+            <p:ph type="dt" sz="half" idx="10"/>
+          </p:nvPr>
+        </p:nvSpPr>
+        <p:spPr/>
+        <p:txBody>
+          <a:bodyPr/>
+          <a:lstStyle/>
+          <a:p>
+            <a:r>
+              <a:rPr lang="en-US" smtClean="0"/>
+              <a:t>5/6/2019</a:t>
+            </a:r>
+            <a:endParaRPr lang="en-US" dirty="0"/>
+          </a:p>
+        </p:txBody>
+      </p:sp>
+      <p:sp>
+        <p:nvSpPr>
+          <p:cNvPr id="5" name="Slide Number Placeholder 4"/>
+          <p:cNvSpPr>
+            <a:spLocks noGrp="1"/>
+          </p:cNvSpPr>
+          <p:nvPr>
+            <p:ph type="sldNum" sz="quarter" idx="12"/>
+          </p:nvPr>
+        </p:nvSpPr>
+        <p:spPr/>
+        <p:txBody>
+          <a:bodyPr/>
+          <a:lstStyle/>
+          <a:p>
+            <a:fld id="{6D22F896-40B5-4ADD-8801-0D06FADFA095}" type="slidenum">
+              <a:rPr lang="en-US" smtClean="0"/>
+              <a:t>97</a:t>
+            </a:fld>
+            <a:endParaRPr lang="en-US" dirty="0"/>
+          </a:p>
+        </p:txBody>
+      </p:sp>
+      <p:pic>
+        <p:nvPicPr>
+          <p:cNvPr id="6" name="Picture 5"/>
+          <p:cNvPicPr>
+            <a:picLocks noChangeAspect="1"/>
+          </p:cNvPicPr>
+          <p:nvPr/>
+        </p:nvPicPr>
+        <p:blipFill>
+          <a:blip r:embed="rId2"/>
+          <a:stretch>
+            <a:fillRect/>
+          </a:stretch>
+        </p:blipFill>
+        <p:spPr>
+          <a:xfrm>
+            <a:off x="0" y="0"/>
+            <a:ext cx="8705850" cy="4972050"/>
+          </a:xfrm>
+          <a:prstGeom prst="rect">
+            <a:avLst/>
+          </a:prstGeom>
+        </p:spPr>
+      </p:pic>
+      <p:pic>
+        <p:nvPicPr>
+          <p:cNvPr id="7" name="Picture 6"/>
+          <p:cNvPicPr>
+            <a:picLocks noChangeAspect="1"/>
+          </p:cNvPicPr>
+          <p:nvPr/>
+        </p:nvPicPr>
+        <p:blipFill>
+          <a:blip r:embed="rId3"/>
+          <a:stretch>
+            <a:fillRect/>
+          </a:stretch>
+        </p:blipFill>
+        <p:spPr>
+          <a:xfrm>
+            <a:off x="7321363" y="2200275"/>
+            <a:ext cx="3600450" cy="2000250"/>
+          </a:xfrm>
+          <a:prstGeom prst="rect">
+            <a:avLst/>
+          </a:prstGeom>
+          <a:ln w="12700">
+            <a:solidFill>
+              <a:srgbClr val="FF0000"/>
+            </a:solidFill>
+          </a:ln>
+        </p:spPr>
+      </p:pic>
+      <p:sp>
+        <p:nvSpPr>
+          <p:cNvPr id="8" name="Rectangle 7"/>
+          <p:cNvSpPr/>
+          <p:nvPr/>
+        </p:nvSpPr>
+        <p:spPr>
+          <a:xfrm>
+            <a:off x="0" y="70956"/>
+            <a:ext cx="1448349" cy="224773"/>
+          </a:xfrm>
+          <a:prstGeom prst="rect">
+            <a:avLst/>
+          </a:prstGeom>
+          <a:noFill/>
+          <a:ln w="28575">
+            <a:solidFill>
+              <a:srgbClr val="FFFF00"/>
+            </a:solidFill>
+          </a:ln>
+        </p:spPr>
+        <p:style>
+          <a:lnRef idx="2">
+            <a:schemeClr val="accent1">
+              <a:shade val="50000"/>
+            </a:schemeClr>
+          </a:lnRef>
+          <a:fillRef idx="1">
+            <a:schemeClr val="accent1"/>
+          </a:fillRef>
+          <a:effectRef idx="0">
+            <a:schemeClr val="accent1"/>
+          </a:effectRef>
+          <a:fontRef idx="minor">
+            <a:schemeClr val="lt1"/>
+          </a:fontRef>
+        </p:style>
+        <p:txBody>
+          <a:bodyPr rtlCol="0" anchor="ctr"/>
+          <a:lstStyle/>
+          <a:p>
+            <a:pPr algn="ctr"/>
+            <a:endParaRPr lang="en-IN"/>
+          </a:p>
+        </p:txBody>
+      </p:sp>
+      <p:sp>
+        <p:nvSpPr>
+          <p:cNvPr id="9" name="Rectangle 8"/>
+          <p:cNvSpPr/>
+          <p:nvPr/>
+        </p:nvSpPr>
+        <p:spPr>
+          <a:xfrm>
+            <a:off x="724174" y="1246899"/>
+            <a:ext cx="7787814" cy="271053"/>
+          </a:xfrm>
+          <a:prstGeom prst="rect">
+            <a:avLst/>
+          </a:prstGeom>
+          <a:noFill/>
+          <a:ln w="28575">
+            <a:solidFill>
+              <a:schemeClr val="bg1"/>
+            </a:solidFill>
+          </a:ln>
+        </p:spPr>
+        <p:style>
+          <a:lnRef idx="2">
+            <a:schemeClr val="accent1">
+              <a:shade val="50000"/>
+            </a:schemeClr>
+          </a:lnRef>
+          <a:fillRef idx="1">
+            <a:schemeClr val="accent1"/>
+          </a:fillRef>
+          <a:effectRef idx="0">
+            <a:schemeClr val="accent1"/>
+          </a:effectRef>
+          <a:fontRef idx="minor">
+            <a:schemeClr val="lt1"/>
+          </a:fontRef>
+        </p:style>
+        <p:txBody>
+          <a:bodyPr rtlCol="0" anchor="ctr"/>
+          <a:lstStyle/>
+          <a:p>
+            <a:pPr algn="ctr"/>
+            <a:endParaRPr lang="en-IN"/>
+          </a:p>
+        </p:txBody>
+      </p:sp>
+      <p:sp>
+        <p:nvSpPr>
+          <p:cNvPr id="10" name="Rectangle 9"/>
+          <p:cNvSpPr/>
+          <p:nvPr/>
+        </p:nvSpPr>
+        <p:spPr>
+          <a:xfrm>
+            <a:off x="918036" y="2393616"/>
+            <a:ext cx="4756637" cy="255455"/>
+          </a:xfrm>
+          <a:prstGeom prst="rect">
+            <a:avLst/>
+          </a:prstGeom>
+          <a:noFill/>
+          <a:ln w="28575">
+            <a:solidFill>
+              <a:schemeClr val="bg1"/>
+            </a:solidFill>
+          </a:ln>
+        </p:spPr>
+        <p:style>
+          <a:lnRef idx="2">
+            <a:schemeClr val="accent1">
+              <a:shade val="50000"/>
+            </a:schemeClr>
+          </a:lnRef>
+          <a:fillRef idx="1">
+            <a:schemeClr val="accent1"/>
+          </a:fillRef>
+          <a:effectRef idx="0">
+            <a:schemeClr val="accent1"/>
+          </a:effectRef>
+          <a:fontRef idx="minor">
+            <a:schemeClr val="lt1"/>
+          </a:fontRef>
+        </p:style>
+        <p:txBody>
+          <a:bodyPr rtlCol="0" anchor="ctr"/>
+          <a:lstStyle/>
+          <a:p>
+            <a:pPr algn="ctr"/>
+            <a:endParaRPr lang="en-IN"/>
+          </a:p>
+        </p:txBody>
+      </p:sp>
+      <p:sp>
+        <p:nvSpPr>
+          <p:cNvPr id="11" name="Rectangle 10"/>
+          <p:cNvSpPr/>
+          <p:nvPr/>
+        </p:nvSpPr>
+        <p:spPr>
+          <a:xfrm>
+            <a:off x="4548923" y="4455499"/>
+            <a:ext cx="2165459" cy="250972"/>
+          </a:xfrm>
+          <a:prstGeom prst="rect">
+            <a:avLst/>
+          </a:prstGeom>
+          <a:noFill/>
+          <a:ln w="28575">
+            <a:solidFill>
+              <a:schemeClr val="bg1"/>
+            </a:solidFill>
+          </a:ln>
+        </p:spPr>
+        <p:style>
+          <a:lnRef idx="2">
+            <a:schemeClr val="accent1">
+              <a:shade val="50000"/>
+            </a:schemeClr>
+          </a:lnRef>
+          <a:fillRef idx="1">
+            <a:schemeClr val="accent1"/>
+          </a:fillRef>
+          <a:effectRef idx="0">
+            <a:schemeClr val="accent1"/>
+          </a:effectRef>
+          <a:fontRef idx="minor">
+            <a:schemeClr val="lt1"/>
+          </a:fontRef>
+        </p:style>
+        <p:txBody>
+          <a:bodyPr rtlCol="0" anchor="ctr"/>
+          <a:lstStyle/>
+          <a:p>
+            <a:pPr algn="ctr"/>
+            <a:endParaRPr lang="en-IN"/>
+          </a:p>
+        </p:txBody>
+      </p:sp>
+      <p:sp>
+        <p:nvSpPr>
+          <p:cNvPr id="12" name="Rectangle 11"/>
+          <p:cNvSpPr/>
+          <p:nvPr/>
+        </p:nvSpPr>
+        <p:spPr>
+          <a:xfrm>
+            <a:off x="9834750" y="2266750"/>
+            <a:ext cx="324581" cy="210434"/>
+          </a:xfrm>
+          <a:prstGeom prst="rect">
+            <a:avLst/>
+          </a:prstGeom>
+          <a:noFill/>
+          <a:ln w="28575">
+            <a:solidFill>
+              <a:schemeClr val="accent1">
+                <a:lumMod val="50000"/>
+              </a:schemeClr>
+            </a:solidFill>
+          </a:ln>
+        </p:spPr>
+        <p:style>
+          <a:lnRef idx="2">
+            <a:schemeClr val="accent1">
+              <a:shade val="50000"/>
+            </a:schemeClr>
+          </a:lnRef>
+          <a:fillRef idx="1">
+            <a:schemeClr val="accent1"/>
+          </a:fillRef>
+          <a:effectRef idx="0">
+            <a:schemeClr val="accent1"/>
+          </a:effectRef>
+          <a:fontRef idx="minor">
+            <a:schemeClr val="lt1"/>
+          </a:fontRef>
+        </p:style>
+        <p:txBody>
+          <a:bodyPr rtlCol="0" anchor="ctr"/>
+          <a:lstStyle/>
+          <a:p>
+            <a:pPr algn="ctr"/>
+            <a:endParaRPr lang="en-IN"/>
+          </a:p>
+        </p:txBody>
+      </p:sp>
+      <p:sp>
+        <p:nvSpPr>
+          <p:cNvPr id="13" name="Rectangle 12"/>
+          <p:cNvSpPr/>
+          <p:nvPr/>
+        </p:nvSpPr>
+        <p:spPr>
+          <a:xfrm>
+            <a:off x="7341612" y="3798910"/>
+            <a:ext cx="1466212" cy="208314"/>
+          </a:xfrm>
+          <a:prstGeom prst="rect">
+            <a:avLst/>
+          </a:prstGeom>
+          <a:noFill/>
+          <a:ln w="28575">
+            <a:solidFill>
+              <a:schemeClr val="accent1">
+                <a:lumMod val="50000"/>
+              </a:schemeClr>
+            </a:solidFill>
+          </a:ln>
+        </p:spPr>
+        <p:style>
+          <a:lnRef idx="2">
+            <a:schemeClr val="accent1">
+              <a:shade val="50000"/>
+            </a:schemeClr>
+          </a:lnRef>
+          <a:fillRef idx="1">
+            <a:schemeClr val="accent1"/>
+          </a:fillRef>
+          <a:effectRef idx="0">
+            <a:schemeClr val="accent1"/>
+          </a:effectRef>
+          <a:fontRef idx="minor">
+            <a:schemeClr val="lt1"/>
+          </a:fontRef>
+        </p:style>
+        <p:txBody>
+          <a:bodyPr rtlCol="0" anchor="ctr"/>
+          <a:lstStyle/>
+          <a:p>
+            <a:pPr algn="ctr"/>
+            <a:endParaRPr lang="en-IN"/>
+          </a:p>
+        </p:txBody>
+      </p:sp>
+    </p:spTree>
+    <p:extLst>
+      <p:ext uri="{BB962C8B-B14F-4D97-AF65-F5344CB8AC3E}">
+        <p14:creationId xmlns:p14="http://schemas.microsoft.com/office/powerpoint/2010/main" val="2076367754"/>
+      </p:ext>
+    </p:extLst>
+  </p:cSld>
+  <p:clrMapOvr>
+    <a:masterClrMapping/>
+  </p:clrMapOvr>
+</p:sld>
+</file>
+
+<file path=ppt/slides/slide98.xml><?xml version="1.0" encoding="utf-8"?>
+<p:sld xmlns:a="http://schemas.openxmlformats.org/drawingml/2006/main" xmlns:r="http://schemas.openxmlformats.org/officeDocument/2006/relationships" xmlns:p="http://schemas.openxmlformats.org/presentationml/2006/main">
+  <p:cSld>
+    <p:spTree>
+      <p:nvGrpSpPr>
+        <p:cNvPr id="1" name=""/>
+        <p:cNvGrpSpPr/>
+        <p:nvPr/>
+      </p:nvGrpSpPr>
+      <p:grpSpPr>
+        <a:xfrm>
+          <a:off x="0" y="0"/>
+          <a:ext cx="0" cy="0"/>
+          <a:chOff x="0" y="0"/>
+          <a:chExt cx="0" cy="0"/>
+        </a:xfrm>
+      </p:grpSpPr>
+      <p:sp>
+        <p:nvSpPr>
+          <p:cNvPr id="6" name="Title 5"/>
+          <p:cNvSpPr>
+            <a:spLocks noGrp="1"/>
+          </p:cNvSpPr>
+          <p:nvPr>
+            <p:ph type="title"/>
+          </p:nvPr>
+        </p:nvSpPr>
+        <p:spPr>
+          <a:xfrm>
+            <a:off x="1154954" y="973668"/>
+            <a:ext cx="10140575" cy="706964"/>
+          </a:xfrm>
+        </p:spPr>
+        <p:txBody>
+          <a:bodyPr/>
+          <a:lstStyle/>
+          <a:p>
+            <a:r>
+              <a:rPr lang="en-IN" b="1" dirty="0" smtClean="0"/>
+              <a:t>24. Redirect Route</a:t>
+            </a:r>
+            <a:endParaRPr lang="en-IN" b="1" dirty="0"/>
+          </a:p>
+        </p:txBody>
+      </p:sp>
+      <p:sp>
+        <p:nvSpPr>
+          <p:cNvPr id="7" name="Content Placeholder 6"/>
+          <p:cNvSpPr>
+            <a:spLocks noGrp="1"/>
+          </p:cNvSpPr>
+          <p:nvPr>
+            <p:ph idx="1"/>
+          </p:nvPr>
+        </p:nvSpPr>
+        <p:spPr>
+          <a:xfrm>
+            <a:off x="1154954" y="2603500"/>
+            <a:ext cx="8825659" cy="2183653"/>
+          </a:xfrm>
+        </p:spPr>
+        <p:txBody>
+          <a:bodyPr>
+            <a:normAutofit/>
+          </a:bodyPr>
+          <a:lstStyle/>
+          <a:p>
+            <a:r>
+              <a:rPr lang="en-IN" sz="2000" dirty="0" smtClean="0">
+                <a:solidFill>
+                  <a:schemeClr val="tx1"/>
+                </a:solidFill>
+              </a:rPr>
+              <a:t>This will be used to when a URL need to redirect to another URL</a:t>
+            </a:r>
+          </a:p>
+          <a:p>
+            <a:r>
+              <a:rPr lang="en-IN" sz="2000" dirty="0" smtClean="0">
+                <a:solidFill>
+                  <a:schemeClr val="tx1"/>
+                </a:solidFill>
+              </a:rPr>
+              <a:t>This contain a attribute called </a:t>
+            </a:r>
+            <a:r>
+              <a:rPr lang="en-IN" sz="2000" b="1" dirty="0" err="1" smtClean="0">
+                <a:solidFill>
+                  <a:schemeClr val="tx1"/>
+                </a:solidFill>
+              </a:rPr>
+              <a:t>pathMatch</a:t>
+            </a:r>
+            <a:r>
+              <a:rPr lang="en-IN" sz="2000" dirty="0" smtClean="0">
+                <a:solidFill>
+                  <a:schemeClr val="tx1"/>
+                </a:solidFill>
+              </a:rPr>
+              <a:t>. This holds value like</a:t>
+            </a:r>
+          </a:p>
+          <a:p>
+            <a:pPr lvl="1"/>
+            <a:r>
+              <a:rPr lang="en-IN" sz="1800" dirty="0" smtClean="0">
+                <a:solidFill>
+                  <a:schemeClr val="tx1"/>
+                </a:solidFill>
+              </a:rPr>
+              <a:t>Prefix: This will redirect all the URL except defined to the redirected one. No ** path will work.  That also will get redirect to given one</a:t>
+            </a:r>
+          </a:p>
+          <a:p>
+            <a:pPr lvl="1"/>
+            <a:r>
+              <a:rPr lang="en-IN" sz="1800" dirty="0" smtClean="0">
+                <a:solidFill>
+                  <a:schemeClr val="tx1"/>
+                </a:solidFill>
+              </a:rPr>
+              <a:t>Full: This will redirect only the particular </a:t>
+            </a:r>
+            <a:r>
+              <a:rPr lang="en-IN" sz="1800" dirty="0" err="1" smtClean="0">
+                <a:solidFill>
+                  <a:schemeClr val="tx1"/>
+                </a:solidFill>
+              </a:rPr>
+              <a:t>url</a:t>
+            </a:r>
+            <a:r>
+              <a:rPr lang="en-IN" sz="1800" dirty="0" smtClean="0">
+                <a:solidFill>
+                  <a:schemeClr val="tx1"/>
+                </a:solidFill>
+              </a:rPr>
+              <a:t> to the redirected one.</a:t>
+            </a:r>
+            <a:endParaRPr lang="en-IN" sz="1800" dirty="0">
+              <a:solidFill>
+                <a:schemeClr val="tx1"/>
+              </a:solidFill>
+            </a:endParaRPr>
+          </a:p>
+        </p:txBody>
+      </p:sp>
+      <p:sp>
+        <p:nvSpPr>
+          <p:cNvPr id="4" name="Date Placeholder 3"/>
+          <p:cNvSpPr>
+            <a:spLocks noGrp="1"/>
+          </p:cNvSpPr>
+          <p:nvPr>
+            <p:ph type="dt" sz="half" idx="10"/>
+          </p:nvPr>
+        </p:nvSpPr>
+        <p:spPr/>
+        <p:txBody>
+          <a:bodyPr/>
+          <a:lstStyle/>
+          <a:p>
+            <a:r>
+              <a:rPr lang="en-US" smtClean="0"/>
+              <a:t>5/6/2019</a:t>
+            </a:r>
+            <a:endParaRPr lang="en-US" dirty="0"/>
+          </a:p>
+        </p:txBody>
+      </p:sp>
+      <p:sp>
+        <p:nvSpPr>
+          <p:cNvPr id="5" name="Slide Number Placeholder 4"/>
+          <p:cNvSpPr>
+            <a:spLocks noGrp="1"/>
+          </p:cNvSpPr>
+          <p:nvPr>
+            <p:ph type="sldNum" sz="quarter" idx="12"/>
+          </p:nvPr>
+        </p:nvSpPr>
+        <p:spPr/>
+        <p:txBody>
+          <a:bodyPr/>
+          <a:lstStyle/>
+          <a:p>
+            <a:fld id="{6D22F896-40B5-4ADD-8801-0D06FADFA095}" type="slidenum">
+              <a:rPr lang="en-US" smtClean="0"/>
+              <a:t>98</a:t>
+            </a:fld>
+            <a:endParaRPr lang="en-US" dirty="0"/>
+          </a:p>
+        </p:txBody>
+      </p:sp>
+      <p:sp>
+        <p:nvSpPr>
+          <p:cNvPr id="8" name="TextBox 7"/>
+          <p:cNvSpPr txBox="1"/>
+          <p:nvPr/>
+        </p:nvSpPr>
+        <p:spPr>
+          <a:xfrm>
+            <a:off x="8240207" y="6019800"/>
+            <a:ext cx="3403496" cy="369332"/>
+          </a:xfrm>
+          <a:prstGeom prst="rect">
+            <a:avLst/>
+          </a:prstGeom>
+          <a:noFill/>
+        </p:spPr>
+        <p:txBody>
+          <a:bodyPr wrap="none" rtlCol="0">
+            <a:spAutoFit/>
+          </a:bodyPr>
+          <a:lstStyle/>
+          <a:p>
+            <a:r>
+              <a:rPr lang="en-IN" dirty="0"/>
+              <a:t>See Example </a:t>
+            </a:r>
+            <a:r>
+              <a:rPr lang="en-IN" dirty="0" smtClean="0"/>
+              <a:t>in next page….</a:t>
+            </a:r>
+            <a:endParaRPr lang="en-IN" dirty="0"/>
+          </a:p>
+        </p:txBody>
+      </p:sp>
+    </p:spTree>
+    <p:extLst>
+      <p:ext uri="{BB962C8B-B14F-4D97-AF65-F5344CB8AC3E}">
+        <p14:creationId xmlns:p14="http://schemas.microsoft.com/office/powerpoint/2010/main" val="4124312514"/>
+      </p:ext>
+    </p:extLst>
+  </p:cSld>
+  <p:clrMapOvr>
+    <a:masterClrMapping/>
+  </p:clrMapOvr>
+</p:sld>
+</file>
+
+<file path=ppt/slides/slide99.xml><?xml version="1.0" encoding="utf-8"?>
+<p:sld xmlns:a="http://schemas.openxmlformats.org/drawingml/2006/main" xmlns:r="http://schemas.openxmlformats.org/officeDocument/2006/relationships" xmlns:p="http://schemas.openxmlformats.org/presentationml/2006/main">
+  <p:cSld>
+    <p:spTree>
+      <p:nvGrpSpPr>
+        <p:cNvPr id="1" name=""/>
+        <p:cNvGrpSpPr/>
+        <p:nvPr/>
+      </p:nvGrpSpPr>
+      <p:grpSpPr>
+        <a:xfrm>
+          <a:off x="0" y="0"/>
+          <a:ext cx="0" cy="0"/>
+          <a:chOff x="0" y="0"/>
+          <a:chExt cx="0" cy="0"/>
+        </a:xfrm>
+      </p:grpSpPr>
+      <p:sp>
+        <p:nvSpPr>
+          <p:cNvPr id="4" name="Date Placeholder 3"/>
+          <p:cNvSpPr>
+            <a:spLocks noGrp="1"/>
+          </p:cNvSpPr>
+          <p:nvPr>
+            <p:ph type="dt" sz="half" idx="10"/>
+          </p:nvPr>
+        </p:nvSpPr>
+        <p:spPr/>
+        <p:txBody>
+          <a:bodyPr/>
+          <a:lstStyle/>
+          <a:p>
+            <a:r>
+              <a:rPr lang="en-US" smtClean="0"/>
+              <a:t>5/6/2019</a:t>
+            </a:r>
+            <a:endParaRPr lang="en-US" dirty="0"/>
+          </a:p>
+        </p:txBody>
+      </p:sp>
+      <p:sp>
+        <p:nvSpPr>
+          <p:cNvPr id="5" name="Slide Number Placeholder 4"/>
+          <p:cNvSpPr>
+            <a:spLocks noGrp="1"/>
+          </p:cNvSpPr>
+          <p:nvPr>
+            <p:ph type="sldNum" sz="quarter" idx="12"/>
+          </p:nvPr>
+        </p:nvSpPr>
+        <p:spPr/>
+        <p:txBody>
+          <a:bodyPr/>
+          <a:lstStyle/>
+          <a:p>
+            <a:fld id="{6D22F896-40B5-4ADD-8801-0D06FADFA095}" type="slidenum">
+              <a:rPr lang="en-US" smtClean="0"/>
+              <a:t>99</a:t>
+            </a:fld>
+            <a:endParaRPr lang="en-US" dirty="0"/>
+          </a:p>
+        </p:txBody>
+      </p:sp>
+      <p:pic>
+        <p:nvPicPr>
+          <p:cNvPr id="6" name="Picture 5"/>
+          <p:cNvPicPr>
+            <a:picLocks noChangeAspect="1"/>
+          </p:cNvPicPr>
+          <p:nvPr/>
+        </p:nvPicPr>
+        <p:blipFill>
+          <a:blip r:embed="rId2"/>
+          <a:stretch>
+            <a:fillRect/>
+          </a:stretch>
+        </p:blipFill>
+        <p:spPr>
+          <a:xfrm>
+            <a:off x="13447" y="0"/>
+            <a:ext cx="8629650" cy="5419725"/>
+          </a:xfrm>
+          <a:prstGeom prst="rect">
+            <a:avLst/>
+          </a:prstGeom>
+        </p:spPr>
+      </p:pic>
+      <p:sp>
+        <p:nvSpPr>
+          <p:cNvPr id="7" name="Rectangle 6"/>
+          <p:cNvSpPr/>
+          <p:nvPr/>
+        </p:nvSpPr>
+        <p:spPr>
+          <a:xfrm>
+            <a:off x="0" y="70956"/>
+            <a:ext cx="1448349" cy="224773"/>
+          </a:xfrm>
+          <a:prstGeom prst="rect">
+            <a:avLst/>
+          </a:prstGeom>
+          <a:noFill/>
+          <a:ln w="28575">
+            <a:solidFill>
+              <a:srgbClr val="FFFF00"/>
+            </a:solidFill>
+          </a:ln>
+        </p:spPr>
+        <p:style>
+          <a:lnRef idx="2">
+            <a:schemeClr val="accent1">
+              <a:shade val="50000"/>
+            </a:schemeClr>
+          </a:lnRef>
+          <a:fillRef idx="1">
+            <a:schemeClr val="accent1"/>
+          </a:fillRef>
+          <a:effectRef idx="0">
+            <a:schemeClr val="accent1"/>
+          </a:effectRef>
+          <a:fontRef idx="minor">
+            <a:schemeClr val="lt1"/>
+          </a:fontRef>
+        </p:style>
+        <p:txBody>
+          <a:bodyPr rtlCol="0" anchor="ctr"/>
+          <a:lstStyle/>
+          <a:p>
+            <a:pPr algn="ctr"/>
+            <a:endParaRPr lang="en-IN"/>
+          </a:p>
+        </p:txBody>
+      </p:sp>
+      <p:sp>
+        <p:nvSpPr>
+          <p:cNvPr id="8" name="Rectangle 7"/>
+          <p:cNvSpPr/>
+          <p:nvPr/>
+        </p:nvSpPr>
+        <p:spPr>
+          <a:xfrm>
+            <a:off x="904589" y="1936416"/>
+            <a:ext cx="5549999" cy="268902"/>
+          </a:xfrm>
+          <a:prstGeom prst="rect">
+            <a:avLst/>
+          </a:prstGeom>
+          <a:noFill/>
+          <a:ln w="28575">
+            <a:solidFill>
+              <a:schemeClr val="bg1"/>
+            </a:solidFill>
+          </a:ln>
+        </p:spPr>
+        <p:style>
+          <a:lnRef idx="2">
+            <a:schemeClr val="accent1">
+              <a:shade val="50000"/>
+            </a:schemeClr>
+          </a:lnRef>
+          <a:fillRef idx="1">
+            <a:schemeClr val="accent1"/>
+          </a:fillRef>
+          <a:effectRef idx="0">
+            <a:schemeClr val="accent1"/>
+          </a:effectRef>
+          <a:fontRef idx="minor">
+            <a:schemeClr val="lt1"/>
+          </a:fontRef>
+        </p:style>
+        <p:txBody>
+          <a:bodyPr rtlCol="0" anchor="ctr"/>
+          <a:lstStyle/>
+          <a:p>
+            <a:pPr algn="ctr"/>
+            <a:endParaRPr lang="en-IN"/>
+          </a:p>
+        </p:txBody>
+      </p:sp>
+      <p:pic>
+        <p:nvPicPr>
+          <p:cNvPr id="9" name="Picture 8"/>
+          <p:cNvPicPr>
+            <a:picLocks noChangeAspect="1"/>
+          </p:cNvPicPr>
+          <p:nvPr/>
+        </p:nvPicPr>
+        <p:blipFill>
+          <a:blip r:embed="rId3"/>
+          <a:stretch>
+            <a:fillRect/>
+          </a:stretch>
+        </p:blipFill>
+        <p:spPr>
+          <a:xfrm>
+            <a:off x="8657090" y="1252818"/>
+            <a:ext cx="3390900" cy="1905000"/>
+          </a:xfrm>
+          <a:prstGeom prst="rect">
+            <a:avLst/>
+          </a:prstGeom>
+          <a:ln>
+            <a:solidFill>
+              <a:schemeClr val="accent1">
+                <a:lumMod val="50000"/>
+              </a:schemeClr>
+            </a:solidFill>
+          </a:ln>
+        </p:spPr>
+      </p:pic>
+      <p:sp>
+        <p:nvSpPr>
+          <p:cNvPr id="10" name="TextBox 9"/>
+          <p:cNvSpPr txBox="1"/>
+          <p:nvPr/>
+        </p:nvSpPr>
+        <p:spPr>
+          <a:xfrm>
+            <a:off x="8944943" y="3117477"/>
+            <a:ext cx="2815194" cy="276999"/>
+          </a:xfrm>
+          <a:prstGeom prst="rect">
+            <a:avLst/>
+          </a:prstGeom>
+          <a:noFill/>
+        </p:spPr>
+        <p:txBody>
+          <a:bodyPr wrap="none" rtlCol="0">
+            <a:spAutoFit/>
+          </a:bodyPr>
+          <a:lstStyle/>
+          <a:p>
+            <a:r>
+              <a:rPr lang="en-IN" sz="1200" b="1" dirty="0" smtClean="0"/>
+              <a:t>Home page redirected to /</a:t>
+            </a:r>
+            <a:r>
+              <a:rPr lang="en-IN" sz="1200" b="1" dirty="0" err="1" smtClean="0"/>
+              <a:t>dept</a:t>
+            </a:r>
+            <a:r>
+              <a:rPr lang="en-IN" sz="1200" b="1" dirty="0" smtClean="0"/>
+              <a:t>-list</a:t>
+            </a:r>
+            <a:endParaRPr lang="en-IN" sz="1200" b="1" dirty="0"/>
+          </a:p>
+        </p:txBody>
+      </p:sp>
+      <p:pic>
+        <p:nvPicPr>
+          <p:cNvPr id="11" name="Picture 10"/>
+          <p:cNvPicPr>
+            <a:picLocks noChangeAspect="1"/>
+          </p:cNvPicPr>
+          <p:nvPr/>
+        </p:nvPicPr>
+        <p:blipFill>
+          <a:blip r:embed="rId4"/>
+          <a:stretch>
+            <a:fillRect/>
+          </a:stretch>
+        </p:blipFill>
+        <p:spPr>
+          <a:xfrm>
+            <a:off x="8656544" y="4101265"/>
+            <a:ext cx="3295650" cy="1885950"/>
+          </a:xfrm>
+          <a:prstGeom prst="rect">
+            <a:avLst/>
+          </a:prstGeom>
+          <a:ln>
+            <a:solidFill>
+              <a:schemeClr val="accent1">
+                <a:lumMod val="50000"/>
+              </a:schemeClr>
+            </a:solidFill>
+          </a:ln>
+        </p:spPr>
+      </p:pic>
+      <p:sp>
+        <p:nvSpPr>
+          <p:cNvPr id="12" name="TextBox 11"/>
+          <p:cNvSpPr txBox="1"/>
+          <p:nvPr/>
+        </p:nvSpPr>
+        <p:spPr>
+          <a:xfrm>
+            <a:off x="8566337" y="5996209"/>
+            <a:ext cx="3558988" cy="276999"/>
+          </a:xfrm>
+          <a:prstGeom prst="rect">
+            <a:avLst/>
+          </a:prstGeom>
+          <a:noFill/>
+        </p:spPr>
+        <p:txBody>
+          <a:bodyPr wrap="none" rtlCol="0">
+            <a:spAutoFit/>
+          </a:bodyPr>
+          <a:lstStyle/>
+          <a:p>
+            <a:r>
+              <a:rPr lang="en-IN" sz="1200" b="1" dirty="0" smtClean="0"/>
+              <a:t>Undefined URL redirected to /page-not-found</a:t>
+            </a:r>
+            <a:endParaRPr lang="en-IN" sz="1200" b="1" dirty="0"/>
+          </a:p>
+        </p:txBody>
+      </p:sp>
+    </p:spTree>
+    <p:extLst>
+      <p:ext uri="{BB962C8B-B14F-4D97-AF65-F5344CB8AC3E}">
+        <p14:creationId xmlns:p14="http://schemas.microsoft.com/office/powerpoint/2010/main" val="593954457"/>
       </p:ext>
     </p:extLst>
   </p:cSld>

</xml_diff>